<commit_message>
RocketMQ简介.pptx by qiyu 2021-04-26
</commit_message>
<xml_diff>
--- a/doc/RocketMQ简介.pptx
+++ b/doc/RocketMQ简介.pptx
@@ -12,19 +12,20 @@
     <p:sldId id="268" r:id="rId6"/>
     <p:sldId id="270" r:id="rId7"/>
     <p:sldId id="276" r:id="rId8"/>
-    <p:sldId id="272" r:id="rId9"/>
-    <p:sldId id="264" r:id="rId10"/>
-    <p:sldId id="265" r:id="rId11"/>
-    <p:sldId id="271" r:id="rId12"/>
-    <p:sldId id="260" r:id="rId13"/>
-    <p:sldId id="277" r:id="rId14"/>
-    <p:sldId id="273" r:id="rId15"/>
-    <p:sldId id="274" r:id="rId16"/>
-    <p:sldId id="262" r:id="rId17"/>
-    <p:sldId id="266" r:id="rId18"/>
-    <p:sldId id="261" r:id="rId19"/>
-    <p:sldId id="263" r:id="rId20"/>
-    <p:sldId id="267" r:id="rId21"/>
+    <p:sldId id="278" r:id="rId9"/>
+    <p:sldId id="272" r:id="rId10"/>
+    <p:sldId id="264" r:id="rId11"/>
+    <p:sldId id="265" r:id="rId12"/>
+    <p:sldId id="271" r:id="rId13"/>
+    <p:sldId id="260" r:id="rId14"/>
+    <p:sldId id="277" r:id="rId15"/>
+    <p:sldId id="273" r:id="rId16"/>
+    <p:sldId id="274" r:id="rId17"/>
+    <p:sldId id="262" r:id="rId18"/>
+    <p:sldId id="266" r:id="rId19"/>
+    <p:sldId id="261" r:id="rId20"/>
+    <p:sldId id="263" r:id="rId21"/>
+    <p:sldId id="267" r:id="rId22"/>
   </p:sldIdLst>
   <p:sldSz cx="12192000" cy="6858000"/>
   <p:notesSz cx="6858000" cy="9144000"/>
@@ -7747,7 +7748,7 @@
           <p:cNvPr id="2" name="标题 1">
             <a:extLst>
               <a:ext uri="{FF2B5EF4-FFF2-40B4-BE49-F238E27FC236}">
-                <a16:creationId xmlns:a16="http://schemas.microsoft.com/office/drawing/2014/main" id="{F89226ED-61C1-F845-8DA6-35D525BDBFCF}"/>
+                <a16:creationId xmlns:a16="http://schemas.microsoft.com/office/drawing/2014/main" id="{93913AE2-AC33-9149-966D-E50C42CFAADC}"/>
               </a:ext>
             </a:extLst>
           </p:cNvPr>
@@ -7769,7 +7770,7 @@
             </a:r>
             <a:r>
               <a:rPr kumimoji="1" lang="zh-CN" altLang="en-US" dirty="0"/>
-              <a:t>存储机制</a:t>
+              <a:t>负载均衡机制</a:t>
             </a:r>
           </a:p>
         </p:txBody>
@@ -7779,7 +7780,7 @@
           <p:cNvPr id="3" name="内容占位符 2">
             <a:extLst>
               <a:ext uri="{FF2B5EF4-FFF2-40B4-BE49-F238E27FC236}">
-                <a16:creationId xmlns:a16="http://schemas.microsoft.com/office/drawing/2014/main" id="{AE5F12A1-20A1-794B-9048-4A83D4115FD9}"/>
+                <a16:creationId xmlns:a16="http://schemas.microsoft.com/office/drawing/2014/main" id="{6890FC5C-9645-6F41-83AB-4707FC922C3C}"/>
               </a:ext>
             </a:extLst>
           </p:cNvPr>
@@ -7795,14 +7796,14 @@
           <a:bodyPr/>
           <a:lstStyle/>
           <a:p>
-            <a:endParaRPr kumimoji="1" lang="zh-CN" altLang="en-US" dirty="0"/>
+            <a:endParaRPr kumimoji="1" lang="zh-CN" altLang="en-US"/>
           </a:p>
         </p:txBody>
       </p:sp>
     </p:spTree>
     <p:extLst>
       <p:ext uri="{BB962C8B-B14F-4D97-AF65-F5344CB8AC3E}">
-        <p14:creationId xmlns:p14="http://schemas.microsoft.com/office/powerpoint/2010/main" val="3262638319"/>
+        <p14:creationId xmlns:p14="http://schemas.microsoft.com/office/powerpoint/2010/main" val="1446558323"/>
       </p:ext>
     </p:extLst>
   </p:cSld>
@@ -7834,7 +7835,7 @@
           <p:cNvPr id="2" name="标题 1">
             <a:extLst>
               <a:ext uri="{FF2B5EF4-FFF2-40B4-BE49-F238E27FC236}">
-                <a16:creationId xmlns:a16="http://schemas.microsoft.com/office/drawing/2014/main" id="{B747197F-2F66-3B42-8078-0CD639AFC1E8}"/>
+                <a16:creationId xmlns:a16="http://schemas.microsoft.com/office/drawing/2014/main" id="{F89226ED-61C1-F845-8DA6-35D525BDBFCF}"/>
               </a:ext>
             </a:extLst>
           </p:cNvPr>
@@ -7856,7 +7857,7 @@
             </a:r>
             <a:r>
               <a:rPr kumimoji="1" lang="zh-CN" altLang="en-US" dirty="0"/>
-              <a:t>延迟消息</a:t>
+              <a:t>存储机制</a:t>
             </a:r>
           </a:p>
         </p:txBody>
@@ -7866,7 +7867,7 @@
           <p:cNvPr id="3" name="内容占位符 2">
             <a:extLst>
               <a:ext uri="{FF2B5EF4-FFF2-40B4-BE49-F238E27FC236}">
-                <a16:creationId xmlns:a16="http://schemas.microsoft.com/office/drawing/2014/main" id="{0343B139-4D01-8C40-8CC0-AD4696002E32}"/>
+                <a16:creationId xmlns:a16="http://schemas.microsoft.com/office/drawing/2014/main" id="{AE5F12A1-20A1-794B-9048-4A83D4115FD9}"/>
               </a:ext>
             </a:extLst>
           </p:cNvPr>
@@ -7889,7 +7890,7 @@
     </p:spTree>
     <p:extLst>
       <p:ext uri="{BB962C8B-B14F-4D97-AF65-F5344CB8AC3E}">
-        <p14:creationId xmlns:p14="http://schemas.microsoft.com/office/powerpoint/2010/main" val="4063166106"/>
+        <p14:creationId xmlns:p14="http://schemas.microsoft.com/office/powerpoint/2010/main" val="3262638319"/>
       </p:ext>
     </p:extLst>
   </p:cSld>
@@ -7921,6 +7922,93 @@
           <p:cNvPr id="2" name="标题 1">
             <a:extLst>
               <a:ext uri="{FF2B5EF4-FFF2-40B4-BE49-F238E27FC236}">
+                <a16:creationId xmlns:a16="http://schemas.microsoft.com/office/drawing/2014/main" id="{B747197F-2F66-3B42-8078-0CD639AFC1E8}"/>
+              </a:ext>
+            </a:extLst>
+          </p:cNvPr>
+          <p:cNvSpPr>
+            <a:spLocks noGrp="1"/>
+          </p:cNvSpPr>
+          <p:nvPr>
+            <p:ph type="title"/>
+          </p:nvPr>
+        </p:nvSpPr>
+        <p:spPr/>
+        <p:txBody>
+          <a:bodyPr/>
+          <a:lstStyle/>
+          <a:p>
+            <a:r>
+              <a:rPr kumimoji="1" lang="en-US" altLang="zh-CN" dirty="0" err="1"/>
+              <a:t>RocketMQ</a:t>
+            </a:r>
+            <a:r>
+              <a:rPr kumimoji="1" lang="zh-CN" altLang="en-US" dirty="0"/>
+              <a:t>延迟消息</a:t>
+            </a:r>
+          </a:p>
+        </p:txBody>
+      </p:sp>
+      <p:sp>
+        <p:nvSpPr>
+          <p:cNvPr id="3" name="内容占位符 2">
+            <a:extLst>
+              <a:ext uri="{FF2B5EF4-FFF2-40B4-BE49-F238E27FC236}">
+                <a16:creationId xmlns:a16="http://schemas.microsoft.com/office/drawing/2014/main" id="{0343B139-4D01-8C40-8CC0-AD4696002E32}"/>
+              </a:ext>
+            </a:extLst>
+          </p:cNvPr>
+          <p:cNvSpPr>
+            <a:spLocks noGrp="1"/>
+          </p:cNvSpPr>
+          <p:nvPr>
+            <p:ph idx="1"/>
+          </p:nvPr>
+        </p:nvSpPr>
+        <p:spPr/>
+        <p:txBody>
+          <a:bodyPr/>
+          <a:lstStyle/>
+          <a:p>
+            <a:endParaRPr kumimoji="1" lang="zh-CN" altLang="en-US" dirty="0"/>
+          </a:p>
+        </p:txBody>
+      </p:sp>
+    </p:spTree>
+    <p:extLst>
+      <p:ext uri="{BB962C8B-B14F-4D97-AF65-F5344CB8AC3E}">
+        <p14:creationId xmlns:p14="http://schemas.microsoft.com/office/powerpoint/2010/main" val="4063166106"/>
+      </p:ext>
+    </p:extLst>
+  </p:cSld>
+  <p:clrMapOvr>
+    <a:masterClrMapping/>
+  </p:clrMapOvr>
+</p:sld>
+</file>
+
+<file path=ppt/slides/slide13.xml><?xml version="1.0" encoding="utf-8"?>
+<p:sld xmlns:a="http://schemas.openxmlformats.org/drawingml/2006/main" xmlns:r="http://schemas.openxmlformats.org/officeDocument/2006/relationships" xmlns:p="http://schemas.openxmlformats.org/presentationml/2006/main">
+  <p:cSld>
+    <p:spTree>
+      <p:nvGrpSpPr>
+        <p:cNvPr id="1" name=""/>
+        <p:cNvGrpSpPr/>
+        <p:nvPr/>
+      </p:nvGrpSpPr>
+      <p:grpSpPr>
+        <a:xfrm>
+          <a:off x="0" y="0"/>
+          <a:ext cx="0" cy="0"/>
+          <a:chOff x="0" y="0"/>
+          <a:chExt cx="0" cy="0"/>
+        </a:xfrm>
+      </p:grpSpPr>
+      <p:sp>
+        <p:nvSpPr>
+          <p:cNvPr id="2" name="标题 1">
+            <a:extLst>
+              <a:ext uri="{FF2B5EF4-FFF2-40B4-BE49-F238E27FC236}">
                 <a16:creationId xmlns:a16="http://schemas.microsoft.com/office/drawing/2014/main" id="{63A09A91-A650-9D4B-BE61-62F8F8FF4EE8}"/>
               </a:ext>
             </a:extLst>
@@ -7963,7 +8051,7 @@
 </p:sld>
 </file>
 
-<file path=ppt/slides/slide13.xml><?xml version="1.0" encoding="utf-8"?>
+<file path=ppt/slides/slide14.xml><?xml version="1.0" encoding="utf-8"?>
 <p:sld xmlns:a="http://schemas.openxmlformats.org/drawingml/2006/main" xmlns:r="http://schemas.openxmlformats.org/officeDocument/2006/relationships" xmlns:p="http://schemas.openxmlformats.org/presentationml/2006/main">
   <p:cSld>
     <p:spTree>
@@ -8279,109 +8367,6 @@
 </p:sld>
 </file>
 
-<file path=ppt/slides/slide14.xml><?xml version="1.0" encoding="utf-8"?>
-<p:sld xmlns:a="http://schemas.openxmlformats.org/drawingml/2006/main" xmlns:r="http://schemas.openxmlformats.org/officeDocument/2006/relationships" xmlns:p="http://schemas.openxmlformats.org/presentationml/2006/main">
-  <p:cSld>
-    <p:spTree>
-      <p:nvGrpSpPr>
-        <p:cNvPr id="1" name=""/>
-        <p:cNvGrpSpPr/>
-        <p:nvPr/>
-      </p:nvGrpSpPr>
-      <p:grpSpPr>
-        <a:xfrm>
-          <a:off x="0" y="0"/>
-          <a:ext cx="0" cy="0"/>
-          <a:chOff x="0" y="0"/>
-          <a:chExt cx="0" cy="0"/>
-        </a:xfrm>
-      </p:grpSpPr>
-      <p:sp>
-        <p:nvSpPr>
-          <p:cNvPr id="2" name="标题 1">
-            <a:extLst>
-              <a:ext uri="{FF2B5EF4-FFF2-40B4-BE49-F238E27FC236}">
-                <a16:creationId xmlns:a16="http://schemas.microsoft.com/office/drawing/2014/main" id="{2A6980E2-634B-844C-B1B3-0CF020D27789}"/>
-              </a:ext>
-            </a:extLst>
-          </p:cNvPr>
-          <p:cNvSpPr>
-            <a:spLocks noGrp="1"/>
-          </p:cNvSpPr>
-          <p:nvPr>
-            <p:ph type="title"/>
-          </p:nvPr>
-        </p:nvSpPr>
-        <p:spPr/>
-        <p:txBody>
-          <a:bodyPr/>
-          <a:lstStyle/>
-          <a:p>
-            <a:r>
-              <a:rPr kumimoji="1" lang="en-US" altLang="zh-CN" dirty="0" err="1"/>
-              <a:t>RocketMQ</a:t>
-            </a:r>
-            <a:r>
-              <a:rPr kumimoji="1" lang="zh-CN" altLang="en-US" dirty="0"/>
-              <a:t>中</a:t>
-            </a:r>
-            <a:r>
-              <a:rPr kumimoji="1" lang="en-US" altLang="zh-CN" dirty="0" err="1"/>
-              <a:t>readQueue</a:t>
-            </a:r>
-            <a:r>
-              <a:rPr kumimoji="1" lang="zh-CN" altLang="en-US" dirty="0"/>
-              <a:t>和</a:t>
-            </a:r>
-            <a:r>
-              <a:rPr kumimoji="1" lang="en-US" altLang="zh-CN" dirty="0" err="1"/>
-              <a:t>WriteQueue</a:t>
-            </a:r>
-            <a:r>
-              <a:rPr kumimoji="1" lang="zh-CN" altLang="en-US" dirty="0"/>
-              <a:t>的概念</a:t>
-            </a:r>
-          </a:p>
-        </p:txBody>
-      </p:sp>
-      <p:sp>
-        <p:nvSpPr>
-          <p:cNvPr id="3" name="内容占位符 2">
-            <a:extLst>
-              <a:ext uri="{FF2B5EF4-FFF2-40B4-BE49-F238E27FC236}">
-                <a16:creationId xmlns:a16="http://schemas.microsoft.com/office/drawing/2014/main" id="{956746AE-E5A1-A543-890F-738B3C9CA93D}"/>
-              </a:ext>
-            </a:extLst>
-          </p:cNvPr>
-          <p:cNvSpPr>
-            <a:spLocks noGrp="1"/>
-          </p:cNvSpPr>
-          <p:nvPr>
-            <p:ph idx="1"/>
-          </p:nvPr>
-        </p:nvSpPr>
-        <p:spPr/>
-        <p:txBody>
-          <a:bodyPr/>
-          <a:lstStyle/>
-          <a:p>
-            <a:endParaRPr kumimoji="1" lang="zh-CN" altLang="en-US" dirty="0"/>
-          </a:p>
-        </p:txBody>
-      </p:sp>
-    </p:spTree>
-    <p:extLst>
-      <p:ext uri="{BB962C8B-B14F-4D97-AF65-F5344CB8AC3E}">
-        <p14:creationId xmlns:p14="http://schemas.microsoft.com/office/powerpoint/2010/main" val="2821253259"/>
-      </p:ext>
-    </p:extLst>
-  </p:cSld>
-  <p:clrMapOvr>
-    <a:masterClrMapping/>
-  </p:clrMapOvr>
-</p:sld>
-</file>
-
 <file path=ppt/slides/slide15.xml><?xml version="1.0" encoding="utf-8"?>
 <p:sld xmlns:a="http://schemas.openxmlformats.org/drawingml/2006/main" xmlns:r="http://schemas.openxmlformats.org/officeDocument/2006/relationships" xmlns:p="http://schemas.openxmlformats.org/presentationml/2006/main">
   <p:cSld>
@@ -8404,7 +8389,7 @@
           <p:cNvPr id="2" name="标题 1">
             <a:extLst>
               <a:ext uri="{FF2B5EF4-FFF2-40B4-BE49-F238E27FC236}">
-                <a16:creationId xmlns:a16="http://schemas.microsoft.com/office/drawing/2014/main" id="{C8EB042B-53C7-134F-B631-E706405B5E7C}"/>
+                <a16:creationId xmlns:a16="http://schemas.microsoft.com/office/drawing/2014/main" id="{2A6980E2-634B-844C-B1B3-0CF020D27789}"/>
               </a:ext>
             </a:extLst>
           </p:cNvPr>
@@ -8421,24 +8406,28 @@
           <a:lstStyle/>
           <a:p>
             <a:r>
+              <a:rPr kumimoji="1" lang="en-US" altLang="zh-CN" dirty="0" err="1"/>
+              <a:t>RocketMQ</a:t>
+            </a:r>
+            <a:r>
               <a:rPr kumimoji="1" lang="zh-CN" altLang="en-US" dirty="0"/>
-              <a:t>如果同一个消费者组的</a:t>
-            </a:r>
-            <a:r>
-              <a:rPr kumimoji="1" lang="en-US" altLang="zh-CN" dirty="0"/>
-              <a:t>Consumer</a:t>
+              <a:t>中</a:t>
+            </a:r>
+            <a:r>
+              <a:rPr kumimoji="1" lang="en-US" altLang="zh-CN" dirty="0" err="1"/>
+              <a:t>readQueue</a:t>
             </a:r>
             <a:r>
               <a:rPr kumimoji="1" lang="zh-CN" altLang="en-US" dirty="0"/>
-              <a:t>订阅了不同的</a:t>
-            </a:r>
-            <a:r>
-              <a:rPr kumimoji="1" lang="en-US" altLang="zh-CN" dirty="0"/>
-              <a:t>Topic</a:t>
+              <a:t>和</a:t>
+            </a:r>
+            <a:r>
+              <a:rPr kumimoji="1" lang="en-US" altLang="zh-CN" dirty="0" err="1"/>
+              <a:t>WriteQueue</a:t>
             </a:r>
             <a:r>
               <a:rPr kumimoji="1" lang="zh-CN" altLang="en-US" dirty="0"/>
-              <a:t>会怎么样？</a:t>
+              <a:t>的概念</a:t>
             </a:r>
           </a:p>
         </p:txBody>
@@ -8448,7 +8437,7 @@
           <p:cNvPr id="3" name="内容占位符 2">
             <a:extLst>
               <a:ext uri="{FF2B5EF4-FFF2-40B4-BE49-F238E27FC236}">
-                <a16:creationId xmlns:a16="http://schemas.microsoft.com/office/drawing/2014/main" id="{84841515-8274-AF4C-AAC2-F331F93B097B}"/>
+                <a16:creationId xmlns:a16="http://schemas.microsoft.com/office/drawing/2014/main" id="{956746AE-E5A1-A543-890F-738B3C9CA93D}"/>
               </a:ext>
             </a:extLst>
           </p:cNvPr>
@@ -8464,9 +8453,6 @@
           <a:bodyPr/>
           <a:lstStyle/>
           <a:p>
-            <a:pPr marL="0" indent="0">
-              <a:buNone/>
-            </a:pPr>
             <a:endParaRPr kumimoji="1" lang="zh-CN" altLang="en-US" dirty="0"/>
           </a:p>
         </p:txBody>
@@ -8474,7 +8460,7 @@
     </p:spTree>
     <p:extLst>
       <p:ext uri="{BB962C8B-B14F-4D97-AF65-F5344CB8AC3E}">
-        <p14:creationId xmlns:p14="http://schemas.microsoft.com/office/powerpoint/2010/main" val="2767276358"/>
+        <p14:creationId xmlns:p14="http://schemas.microsoft.com/office/powerpoint/2010/main" val="2821253259"/>
       </p:ext>
     </p:extLst>
   </p:cSld>
@@ -8506,7 +8492,7 @@
           <p:cNvPr id="2" name="标题 1">
             <a:extLst>
               <a:ext uri="{FF2B5EF4-FFF2-40B4-BE49-F238E27FC236}">
-                <a16:creationId xmlns:a16="http://schemas.microsoft.com/office/drawing/2014/main" id="{4605813C-1C8D-684C-972E-A7B35E17B52C}"/>
+                <a16:creationId xmlns:a16="http://schemas.microsoft.com/office/drawing/2014/main" id="{C8EB042B-53C7-134F-B631-E706405B5E7C}"/>
               </a:ext>
             </a:extLst>
           </p:cNvPr>
@@ -8524,23 +8510,23 @@
           <a:p>
             <a:r>
               <a:rPr kumimoji="1" lang="zh-CN" altLang="en-US" dirty="0"/>
-              <a:t>引入</a:t>
-            </a:r>
-            <a:r>
-              <a:rPr kumimoji="1" lang="en-US" altLang="zh-CN" dirty="0" err="1"/>
-              <a:t>RocketMQ</a:t>
+              <a:t>如果同一个消费者组的</a:t>
+            </a:r>
+            <a:r>
+              <a:rPr kumimoji="1" lang="en-US" altLang="zh-CN" dirty="0"/>
+              <a:t>Consumer</a:t>
             </a:r>
             <a:r>
               <a:rPr kumimoji="1" lang="zh-CN" altLang="en-US" dirty="0"/>
-              <a:t>（</a:t>
+              <a:t>订阅了不同的</a:t>
             </a:r>
             <a:r>
               <a:rPr kumimoji="1" lang="en-US" altLang="zh-CN" dirty="0"/>
-              <a:t>MQ</a:t>
+              <a:t>Topic</a:t>
             </a:r>
             <a:r>
               <a:rPr kumimoji="1" lang="zh-CN" altLang="en-US" dirty="0"/>
-              <a:t>）带来的问题</a:t>
+              <a:t>会怎么样？</a:t>
             </a:r>
           </a:p>
         </p:txBody>
@@ -8550,7 +8536,7 @@
           <p:cNvPr id="3" name="内容占位符 2">
             <a:extLst>
               <a:ext uri="{FF2B5EF4-FFF2-40B4-BE49-F238E27FC236}">
-                <a16:creationId xmlns:a16="http://schemas.microsoft.com/office/drawing/2014/main" id="{148033EE-4F04-5048-9BEC-24DDFAEE6177}"/>
+                <a16:creationId xmlns:a16="http://schemas.microsoft.com/office/drawing/2014/main" id="{84841515-8274-AF4C-AAC2-F331F93B097B}"/>
               </a:ext>
             </a:extLst>
           </p:cNvPr>
@@ -8561,151 +8547,22 @@
             <p:ph idx="1"/>
           </p:nvPr>
         </p:nvSpPr>
-        <p:spPr>
-          <a:xfrm>
-            <a:off x="2589212" y="1643974"/>
-            <a:ext cx="8915400" cy="4267248"/>
-          </a:xfrm>
-        </p:spPr>
-        <p:txBody>
-          <a:bodyPr>
-            <a:normAutofit lnSpcReduction="10000"/>
-          </a:bodyPr>
+        <p:spPr/>
+        <p:txBody>
+          <a:bodyPr/>
           <a:lstStyle/>
           <a:p>
-            <a:r>
-              <a:rPr kumimoji="1" lang="en-US" altLang="zh-CN" dirty="0"/>
-              <a:t> </a:t>
-            </a:r>
-            <a:r>
-              <a:rPr kumimoji="1" lang="zh-CN" altLang="en-US" dirty="0"/>
-              <a:t>增加了中间件，也就增加了单点故障的可能性。</a:t>
-            </a:r>
-            <a:endParaRPr kumimoji="1" lang="en-US" altLang="zh-CN" dirty="0"/>
-          </a:p>
-          <a:p>
-            <a:r>
-              <a:rPr kumimoji="1" lang="zh-CN" altLang="en-US" dirty="0"/>
-              <a:t>通过消息队列的形式属于异步形式，无法同步获取返回值。</a:t>
-            </a:r>
-            <a:endParaRPr kumimoji="1" lang="en-US" altLang="zh-CN" dirty="0"/>
-          </a:p>
-          <a:p>
-            <a:r>
-              <a:rPr kumimoji="1" lang="zh-CN" altLang="en-US" dirty="0"/>
-              <a:t>解决思路：</a:t>
-            </a:r>
-            <a:endParaRPr kumimoji="1" lang="en-US" altLang="zh-CN" dirty="0"/>
-          </a:p>
-          <a:p>
-            <a:r>
-              <a:rPr kumimoji="1" lang="en-US" altLang="zh-CN" dirty="0"/>
-              <a:t>1.</a:t>
-            </a:r>
-            <a:r>
-              <a:rPr kumimoji="1" lang="zh-CN" altLang="en-US" dirty="0"/>
-              <a:t> 消费者消费完成后，把返回消息放到另一个消息通道，生产者通过发生的消息</a:t>
-            </a:r>
-            <a:r>
-              <a:rPr kumimoji="1" lang="en-US" altLang="zh-CN" dirty="0"/>
-              <a:t>ID</a:t>
-            </a:r>
-            <a:r>
-              <a:rPr kumimoji="1" lang="zh-CN" altLang="en-US" dirty="0"/>
-              <a:t>来确定返回消息。</a:t>
-            </a:r>
-            <a:endParaRPr kumimoji="1" lang="en-US" altLang="zh-CN" dirty="0"/>
-          </a:p>
-          <a:p>
-            <a:r>
-              <a:rPr kumimoji="1" lang="en-US" altLang="zh-CN" dirty="0"/>
-              <a:t>2. </a:t>
-            </a:r>
-            <a:r>
-              <a:rPr kumimoji="1" lang="en-US" altLang="zh-CN" dirty="0" err="1"/>
-              <a:t>RocketMQ</a:t>
-            </a:r>
-            <a:r>
-              <a:rPr kumimoji="1" lang="zh-CN" altLang="en-US" dirty="0"/>
-              <a:t>支持</a:t>
-            </a:r>
-            <a:r>
-              <a:rPr lang="zh-CN" altLang="en-US" dirty="0"/>
-              <a:t>请求</a:t>
-            </a:r>
-            <a:r>
-              <a:rPr lang="en-US" altLang="zh-CN" dirty="0"/>
-              <a:t>/</a:t>
-            </a:r>
-            <a:r>
-              <a:rPr lang="zh-CN" altLang="en-US" dirty="0"/>
-              <a:t>应答 语义。可以通过</a:t>
-            </a:r>
-            <a:r>
-              <a:rPr lang="en-US" altLang="zh-CN" dirty="0" err="1"/>
-              <a:t>RocketMQ</a:t>
-            </a:r>
-            <a:r>
-              <a:rPr lang="zh-CN" altLang="en-US" dirty="0"/>
-              <a:t>的</a:t>
-            </a:r>
-            <a:r>
-              <a:rPr lang="en-US" altLang="zh-CN" dirty="0"/>
-              <a:t>API</a:t>
-            </a:r>
-            <a:r>
-              <a:rPr lang="zh-CN" altLang="en-US" dirty="0"/>
-              <a:t>进行消息和回复。</a:t>
-            </a:r>
-            <a:endParaRPr kumimoji="1" lang="en-US" altLang="zh-CN" dirty="0"/>
-          </a:p>
-          <a:p>
-            <a:r>
-              <a:rPr kumimoji="1" lang="en-US" altLang="zh-CN" dirty="0" err="1"/>
-              <a:t>RocketMQ</a:t>
-            </a:r>
-            <a:r>
-              <a:rPr kumimoji="1" lang="zh-CN" altLang="en-US" dirty="0"/>
-              <a:t>不同于数据库，没有</a:t>
-            </a:r>
-            <a:r>
-              <a:rPr kumimoji="1" lang="en-US" altLang="zh-CN" dirty="0"/>
-              <a:t>ACID</a:t>
-            </a:r>
-            <a:r>
-              <a:rPr kumimoji="1" lang="zh-CN" altLang="en-US" dirty="0"/>
-              <a:t>这样的本地事务。如何保证业务执行和消息发送在一个事务中？比如以下场景：用户下单，业务执行完成后发送了订单生成消息给下游系统，但是在事务提交的时候因为某些问题失败了，事务回退了，但是订单消息已经发送，无法回退。</a:t>
-            </a:r>
-            <a:endParaRPr kumimoji="1" lang="en-US" altLang="zh-CN" dirty="0"/>
-          </a:p>
-          <a:p>
-            <a:r>
-              <a:rPr kumimoji="1" lang="zh-CN" altLang="en-US" dirty="0"/>
-              <a:t>解决思路：</a:t>
-            </a:r>
-            <a:endParaRPr kumimoji="1" lang="en-US" altLang="zh-CN" dirty="0"/>
-          </a:p>
-          <a:p>
-            <a:r>
-              <a:rPr kumimoji="1" lang="zh-CN" altLang="en-US" dirty="0"/>
-              <a:t>发件箱模式。定义一个消息队列表，发送</a:t>
-            </a:r>
-            <a:r>
-              <a:rPr kumimoji="1" lang="en-US" altLang="zh-CN" dirty="0" err="1"/>
-              <a:t>mq</a:t>
-            </a:r>
-            <a:r>
-              <a:rPr kumimoji="1" lang="zh-CN" altLang="en-US" dirty="0"/>
-              <a:t>消息时，先将消息小如到消息表中，此时属于数据库本地事务。启用一个组件扫描发件箱并发送。</a:t>
-            </a:r>
-            <a:endParaRPr kumimoji="1" lang="en-US" altLang="zh-CN" dirty="0"/>
+            <a:pPr marL="0" indent="0">
+              <a:buNone/>
+            </a:pPr>
+            <a:endParaRPr kumimoji="1" lang="zh-CN" altLang="en-US" dirty="0"/>
           </a:p>
         </p:txBody>
       </p:sp>
     </p:spTree>
     <p:extLst>
       <p:ext uri="{BB962C8B-B14F-4D97-AF65-F5344CB8AC3E}">
-        <p14:creationId xmlns:p14="http://schemas.microsoft.com/office/powerpoint/2010/main" val="1962971040"/>
+        <p14:creationId xmlns:p14="http://schemas.microsoft.com/office/powerpoint/2010/main" val="2767276358"/>
       </p:ext>
     </p:extLst>
   </p:cSld>
@@ -8737,7 +8594,7 @@
           <p:cNvPr id="2" name="标题 1">
             <a:extLst>
               <a:ext uri="{FF2B5EF4-FFF2-40B4-BE49-F238E27FC236}">
-                <a16:creationId xmlns:a16="http://schemas.microsoft.com/office/drawing/2014/main" id="{13EC6E4E-9A46-DC4A-B9F2-FE4720A7C149}"/>
+                <a16:creationId xmlns:a16="http://schemas.microsoft.com/office/drawing/2014/main" id="{4605813C-1C8D-684C-972E-A7B35E17B52C}"/>
               </a:ext>
             </a:extLst>
           </p:cNvPr>
@@ -8754,12 +8611,24 @@
           <a:lstStyle/>
           <a:p>
             <a:r>
+              <a:rPr kumimoji="1" lang="zh-CN" altLang="en-US" dirty="0"/>
+              <a:t>引入</a:t>
+            </a:r>
+            <a:r>
               <a:rPr kumimoji="1" lang="en-US" altLang="zh-CN" dirty="0" err="1"/>
               <a:t>RocketMQ</a:t>
             </a:r>
             <a:r>
               <a:rPr kumimoji="1" lang="zh-CN" altLang="en-US" dirty="0"/>
-              <a:t>如何保证消息可靠性</a:t>
+              <a:t>（</a:t>
+            </a:r>
+            <a:r>
+              <a:rPr kumimoji="1" lang="en-US" altLang="zh-CN" dirty="0"/>
+              <a:t>MQ</a:t>
+            </a:r>
+            <a:r>
+              <a:rPr kumimoji="1" lang="zh-CN" altLang="en-US" dirty="0"/>
+              <a:t>）带来的问题</a:t>
             </a:r>
           </a:p>
         </p:txBody>
@@ -8769,7 +8638,7 @@
           <p:cNvPr id="3" name="内容占位符 2">
             <a:extLst>
               <a:ext uri="{FF2B5EF4-FFF2-40B4-BE49-F238E27FC236}">
-                <a16:creationId xmlns:a16="http://schemas.microsoft.com/office/drawing/2014/main" id="{4F031BC5-D296-224F-A766-C3D56C05B782}"/>
+                <a16:creationId xmlns:a16="http://schemas.microsoft.com/office/drawing/2014/main" id="{148033EE-4F04-5048-9BEC-24DDFAEE6177}"/>
               </a:ext>
             </a:extLst>
           </p:cNvPr>
@@ -8780,7 +8649,12 @@
             <p:ph idx="1"/>
           </p:nvPr>
         </p:nvSpPr>
-        <p:spPr/>
+        <p:spPr>
+          <a:xfrm>
+            <a:off x="2589212" y="1643974"/>
+            <a:ext cx="8915400" cy="4267248"/>
+          </a:xfrm>
+        </p:spPr>
         <p:txBody>
           <a:bodyPr>
             <a:normAutofit lnSpcReduction="10000"/>
@@ -8789,26 +8663,51 @@
           <a:p>
             <a:r>
               <a:rPr kumimoji="1" lang="en-US" altLang="zh-CN" dirty="0"/>
-              <a:t>Provider</a:t>
+              <a:t> </a:t>
             </a:r>
             <a:r>
               <a:rPr kumimoji="1" lang="zh-CN" altLang="en-US" dirty="0"/>
-              <a:t>端</a:t>
+              <a:t>增加了中间件，也就增加了单点故障的可能性。</a:t>
             </a:r>
             <a:endParaRPr kumimoji="1" lang="en-US" altLang="zh-CN" dirty="0"/>
           </a:p>
           <a:p>
             <a:r>
               <a:rPr kumimoji="1" lang="zh-CN" altLang="en-US" dirty="0"/>
-              <a:t>如果是同步消息，消息投递时</a:t>
-            </a:r>
+              <a:t>通过消息队列的形式属于异步形式，无法同步获取返回值。</a:t>
+            </a:r>
+            <a:endParaRPr kumimoji="1" lang="en-US" altLang="zh-CN" dirty="0"/>
+          </a:p>
+          <a:p>
+            <a:r>
+              <a:rPr kumimoji="1" lang="zh-CN" altLang="en-US" dirty="0"/>
+              <a:t>解决思路：</a:t>
+            </a:r>
+            <a:endParaRPr kumimoji="1" lang="en-US" altLang="zh-CN" dirty="0"/>
+          </a:p>
+          <a:p>
             <a:r>
               <a:rPr kumimoji="1" lang="en-US" altLang="zh-CN" dirty="0"/>
-              <a:t>Broker</a:t>
+              <a:t>1.</a:t>
             </a:r>
             <a:r>
               <a:rPr kumimoji="1" lang="zh-CN" altLang="en-US" dirty="0"/>
-              <a:t>返回失败，重新投递（</a:t>
+              <a:t> 消费者消费完成后，把返回消息放到另一个消息通道，生产者通过发生的消息</a:t>
+            </a:r>
+            <a:r>
+              <a:rPr kumimoji="1" lang="en-US" altLang="zh-CN" dirty="0"/>
+              <a:t>ID</a:t>
+            </a:r>
+            <a:r>
+              <a:rPr kumimoji="1" lang="zh-CN" altLang="en-US" dirty="0"/>
+              <a:t>来确定返回消息。</a:t>
+            </a:r>
+            <a:endParaRPr kumimoji="1" lang="en-US" altLang="zh-CN" dirty="0"/>
+          </a:p>
+          <a:p>
+            <a:r>
+              <a:rPr kumimoji="1" lang="en-US" altLang="zh-CN" dirty="0"/>
+              <a:t>2. </a:t>
             </a:r>
             <a:r>
               <a:rPr kumimoji="1" lang="en-US" altLang="zh-CN" dirty="0" err="1"/>
@@ -8816,68 +8715,85 @@
             </a:r>
             <a:r>
               <a:rPr kumimoji="1" lang="zh-CN" altLang="en-US" dirty="0"/>
-              <a:t>保证消息一定投递成功）</a:t>
+              <a:t>支持</a:t>
+            </a:r>
+            <a:r>
+              <a:rPr lang="zh-CN" altLang="en-US" dirty="0"/>
+              <a:t>请求</a:t>
+            </a:r>
+            <a:r>
+              <a:rPr lang="en-US" altLang="zh-CN" dirty="0"/>
+              <a:t>/</a:t>
+            </a:r>
+            <a:r>
+              <a:rPr lang="zh-CN" altLang="en-US" dirty="0"/>
+              <a:t>应答 语义。可以通过</a:t>
+            </a:r>
+            <a:r>
+              <a:rPr lang="en-US" altLang="zh-CN" dirty="0" err="1"/>
+              <a:t>RocketMQ</a:t>
+            </a:r>
+            <a:r>
+              <a:rPr lang="zh-CN" altLang="en-US" dirty="0"/>
+              <a:t>的</a:t>
+            </a:r>
+            <a:r>
+              <a:rPr lang="en-US" altLang="zh-CN" dirty="0"/>
+              <a:t>API</a:t>
+            </a:r>
+            <a:r>
+              <a:rPr lang="zh-CN" altLang="en-US" dirty="0"/>
+              <a:t>进行消息和回复。</a:t>
             </a:r>
             <a:endParaRPr kumimoji="1" lang="en-US" altLang="zh-CN" dirty="0"/>
           </a:p>
           <a:p>
             <a:r>
+              <a:rPr kumimoji="1" lang="en-US" altLang="zh-CN" dirty="0" err="1"/>
+              <a:t>RocketMQ</a:t>
+            </a:r>
+            <a:r>
               <a:rPr kumimoji="1" lang="zh-CN" altLang="en-US" dirty="0"/>
-              <a:t>如果是异步消息，在回调接口里根据投递状态决定是否重新投递。</a:t>
+              <a:t>不同于数据库，没有</a:t>
+            </a:r>
+            <a:r>
+              <a:rPr kumimoji="1" lang="en-US" altLang="zh-CN" dirty="0"/>
+              <a:t>ACID</a:t>
+            </a:r>
+            <a:r>
+              <a:rPr kumimoji="1" lang="zh-CN" altLang="en-US" dirty="0"/>
+              <a:t>这样的本地事务。如何保证业务执行和消息发送在一个事务中？比如以下场景：用户下单，业务执行完成后发送了订单生成消息给下游系统，但是在事务提交的时候因为某些问题失败了，事务回退了，但是订单消息已经发送，无法回退。</a:t>
             </a:r>
             <a:endParaRPr kumimoji="1" lang="en-US" altLang="zh-CN" dirty="0"/>
           </a:p>
           <a:p>
             <a:r>
-              <a:rPr kumimoji="1" lang="en-US" altLang="zh-CN" dirty="0"/>
-              <a:t>Broker</a:t>
-            </a:r>
-            <a:r>
               <a:rPr kumimoji="1" lang="zh-CN" altLang="en-US" dirty="0"/>
-              <a:t>端</a:t>
+              <a:t>解决思路：</a:t>
             </a:r>
             <a:endParaRPr kumimoji="1" lang="en-US" altLang="zh-CN" dirty="0"/>
           </a:p>
           <a:p>
             <a:r>
               <a:rPr kumimoji="1" lang="zh-CN" altLang="en-US" dirty="0"/>
-              <a:t>根据主从同步策略和消息刷盘策略来共同保证</a:t>
+              <a:t>发件箱模式。定义一个消息队列表，发送</a:t>
+            </a:r>
+            <a:r>
+              <a:rPr kumimoji="1" lang="en-US" altLang="zh-CN" dirty="0" err="1"/>
+              <a:t>mq</a:t>
+            </a:r>
+            <a:r>
+              <a:rPr kumimoji="1" lang="zh-CN" altLang="en-US" dirty="0"/>
+              <a:t>消息时，先将消息小如到消息表中，此时属于数据库本地事务。启用一个组件扫描发件箱并发送。</a:t>
             </a:r>
             <a:endParaRPr kumimoji="1" lang="en-US" altLang="zh-CN" dirty="0"/>
-          </a:p>
-          <a:p>
-            <a:r>
-              <a:rPr kumimoji="1" lang="zh-CN" altLang="en-US" dirty="0"/>
-              <a:t>同步复制，同步刷盘。最安全，不会丢失消息，但是性能最差。</a:t>
-            </a:r>
-            <a:endParaRPr kumimoji="1" lang="en-US" altLang="zh-CN" dirty="0"/>
-          </a:p>
-          <a:p>
-            <a:r>
-              <a:rPr kumimoji="1" lang="zh-CN" altLang="en-US" dirty="0"/>
-              <a:t>同步复制，异步刷盘。折中方案，可靠性和性能都比较好，除非主从同时故障。</a:t>
-            </a:r>
-            <a:endParaRPr kumimoji="1" lang="en-US" altLang="zh-CN" dirty="0"/>
-          </a:p>
-          <a:p>
-            <a:r>
-              <a:rPr kumimoji="1" lang="zh-CN" altLang="en-US" dirty="0"/>
-              <a:t>异步复制，同步刷盘。都同步刷盘了，意义不大。</a:t>
-            </a:r>
-            <a:endParaRPr kumimoji="1" lang="en-US" altLang="zh-CN" dirty="0"/>
-          </a:p>
-          <a:p>
-            <a:r>
-              <a:rPr kumimoji="1" lang="zh-CN" altLang="en-US" dirty="0"/>
-              <a:t>异步复制，异步刷盘。性能最好，如果主节点故障，消息丢失，不推荐。</a:t>
-            </a:r>
           </a:p>
         </p:txBody>
       </p:sp>
     </p:spTree>
     <p:extLst>
       <p:ext uri="{BB962C8B-B14F-4D97-AF65-F5344CB8AC3E}">
-        <p14:creationId xmlns:p14="http://schemas.microsoft.com/office/powerpoint/2010/main" val="1673429681"/>
+        <p14:creationId xmlns:p14="http://schemas.microsoft.com/office/powerpoint/2010/main" val="1962971040"/>
       </p:ext>
     </p:extLst>
   </p:cSld>
@@ -8909,7 +8825,7 @@
           <p:cNvPr id="2" name="标题 1">
             <a:extLst>
               <a:ext uri="{FF2B5EF4-FFF2-40B4-BE49-F238E27FC236}">
-                <a16:creationId xmlns:a16="http://schemas.microsoft.com/office/drawing/2014/main" id="{AF1DC664-2C41-7543-953E-7256D28E7422}"/>
+                <a16:creationId xmlns:a16="http://schemas.microsoft.com/office/drawing/2014/main" id="{13EC6E4E-9A46-DC4A-B9F2-FE4720A7C149}"/>
               </a:ext>
             </a:extLst>
           </p:cNvPr>
@@ -8931,7 +8847,7 @@
             </a:r>
             <a:r>
               <a:rPr kumimoji="1" lang="zh-CN" altLang="en-US" dirty="0"/>
-              <a:t>如何处理消息重复消费</a:t>
+              <a:t>如何保证消息可靠性</a:t>
             </a:r>
           </a:p>
         </p:txBody>
@@ -8941,7 +8857,7 @@
           <p:cNvPr id="3" name="内容占位符 2">
             <a:extLst>
               <a:ext uri="{FF2B5EF4-FFF2-40B4-BE49-F238E27FC236}">
-                <a16:creationId xmlns:a16="http://schemas.microsoft.com/office/drawing/2014/main" id="{8D92B3C3-CF9F-1D43-9D5D-D435D712EA06}"/>
+                <a16:creationId xmlns:a16="http://schemas.microsoft.com/office/drawing/2014/main" id="{4F031BC5-D296-224F-A766-C3D56C05B782}"/>
               </a:ext>
             </a:extLst>
           </p:cNvPr>
@@ -8954,73 +8870,102 @@
         </p:nvSpPr>
         <p:spPr/>
         <p:txBody>
-          <a:bodyPr/>
+          <a:bodyPr>
+            <a:normAutofit lnSpcReduction="10000"/>
+          </a:bodyPr>
           <a:lstStyle/>
           <a:p>
+            <a:r>
+              <a:rPr kumimoji="1" lang="en-US" altLang="zh-CN" dirty="0"/>
+              <a:t>Provider</a:t>
+            </a:r>
+            <a:r>
+              <a:rPr kumimoji="1" lang="zh-CN" altLang="en-US" dirty="0"/>
+              <a:t>端</a:t>
+            </a:r>
+            <a:endParaRPr kumimoji="1" lang="en-US" altLang="zh-CN" dirty="0"/>
+          </a:p>
+          <a:p>
+            <a:r>
+              <a:rPr kumimoji="1" lang="zh-CN" altLang="en-US" dirty="0"/>
+              <a:t>如果是同步消息，消息投递时</a:t>
+            </a:r>
+            <a:r>
+              <a:rPr kumimoji="1" lang="en-US" altLang="zh-CN" dirty="0"/>
+              <a:t>Broker</a:t>
+            </a:r>
+            <a:r>
+              <a:rPr kumimoji="1" lang="zh-CN" altLang="en-US" dirty="0"/>
+              <a:t>返回失败，重新投递（</a:t>
+            </a:r>
             <a:r>
               <a:rPr kumimoji="1" lang="en-US" altLang="zh-CN" dirty="0" err="1"/>
               <a:t>RocketMQ</a:t>
             </a:r>
             <a:r>
               <a:rPr kumimoji="1" lang="zh-CN" altLang="en-US" dirty="0"/>
-              <a:t>自身并不解决消息重复消费的问题。需要使用者自己解决。</a:t>
+              <a:t>保证消息一定投递成功）</a:t>
             </a:r>
             <a:endParaRPr kumimoji="1" lang="en-US" altLang="zh-CN" dirty="0"/>
           </a:p>
           <a:p>
             <a:r>
               <a:rPr kumimoji="1" lang="zh-CN" altLang="en-US" dirty="0"/>
-              <a:t>解决方案有</a:t>
-            </a:r>
+              <a:t>如果是异步消息，在回调接口里根据投递状态决定是否重新投递。</a:t>
+            </a:r>
+            <a:endParaRPr kumimoji="1" lang="en-US" altLang="zh-CN" dirty="0"/>
+          </a:p>
+          <a:p>
             <a:r>
               <a:rPr kumimoji="1" lang="en-US" altLang="zh-CN" dirty="0"/>
-              <a:t>2</a:t>
+              <a:t>Broker</a:t>
             </a:r>
             <a:r>
               <a:rPr kumimoji="1" lang="zh-CN" altLang="en-US" dirty="0"/>
-              <a:t>种：</a:t>
+              <a:t>端</a:t>
             </a:r>
             <a:endParaRPr kumimoji="1" lang="en-US" altLang="zh-CN" dirty="0"/>
           </a:p>
           <a:p>
             <a:r>
               <a:rPr kumimoji="1" lang="zh-CN" altLang="en-US" dirty="0"/>
-              <a:t>保证消费逻辑的幂等性。</a:t>
+              <a:t>根据主从同步策略和消息刷盘策略来共同保证</a:t>
             </a:r>
             <a:endParaRPr kumimoji="1" lang="en-US" altLang="zh-CN" dirty="0"/>
           </a:p>
           <a:p>
             <a:r>
               <a:rPr kumimoji="1" lang="zh-CN" altLang="en-US" dirty="0"/>
-              <a:t>维护一个已消费消息的记录。（比如在数据库或者</a:t>
-            </a:r>
-            <a:r>
-              <a:rPr kumimoji="1" lang="en-US" altLang="zh-CN" dirty="0"/>
-              <a:t>Redis</a:t>
-            </a:r>
+              <a:t>同步复制，同步刷盘。最安全，不会丢失消息，但是性能最差。</a:t>
+            </a:r>
+            <a:endParaRPr kumimoji="1" lang="en-US" altLang="zh-CN" dirty="0"/>
+          </a:p>
+          <a:p>
             <a:r>
               <a:rPr kumimoji="1" lang="zh-CN" altLang="en-US" dirty="0"/>
-              <a:t>中保存已经消费的消息</a:t>
-            </a:r>
-            <a:r>
-              <a:rPr kumimoji="1" lang="en-US" altLang="zh-CN" dirty="0"/>
-              <a:t>ID</a:t>
-            </a:r>
+              <a:t>同步复制，异步刷盘。折中方案，可靠性和性能都比较好，除非主从同时故障。</a:t>
+            </a:r>
+            <a:endParaRPr kumimoji="1" lang="en-US" altLang="zh-CN" dirty="0"/>
+          </a:p>
+          <a:p>
             <a:r>
               <a:rPr kumimoji="1" lang="zh-CN" altLang="en-US" dirty="0"/>
-              <a:t>）</a:t>
+              <a:t>异步复制，同步刷盘。都同步刷盘了，意义不大。</a:t>
             </a:r>
             <a:endParaRPr kumimoji="1" lang="en-US" altLang="zh-CN" dirty="0"/>
           </a:p>
           <a:p>
-            <a:endParaRPr kumimoji="1" lang="en-US" altLang="zh-CN" dirty="0"/>
+            <a:r>
+              <a:rPr kumimoji="1" lang="zh-CN" altLang="en-US" dirty="0"/>
+              <a:t>异步复制，异步刷盘。性能最好，如果主节点故障，消息丢失，不推荐。</a:t>
+            </a:r>
           </a:p>
         </p:txBody>
       </p:sp>
     </p:spTree>
     <p:extLst>
       <p:ext uri="{BB962C8B-B14F-4D97-AF65-F5344CB8AC3E}">
-        <p14:creationId xmlns:p14="http://schemas.microsoft.com/office/powerpoint/2010/main" val="3595485941"/>
+        <p14:creationId xmlns:p14="http://schemas.microsoft.com/office/powerpoint/2010/main" val="1673429681"/>
       </p:ext>
     </p:extLst>
   </p:cSld>
@@ -9052,7 +8997,7 @@
           <p:cNvPr id="2" name="标题 1">
             <a:extLst>
               <a:ext uri="{FF2B5EF4-FFF2-40B4-BE49-F238E27FC236}">
-                <a16:creationId xmlns:a16="http://schemas.microsoft.com/office/drawing/2014/main" id="{29BD7B92-C53F-5048-A035-CD294FA54FCA}"/>
+                <a16:creationId xmlns:a16="http://schemas.microsoft.com/office/drawing/2014/main" id="{AF1DC664-2C41-7543-953E-7256D28E7422}"/>
               </a:ext>
             </a:extLst>
           </p:cNvPr>
@@ -9074,7 +9019,7 @@
             </a:r>
             <a:r>
               <a:rPr kumimoji="1" lang="zh-CN" altLang="en-US" dirty="0"/>
-              <a:t>如何保证顺序消费</a:t>
+              <a:t>如何处理消息重复消费</a:t>
             </a:r>
           </a:p>
         </p:txBody>
@@ -9084,7 +9029,7 @@
           <p:cNvPr id="3" name="内容占位符 2">
             <a:extLst>
               <a:ext uri="{FF2B5EF4-FFF2-40B4-BE49-F238E27FC236}">
-                <a16:creationId xmlns:a16="http://schemas.microsoft.com/office/drawing/2014/main" id="{DFE86850-C320-CE4F-B6EC-693E90834B72}"/>
+                <a16:creationId xmlns:a16="http://schemas.microsoft.com/office/drawing/2014/main" id="{8D92B3C3-CF9F-1D43-9D5D-D435D712EA06}"/>
               </a:ext>
             </a:extLst>
           </p:cNvPr>
@@ -9100,14 +9045,70 @@
           <a:bodyPr/>
           <a:lstStyle/>
           <a:p>
-            <a:endParaRPr kumimoji="1" lang="zh-CN" altLang="en-US"/>
+            <a:r>
+              <a:rPr kumimoji="1" lang="en-US" altLang="zh-CN" dirty="0" err="1"/>
+              <a:t>RocketMQ</a:t>
+            </a:r>
+            <a:r>
+              <a:rPr kumimoji="1" lang="zh-CN" altLang="en-US" dirty="0"/>
+              <a:t>自身并不解决消息重复消费的问题。需要使用者自己解决。</a:t>
+            </a:r>
+            <a:endParaRPr kumimoji="1" lang="en-US" altLang="zh-CN" dirty="0"/>
+          </a:p>
+          <a:p>
+            <a:r>
+              <a:rPr kumimoji="1" lang="zh-CN" altLang="en-US" dirty="0"/>
+              <a:t>解决方案有</a:t>
+            </a:r>
+            <a:r>
+              <a:rPr kumimoji="1" lang="en-US" altLang="zh-CN" dirty="0"/>
+              <a:t>2</a:t>
+            </a:r>
+            <a:r>
+              <a:rPr kumimoji="1" lang="zh-CN" altLang="en-US" dirty="0"/>
+              <a:t>种：</a:t>
+            </a:r>
+            <a:endParaRPr kumimoji="1" lang="en-US" altLang="zh-CN" dirty="0"/>
+          </a:p>
+          <a:p>
+            <a:r>
+              <a:rPr kumimoji="1" lang="zh-CN" altLang="en-US" dirty="0"/>
+              <a:t>保证消费逻辑的幂等性。</a:t>
+            </a:r>
+            <a:endParaRPr kumimoji="1" lang="en-US" altLang="zh-CN" dirty="0"/>
+          </a:p>
+          <a:p>
+            <a:r>
+              <a:rPr kumimoji="1" lang="zh-CN" altLang="en-US" dirty="0"/>
+              <a:t>维护一个已消费消息的记录。（比如在数据库或者</a:t>
+            </a:r>
+            <a:r>
+              <a:rPr kumimoji="1" lang="en-US" altLang="zh-CN" dirty="0"/>
+              <a:t>Redis</a:t>
+            </a:r>
+            <a:r>
+              <a:rPr kumimoji="1" lang="zh-CN" altLang="en-US" dirty="0"/>
+              <a:t>中保存已经消费的消息</a:t>
+            </a:r>
+            <a:r>
+              <a:rPr kumimoji="1" lang="en-US" altLang="zh-CN" dirty="0"/>
+              <a:t>ID</a:t>
+            </a:r>
+            <a:r>
+              <a:rPr kumimoji="1" lang="zh-CN" altLang="en-US" dirty="0"/>
+              <a:t>）</a:t>
+            </a:r>
+            <a:endParaRPr kumimoji="1" lang="en-US" altLang="zh-CN" dirty="0"/>
+          </a:p>
+          <a:p>
+            <a:endParaRPr kumimoji="1" lang="en-US" altLang="zh-CN" dirty="0"/>
           </a:p>
         </p:txBody>
       </p:sp>
     </p:spTree>
     <p:extLst>
       <p:ext uri="{BB962C8B-B14F-4D97-AF65-F5344CB8AC3E}">
-        <p14:creationId xmlns:p14="http://schemas.microsoft.com/office/powerpoint/2010/main" val="4146228857"/>
+        <p14:creationId xmlns:p14="http://schemas.microsoft.com/office/powerpoint/2010/main" val="3595485941"/>
       </p:ext>
     </p:extLst>
   </p:cSld>
@@ -9232,6 +9233,93 @@
 </file>
 
 <file path=ppt/slides/slide20.xml><?xml version="1.0" encoding="utf-8"?>
+<p:sld xmlns:a="http://schemas.openxmlformats.org/drawingml/2006/main" xmlns:r="http://schemas.openxmlformats.org/officeDocument/2006/relationships" xmlns:p="http://schemas.openxmlformats.org/presentationml/2006/main">
+  <p:cSld>
+    <p:spTree>
+      <p:nvGrpSpPr>
+        <p:cNvPr id="1" name=""/>
+        <p:cNvGrpSpPr/>
+        <p:nvPr/>
+      </p:nvGrpSpPr>
+      <p:grpSpPr>
+        <a:xfrm>
+          <a:off x="0" y="0"/>
+          <a:ext cx="0" cy="0"/>
+          <a:chOff x="0" y="0"/>
+          <a:chExt cx="0" cy="0"/>
+        </a:xfrm>
+      </p:grpSpPr>
+      <p:sp>
+        <p:nvSpPr>
+          <p:cNvPr id="2" name="标题 1">
+            <a:extLst>
+              <a:ext uri="{FF2B5EF4-FFF2-40B4-BE49-F238E27FC236}">
+                <a16:creationId xmlns:a16="http://schemas.microsoft.com/office/drawing/2014/main" id="{29BD7B92-C53F-5048-A035-CD294FA54FCA}"/>
+              </a:ext>
+            </a:extLst>
+          </p:cNvPr>
+          <p:cNvSpPr>
+            <a:spLocks noGrp="1"/>
+          </p:cNvSpPr>
+          <p:nvPr>
+            <p:ph type="title"/>
+          </p:nvPr>
+        </p:nvSpPr>
+        <p:spPr/>
+        <p:txBody>
+          <a:bodyPr/>
+          <a:lstStyle/>
+          <a:p>
+            <a:r>
+              <a:rPr kumimoji="1" lang="en-US" altLang="zh-CN" dirty="0" err="1"/>
+              <a:t>RocketMQ</a:t>
+            </a:r>
+            <a:r>
+              <a:rPr kumimoji="1" lang="zh-CN" altLang="en-US" dirty="0"/>
+              <a:t>如何保证顺序消费</a:t>
+            </a:r>
+          </a:p>
+        </p:txBody>
+      </p:sp>
+      <p:sp>
+        <p:nvSpPr>
+          <p:cNvPr id="3" name="内容占位符 2">
+            <a:extLst>
+              <a:ext uri="{FF2B5EF4-FFF2-40B4-BE49-F238E27FC236}">
+                <a16:creationId xmlns:a16="http://schemas.microsoft.com/office/drawing/2014/main" id="{DFE86850-C320-CE4F-B6EC-693E90834B72}"/>
+              </a:ext>
+            </a:extLst>
+          </p:cNvPr>
+          <p:cNvSpPr>
+            <a:spLocks noGrp="1"/>
+          </p:cNvSpPr>
+          <p:nvPr>
+            <p:ph idx="1"/>
+          </p:nvPr>
+        </p:nvSpPr>
+        <p:spPr/>
+        <p:txBody>
+          <a:bodyPr/>
+          <a:lstStyle/>
+          <a:p>
+            <a:endParaRPr kumimoji="1" lang="zh-CN" altLang="en-US"/>
+          </a:p>
+        </p:txBody>
+      </p:sp>
+    </p:spTree>
+    <p:extLst>
+      <p:ext uri="{BB962C8B-B14F-4D97-AF65-F5344CB8AC3E}">
+        <p14:creationId xmlns:p14="http://schemas.microsoft.com/office/powerpoint/2010/main" val="4146228857"/>
+      </p:ext>
+    </p:extLst>
+  </p:cSld>
+  <p:clrMapOvr>
+    <a:masterClrMapping/>
+  </p:clrMapOvr>
+</p:sld>
+</file>
+
+<file path=ppt/slides/slide21.xml><?xml version="1.0" encoding="utf-8"?>
 <p:sld xmlns:a="http://schemas.openxmlformats.org/drawingml/2006/main" xmlns:r="http://schemas.openxmlformats.org/officeDocument/2006/relationships" xmlns:p="http://schemas.openxmlformats.org/presentationml/2006/main">
   <p:cSld>
     <p:spTree>
@@ -11577,7 +11665,91 @@
               <a:rPr kumimoji="1" lang="zh-CN" altLang="en-US" dirty="0"/>
               <a:t>的消息。</a:t>
             </a:r>
-            <a:endParaRPr kumimoji="1" lang="en-US" altLang="zh-CN"/>
+            <a:endParaRPr kumimoji="1" lang="en-US" altLang="zh-CN" dirty="0"/>
+          </a:p>
+          <a:p>
+            <a:r>
+              <a:rPr kumimoji="1" lang="en-US" altLang="zh-CN" dirty="0"/>
+              <a:t>Broadcasting</a:t>
+            </a:r>
+            <a:r>
+              <a:rPr kumimoji="1" lang="zh-CN" altLang="en-US" dirty="0"/>
+              <a:t>：</a:t>
+            </a:r>
+            <a:r>
+              <a:rPr lang="zh-CN" altLang="en-US" dirty="0"/>
+              <a:t>同一个</a:t>
+            </a:r>
+            <a:r>
+              <a:rPr lang="en" altLang="zh-CN" dirty="0" err="1"/>
+              <a:t>ConsumerGroup</a:t>
+            </a:r>
+            <a:r>
+              <a:rPr lang="en" altLang="zh-CN" dirty="0"/>
+              <a:t> </a:t>
+            </a:r>
+            <a:r>
+              <a:rPr lang="zh-CN" altLang="en-US" dirty="0"/>
+              <a:t>里的每个</a:t>
+            </a:r>
+            <a:r>
+              <a:rPr lang="en" altLang="zh-CN" dirty="0"/>
+              <a:t>Consumer </a:t>
+            </a:r>
+            <a:r>
+              <a:rPr lang="zh-CN" altLang="en-US" dirty="0"/>
+              <a:t>都能消费到所订阅</a:t>
+            </a:r>
+            <a:r>
+              <a:rPr lang="en" altLang="zh-CN" dirty="0"/>
+              <a:t>Topic </a:t>
+            </a:r>
+            <a:r>
+              <a:rPr lang="zh-CN" altLang="en-US" dirty="0"/>
+              <a:t>的全部消息，也就是一个消息会被多次分发，被多个</a:t>
+            </a:r>
+            <a:r>
+              <a:rPr lang="en" altLang="zh-CN" dirty="0"/>
+              <a:t>Consumer </a:t>
+            </a:r>
+            <a:r>
+              <a:rPr lang="zh-CN" altLang="en-US" dirty="0"/>
+              <a:t>消费。</a:t>
+            </a:r>
+          </a:p>
+          <a:p>
+            <a:r>
+              <a:rPr kumimoji="1" lang="zh-CN" altLang="en-US" dirty="0"/>
+              <a:t>按实现：</a:t>
+            </a:r>
+            <a:endParaRPr kumimoji="1" lang="en-US" altLang="zh-CN" dirty="0"/>
+          </a:p>
+          <a:p>
+            <a:r>
+              <a:rPr lang="en" altLang="zh-CN" dirty="0" err="1"/>
+              <a:t>DefaultMQPushConsumer</a:t>
+            </a:r>
+            <a:r>
+              <a:rPr lang="zh-CN" altLang="en-US" dirty="0"/>
+              <a:t>：</a:t>
+            </a:r>
+            <a:endParaRPr lang="en-US" altLang="zh-CN" dirty="0"/>
+          </a:p>
+          <a:p>
+            <a:r>
+              <a:rPr lang="en" altLang="zh-CN" dirty="0" err="1"/>
+              <a:t>DefaultMQPullConsumer</a:t>
+            </a:r>
+            <a:r>
+              <a:rPr lang="en" altLang="zh-CN" dirty="0"/>
+              <a:t>: </a:t>
+            </a:r>
+          </a:p>
+          <a:p>
+            <a:endParaRPr lang="en" altLang="zh-CN" dirty="0"/>
+          </a:p>
+          <a:p>
+            <a:endParaRPr kumimoji="1" lang="en-US" altLang="zh-CN" dirty="0"/>
           </a:p>
           <a:p>
             <a:endParaRPr kumimoji="1" lang="en-US" altLang="zh-CN" dirty="0"/>
@@ -11622,7 +11794,7 @@
           <p:cNvPr id="2" name="标题 1">
             <a:extLst>
               <a:ext uri="{FF2B5EF4-FFF2-40B4-BE49-F238E27FC236}">
-                <a16:creationId xmlns:a16="http://schemas.microsoft.com/office/drawing/2014/main" id="{56B54089-DDA3-0546-9A46-36594C1BDD08}"/>
+                <a16:creationId xmlns:a16="http://schemas.microsoft.com/office/drawing/2014/main" id="{749B85EF-B4A2-CD4D-9FF5-9992CAB61BAF}"/>
               </a:ext>
             </a:extLst>
           </p:cNvPr>
@@ -11644,7 +11816,7 @@
             </a:r>
             <a:r>
               <a:rPr kumimoji="1" lang="zh-CN" altLang="en-US" dirty="0"/>
-              <a:t>如何保证高可用</a:t>
+              <a:t>消息类型</a:t>
             </a:r>
           </a:p>
         </p:txBody>
@@ -11654,7 +11826,7 @@
           <p:cNvPr id="3" name="内容占位符 2">
             <a:extLst>
               <a:ext uri="{FF2B5EF4-FFF2-40B4-BE49-F238E27FC236}">
-                <a16:creationId xmlns:a16="http://schemas.microsoft.com/office/drawing/2014/main" id="{C69D53C2-376F-C947-8A16-315A869CD2F9}"/>
+                <a16:creationId xmlns:a16="http://schemas.microsoft.com/office/drawing/2014/main" id="{D415E970-5B2D-1C46-B297-FA97D0F7AA0E}"/>
               </a:ext>
             </a:extLst>
           </p:cNvPr>
@@ -11670,14 +11842,21 @@
           <a:bodyPr/>
           <a:lstStyle/>
           <a:p>
-            <a:endParaRPr kumimoji="1" lang="zh-CN" altLang="en-US" dirty="0"/>
+            <a:r>
+              <a:rPr kumimoji="1" lang="zh-CN" altLang="en-US" dirty="0"/>
+              <a:t>按发送形式：</a:t>
+            </a:r>
+            <a:endParaRPr kumimoji="1" lang="en-US" altLang="zh-CN"/>
+          </a:p>
+          <a:p>
+            <a:endParaRPr kumimoji="1" lang="zh-CN" altLang="en-US"/>
           </a:p>
         </p:txBody>
       </p:sp>
     </p:spTree>
     <p:extLst>
       <p:ext uri="{BB962C8B-B14F-4D97-AF65-F5344CB8AC3E}">
-        <p14:creationId xmlns:p14="http://schemas.microsoft.com/office/powerpoint/2010/main" val="1961592500"/>
+        <p14:creationId xmlns:p14="http://schemas.microsoft.com/office/powerpoint/2010/main" val="2474116664"/>
       </p:ext>
     </p:extLst>
   </p:cSld>
@@ -11709,7 +11888,7 @@
           <p:cNvPr id="2" name="标题 1">
             <a:extLst>
               <a:ext uri="{FF2B5EF4-FFF2-40B4-BE49-F238E27FC236}">
-                <a16:creationId xmlns:a16="http://schemas.microsoft.com/office/drawing/2014/main" id="{93913AE2-AC33-9149-966D-E50C42CFAADC}"/>
+                <a16:creationId xmlns:a16="http://schemas.microsoft.com/office/drawing/2014/main" id="{56B54089-DDA3-0546-9A46-36594C1BDD08}"/>
               </a:ext>
             </a:extLst>
           </p:cNvPr>
@@ -11731,7 +11910,7 @@
             </a:r>
             <a:r>
               <a:rPr kumimoji="1" lang="zh-CN" altLang="en-US" dirty="0"/>
-              <a:t>负载均衡机制</a:t>
+              <a:t>如何保证高可用</a:t>
             </a:r>
           </a:p>
         </p:txBody>
@@ -11741,7 +11920,7 @@
           <p:cNvPr id="3" name="内容占位符 2">
             <a:extLst>
               <a:ext uri="{FF2B5EF4-FFF2-40B4-BE49-F238E27FC236}">
-                <a16:creationId xmlns:a16="http://schemas.microsoft.com/office/drawing/2014/main" id="{6890FC5C-9645-6F41-83AB-4707FC922C3C}"/>
+                <a16:creationId xmlns:a16="http://schemas.microsoft.com/office/drawing/2014/main" id="{C69D53C2-376F-C947-8A16-315A869CD2F9}"/>
               </a:ext>
             </a:extLst>
           </p:cNvPr>
@@ -11757,14 +11936,14 @@
           <a:bodyPr/>
           <a:lstStyle/>
           <a:p>
-            <a:endParaRPr kumimoji="1" lang="zh-CN" altLang="en-US"/>
+            <a:endParaRPr kumimoji="1" lang="zh-CN" altLang="en-US" dirty="0"/>
           </a:p>
         </p:txBody>
       </p:sp>
     </p:spTree>
     <p:extLst>
       <p:ext uri="{BB962C8B-B14F-4D97-AF65-F5344CB8AC3E}">
-        <p14:creationId xmlns:p14="http://schemas.microsoft.com/office/powerpoint/2010/main" val="1446558323"/>
+        <p14:creationId xmlns:p14="http://schemas.microsoft.com/office/powerpoint/2010/main" val="1961592500"/>
       </p:ext>
     </p:extLst>
   </p:cSld>

</xml_diff>

<commit_message>
RocketMQ简介.pptx by qiyu 2021-04-27
</commit_message>
<xml_diff>
--- a/doc/RocketMQ简介.pptx
+++ b/doc/RocketMQ简介.pptx
@@ -12,23 +12,24 @@
     <p:sldId id="268" r:id="rId6"/>
     <p:sldId id="270" r:id="rId7"/>
     <p:sldId id="276" r:id="rId8"/>
-    <p:sldId id="278" r:id="rId9"/>
-    <p:sldId id="271" r:id="rId10"/>
-    <p:sldId id="279" r:id="rId11"/>
-    <p:sldId id="281" r:id="rId12"/>
-    <p:sldId id="282" r:id="rId13"/>
-    <p:sldId id="272" r:id="rId14"/>
-    <p:sldId id="264" r:id="rId15"/>
-    <p:sldId id="265" r:id="rId16"/>
-    <p:sldId id="260" r:id="rId17"/>
-    <p:sldId id="277" r:id="rId18"/>
-    <p:sldId id="273" r:id="rId19"/>
-    <p:sldId id="274" r:id="rId20"/>
-    <p:sldId id="262" r:id="rId21"/>
-    <p:sldId id="266" r:id="rId22"/>
-    <p:sldId id="261" r:id="rId23"/>
-    <p:sldId id="263" r:id="rId24"/>
-    <p:sldId id="267" r:id="rId25"/>
+    <p:sldId id="279" r:id="rId9"/>
+    <p:sldId id="281" r:id="rId10"/>
+    <p:sldId id="282" r:id="rId11"/>
+    <p:sldId id="283" r:id="rId12"/>
+    <p:sldId id="271" r:id="rId13"/>
+    <p:sldId id="284" r:id="rId14"/>
+    <p:sldId id="272" r:id="rId15"/>
+    <p:sldId id="264" r:id="rId16"/>
+    <p:sldId id="265" r:id="rId17"/>
+    <p:sldId id="260" r:id="rId18"/>
+    <p:sldId id="277" r:id="rId19"/>
+    <p:sldId id="273" r:id="rId20"/>
+    <p:sldId id="274" r:id="rId21"/>
+    <p:sldId id="262" r:id="rId22"/>
+    <p:sldId id="266" r:id="rId23"/>
+    <p:sldId id="261" r:id="rId24"/>
+    <p:sldId id="263" r:id="rId25"/>
+    <p:sldId id="267" r:id="rId26"/>
   </p:sldIdLst>
   <p:sldSz cx="12192000" cy="6858000"/>
   <p:notesSz cx="6858000" cy="9144000"/>
@@ -324,7 +325,7 @@
             <a:fld id="{B61BEF0D-F0BB-DE4B-95CE-6DB70DBA9567}" type="datetimeFigureOut">
               <a:rPr lang="en-US" dirty="0"/>
               <a:pPr/>
-              <a:t>4/26/21</a:t>
+              <a:t>4/27/21</a:t>
             </a:fld>
             <a:endParaRPr lang="en-US" dirty="0"/>
           </a:p>
@@ -659,7 +660,7 @@
             <a:fld id="{B61BEF0D-F0BB-DE4B-95CE-6DB70DBA9567}" type="datetimeFigureOut">
               <a:rPr lang="en-US" dirty="0"/>
               <a:pPr/>
-              <a:t>4/26/21</a:t>
+              <a:t>4/27/21</a:t>
             </a:fld>
             <a:endParaRPr lang="en-US" dirty="0"/>
           </a:p>
@@ -1057,7 +1058,7 @@
             <a:fld id="{B61BEF0D-F0BB-DE4B-95CE-6DB70DBA9567}" type="datetimeFigureOut">
               <a:rPr lang="en-US" dirty="0"/>
               <a:pPr/>
-              <a:t>4/26/21</a:t>
+              <a:t>4/27/21</a:t>
             </a:fld>
             <a:endParaRPr lang="en-US" dirty="0"/>
           </a:p>
@@ -1390,7 +1391,7 @@
             <a:fld id="{B61BEF0D-F0BB-DE4B-95CE-6DB70DBA9567}" type="datetimeFigureOut">
               <a:rPr lang="en-US" dirty="0"/>
               <a:pPr/>
-              <a:t>4/26/21</a:t>
+              <a:t>4/27/21</a:t>
             </a:fld>
             <a:endParaRPr lang="en-US" dirty="0"/>
           </a:p>
@@ -1707,7 +1708,7 @@
             <a:fld id="{B61BEF0D-F0BB-DE4B-95CE-6DB70DBA9567}" type="datetimeFigureOut">
               <a:rPr lang="en-US" dirty="0"/>
               <a:pPr/>
-              <a:t>4/26/21</a:t>
+              <a:t>4/27/21</a:t>
             </a:fld>
             <a:endParaRPr lang="en-US" dirty="0"/>
           </a:p>
@@ -2100,7 +2101,7 @@
             <a:fld id="{B61BEF0D-F0BB-DE4B-95CE-6DB70DBA9567}" type="datetimeFigureOut">
               <a:rPr lang="en-US" dirty="0"/>
               <a:pPr/>
-              <a:t>4/26/21</a:t>
+              <a:t>4/27/21</a:t>
             </a:fld>
             <a:endParaRPr lang="en-US" dirty="0"/>
           </a:p>
@@ -2354,7 +2355,7 @@
             <a:fld id="{B61BEF0D-F0BB-DE4B-95CE-6DB70DBA9567}" type="datetimeFigureOut">
               <a:rPr lang="en-US" dirty="0"/>
               <a:pPr/>
-              <a:t>4/26/21</a:t>
+              <a:t>4/27/21</a:t>
             </a:fld>
             <a:endParaRPr lang="en-US" dirty="0"/>
           </a:p>
@@ -2613,7 +2614,7 @@
             <a:fld id="{B61BEF0D-F0BB-DE4B-95CE-6DB70DBA9567}" type="datetimeFigureOut">
               <a:rPr lang="en-US" dirty="0"/>
               <a:pPr/>
-              <a:t>4/26/21</a:t>
+              <a:t>4/27/21</a:t>
             </a:fld>
             <a:endParaRPr lang="en-US" dirty="0"/>
           </a:p>
@@ -2872,7 +2873,7 @@
             <a:fld id="{B61BEF0D-F0BB-DE4B-95CE-6DB70DBA9567}" type="datetimeFigureOut">
               <a:rPr lang="en-US" dirty="0"/>
               <a:pPr/>
-              <a:t>4/26/21</a:t>
+              <a:t>4/27/21</a:t>
             </a:fld>
             <a:endParaRPr lang="en-US" dirty="0"/>
           </a:p>
@@ -3198,7 +3199,7 @@
             <a:fld id="{B61BEF0D-F0BB-DE4B-95CE-6DB70DBA9567}" type="datetimeFigureOut">
               <a:rPr lang="en-US" dirty="0"/>
               <a:pPr/>
-              <a:t>4/26/21</a:t>
+              <a:t>4/27/21</a:t>
             </a:fld>
             <a:endParaRPr lang="en-US" dirty="0"/>
           </a:p>
@@ -3518,7 +3519,7 @@
             <a:fld id="{B61BEF0D-F0BB-DE4B-95CE-6DB70DBA9567}" type="datetimeFigureOut">
               <a:rPr lang="en-US" dirty="0"/>
               <a:pPr/>
-              <a:t>4/26/21</a:t>
+              <a:t>4/27/21</a:t>
             </a:fld>
             <a:endParaRPr lang="en-US" dirty="0"/>
           </a:p>
@@ -3972,7 +3973,7 @@
             <a:fld id="{B61BEF0D-F0BB-DE4B-95CE-6DB70DBA9567}" type="datetimeFigureOut">
               <a:rPr lang="en-US" dirty="0"/>
               <a:pPr/>
-              <a:t>4/26/21</a:t>
+              <a:t>4/27/21</a:t>
             </a:fld>
             <a:endParaRPr lang="en-US" dirty="0"/>
           </a:p>
@@ -4174,7 +4175,7 @@
             <a:fld id="{B61BEF0D-F0BB-DE4B-95CE-6DB70DBA9567}" type="datetimeFigureOut">
               <a:rPr lang="en-US" dirty="0"/>
               <a:pPr/>
-              <a:t>4/26/21</a:t>
+              <a:t>4/27/21</a:t>
             </a:fld>
             <a:endParaRPr lang="en-US" dirty="0"/>
           </a:p>
@@ -4348,7 +4349,7 @@
             <a:fld id="{B61BEF0D-F0BB-DE4B-95CE-6DB70DBA9567}" type="datetimeFigureOut">
               <a:rPr lang="en-US" dirty="0"/>
               <a:pPr/>
-              <a:t>4/26/21</a:t>
+              <a:t>4/27/21</a:t>
             </a:fld>
             <a:endParaRPr lang="en-US" dirty="0"/>
           </a:p>
@@ -4678,7 +4679,7 @@
             <a:fld id="{B61BEF0D-F0BB-DE4B-95CE-6DB70DBA9567}" type="datetimeFigureOut">
               <a:rPr lang="en-US" dirty="0"/>
               <a:pPr/>
-              <a:t>4/26/21</a:t>
+              <a:t>4/27/21</a:t>
             </a:fld>
             <a:endParaRPr lang="en-US" dirty="0"/>
           </a:p>
@@ -5020,7 +5021,7 @@
             <a:fld id="{B61BEF0D-F0BB-DE4B-95CE-6DB70DBA9567}" type="datetimeFigureOut">
               <a:rPr lang="en-US" dirty="0"/>
               <a:pPr/>
-              <a:t>4/26/21</a:t>
+              <a:t>4/27/21</a:t>
             </a:fld>
             <a:endParaRPr lang="en-US" dirty="0"/>
           </a:p>
@@ -7134,7 +7135,7 @@
             <a:fld id="{B61BEF0D-F0BB-DE4B-95CE-6DB70DBA9567}" type="datetimeFigureOut">
               <a:rPr lang="en-US" dirty="0"/>
               <a:pPr/>
-              <a:t>4/26/21</a:t>
+              <a:t>4/27/21</a:t>
             </a:fld>
             <a:endParaRPr lang="en-US" dirty="0"/>
           </a:p>
@@ -7751,7 +7752,7 @@
           <p:cNvPr id="2" name="标题 1">
             <a:extLst>
               <a:ext uri="{FF2B5EF4-FFF2-40B4-BE49-F238E27FC236}">
-                <a16:creationId xmlns:a16="http://schemas.microsoft.com/office/drawing/2014/main" id="{3CA14422-F1CE-9B43-8ED2-FB9A7B0EDFC0}"/>
+                <a16:creationId xmlns:a16="http://schemas.microsoft.com/office/drawing/2014/main" id="{3C4C9DB7-7226-3245-82DB-7C28A876D84C}"/>
               </a:ext>
             </a:extLst>
           </p:cNvPr>
@@ -7768,104 +7769,60 @@
           <a:lstStyle/>
           <a:p>
             <a:r>
-              <a:rPr kumimoji="1" lang="en-US" altLang="zh-CN" dirty="0" err="1"/>
-              <a:t>RocketMQ</a:t>
-            </a:r>
-            <a:r>
               <a:rPr kumimoji="1" lang="en-US" altLang="zh-CN" dirty="0"/>
-              <a:t> Broker</a:t>
-            </a:r>
-            <a:endParaRPr kumimoji="1" lang="zh-CN" altLang="en-US" dirty="0"/>
-          </a:p>
-        </p:txBody>
-      </p:sp>
-      <p:sp>
-        <p:nvSpPr>
-          <p:cNvPr id="3" name="内容占位符 2">
+              <a:t>Topic</a:t>
+            </a:r>
+            <a:r>
+              <a:rPr kumimoji="1" lang="zh-CN" altLang="en-US" dirty="0"/>
+              <a:t>和</a:t>
+            </a:r>
+            <a:r>
+              <a:rPr kumimoji="1" lang="en-US" altLang="zh-CN" dirty="0"/>
+              <a:t>Broker</a:t>
+            </a:r>
+            <a:r>
+              <a:rPr kumimoji="1" lang="zh-CN" altLang="en-US" dirty="0"/>
+              <a:t>的关系</a:t>
+            </a:r>
+          </a:p>
+        </p:txBody>
+      </p:sp>
+      <p:pic>
+        <p:nvPicPr>
+          <p:cNvPr id="9" name="内容占位符 8">
             <a:extLst>
               <a:ext uri="{FF2B5EF4-FFF2-40B4-BE49-F238E27FC236}">
-                <a16:creationId xmlns:a16="http://schemas.microsoft.com/office/drawing/2014/main" id="{E3E523E4-A945-3641-BDF9-4ADCD91C9AFD}"/>
+                <a16:creationId xmlns:a16="http://schemas.microsoft.com/office/drawing/2014/main" id="{ABB9ADC1-5ACB-4D4B-8381-43D9724E58FD}"/>
               </a:ext>
             </a:extLst>
           </p:cNvPr>
-          <p:cNvSpPr>
-            <a:spLocks noGrp="1"/>
-          </p:cNvSpPr>
+          <p:cNvPicPr>
+            <a:picLocks noGrp="1" noChangeAspect="1"/>
+          </p:cNvPicPr>
           <p:nvPr>
             <p:ph idx="1"/>
           </p:nvPr>
-        </p:nvSpPr>
-        <p:spPr/>
-        <p:txBody>
-          <a:bodyPr/>
-          <a:lstStyle/>
-          <a:p>
-            <a:r>
-              <a:rPr lang="zh-CN" altLang="en-US" dirty="0"/>
-              <a:t>接收</a:t>
-            </a:r>
-            <a:r>
-              <a:rPr lang="en" altLang="zh-CN" dirty="0"/>
-              <a:t>Producer </a:t>
-            </a:r>
-            <a:r>
-              <a:rPr lang="zh-CN" altLang="en-US" dirty="0"/>
-              <a:t>发过来的消息</a:t>
-            </a:r>
-            <a:endParaRPr lang="en-US" altLang="zh-CN" dirty="0"/>
-          </a:p>
-          <a:p>
-            <a:r>
-              <a:rPr lang="zh-CN" altLang="en-US" dirty="0"/>
-              <a:t>处理</a:t>
-            </a:r>
-            <a:r>
-              <a:rPr lang="en" altLang="zh-CN" dirty="0"/>
-              <a:t>Consumer </a:t>
-            </a:r>
-            <a:r>
-              <a:rPr lang="zh-CN" altLang="en-US" dirty="0"/>
-              <a:t>的消费消息请求</a:t>
-            </a:r>
-            <a:endParaRPr lang="en-US" altLang="zh-CN" dirty="0"/>
-          </a:p>
-          <a:p>
-            <a:r>
-              <a:rPr lang="zh-CN" altLang="en-US" dirty="0"/>
-              <a:t>消息的持久化存储</a:t>
-            </a:r>
-            <a:endParaRPr lang="en-US" altLang="zh-CN" dirty="0"/>
-          </a:p>
-          <a:p>
-            <a:r>
-              <a:rPr lang="zh-CN" altLang="en-US" dirty="0"/>
-              <a:t>消息的</a:t>
-            </a:r>
-            <a:r>
-              <a:rPr lang="en" altLang="zh-CN" dirty="0"/>
-              <a:t>HA </a:t>
-            </a:r>
-            <a:r>
-              <a:rPr lang="zh-CN" altLang="en-US" dirty="0"/>
-              <a:t>机制</a:t>
-            </a:r>
-            <a:endParaRPr lang="en-US" altLang="zh-CN" dirty="0"/>
-          </a:p>
-          <a:p>
-            <a:r>
-              <a:rPr lang="zh-CN" altLang="en-US" dirty="0"/>
-              <a:t>服务端过滤功能</a:t>
-            </a:r>
-          </a:p>
-          <a:p>
-            <a:endParaRPr kumimoji="1" lang="zh-CN" altLang="en-US" dirty="0"/>
-          </a:p>
-        </p:txBody>
-      </p:sp>
+        </p:nvPicPr>
+        <p:blipFill>
+          <a:blip r:embed="rId2"/>
+          <a:stretch>
+            <a:fillRect/>
+          </a:stretch>
+        </p:blipFill>
+        <p:spPr>
+          <a:xfrm>
+            <a:off x="4384264" y="2133600"/>
+            <a:ext cx="5325298" cy="3778250"/>
+          </a:xfrm>
+          <a:prstGeom prst="rect">
+            <a:avLst/>
+          </a:prstGeom>
+        </p:spPr>
+      </p:pic>
     </p:spTree>
     <p:extLst>
       <p:ext uri="{BB962C8B-B14F-4D97-AF65-F5344CB8AC3E}">
-        <p14:creationId xmlns:p14="http://schemas.microsoft.com/office/powerpoint/2010/main" val="2861629590"/>
+        <p14:creationId xmlns:p14="http://schemas.microsoft.com/office/powerpoint/2010/main" val="2162725505"/>
       </p:ext>
     </p:extLst>
   </p:cSld>
@@ -7894,10 +7851,10 @@
       </p:grpSpPr>
       <p:sp>
         <p:nvSpPr>
-          <p:cNvPr id="2" name="标题 1">
+          <p:cNvPr id="3" name="内容占位符 2">
             <a:extLst>
               <a:ext uri="{FF2B5EF4-FFF2-40B4-BE49-F238E27FC236}">
-                <a16:creationId xmlns:a16="http://schemas.microsoft.com/office/drawing/2014/main" id="{AAA82EE9-91D9-DD44-9A2A-8BF8F7E5A3FD}"/>
+                <a16:creationId xmlns:a16="http://schemas.microsoft.com/office/drawing/2014/main" id="{53613687-9442-F346-8008-234B7862D73B}"/>
               </a:ext>
             </a:extLst>
           </p:cNvPr>
@@ -7905,186 +7862,177 @@
             <a:spLocks noGrp="1"/>
           </p:cNvSpPr>
           <p:nvPr>
-            <p:ph type="title"/>
-          </p:nvPr>
-        </p:nvSpPr>
-        <p:spPr/>
+            <p:ph idx="1"/>
+          </p:nvPr>
+        </p:nvSpPr>
+        <p:spPr>
+          <a:xfrm>
+            <a:off x="2589212" y="646043"/>
+            <a:ext cx="8915400" cy="5265179"/>
+          </a:xfrm>
+        </p:spPr>
         <p:txBody>
           <a:bodyPr/>
           <a:lstStyle/>
           <a:p>
             <a:r>
+              <a:rPr kumimoji="1" lang="zh-CN" altLang="en-US" dirty="0"/>
+              <a:t>使用</a:t>
+            </a:r>
+            <a:r>
+              <a:rPr kumimoji="1" lang="en-US" altLang="zh-CN" dirty="0" err="1"/>
+              <a:t>mqadmin</a:t>
+            </a:r>
+            <a:r>
+              <a:rPr kumimoji="1" lang="zh-CN" altLang="en-US" dirty="0"/>
+              <a:t>工具以制定</a:t>
+            </a:r>
+            <a:r>
               <a:rPr kumimoji="1" lang="en-US" altLang="zh-CN" dirty="0"/>
-              <a:t>Topic</a:t>
-            </a:r>
+              <a:t>broker</a:t>
+            </a:r>
+            <a:r>
+              <a:rPr kumimoji="1" lang="zh-CN" altLang="en-US" dirty="0"/>
+              <a:t>的形式创建</a:t>
+            </a:r>
+            <a:r>
+              <a:rPr kumimoji="1" lang="en-US" altLang="zh-CN" dirty="0"/>
+              <a:t>topic</a:t>
+            </a:r>
+          </a:p>
+          <a:p>
+            <a:r>
+              <a:rPr kumimoji="1" lang="en" altLang="zh-CN" dirty="0"/>
+              <a:t>./</a:t>
+            </a:r>
+            <a:r>
+              <a:rPr kumimoji="1" lang="en" altLang="zh-CN" dirty="0" err="1"/>
+              <a:t>mqadmin</a:t>
+            </a:r>
+            <a:r>
+              <a:rPr kumimoji="1" lang="en" altLang="zh-CN" dirty="0"/>
+              <a:t> </a:t>
+            </a:r>
+            <a:r>
+              <a:rPr kumimoji="1" lang="en" altLang="zh-CN" dirty="0" err="1"/>
+              <a:t>updateTopic</a:t>
+            </a:r>
+            <a:r>
+              <a:rPr kumimoji="1" lang="en" altLang="zh-CN" dirty="0"/>
+              <a:t> -n 192.168.1.25:30876 -b 192.168.1.25:30911 -t topic-</a:t>
+            </a:r>
+            <a:r>
+              <a:rPr kumimoji="1" lang="en" altLang="zh-CN" dirty="0" err="1"/>
+              <a:t>wt</a:t>
+            </a:r>
+            <a:r>
+              <a:rPr kumimoji="1" lang="en" altLang="zh-CN" dirty="0"/>
+              <a:t>-test -r 8 -w 8  -p 6</a:t>
+            </a:r>
+          </a:p>
+          <a:p>
+            <a:r>
+              <a:rPr kumimoji="1" lang="en" altLang="zh-CN" dirty="0"/>
+              <a:t>./</a:t>
+            </a:r>
+            <a:r>
+              <a:rPr kumimoji="1" lang="en" altLang="zh-CN" dirty="0" err="1"/>
+              <a:t>mqadmin</a:t>
+            </a:r>
+            <a:r>
+              <a:rPr kumimoji="1" lang="en" altLang="zh-CN" dirty="0"/>
+              <a:t> </a:t>
+            </a:r>
+            <a:r>
+              <a:rPr kumimoji="1" lang="en" altLang="zh-CN" dirty="0" err="1"/>
+              <a:t>updateTopic</a:t>
+            </a:r>
+            <a:r>
+              <a:rPr kumimoji="1" lang="en" altLang="zh-CN" dirty="0"/>
+              <a:t> -n 192.168.1.25:30876 -b 192.168.1.25:31911 -t topic-</a:t>
+            </a:r>
+            <a:r>
+              <a:rPr kumimoji="1" lang="en" altLang="zh-CN" dirty="0" err="1"/>
+              <a:t>wt</a:t>
+            </a:r>
+            <a:r>
+              <a:rPr kumimoji="1" lang="en" altLang="zh-CN" dirty="0"/>
+              <a:t>-test -r 4 -w 4 -p 6</a:t>
+            </a:r>
+          </a:p>
+          <a:p>
+            <a:r>
+              <a:rPr kumimoji="1" lang="zh-CN" altLang="en-US" dirty="0"/>
+              <a:t>可以看到分别在</a:t>
+            </a:r>
+            <a:r>
+              <a:rPr kumimoji="1" lang="en-US" altLang="zh-CN" dirty="0"/>
+              <a:t>broker-a </a:t>
+            </a:r>
+            <a:r>
+              <a:rPr kumimoji="1" lang="zh-CN" altLang="en-US" dirty="0"/>
+              <a:t>和</a:t>
+            </a:r>
+            <a:r>
+              <a:rPr kumimoji="1" lang="en-US" altLang="zh-CN" dirty="0"/>
+              <a:t>broker-b</a:t>
+            </a:r>
+            <a:r>
+              <a:rPr kumimoji="1" lang="zh-CN" altLang="en-US" dirty="0"/>
+              <a:t>上创建了</a:t>
+            </a:r>
+            <a:r>
+              <a:rPr kumimoji="1" lang="en-US" altLang="zh-CN" dirty="0"/>
+              <a:t>queue</a:t>
+            </a:r>
+            <a:r>
+              <a:rPr kumimoji="1" lang="zh-CN" altLang="en-US" dirty="0"/>
+              <a:t>数量不同的</a:t>
+            </a:r>
+            <a:r>
+              <a:rPr kumimoji="1" lang="en-US" altLang="zh-CN" dirty="0"/>
+              <a:t>topic</a:t>
+            </a:r>
+          </a:p>
+          <a:p>
             <a:endParaRPr kumimoji="1" lang="zh-CN" altLang="en-US" dirty="0"/>
           </a:p>
         </p:txBody>
       </p:sp>
-      <p:sp>
-        <p:nvSpPr>
-          <p:cNvPr id="3" name="内容占位符 2">
+      <p:pic>
+        <p:nvPicPr>
+          <p:cNvPr id="6" name="图片 5">
             <a:extLst>
               <a:ext uri="{FF2B5EF4-FFF2-40B4-BE49-F238E27FC236}">
-                <a16:creationId xmlns:a16="http://schemas.microsoft.com/office/drawing/2014/main" id="{BB11095B-146A-AA40-888A-9D5D0057495A}"/>
+                <a16:creationId xmlns:a16="http://schemas.microsoft.com/office/drawing/2014/main" id="{E2CB5ECB-8A1B-AE48-9EF4-777B99A203EA}"/>
               </a:ext>
             </a:extLst>
           </p:cNvPr>
-          <p:cNvSpPr>
-            <a:spLocks noGrp="1"/>
-          </p:cNvSpPr>
-          <p:nvPr>
-            <p:ph idx="1"/>
-          </p:nvPr>
-        </p:nvSpPr>
-        <p:spPr/>
-        <p:txBody>
-          <a:bodyPr/>
-          <a:lstStyle/>
-          <a:p>
-            <a:r>
-              <a:rPr lang="en" altLang="zh-CN" dirty="0"/>
-              <a:t>​ Topic</a:t>
-            </a:r>
-            <a:r>
-              <a:rPr lang="zh-CN" altLang="en-US" dirty="0"/>
-              <a:t>是一个逻辑上的概念，实际上</a:t>
-            </a:r>
-            <a:r>
-              <a:rPr lang="en" altLang="zh-CN" dirty="0"/>
-              <a:t>Message</a:t>
-            </a:r>
-            <a:r>
-              <a:rPr lang="zh-CN" altLang="en-US" dirty="0"/>
-              <a:t>是在每个</a:t>
-            </a:r>
-            <a:r>
-              <a:rPr lang="en" altLang="zh-CN" dirty="0"/>
-              <a:t>Broker</a:t>
-            </a:r>
-            <a:r>
-              <a:rPr lang="zh-CN" altLang="en-US" dirty="0"/>
-              <a:t>上以</a:t>
-            </a:r>
-            <a:r>
-              <a:rPr lang="en" altLang="zh-CN" dirty="0"/>
-              <a:t>Queue</a:t>
-            </a:r>
-            <a:r>
-              <a:rPr lang="zh-CN" altLang="en-US" dirty="0"/>
-              <a:t>的形式记录。</a:t>
-            </a:r>
-            <a:endParaRPr lang="en-US" altLang="zh-CN" dirty="0"/>
-          </a:p>
-          <a:p>
-            <a:r>
-              <a:rPr lang="zh-CN" altLang="en-US" dirty="0"/>
-              <a:t>消费者发送的</a:t>
-            </a:r>
-            <a:r>
-              <a:rPr lang="en" altLang="zh-CN" dirty="0"/>
-              <a:t>Message</a:t>
-            </a:r>
-            <a:r>
-              <a:rPr lang="zh-CN" altLang="en-US" dirty="0"/>
-              <a:t>会在</a:t>
-            </a:r>
-            <a:r>
-              <a:rPr lang="en" altLang="zh-CN" dirty="0"/>
-              <a:t>Broker</a:t>
-            </a:r>
-            <a:r>
-              <a:rPr lang="zh-CN" altLang="en-US" dirty="0"/>
-              <a:t>中的</a:t>
-            </a:r>
-            <a:r>
-              <a:rPr lang="en" altLang="zh-CN" dirty="0"/>
-              <a:t>Queue</a:t>
-            </a:r>
-            <a:r>
-              <a:rPr lang="zh-CN" altLang="en-US" dirty="0"/>
-              <a:t>队列中记录。 </a:t>
-            </a:r>
-            <a:endParaRPr lang="en-US" altLang="zh-CN" dirty="0"/>
-          </a:p>
-          <a:p>
-            <a:r>
-              <a:rPr lang="zh-CN" altLang="en-US" dirty="0"/>
-              <a:t>一个</a:t>
-            </a:r>
-            <a:r>
-              <a:rPr lang="en" altLang="zh-CN" dirty="0"/>
-              <a:t>Topic</a:t>
-            </a:r>
-            <a:r>
-              <a:rPr lang="zh-CN" altLang="en-US" dirty="0"/>
-              <a:t>的数据可能会存在多个</a:t>
-            </a:r>
-            <a:r>
-              <a:rPr lang="en" altLang="zh-CN" dirty="0"/>
-              <a:t>Broker</a:t>
-            </a:r>
-            <a:r>
-              <a:rPr lang="zh-CN" altLang="en-US" dirty="0"/>
-              <a:t>中。</a:t>
-            </a:r>
-            <a:endParaRPr lang="en-US" altLang="zh-CN" dirty="0"/>
-          </a:p>
-          <a:p>
-            <a:r>
-              <a:rPr lang="zh-CN" altLang="en-US" dirty="0"/>
-              <a:t>一个</a:t>
-            </a:r>
-            <a:r>
-              <a:rPr lang="en" altLang="zh-CN" dirty="0"/>
-              <a:t>Broker</a:t>
-            </a:r>
-            <a:r>
-              <a:rPr lang="zh-CN" altLang="en-US" dirty="0"/>
-              <a:t>存在多个</a:t>
-            </a:r>
-            <a:r>
-              <a:rPr lang="en" altLang="zh-CN" dirty="0"/>
-              <a:t>Queue</a:t>
-            </a:r>
-            <a:r>
-              <a:rPr lang="zh-CN" altLang="en" dirty="0"/>
-              <a:t>。</a:t>
-            </a:r>
-            <a:r>
-              <a:rPr lang="en" altLang="zh-CN" dirty="0"/>
-              <a:t> </a:t>
-            </a:r>
-          </a:p>
-          <a:p>
-            <a:r>
-              <a:rPr lang="zh-CN" altLang="en-US" dirty="0"/>
-              <a:t>单个的</a:t>
-            </a:r>
-            <a:r>
-              <a:rPr lang="en" altLang="zh-CN" dirty="0"/>
-              <a:t>Queue</a:t>
-            </a:r>
-            <a:r>
-              <a:rPr lang="zh-CN" altLang="en-US" dirty="0"/>
-              <a:t>也可能存储多个</a:t>
-            </a:r>
-            <a:r>
-              <a:rPr lang="en" altLang="zh-CN" dirty="0"/>
-              <a:t>Topic</a:t>
-            </a:r>
-            <a:r>
-              <a:rPr lang="zh-CN" altLang="en-US" dirty="0"/>
-              <a:t>的消息。</a:t>
-            </a:r>
-            <a:endParaRPr kumimoji="1" lang="zh-CN" altLang="en-US" dirty="0"/>
-          </a:p>
-        </p:txBody>
-      </p:sp>
+          <p:cNvPicPr>
+            <a:picLocks noChangeAspect="1"/>
+          </p:cNvPicPr>
+          <p:nvPr/>
+        </p:nvPicPr>
+        <p:blipFill>
+          <a:blip r:embed="rId2"/>
+          <a:stretch>
+            <a:fillRect/>
+          </a:stretch>
+        </p:blipFill>
+        <p:spPr>
+          <a:xfrm>
+            <a:off x="3786809" y="2898756"/>
+            <a:ext cx="5516217" cy="3733608"/>
+          </a:xfrm>
+          <a:prstGeom prst="rect">
+            <a:avLst/>
+          </a:prstGeom>
+        </p:spPr>
+      </p:pic>
     </p:spTree>
     <p:extLst>
       <p:ext uri="{BB962C8B-B14F-4D97-AF65-F5344CB8AC3E}">
-        <p14:creationId xmlns:p14="http://schemas.microsoft.com/office/powerpoint/2010/main" val="3261858290"/>
+        <p14:creationId xmlns:p14="http://schemas.microsoft.com/office/powerpoint/2010/main" val="2087740974"/>
       </p:ext>
     </p:extLst>
   </p:cSld>
@@ -8116,7 +8064,7 @@
           <p:cNvPr id="2" name="标题 1">
             <a:extLst>
               <a:ext uri="{FF2B5EF4-FFF2-40B4-BE49-F238E27FC236}">
-                <a16:creationId xmlns:a16="http://schemas.microsoft.com/office/drawing/2014/main" id="{3C4C9DB7-7226-3245-82DB-7C28A876D84C}"/>
+                <a16:creationId xmlns:a16="http://schemas.microsoft.com/office/drawing/2014/main" id="{B747197F-2F66-3B42-8078-0CD639AFC1E8}"/>
               </a:ext>
             </a:extLst>
           </p:cNvPr>
@@ -8133,77 +8081,41 @@
           <a:lstStyle/>
           <a:p>
             <a:r>
-              <a:rPr kumimoji="1" lang="en-US" altLang="zh-CN" dirty="0"/>
-              <a:t>Topic</a:t>
-            </a:r>
-            <a:r>
               <a:rPr kumimoji="1" lang="zh-CN" altLang="en-US" dirty="0"/>
-              <a:t>和</a:t>
-            </a:r>
-            <a:r>
-              <a:rPr kumimoji="1" lang="en-US" altLang="zh-CN" dirty="0"/>
-              <a:t>Broker</a:t>
-            </a:r>
-            <a:r>
-              <a:rPr kumimoji="1" lang="zh-CN" altLang="en-US" dirty="0"/>
-              <a:t>的关系</a:t>
-            </a:r>
-          </a:p>
-        </p:txBody>
-      </p:sp>
-      <p:pic>
-        <p:nvPicPr>
-          <p:cNvPr id="4" name="Picture 2">
+              <a:t>延迟消息</a:t>
+            </a:r>
+          </a:p>
+        </p:txBody>
+      </p:sp>
+      <p:sp>
+        <p:nvSpPr>
+          <p:cNvPr id="3" name="内容占位符 2">
             <a:extLst>
               <a:ext uri="{FF2B5EF4-FFF2-40B4-BE49-F238E27FC236}">
-                <a16:creationId xmlns:a16="http://schemas.microsoft.com/office/drawing/2014/main" id="{B48DB0A0-2BAA-F646-8B49-0963B233A14A}"/>
+                <a16:creationId xmlns:a16="http://schemas.microsoft.com/office/drawing/2014/main" id="{0343B139-4D01-8C40-8CC0-AD4696002E32}"/>
               </a:ext>
             </a:extLst>
           </p:cNvPr>
-          <p:cNvPicPr>
-            <a:picLocks noGrp="1" noChangeAspect="1" noChangeArrowheads="1"/>
-          </p:cNvPicPr>
+          <p:cNvSpPr>
+            <a:spLocks noGrp="1"/>
+          </p:cNvSpPr>
           <p:nvPr>
             <p:ph idx="1"/>
           </p:nvPr>
-        </p:nvPicPr>
-        <p:blipFill>
-          <a:blip r:embed="rId2">
-            <a:extLst>
-              <a:ext uri="{28A0092B-C50C-407E-A947-70E740481C1C}">
-                <a14:useLocalDpi xmlns:a14="http://schemas.microsoft.com/office/drawing/2010/main" val="0"/>
-              </a:ext>
-            </a:extLst>
-          </a:blip>
-          <a:srcRect/>
-          <a:stretch>
-            <a:fillRect/>
-          </a:stretch>
-        </p:blipFill>
-        <p:spPr bwMode="auto">
-          <a:xfrm>
-            <a:off x="3431641" y="1679197"/>
-            <a:ext cx="5908302" cy="4806755"/>
-          </a:xfrm>
-          <a:prstGeom prst="rect">
-            <a:avLst/>
-          </a:prstGeom>
-          <a:noFill/>
-          <a:extLst>
-            <a:ext uri="{909E8E84-426E-40DD-AFC4-6F175D3DCCD1}">
-              <a14:hiddenFill xmlns:a14="http://schemas.microsoft.com/office/drawing/2010/main">
-                <a:solidFill>
-                  <a:srgbClr val="FFFFFF"/>
-                </a:solidFill>
-              </a14:hiddenFill>
-            </a:ext>
-          </a:extLst>
-        </p:spPr>
-      </p:pic>
+        </p:nvSpPr>
+        <p:spPr/>
+        <p:txBody>
+          <a:bodyPr/>
+          <a:lstStyle/>
+          <a:p>
+            <a:endParaRPr kumimoji="1" lang="zh-CN" altLang="en-US" dirty="0"/>
+          </a:p>
+        </p:txBody>
+      </p:sp>
     </p:spTree>
     <p:extLst>
       <p:ext uri="{BB962C8B-B14F-4D97-AF65-F5344CB8AC3E}">
-        <p14:creationId xmlns:p14="http://schemas.microsoft.com/office/powerpoint/2010/main" val="2162725505"/>
+        <p14:creationId xmlns:p14="http://schemas.microsoft.com/office/powerpoint/2010/main" val="4063166106"/>
       </p:ext>
     </p:extLst>
   </p:cSld>
@@ -8235,7 +8147,7 @@
           <p:cNvPr id="2" name="标题 1">
             <a:extLst>
               <a:ext uri="{FF2B5EF4-FFF2-40B4-BE49-F238E27FC236}">
-                <a16:creationId xmlns:a16="http://schemas.microsoft.com/office/drawing/2014/main" id="{56B54089-DDA3-0546-9A46-36594C1BDD08}"/>
+                <a16:creationId xmlns:a16="http://schemas.microsoft.com/office/drawing/2014/main" id="{3DED9C40-180B-8D40-89A0-94120786767C}"/>
               </a:ext>
             </a:extLst>
           </p:cNvPr>
@@ -8252,12 +8164,8 @@
           <a:lstStyle/>
           <a:p>
             <a:r>
-              <a:rPr kumimoji="1" lang="en-US" altLang="zh-CN" dirty="0" err="1"/>
-              <a:t>RocketMQ</a:t>
-            </a:r>
-            <a:r>
               <a:rPr kumimoji="1" lang="zh-CN" altLang="en-US" dirty="0"/>
-              <a:t>如何保证高可用</a:t>
+              <a:t>事务消息</a:t>
             </a:r>
           </a:p>
         </p:txBody>
@@ -8267,7 +8175,7 @@
           <p:cNvPr id="3" name="内容占位符 2">
             <a:extLst>
               <a:ext uri="{FF2B5EF4-FFF2-40B4-BE49-F238E27FC236}">
-                <a16:creationId xmlns:a16="http://schemas.microsoft.com/office/drawing/2014/main" id="{C69D53C2-376F-C947-8A16-315A869CD2F9}"/>
+                <a16:creationId xmlns:a16="http://schemas.microsoft.com/office/drawing/2014/main" id="{C606135D-D294-0E40-B41B-8036DE1D0794}"/>
               </a:ext>
             </a:extLst>
           </p:cNvPr>
@@ -8283,14 +8191,14 @@
           <a:bodyPr/>
           <a:lstStyle/>
           <a:p>
-            <a:endParaRPr kumimoji="1" lang="zh-CN" altLang="en-US" dirty="0"/>
+            <a:endParaRPr kumimoji="1" lang="zh-CN" altLang="en-US"/>
           </a:p>
         </p:txBody>
       </p:sp>
     </p:spTree>
     <p:extLst>
       <p:ext uri="{BB962C8B-B14F-4D97-AF65-F5344CB8AC3E}">
-        <p14:creationId xmlns:p14="http://schemas.microsoft.com/office/powerpoint/2010/main" val="1961592500"/>
+        <p14:creationId xmlns:p14="http://schemas.microsoft.com/office/powerpoint/2010/main" val="3660366731"/>
       </p:ext>
     </p:extLst>
   </p:cSld>
@@ -8322,7 +8230,7 @@
           <p:cNvPr id="2" name="标题 1">
             <a:extLst>
               <a:ext uri="{FF2B5EF4-FFF2-40B4-BE49-F238E27FC236}">
-                <a16:creationId xmlns:a16="http://schemas.microsoft.com/office/drawing/2014/main" id="{93913AE2-AC33-9149-966D-E50C42CFAADC}"/>
+                <a16:creationId xmlns:a16="http://schemas.microsoft.com/office/drawing/2014/main" id="{56B54089-DDA3-0546-9A46-36594C1BDD08}"/>
               </a:ext>
             </a:extLst>
           </p:cNvPr>
@@ -8339,12 +8247,8 @@
           <a:lstStyle/>
           <a:p>
             <a:r>
-              <a:rPr kumimoji="1" lang="en-US" altLang="zh-CN" dirty="0" err="1"/>
-              <a:t>RocketMQ</a:t>
-            </a:r>
-            <a:r>
               <a:rPr kumimoji="1" lang="zh-CN" altLang="en-US" dirty="0"/>
-              <a:t>负载均衡机制</a:t>
+              <a:t>如何保证高可用</a:t>
             </a:r>
           </a:p>
         </p:txBody>
@@ -8354,7 +8258,7 @@
           <p:cNvPr id="3" name="内容占位符 2">
             <a:extLst>
               <a:ext uri="{FF2B5EF4-FFF2-40B4-BE49-F238E27FC236}">
-                <a16:creationId xmlns:a16="http://schemas.microsoft.com/office/drawing/2014/main" id="{6890FC5C-9645-6F41-83AB-4707FC922C3C}"/>
+                <a16:creationId xmlns:a16="http://schemas.microsoft.com/office/drawing/2014/main" id="{C69D53C2-376F-C947-8A16-315A869CD2F9}"/>
               </a:ext>
             </a:extLst>
           </p:cNvPr>
@@ -8370,14 +8274,14 @@
           <a:bodyPr/>
           <a:lstStyle/>
           <a:p>
-            <a:endParaRPr kumimoji="1" lang="zh-CN" altLang="en-US"/>
+            <a:endParaRPr kumimoji="1" lang="zh-CN" altLang="en-US" dirty="0"/>
           </a:p>
         </p:txBody>
       </p:sp>
     </p:spTree>
     <p:extLst>
       <p:ext uri="{BB962C8B-B14F-4D97-AF65-F5344CB8AC3E}">
-        <p14:creationId xmlns:p14="http://schemas.microsoft.com/office/powerpoint/2010/main" val="1446558323"/>
+        <p14:creationId xmlns:p14="http://schemas.microsoft.com/office/powerpoint/2010/main" val="1961592500"/>
       </p:ext>
     </p:extLst>
   </p:cSld>
@@ -8409,7 +8313,7 @@
           <p:cNvPr id="2" name="标题 1">
             <a:extLst>
               <a:ext uri="{FF2B5EF4-FFF2-40B4-BE49-F238E27FC236}">
-                <a16:creationId xmlns:a16="http://schemas.microsoft.com/office/drawing/2014/main" id="{F89226ED-61C1-F845-8DA6-35D525BDBFCF}"/>
+                <a16:creationId xmlns:a16="http://schemas.microsoft.com/office/drawing/2014/main" id="{93913AE2-AC33-9149-966D-E50C42CFAADC}"/>
               </a:ext>
             </a:extLst>
           </p:cNvPr>
@@ -8426,12 +8330,8 @@
           <a:lstStyle/>
           <a:p>
             <a:r>
-              <a:rPr kumimoji="1" lang="en-US" altLang="zh-CN" dirty="0" err="1"/>
-              <a:t>RocketMQ</a:t>
-            </a:r>
-            <a:r>
               <a:rPr kumimoji="1" lang="zh-CN" altLang="en-US" dirty="0"/>
-              <a:t>存储机制</a:t>
+              <a:t>负载均衡机制</a:t>
             </a:r>
           </a:p>
         </p:txBody>
@@ -8441,7 +8341,7 @@
           <p:cNvPr id="3" name="内容占位符 2">
             <a:extLst>
               <a:ext uri="{FF2B5EF4-FFF2-40B4-BE49-F238E27FC236}">
-                <a16:creationId xmlns:a16="http://schemas.microsoft.com/office/drawing/2014/main" id="{AE5F12A1-20A1-794B-9048-4A83D4115FD9}"/>
+                <a16:creationId xmlns:a16="http://schemas.microsoft.com/office/drawing/2014/main" id="{6890FC5C-9645-6F41-83AB-4707FC922C3C}"/>
               </a:ext>
             </a:extLst>
           </p:cNvPr>
@@ -8457,14 +8357,14 @@
           <a:bodyPr/>
           <a:lstStyle/>
           <a:p>
-            <a:endParaRPr kumimoji="1" lang="zh-CN" altLang="en-US" dirty="0"/>
+            <a:endParaRPr kumimoji="1" lang="zh-CN" altLang="en-US"/>
           </a:p>
         </p:txBody>
       </p:sp>
     </p:spTree>
     <p:extLst>
       <p:ext uri="{BB962C8B-B14F-4D97-AF65-F5344CB8AC3E}">
-        <p14:creationId xmlns:p14="http://schemas.microsoft.com/office/powerpoint/2010/main" val="3262638319"/>
+        <p14:creationId xmlns:p14="http://schemas.microsoft.com/office/powerpoint/2010/main" val="1446558323"/>
       </p:ext>
     </p:extLst>
   </p:cSld>
@@ -8496,6 +8396,93 @@
           <p:cNvPr id="2" name="标题 1">
             <a:extLst>
               <a:ext uri="{FF2B5EF4-FFF2-40B4-BE49-F238E27FC236}">
+                <a16:creationId xmlns:a16="http://schemas.microsoft.com/office/drawing/2014/main" id="{F89226ED-61C1-F845-8DA6-35D525BDBFCF}"/>
+              </a:ext>
+            </a:extLst>
+          </p:cNvPr>
+          <p:cNvSpPr>
+            <a:spLocks noGrp="1"/>
+          </p:cNvSpPr>
+          <p:nvPr>
+            <p:ph type="title"/>
+          </p:nvPr>
+        </p:nvSpPr>
+        <p:spPr/>
+        <p:txBody>
+          <a:bodyPr/>
+          <a:lstStyle/>
+          <a:p>
+            <a:r>
+              <a:rPr kumimoji="1" lang="en-US" altLang="zh-CN" dirty="0" err="1"/>
+              <a:t>RocketMQ</a:t>
+            </a:r>
+            <a:r>
+              <a:rPr kumimoji="1" lang="zh-CN" altLang="en-US" dirty="0"/>
+              <a:t>存储机制</a:t>
+            </a:r>
+          </a:p>
+        </p:txBody>
+      </p:sp>
+      <p:sp>
+        <p:nvSpPr>
+          <p:cNvPr id="3" name="内容占位符 2">
+            <a:extLst>
+              <a:ext uri="{FF2B5EF4-FFF2-40B4-BE49-F238E27FC236}">
+                <a16:creationId xmlns:a16="http://schemas.microsoft.com/office/drawing/2014/main" id="{AE5F12A1-20A1-794B-9048-4A83D4115FD9}"/>
+              </a:ext>
+            </a:extLst>
+          </p:cNvPr>
+          <p:cNvSpPr>
+            <a:spLocks noGrp="1"/>
+          </p:cNvSpPr>
+          <p:nvPr>
+            <p:ph idx="1"/>
+          </p:nvPr>
+        </p:nvSpPr>
+        <p:spPr/>
+        <p:txBody>
+          <a:bodyPr/>
+          <a:lstStyle/>
+          <a:p>
+            <a:endParaRPr kumimoji="1" lang="zh-CN" altLang="en-US" dirty="0"/>
+          </a:p>
+        </p:txBody>
+      </p:sp>
+    </p:spTree>
+    <p:extLst>
+      <p:ext uri="{BB962C8B-B14F-4D97-AF65-F5344CB8AC3E}">
+        <p14:creationId xmlns:p14="http://schemas.microsoft.com/office/powerpoint/2010/main" val="3262638319"/>
+      </p:ext>
+    </p:extLst>
+  </p:cSld>
+  <p:clrMapOvr>
+    <a:masterClrMapping/>
+  </p:clrMapOvr>
+</p:sld>
+</file>
+
+<file path=ppt/slides/slide17.xml><?xml version="1.0" encoding="utf-8"?>
+<p:sld xmlns:a="http://schemas.openxmlformats.org/drawingml/2006/main" xmlns:r="http://schemas.openxmlformats.org/officeDocument/2006/relationships" xmlns:p="http://schemas.openxmlformats.org/presentationml/2006/main">
+  <p:cSld>
+    <p:spTree>
+      <p:nvGrpSpPr>
+        <p:cNvPr id="1" name=""/>
+        <p:cNvGrpSpPr/>
+        <p:nvPr/>
+      </p:nvGrpSpPr>
+      <p:grpSpPr>
+        <a:xfrm>
+          <a:off x="0" y="0"/>
+          <a:ext cx="0" cy="0"/>
+          <a:chOff x="0" y="0"/>
+          <a:chExt cx="0" cy="0"/>
+        </a:xfrm>
+      </p:grpSpPr>
+      <p:sp>
+        <p:nvSpPr>
+          <p:cNvPr id="2" name="标题 1">
+            <a:extLst>
+              <a:ext uri="{FF2B5EF4-FFF2-40B4-BE49-F238E27FC236}">
                 <a16:creationId xmlns:a16="http://schemas.microsoft.com/office/drawing/2014/main" id="{63A09A91-A650-9D4B-BE61-62F8F8FF4EE8}"/>
               </a:ext>
             </a:extLst>
@@ -8538,7 +8525,7 @@
 </p:sld>
 </file>
 
-<file path=ppt/slides/slide17.xml><?xml version="1.0" encoding="utf-8"?>
+<file path=ppt/slides/slide18.xml><?xml version="1.0" encoding="utf-8"?>
 <p:sld xmlns:a="http://schemas.openxmlformats.org/drawingml/2006/main" xmlns:r="http://schemas.openxmlformats.org/officeDocument/2006/relationships" xmlns:p="http://schemas.openxmlformats.org/presentationml/2006/main">
   <p:cSld>
     <p:spTree>
@@ -8854,109 +8841,6 @@
 </p:sld>
 </file>
 
-<file path=ppt/slides/slide18.xml><?xml version="1.0" encoding="utf-8"?>
-<p:sld xmlns:a="http://schemas.openxmlformats.org/drawingml/2006/main" xmlns:r="http://schemas.openxmlformats.org/officeDocument/2006/relationships" xmlns:p="http://schemas.openxmlformats.org/presentationml/2006/main">
-  <p:cSld>
-    <p:spTree>
-      <p:nvGrpSpPr>
-        <p:cNvPr id="1" name=""/>
-        <p:cNvGrpSpPr/>
-        <p:nvPr/>
-      </p:nvGrpSpPr>
-      <p:grpSpPr>
-        <a:xfrm>
-          <a:off x="0" y="0"/>
-          <a:ext cx="0" cy="0"/>
-          <a:chOff x="0" y="0"/>
-          <a:chExt cx="0" cy="0"/>
-        </a:xfrm>
-      </p:grpSpPr>
-      <p:sp>
-        <p:nvSpPr>
-          <p:cNvPr id="2" name="标题 1">
-            <a:extLst>
-              <a:ext uri="{FF2B5EF4-FFF2-40B4-BE49-F238E27FC236}">
-                <a16:creationId xmlns:a16="http://schemas.microsoft.com/office/drawing/2014/main" id="{2A6980E2-634B-844C-B1B3-0CF020D27789}"/>
-              </a:ext>
-            </a:extLst>
-          </p:cNvPr>
-          <p:cNvSpPr>
-            <a:spLocks noGrp="1"/>
-          </p:cNvSpPr>
-          <p:nvPr>
-            <p:ph type="title"/>
-          </p:nvPr>
-        </p:nvSpPr>
-        <p:spPr/>
-        <p:txBody>
-          <a:bodyPr/>
-          <a:lstStyle/>
-          <a:p>
-            <a:r>
-              <a:rPr kumimoji="1" lang="en-US" altLang="zh-CN" dirty="0" err="1"/>
-              <a:t>RocketMQ</a:t>
-            </a:r>
-            <a:r>
-              <a:rPr kumimoji="1" lang="zh-CN" altLang="en-US" dirty="0"/>
-              <a:t>中</a:t>
-            </a:r>
-            <a:r>
-              <a:rPr kumimoji="1" lang="en-US" altLang="zh-CN" dirty="0" err="1"/>
-              <a:t>readQueue</a:t>
-            </a:r>
-            <a:r>
-              <a:rPr kumimoji="1" lang="zh-CN" altLang="en-US" dirty="0"/>
-              <a:t>和</a:t>
-            </a:r>
-            <a:r>
-              <a:rPr kumimoji="1" lang="en-US" altLang="zh-CN" dirty="0" err="1"/>
-              <a:t>WriteQueue</a:t>
-            </a:r>
-            <a:r>
-              <a:rPr kumimoji="1" lang="zh-CN" altLang="en-US" dirty="0"/>
-              <a:t>的概念</a:t>
-            </a:r>
-          </a:p>
-        </p:txBody>
-      </p:sp>
-      <p:sp>
-        <p:nvSpPr>
-          <p:cNvPr id="3" name="内容占位符 2">
-            <a:extLst>
-              <a:ext uri="{FF2B5EF4-FFF2-40B4-BE49-F238E27FC236}">
-                <a16:creationId xmlns:a16="http://schemas.microsoft.com/office/drawing/2014/main" id="{956746AE-E5A1-A543-890F-738B3C9CA93D}"/>
-              </a:ext>
-            </a:extLst>
-          </p:cNvPr>
-          <p:cNvSpPr>
-            <a:spLocks noGrp="1"/>
-          </p:cNvSpPr>
-          <p:nvPr>
-            <p:ph idx="1"/>
-          </p:nvPr>
-        </p:nvSpPr>
-        <p:spPr/>
-        <p:txBody>
-          <a:bodyPr/>
-          <a:lstStyle/>
-          <a:p>
-            <a:endParaRPr kumimoji="1" lang="zh-CN" altLang="en-US" dirty="0"/>
-          </a:p>
-        </p:txBody>
-      </p:sp>
-    </p:spTree>
-    <p:extLst>
-      <p:ext uri="{BB962C8B-B14F-4D97-AF65-F5344CB8AC3E}">
-        <p14:creationId xmlns:p14="http://schemas.microsoft.com/office/powerpoint/2010/main" val="2821253259"/>
-      </p:ext>
-    </p:extLst>
-  </p:cSld>
-  <p:clrMapOvr>
-    <a:masterClrMapping/>
-  </p:clrMapOvr>
-</p:sld>
-</file>
-
 <file path=ppt/slides/slide19.xml><?xml version="1.0" encoding="utf-8"?>
 <p:sld xmlns:a="http://schemas.openxmlformats.org/drawingml/2006/main" xmlns:r="http://schemas.openxmlformats.org/officeDocument/2006/relationships" xmlns:p="http://schemas.openxmlformats.org/presentationml/2006/main">
   <p:cSld>
@@ -8979,7 +8863,7 @@
           <p:cNvPr id="2" name="标题 1">
             <a:extLst>
               <a:ext uri="{FF2B5EF4-FFF2-40B4-BE49-F238E27FC236}">
-                <a16:creationId xmlns:a16="http://schemas.microsoft.com/office/drawing/2014/main" id="{C8EB042B-53C7-134F-B631-E706405B5E7C}"/>
+                <a16:creationId xmlns:a16="http://schemas.microsoft.com/office/drawing/2014/main" id="{2A6980E2-634B-844C-B1B3-0CF020D27789}"/>
               </a:ext>
             </a:extLst>
           </p:cNvPr>
@@ -8996,24 +8880,28 @@
           <a:lstStyle/>
           <a:p>
             <a:r>
+              <a:rPr kumimoji="1" lang="en-US" altLang="zh-CN" dirty="0" err="1"/>
+              <a:t>RocketMQ</a:t>
+            </a:r>
+            <a:r>
               <a:rPr kumimoji="1" lang="zh-CN" altLang="en-US" dirty="0"/>
-              <a:t>如果同一个消费者组的</a:t>
-            </a:r>
-            <a:r>
-              <a:rPr kumimoji="1" lang="en-US" altLang="zh-CN" dirty="0"/>
-              <a:t>Consumer</a:t>
+              <a:t>中</a:t>
+            </a:r>
+            <a:r>
+              <a:rPr kumimoji="1" lang="en-US" altLang="zh-CN" dirty="0" err="1"/>
+              <a:t>readQueue</a:t>
             </a:r>
             <a:r>
               <a:rPr kumimoji="1" lang="zh-CN" altLang="en-US" dirty="0"/>
-              <a:t>订阅了不同的</a:t>
-            </a:r>
-            <a:r>
-              <a:rPr kumimoji="1" lang="en-US" altLang="zh-CN" dirty="0"/>
-              <a:t>Topic</a:t>
+              <a:t>和</a:t>
+            </a:r>
+            <a:r>
+              <a:rPr kumimoji="1" lang="en-US" altLang="zh-CN" dirty="0" err="1"/>
+              <a:t>WriteQueue</a:t>
             </a:r>
             <a:r>
               <a:rPr kumimoji="1" lang="zh-CN" altLang="en-US" dirty="0"/>
-              <a:t>会怎么样？</a:t>
+              <a:t>的概念</a:t>
             </a:r>
           </a:p>
         </p:txBody>
@@ -9023,7 +8911,7 @@
           <p:cNvPr id="3" name="内容占位符 2">
             <a:extLst>
               <a:ext uri="{FF2B5EF4-FFF2-40B4-BE49-F238E27FC236}">
-                <a16:creationId xmlns:a16="http://schemas.microsoft.com/office/drawing/2014/main" id="{84841515-8274-AF4C-AAC2-F331F93B097B}"/>
+                <a16:creationId xmlns:a16="http://schemas.microsoft.com/office/drawing/2014/main" id="{956746AE-E5A1-A543-890F-738B3C9CA93D}"/>
               </a:ext>
             </a:extLst>
           </p:cNvPr>
@@ -9039,9 +8927,6 @@
           <a:bodyPr/>
           <a:lstStyle/>
           <a:p>
-            <a:pPr marL="0" indent="0">
-              <a:buNone/>
-            </a:pPr>
             <a:endParaRPr kumimoji="1" lang="zh-CN" altLang="en-US" dirty="0"/>
           </a:p>
         </p:txBody>
@@ -9049,7 +8934,7 @@
     </p:spTree>
     <p:extLst>
       <p:ext uri="{BB962C8B-B14F-4D97-AF65-F5344CB8AC3E}">
-        <p14:creationId xmlns:p14="http://schemas.microsoft.com/office/powerpoint/2010/main" val="2767276358"/>
+        <p14:creationId xmlns:p14="http://schemas.microsoft.com/office/powerpoint/2010/main" val="2821253259"/>
       </p:ext>
     </p:extLst>
   </p:cSld>
@@ -9195,7 +9080,7 @@
           <p:cNvPr id="2" name="标题 1">
             <a:extLst>
               <a:ext uri="{FF2B5EF4-FFF2-40B4-BE49-F238E27FC236}">
-                <a16:creationId xmlns:a16="http://schemas.microsoft.com/office/drawing/2014/main" id="{4605813C-1C8D-684C-972E-A7B35E17B52C}"/>
+                <a16:creationId xmlns:a16="http://schemas.microsoft.com/office/drawing/2014/main" id="{C8EB042B-53C7-134F-B631-E706405B5E7C}"/>
               </a:ext>
             </a:extLst>
           </p:cNvPr>
@@ -9213,23 +9098,23 @@
           <a:p>
             <a:r>
               <a:rPr kumimoji="1" lang="zh-CN" altLang="en-US" dirty="0"/>
-              <a:t>引入</a:t>
-            </a:r>
-            <a:r>
-              <a:rPr kumimoji="1" lang="en-US" altLang="zh-CN" dirty="0" err="1"/>
-              <a:t>RocketMQ</a:t>
+              <a:t>如果同一个消费者组的</a:t>
+            </a:r>
+            <a:r>
+              <a:rPr kumimoji="1" lang="en-US" altLang="zh-CN" dirty="0"/>
+              <a:t>Consumer</a:t>
             </a:r>
             <a:r>
               <a:rPr kumimoji="1" lang="zh-CN" altLang="en-US" dirty="0"/>
-              <a:t>（</a:t>
+              <a:t>订阅了不同的</a:t>
             </a:r>
             <a:r>
               <a:rPr kumimoji="1" lang="en-US" altLang="zh-CN" dirty="0"/>
-              <a:t>MQ</a:t>
+              <a:t>Topic</a:t>
             </a:r>
             <a:r>
               <a:rPr kumimoji="1" lang="zh-CN" altLang="en-US" dirty="0"/>
-              <a:t>）带来的问题</a:t>
+              <a:t>会怎么样？</a:t>
             </a:r>
           </a:p>
         </p:txBody>
@@ -9239,7 +9124,7 @@
           <p:cNvPr id="3" name="内容占位符 2">
             <a:extLst>
               <a:ext uri="{FF2B5EF4-FFF2-40B4-BE49-F238E27FC236}">
-                <a16:creationId xmlns:a16="http://schemas.microsoft.com/office/drawing/2014/main" id="{148033EE-4F04-5048-9BEC-24DDFAEE6177}"/>
+                <a16:creationId xmlns:a16="http://schemas.microsoft.com/office/drawing/2014/main" id="{84841515-8274-AF4C-AAC2-F331F93B097B}"/>
               </a:ext>
             </a:extLst>
           </p:cNvPr>
@@ -9250,151 +9135,22 @@
             <p:ph idx="1"/>
           </p:nvPr>
         </p:nvSpPr>
-        <p:spPr>
-          <a:xfrm>
-            <a:off x="2589212" y="1643974"/>
-            <a:ext cx="8915400" cy="4267248"/>
-          </a:xfrm>
-        </p:spPr>
-        <p:txBody>
-          <a:bodyPr>
-            <a:normAutofit lnSpcReduction="10000"/>
-          </a:bodyPr>
+        <p:spPr/>
+        <p:txBody>
+          <a:bodyPr/>
           <a:lstStyle/>
           <a:p>
-            <a:r>
-              <a:rPr kumimoji="1" lang="en-US" altLang="zh-CN" dirty="0"/>
-              <a:t> </a:t>
-            </a:r>
-            <a:r>
-              <a:rPr kumimoji="1" lang="zh-CN" altLang="en-US" dirty="0"/>
-              <a:t>增加了中间件，也就增加了单点故障的可能性。</a:t>
-            </a:r>
-            <a:endParaRPr kumimoji="1" lang="en-US" altLang="zh-CN" dirty="0"/>
-          </a:p>
-          <a:p>
-            <a:r>
-              <a:rPr kumimoji="1" lang="zh-CN" altLang="en-US" dirty="0"/>
-              <a:t>通过消息队列的形式属于异步形式，无法同步获取返回值。</a:t>
-            </a:r>
-            <a:endParaRPr kumimoji="1" lang="en-US" altLang="zh-CN" dirty="0"/>
-          </a:p>
-          <a:p>
-            <a:r>
-              <a:rPr kumimoji="1" lang="zh-CN" altLang="en-US" dirty="0"/>
-              <a:t>解决思路：</a:t>
-            </a:r>
-            <a:endParaRPr kumimoji="1" lang="en-US" altLang="zh-CN" dirty="0"/>
-          </a:p>
-          <a:p>
-            <a:r>
-              <a:rPr kumimoji="1" lang="en-US" altLang="zh-CN" dirty="0"/>
-              <a:t>1.</a:t>
-            </a:r>
-            <a:r>
-              <a:rPr kumimoji="1" lang="zh-CN" altLang="en-US" dirty="0"/>
-              <a:t> 消费者消费完成后，把返回消息放到另一个消息通道，生产者通过发生的消息</a:t>
-            </a:r>
-            <a:r>
-              <a:rPr kumimoji="1" lang="en-US" altLang="zh-CN" dirty="0"/>
-              <a:t>ID</a:t>
-            </a:r>
-            <a:r>
-              <a:rPr kumimoji="1" lang="zh-CN" altLang="en-US" dirty="0"/>
-              <a:t>来确定返回消息。</a:t>
-            </a:r>
-            <a:endParaRPr kumimoji="1" lang="en-US" altLang="zh-CN" dirty="0"/>
-          </a:p>
-          <a:p>
-            <a:r>
-              <a:rPr kumimoji="1" lang="en-US" altLang="zh-CN" dirty="0"/>
-              <a:t>2. </a:t>
-            </a:r>
-            <a:r>
-              <a:rPr kumimoji="1" lang="en-US" altLang="zh-CN" dirty="0" err="1"/>
-              <a:t>RocketMQ</a:t>
-            </a:r>
-            <a:r>
-              <a:rPr kumimoji="1" lang="zh-CN" altLang="en-US" dirty="0"/>
-              <a:t>支持</a:t>
-            </a:r>
-            <a:r>
-              <a:rPr lang="zh-CN" altLang="en-US" dirty="0"/>
-              <a:t>请求</a:t>
-            </a:r>
-            <a:r>
-              <a:rPr lang="en-US" altLang="zh-CN" dirty="0"/>
-              <a:t>/</a:t>
-            </a:r>
-            <a:r>
-              <a:rPr lang="zh-CN" altLang="en-US" dirty="0"/>
-              <a:t>应答 语义。可以通过</a:t>
-            </a:r>
-            <a:r>
-              <a:rPr lang="en-US" altLang="zh-CN" dirty="0" err="1"/>
-              <a:t>RocketMQ</a:t>
-            </a:r>
-            <a:r>
-              <a:rPr lang="zh-CN" altLang="en-US" dirty="0"/>
-              <a:t>的</a:t>
-            </a:r>
-            <a:r>
-              <a:rPr lang="en-US" altLang="zh-CN" dirty="0"/>
-              <a:t>API</a:t>
-            </a:r>
-            <a:r>
-              <a:rPr lang="zh-CN" altLang="en-US" dirty="0"/>
-              <a:t>进行消息和回复。</a:t>
-            </a:r>
-            <a:endParaRPr kumimoji="1" lang="en-US" altLang="zh-CN" dirty="0"/>
-          </a:p>
-          <a:p>
-            <a:r>
-              <a:rPr kumimoji="1" lang="en-US" altLang="zh-CN" dirty="0" err="1"/>
-              <a:t>RocketMQ</a:t>
-            </a:r>
-            <a:r>
-              <a:rPr kumimoji="1" lang="zh-CN" altLang="en-US" dirty="0"/>
-              <a:t>不同于数据库，没有</a:t>
-            </a:r>
-            <a:r>
-              <a:rPr kumimoji="1" lang="en-US" altLang="zh-CN" dirty="0"/>
-              <a:t>ACID</a:t>
-            </a:r>
-            <a:r>
-              <a:rPr kumimoji="1" lang="zh-CN" altLang="en-US" dirty="0"/>
-              <a:t>这样的本地事务。如何保证业务执行和消息发送在一个事务中？比如以下场景：用户下单，业务执行完成后发送了订单生成消息给下游系统，但是在事务提交的时候因为某些问题失败了，事务回退了，但是订单消息已经发送，无法回退。</a:t>
-            </a:r>
-            <a:endParaRPr kumimoji="1" lang="en-US" altLang="zh-CN" dirty="0"/>
-          </a:p>
-          <a:p>
-            <a:r>
-              <a:rPr kumimoji="1" lang="zh-CN" altLang="en-US" dirty="0"/>
-              <a:t>解决思路：</a:t>
-            </a:r>
-            <a:endParaRPr kumimoji="1" lang="en-US" altLang="zh-CN" dirty="0"/>
-          </a:p>
-          <a:p>
-            <a:r>
-              <a:rPr kumimoji="1" lang="zh-CN" altLang="en-US" dirty="0"/>
-              <a:t>发件箱模式。定义一个消息队列表，发送</a:t>
-            </a:r>
-            <a:r>
-              <a:rPr kumimoji="1" lang="en-US" altLang="zh-CN" dirty="0" err="1"/>
-              <a:t>mq</a:t>
-            </a:r>
-            <a:r>
-              <a:rPr kumimoji="1" lang="zh-CN" altLang="en-US" dirty="0"/>
-              <a:t>消息时，先将消息小如到消息表中，此时属于数据库本地事务。启用一个组件扫描发件箱并发送。</a:t>
-            </a:r>
-            <a:endParaRPr kumimoji="1" lang="en-US" altLang="zh-CN" dirty="0"/>
+            <a:pPr marL="0" indent="0">
+              <a:buNone/>
+            </a:pPr>
+            <a:endParaRPr kumimoji="1" lang="zh-CN" altLang="en-US" dirty="0"/>
           </a:p>
         </p:txBody>
       </p:sp>
     </p:spTree>
     <p:extLst>
       <p:ext uri="{BB962C8B-B14F-4D97-AF65-F5344CB8AC3E}">
-        <p14:creationId xmlns:p14="http://schemas.microsoft.com/office/powerpoint/2010/main" val="1962971040"/>
+        <p14:creationId xmlns:p14="http://schemas.microsoft.com/office/powerpoint/2010/main" val="2767276358"/>
       </p:ext>
     </p:extLst>
   </p:cSld>
@@ -9426,7 +9182,7 @@
           <p:cNvPr id="2" name="标题 1">
             <a:extLst>
               <a:ext uri="{FF2B5EF4-FFF2-40B4-BE49-F238E27FC236}">
-                <a16:creationId xmlns:a16="http://schemas.microsoft.com/office/drawing/2014/main" id="{13EC6E4E-9A46-DC4A-B9F2-FE4720A7C149}"/>
+                <a16:creationId xmlns:a16="http://schemas.microsoft.com/office/drawing/2014/main" id="{4605813C-1C8D-684C-972E-A7B35E17B52C}"/>
               </a:ext>
             </a:extLst>
           </p:cNvPr>
@@ -9443,12 +9199,24 @@
           <a:lstStyle/>
           <a:p>
             <a:r>
+              <a:rPr kumimoji="1" lang="zh-CN" altLang="en-US" dirty="0"/>
+              <a:t>引入</a:t>
+            </a:r>
+            <a:r>
               <a:rPr kumimoji="1" lang="en-US" altLang="zh-CN" dirty="0" err="1"/>
               <a:t>RocketMQ</a:t>
             </a:r>
             <a:r>
               <a:rPr kumimoji="1" lang="zh-CN" altLang="en-US" dirty="0"/>
-              <a:t>如何保证消息可靠性</a:t>
+              <a:t>（</a:t>
+            </a:r>
+            <a:r>
+              <a:rPr kumimoji="1" lang="en-US" altLang="zh-CN" dirty="0"/>
+              <a:t>MQ</a:t>
+            </a:r>
+            <a:r>
+              <a:rPr kumimoji="1" lang="zh-CN" altLang="en-US" dirty="0"/>
+              <a:t>）带来的问题</a:t>
             </a:r>
           </a:p>
         </p:txBody>
@@ -9458,7 +9226,7 @@
           <p:cNvPr id="3" name="内容占位符 2">
             <a:extLst>
               <a:ext uri="{FF2B5EF4-FFF2-40B4-BE49-F238E27FC236}">
-                <a16:creationId xmlns:a16="http://schemas.microsoft.com/office/drawing/2014/main" id="{4F031BC5-D296-224F-A766-C3D56C05B782}"/>
+                <a16:creationId xmlns:a16="http://schemas.microsoft.com/office/drawing/2014/main" id="{148033EE-4F04-5048-9BEC-24DDFAEE6177}"/>
               </a:ext>
             </a:extLst>
           </p:cNvPr>
@@ -9469,7 +9237,12 @@
             <p:ph idx="1"/>
           </p:nvPr>
         </p:nvSpPr>
-        <p:spPr/>
+        <p:spPr>
+          <a:xfrm>
+            <a:off x="2589212" y="1643974"/>
+            <a:ext cx="8915400" cy="4267248"/>
+          </a:xfrm>
+        </p:spPr>
         <p:txBody>
           <a:bodyPr>
             <a:normAutofit lnSpcReduction="10000"/>
@@ -9478,26 +9251,51 @@
           <a:p>
             <a:r>
               <a:rPr kumimoji="1" lang="en-US" altLang="zh-CN" dirty="0"/>
-              <a:t>Provider</a:t>
+              <a:t> </a:t>
             </a:r>
             <a:r>
               <a:rPr kumimoji="1" lang="zh-CN" altLang="en-US" dirty="0"/>
-              <a:t>端</a:t>
+              <a:t>增加了中间件，也就增加了单点故障的可能性。</a:t>
             </a:r>
             <a:endParaRPr kumimoji="1" lang="en-US" altLang="zh-CN" dirty="0"/>
           </a:p>
           <a:p>
             <a:r>
               <a:rPr kumimoji="1" lang="zh-CN" altLang="en-US" dirty="0"/>
-              <a:t>如果是同步消息，消息投递时</a:t>
-            </a:r>
+              <a:t>通过消息队列的形式属于异步形式，无法同步获取返回值。</a:t>
+            </a:r>
+            <a:endParaRPr kumimoji="1" lang="en-US" altLang="zh-CN" dirty="0"/>
+          </a:p>
+          <a:p>
+            <a:r>
+              <a:rPr kumimoji="1" lang="zh-CN" altLang="en-US" dirty="0"/>
+              <a:t>解决思路：</a:t>
+            </a:r>
+            <a:endParaRPr kumimoji="1" lang="en-US" altLang="zh-CN" dirty="0"/>
+          </a:p>
+          <a:p>
             <a:r>
               <a:rPr kumimoji="1" lang="en-US" altLang="zh-CN" dirty="0"/>
-              <a:t>Broker</a:t>
+              <a:t>1.</a:t>
             </a:r>
             <a:r>
               <a:rPr kumimoji="1" lang="zh-CN" altLang="en-US" dirty="0"/>
-              <a:t>返回失败，重新投递（</a:t>
+              <a:t> 消费者消费完成后，把返回消息放到另一个消息通道，生产者通过发生的消息</a:t>
+            </a:r>
+            <a:r>
+              <a:rPr kumimoji="1" lang="en-US" altLang="zh-CN" dirty="0"/>
+              <a:t>ID</a:t>
+            </a:r>
+            <a:r>
+              <a:rPr kumimoji="1" lang="zh-CN" altLang="en-US" dirty="0"/>
+              <a:t>来确定返回消息。</a:t>
+            </a:r>
+            <a:endParaRPr kumimoji="1" lang="en-US" altLang="zh-CN" dirty="0"/>
+          </a:p>
+          <a:p>
+            <a:r>
+              <a:rPr kumimoji="1" lang="en-US" altLang="zh-CN" dirty="0"/>
+              <a:t>2. </a:t>
             </a:r>
             <a:r>
               <a:rPr kumimoji="1" lang="en-US" altLang="zh-CN" dirty="0" err="1"/>
@@ -9505,68 +9303,85 @@
             </a:r>
             <a:r>
               <a:rPr kumimoji="1" lang="zh-CN" altLang="en-US" dirty="0"/>
-              <a:t>保证消息一定投递成功）</a:t>
+              <a:t>支持</a:t>
+            </a:r>
+            <a:r>
+              <a:rPr lang="zh-CN" altLang="en-US" dirty="0"/>
+              <a:t>请求</a:t>
+            </a:r>
+            <a:r>
+              <a:rPr lang="en-US" altLang="zh-CN" dirty="0"/>
+              <a:t>/</a:t>
+            </a:r>
+            <a:r>
+              <a:rPr lang="zh-CN" altLang="en-US" dirty="0"/>
+              <a:t>应答 语义。可以通过</a:t>
+            </a:r>
+            <a:r>
+              <a:rPr lang="en-US" altLang="zh-CN" dirty="0" err="1"/>
+              <a:t>RocketMQ</a:t>
+            </a:r>
+            <a:r>
+              <a:rPr lang="zh-CN" altLang="en-US" dirty="0"/>
+              <a:t>的</a:t>
+            </a:r>
+            <a:r>
+              <a:rPr lang="en-US" altLang="zh-CN" dirty="0"/>
+              <a:t>API</a:t>
+            </a:r>
+            <a:r>
+              <a:rPr lang="zh-CN" altLang="en-US" dirty="0"/>
+              <a:t>进行消息和回复。</a:t>
             </a:r>
             <a:endParaRPr kumimoji="1" lang="en-US" altLang="zh-CN" dirty="0"/>
           </a:p>
           <a:p>
             <a:r>
+              <a:rPr kumimoji="1" lang="en-US" altLang="zh-CN" dirty="0" err="1"/>
+              <a:t>RocketMQ</a:t>
+            </a:r>
+            <a:r>
               <a:rPr kumimoji="1" lang="zh-CN" altLang="en-US" dirty="0"/>
-              <a:t>如果是异步消息，在回调接口里根据投递状态决定是否重新投递。</a:t>
+              <a:t>不同于数据库，没有</a:t>
+            </a:r>
+            <a:r>
+              <a:rPr kumimoji="1" lang="en-US" altLang="zh-CN" dirty="0"/>
+              <a:t>ACID</a:t>
+            </a:r>
+            <a:r>
+              <a:rPr kumimoji="1" lang="zh-CN" altLang="en-US" dirty="0"/>
+              <a:t>这样的本地事务。如何保证业务执行和消息发送在一个事务中？比如以下场景：用户下单，业务执行完成后发送了订单生成消息给下游系统，但是在事务提交的时候因为某些问题失败了，事务回退了，但是订单消息已经发送，无法回退。</a:t>
             </a:r>
             <a:endParaRPr kumimoji="1" lang="en-US" altLang="zh-CN" dirty="0"/>
           </a:p>
           <a:p>
             <a:r>
-              <a:rPr kumimoji="1" lang="en-US" altLang="zh-CN" dirty="0"/>
-              <a:t>Broker</a:t>
-            </a:r>
-            <a:r>
               <a:rPr kumimoji="1" lang="zh-CN" altLang="en-US" dirty="0"/>
-              <a:t>端</a:t>
+              <a:t>解决思路：</a:t>
             </a:r>
             <a:endParaRPr kumimoji="1" lang="en-US" altLang="zh-CN" dirty="0"/>
           </a:p>
           <a:p>
             <a:r>
               <a:rPr kumimoji="1" lang="zh-CN" altLang="en-US" dirty="0"/>
-              <a:t>根据主从同步策略和消息刷盘策略来共同保证</a:t>
+              <a:t>发件箱模式。定义一个消息队列表，发送</a:t>
+            </a:r>
+            <a:r>
+              <a:rPr kumimoji="1" lang="en-US" altLang="zh-CN" dirty="0" err="1"/>
+              <a:t>mq</a:t>
+            </a:r>
+            <a:r>
+              <a:rPr kumimoji="1" lang="zh-CN" altLang="en-US" dirty="0"/>
+              <a:t>消息时，先将消息小如到消息表中，此时属于数据库本地事务。启用一个组件扫描发件箱并发送。</a:t>
             </a:r>
             <a:endParaRPr kumimoji="1" lang="en-US" altLang="zh-CN" dirty="0"/>
-          </a:p>
-          <a:p>
-            <a:r>
-              <a:rPr kumimoji="1" lang="zh-CN" altLang="en-US" dirty="0"/>
-              <a:t>同步复制，同步刷盘。最安全，不会丢失消息，但是性能最差。</a:t>
-            </a:r>
-            <a:endParaRPr kumimoji="1" lang="en-US" altLang="zh-CN" dirty="0"/>
-          </a:p>
-          <a:p>
-            <a:r>
-              <a:rPr kumimoji="1" lang="zh-CN" altLang="en-US" dirty="0"/>
-              <a:t>同步复制，异步刷盘。折中方案，可靠性和性能都比较好，除非主从同时故障。</a:t>
-            </a:r>
-            <a:endParaRPr kumimoji="1" lang="en-US" altLang="zh-CN" dirty="0"/>
-          </a:p>
-          <a:p>
-            <a:r>
-              <a:rPr kumimoji="1" lang="zh-CN" altLang="en-US" dirty="0"/>
-              <a:t>异步复制，同步刷盘。都同步刷盘了，意义不大。</a:t>
-            </a:r>
-            <a:endParaRPr kumimoji="1" lang="en-US" altLang="zh-CN" dirty="0"/>
-          </a:p>
-          <a:p>
-            <a:r>
-              <a:rPr kumimoji="1" lang="zh-CN" altLang="en-US" dirty="0"/>
-              <a:t>异步复制，异步刷盘。性能最好，如果主节点故障，消息丢失，不推荐。</a:t>
-            </a:r>
           </a:p>
         </p:txBody>
       </p:sp>
     </p:spTree>
     <p:extLst>
       <p:ext uri="{BB962C8B-B14F-4D97-AF65-F5344CB8AC3E}">
-        <p14:creationId xmlns:p14="http://schemas.microsoft.com/office/powerpoint/2010/main" val="1673429681"/>
+        <p14:creationId xmlns:p14="http://schemas.microsoft.com/office/powerpoint/2010/main" val="1962971040"/>
       </p:ext>
     </p:extLst>
   </p:cSld>
@@ -9598,7 +9413,7 @@
           <p:cNvPr id="2" name="标题 1">
             <a:extLst>
               <a:ext uri="{FF2B5EF4-FFF2-40B4-BE49-F238E27FC236}">
-                <a16:creationId xmlns:a16="http://schemas.microsoft.com/office/drawing/2014/main" id="{AF1DC664-2C41-7543-953E-7256D28E7422}"/>
+                <a16:creationId xmlns:a16="http://schemas.microsoft.com/office/drawing/2014/main" id="{13EC6E4E-9A46-DC4A-B9F2-FE4720A7C149}"/>
               </a:ext>
             </a:extLst>
           </p:cNvPr>
@@ -9620,7 +9435,7 @@
             </a:r>
             <a:r>
               <a:rPr kumimoji="1" lang="zh-CN" altLang="en-US" dirty="0"/>
-              <a:t>如何处理消息重复消费</a:t>
+              <a:t>如何保证消息可靠性</a:t>
             </a:r>
           </a:p>
         </p:txBody>
@@ -9630,7 +9445,7 @@
           <p:cNvPr id="3" name="内容占位符 2">
             <a:extLst>
               <a:ext uri="{FF2B5EF4-FFF2-40B4-BE49-F238E27FC236}">
-                <a16:creationId xmlns:a16="http://schemas.microsoft.com/office/drawing/2014/main" id="{8D92B3C3-CF9F-1D43-9D5D-D435D712EA06}"/>
+                <a16:creationId xmlns:a16="http://schemas.microsoft.com/office/drawing/2014/main" id="{4F031BC5-D296-224F-A766-C3D56C05B782}"/>
               </a:ext>
             </a:extLst>
           </p:cNvPr>
@@ -9643,73 +9458,102 @@
         </p:nvSpPr>
         <p:spPr/>
         <p:txBody>
-          <a:bodyPr/>
+          <a:bodyPr>
+            <a:normAutofit lnSpcReduction="10000"/>
+          </a:bodyPr>
           <a:lstStyle/>
           <a:p>
+            <a:r>
+              <a:rPr kumimoji="1" lang="en-US" altLang="zh-CN" dirty="0"/>
+              <a:t>Provider</a:t>
+            </a:r>
+            <a:r>
+              <a:rPr kumimoji="1" lang="zh-CN" altLang="en-US" dirty="0"/>
+              <a:t>端</a:t>
+            </a:r>
+            <a:endParaRPr kumimoji="1" lang="en-US" altLang="zh-CN" dirty="0"/>
+          </a:p>
+          <a:p>
+            <a:r>
+              <a:rPr kumimoji="1" lang="zh-CN" altLang="en-US" dirty="0"/>
+              <a:t>如果是同步消息，消息投递时</a:t>
+            </a:r>
+            <a:r>
+              <a:rPr kumimoji="1" lang="en-US" altLang="zh-CN" dirty="0"/>
+              <a:t>Broker</a:t>
+            </a:r>
+            <a:r>
+              <a:rPr kumimoji="1" lang="zh-CN" altLang="en-US" dirty="0"/>
+              <a:t>返回失败，重新投递（</a:t>
+            </a:r>
             <a:r>
               <a:rPr kumimoji="1" lang="en-US" altLang="zh-CN" dirty="0" err="1"/>
               <a:t>RocketMQ</a:t>
             </a:r>
             <a:r>
               <a:rPr kumimoji="1" lang="zh-CN" altLang="en-US" dirty="0"/>
-              <a:t>自身并不解决消息重复消费的问题。需要使用者自己解决。</a:t>
+              <a:t>保证消息一定投递成功）</a:t>
             </a:r>
             <a:endParaRPr kumimoji="1" lang="en-US" altLang="zh-CN" dirty="0"/>
           </a:p>
           <a:p>
             <a:r>
               <a:rPr kumimoji="1" lang="zh-CN" altLang="en-US" dirty="0"/>
-              <a:t>解决方案有</a:t>
-            </a:r>
+              <a:t>如果是异步消息，在回调接口里根据投递状态决定是否重新投递。</a:t>
+            </a:r>
+            <a:endParaRPr kumimoji="1" lang="en-US" altLang="zh-CN" dirty="0"/>
+          </a:p>
+          <a:p>
             <a:r>
               <a:rPr kumimoji="1" lang="en-US" altLang="zh-CN" dirty="0"/>
-              <a:t>2</a:t>
+              <a:t>Broker</a:t>
             </a:r>
             <a:r>
               <a:rPr kumimoji="1" lang="zh-CN" altLang="en-US" dirty="0"/>
-              <a:t>种：</a:t>
+              <a:t>端</a:t>
             </a:r>
             <a:endParaRPr kumimoji="1" lang="en-US" altLang="zh-CN" dirty="0"/>
           </a:p>
           <a:p>
             <a:r>
               <a:rPr kumimoji="1" lang="zh-CN" altLang="en-US" dirty="0"/>
-              <a:t>保证消费逻辑的幂等性。</a:t>
+              <a:t>根据主从同步策略和消息刷盘策略来共同保证</a:t>
             </a:r>
             <a:endParaRPr kumimoji="1" lang="en-US" altLang="zh-CN" dirty="0"/>
           </a:p>
           <a:p>
             <a:r>
               <a:rPr kumimoji="1" lang="zh-CN" altLang="en-US" dirty="0"/>
-              <a:t>维护一个已消费消息的记录。（比如在数据库或者</a:t>
-            </a:r>
-            <a:r>
-              <a:rPr kumimoji="1" lang="en-US" altLang="zh-CN" dirty="0"/>
-              <a:t>Redis</a:t>
-            </a:r>
+              <a:t>同步复制，同步刷盘。最安全，不会丢失消息，但是性能最差。</a:t>
+            </a:r>
+            <a:endParaRPr kumimoji="1" lang="en-US" altLang="zh-CN" dirty="0"/>
+          </a:p>
+          <a:p>
             <a:r>
               <a:rPr kumimoji="1" lang="zh-CN" altLang="en-US" dirty="0"/>
-              <a:t>中保存已经消费的消息</a:t>
-            </a:r>
-            <a:r>
-              <a:rPr kumimoji="1" lang="en-US" altLang="zh-CN" dirty="0"/>
-              <a:t>ID</a:t>
-            </a:r>
+              <a:t>同步复制，异步刷盘。折中方案，可靠性和性能都比较好，除非主从同时故障。</a:t>
+            </a:r>
+            <a:endParaRPr kumimoji="1" lang="en-US" altLang="zh-CN" dirty="0"/>
+          </a:p>
+          <a:p>
             <a:r>
               <a:rPr kumimoji="1" lang="zh-CN" altLang="en-US" dirty="0"/>
-              <a:t>）</a:t>
+              <a:t>异步复制，同步刷盘。都同步刷盘了，意义不大。</a:t>
             </a:r>
             <a:endParaRPr kumimoji="1" lang="en-US" altLang="zh-CN" dirty="0"/>
           </a:p>
           <a:p>
-            <a:endParaRPr kumimoji="1" lang="en-US" altLang="zh-CN" dirty="0"/>
+            <a:r>
+              <a:rPr kumimoji="1" lang="zh-CN" altLang="en-US" dirty="0"/>
+              <a:t>异步复制，异步刷盘。性能最好，如果主节点故障，消息丢失，不推荐。</a:t>
+            </a:r>
           </a:p>
         </p:txBody>
       </p:sp>
     </p:spTree>
     <p:extLst>
       <p:ext uri="{BB962C8B-B14F-4D97-AF65-F5344CB8AC3E}">
-        <p14:creationId xmlns:p14="http://schemas.microsoft.com/office/powerpoint/2010/main" val="3595485941"/>
+        <p14:creationId xmlns:p14="http://schemas.microsoft.com/office/powerpoint/2010/main" val="1673429681"/>
       </p:ext>
     </p:extLst>
   </p:cSld>
@@ -9741,6 +9585,149 @@
           <p:cNvPr id="2" name="标题 1">
             <a:extLst>
               <a:ext uri="{FF2B5EF4-FFF2-40B4-BE49-F238E27FC236}">
+                <a16:creationId xmlns:a16="http://schemas.microsoft.com/office/drawing/2014/main" id="{AF1DC664-2C41-7543-953E-7256D28E7422}"/>
+              </a:ext>
+            </a:extLst>
+          </p:cNvPr>
+          <p:cNvSpPr>
+            <a:spLocks noGrp="1"/>
+          </p:cNvSpPr>
+          <p:nvPr>
+            <p:ph type="title"/>
+          </p:nvPr>
+        </p:nvSpPr>
+        <p:spPr/>
+        <p:txBody>
+          <a:bodyPr/>
+          <a:lstStyle/>
+          <a:p>
+            <a:r>
+              <a:rPr kumimoji="1" lang="en-US" altLang="zh-CN" dirty="0" err="1"/>
+              <a:t>RocketMQ</a:t>
+            </a:r>
+            <a:r>
+              <a:rPr kumimoji="1" lang="zh-CN" altLang="en-US" dirty="0"/>
+              <a:t>如何处理消息重复消费</a:t>
+            </a:r>
+          </a:p>
+        </p:txBody>
+      </p:sp>
+      <p:sp>
+        <p:nvSpPr>
+          <p:cNvPr id="3" name="内容占位符 2">
+            <a:extLst>
+              <a:ext uri="{FF2B5EF4-FFF2-40B4-BE49-F238E27FC236}">
+                <a16:creationId xmlns:a16="http://schemas.microsoft.com/office/drawing/2014/main" id="{8D92B3C3-CF9F-1D43-9D5D-D435D712EA06}"/>
+              </a:ext>
+            </a:extLst>
+          </p:cNvPr>
+          <p:cNvSpPr>
+            <a:spLocks noGrp="1"/>
+          </p:cNvSpPr>
+          <p:nvPr>
+            <p:ph idx="1"/>
+          </p:nvPr>
+        </p:nvSpPr>
+        <p:spPr/>
+        <p:txBody>
+          <a:bodyPr/>
+          <a:lstStyle/>
+          <a:p>
+            <a:r>
+              <a:rPr kumimoji="1" lang="en-US" altLang="zh-CN" dirty="0" err="1"/>
+              <a:t>RocketMQ</a:t>
+            </a:r>
+            <a:r>
+              <a:rPr kumimoji="1" lang="zh-CN" altLang="en-US" dirty="0"/>
+              <a:t>自身并不解决消息重复消费的问题。需要使用者自己解决。</a:t>
+            </a:r>
+            <a:endParaRPr kumimoji="1" lang="en-US" altLang="zh-CN" dirty="0"/>
+          </a:p>
+          <a:p>
+            <a:r>
+              <a:rPr kumimoji="1" lang="zh-CN" altLang="en-US" dirty="0"/>
+              <a:t>解决方案有</a:t>
+            </a:r>
+            <a:r>
+              <a:rPr kumimoji="1" lang="en-US" altLang="zh-CN" dirty="0"/>
+              <a:t>2</a:t>
+            </a:r>
+            <a:r>
+              <a:rPr kumimoji="1" lang="zh-CN" altLang="en-US" dirty="0"/>
+              <a:t>种：</a:t>
+            </a:r>
+            <a:endParaRPr kumimoji="1" lang="en-US" altLang="zh-CN" dirty="0"/>
+          </a:p>
+          <a:p>
+            <a:r>
+              <a:rPr kumimoji="1" lang="zh-CN" altLang="en-US" dirty="0"/>
+              <a:t>保证消费逻辑的幂等性。</a:t>
+            </a:r>
+            <a:endParaRPr kumimoji="1" lang="en-US" altLang="zh-CN" dirty="0"/>
+          </a:p>
+          <a:p>
+            <a:r>
+              <a:rPr kumimoji="1" lang="zh-CN" altLang="en-US" dirty="0"/>
+              <a:t>维护一个已消费消息的记录。（比如在数据库或者</a:t>
+            </a:r>
+            <a:r>
+              <a:rPr kumimoji="1" lang="en-US" altLang="zh-CN" dirty="0"/>
+              <a:t>Redis</a:t>
+            </a:r>
+            <a:r>
+              <a:rPr kumimoji="1" lang="zh-CN" altLang="en-US" dirty="0"/>
+              <a:t>中保存已经消费的消息</a:t>
+            </a:r>
+            <a:r>
+              <a:rPr kumimoji="1" lang="en-US" altLang="zh-CN" dirty="0"/>
+              <a:t>ID</a:t>
+            </a:r>
+            <a:r>
+              <a:rPr kumimoji="1" lang="zh-CN" altLang="en-US" dirty="0"/>
+              <a:t>）</a:t>
+            </a:r>
+            <a:endParaRPr kumimoji="1" lang="en-US" altLang="zh-CN" dirty="0"/>
+          </a:p>
+          <a:p>
+            <a:endParaRPr kumimoji="1" lang="en-US" altLang="zh-CN" dirty="0"/>
+          </a:p>
+        </p:txBody>
+      </p:sp>
+    </p:spTree>
+    <p:extLst>
+      <p:ext uri="{BB962C8B-B14F-4D97-AF65-F5344CB8AC3E}">
+        <p14:creationId xmlns:p14="http://schemas.microsoft.com/office/powerpoint/2010/main" val="3595485941"/>
+      </p:ext>
+    </p:extLst>
+  </p:cSld>
+  <p:clrMapOvr>
+    <a:masterClrMapping/>
+  </p:clrMapOvr>
+</p:sld>
+</file>
+
+<file path=ppt/slides/slide24.xml><?xml version="1.0" encoding="utf-8"?>
+<p:sld xmlns:a="http://schemas.openxmlformats.org/drawingml/2006/main" xmlns:r="http://schemas.openxmlformats.org/officeDocument/2006/relationships" xmlns:p="http://schemas.openxmlformats.org/presentationml/2006/main">
+  <p:cSld>
+    <p:spTree>
+      <p:nvGrpSpPr>
+        <p:cNvPr id="1" name=""/>
+        <p:cNvGrpSpPr/>
+        <p:nvPr/>
+      </p:nvGrpSpPr>
+      <p:grpSpPr>
+        <a:xfrm>
+          <a:off x="0" y="0"/>
+          <a:ext cx="0" cy="0"/>
+          <a:chOff x="0" y="0"/>
+          <a:chExt cx="0" cy="0"/>
+        </a:xfrm>
+      </p:grpSpPr>
+      <p:sp>
+        <p:nvSpPr>
+          <p:cNvPr id="2" name="标题 1">
+            <a:extLst>
+              <a:ext uri="{FF2B5EF4-FFF2-40B4-BE49-F238E27FC236}">
                 <a16:creationId xmlns:a16="http://schemas.microsoft.com/office/drawing/2014/main" id="{29BD7B92-C53F-5048-A035-CD294FA54FCA}"/>
               </a:ext>
             </a:extLst>
@@ -9806,7 +9793,7 @@
 </p:sld>
 </file>
 
-<file path=ppt/slides/slide24.xml><?xml version="1.0" encoding="utf-8"?>
+<file path=ppt/slides/slide25.xml><?xml version="1.0" encoding="utf-8"?>
 <p:sld xmlns:a="http://schemas.openxmlformats.org/drawingml/2006/main" xmlns:r="http://schemas.openxmlformats.org/officeDocument/2006/relationships" xmlns:p="http://schemas.openxmlformats.org/presentationml/2006/main">
   <p:cSld>
     <p:spTree>
@@ -12281,7 +12268,7 @@
           <p:cNvPr id="2" name="标题 1">
             <a:extLst>
               <a:ext uri="{FF2B5EF4-FFF2-40B4-BE49-F238E27FC236}">
-                <a16:creationId xmlns:a16="http://schemas.microsoft.com/office/drawing/2014/main" id="{749B85EF-B4A2-CD4D-9FF5-9992CAB61BAF}"/>
+                <a16:creationId xmlns:a16="http://schemas.microsoft.com/office/drawing/2014/main" id="{3CA14422-F1CE-9B43-8ED2-FB9A7B0EDFC0}"/>
               </a:ext>
             </a:extLst>
           </p:cNvPr>
@@ -12302,9 +12289,10 @@
               <a:t>RocketMQ</a:t>
             </a:r>
             <a:r>
-              <a:rPr kumimoji="1" lang="zh-CN" altLang="en-US" dirty="0"/>
-              <a:t>消息类型</a:t>
-            </a:r>
+              <a:rPr kumimoji="1" lang="en-US" altLang="zh-CN" dirty="0"/>
+              <a:t> Broker</a:t>
+            </a:r>
+            <a:endParaRPr kumimoji="1" lang="zh-CN" altLang="en-US" dirty="0"/>
           </a:p>
         </p:txBody>
       </p:sp>
@@ -12313,7 +12301,7 @@
           <p:cNvPr id="3" name="内容占位符 2">
             <a:extLst>
               <a:ext uri="{FF2B5EF4-FFF2-40B4-BE49-F238E27FC236}">
-                <a16:creationId xmlns:a16="http://schemas.microsoft.com/office/drawing/2014/main" id="{D415E970-5B2D-1C46-B297-FA97D0F7AA0E}"/>
+                <a16:creationId xmlns:a16="http://schemas.microsoft.com/office/drawing/2014/main" id="{E3E523E4-A945-3641-BDF9-4ADCD91C9AFD}"/>
               </a:ext>
             </a:extLst>
           </p:cNvPr>
@@ -12330,27 +12318,61 @@
           <a:lstStyle/>
           <a:p>
             <a:r>
-              <a:rPr kumimoji="1" lang="zh-CN" altLang="en-US" dirty="0"/>
-              <a:t>普通消息：同步，异步</a:t>
-            </a:r>
-            <a:endParaRPr kumimoji="1" lang="en-US" altLang="zh-CN" dirty="0"/>
-          </a:p>
-          <a:p>
-            <a:r>
-              <a:rPr kumimoji="1" lang="zh-CN" altLang="en-US" dirty="0"/>
-              <a:t>事务消息</a:t>
-            </a:r>
-            <a:endParaRPr kumimoji="1" lang="en-US" altLang="zh-CN" dirty="0"/>
-          </a:p>
-          <a:p>
-            <a:r>
-              <a:rPr kumimoji="1" lang="zh-CN" altLang="en-US" dirty="0"/>
-              <a:t>延迟消息</a:t>
-            </a:r>
-            <a:endParaRPr kumimoji="1" lang="en-US" altLang="zh-CN" dirty="0"/>
-          </a:p>
-          <a:p>
-            <a:endParaRPr kumimoji="1" lang="en-US" altLang="zh-CN" dirty="0"/>
+              <a:rPr lang="zh-CN" altLang="en-US" dirty="0"/>
+              <a:t>接收</a:t>
+            </a:r>
+            <a:r>
+              <a:rPr lang="en" altLang="zh-CN" dirty="0"/>
+              <a:t>Producer </a:t>
+            </a:r>
+            <a:r>
+              <a:rPr lang="zh-CN" altLang="en-US" dirty="0"/>
+              <a:t>发过来的消息</a:t>
+            </a:r>
+            <a:endParaRPr lang="en-US" altLang="zh-CN" dirty="0"/>
+          </a:p>
+          <a:p>
+            <a:r>
+              <a:rPr lang="zh-CN" altLang="en-US" dirty="0"/>
+              <a:t>处理</a:t>
+            </a:r>
+            <a:r>
+              <a:rPr lang="en" altLang="zh-CN" dirty="0"/>
+              <a:t>Consumer </a:t>
+            </a:r>
+            <a:r>
+              <a:rPr lang="zh-CN" altLang="en-US" dirty="0"/>
+              <a:t>的消费消息请求</a:t>
+            </a:r>
+            <a:endParaRPr lang="en-US" altLang="zh-CN" dirty="0"/>
+          </a:p>
+          <a:p>
+            <a:r>
+              <a:rPr lang="zh-CN" altLang="en-US" dirty="0"/>
+              <a:t>消息的持久化存储</a:t>
+            </a:r>
+            <a:endParaRPr lang="en-US" altLang="zh-CN" dirty="0"/>
+          </a:p>
+          <a:p>
+            <a:r>
+              <a:rPr lang="zh-CN" altLang="en-US" dirty="0"/>
+              <a:t>消息的</a:t>
+            </a:r>
+            <a:r>
+              <a:rPr lang="en" altLang="zh-CN" dirty="0"/>
+              <a:t>HA </a:t>
+            </a:r>
+            <a:r>
+              <a:rPr lang="zh-CN" altLang="en-US" dirty="0"/>
+              <a:t>机制</a:t>
+            </a:r>
+            <a:endParaRPr lang="en-US" altLang="zh-CN" dirty="0"/>
+          </a:p>
+          <a:p>
+            <a:r>
+              <a:rPr lang="zh-CN" altLang="en-US" dirty="0"/>
+              <a:t>服务端过滤功能</a:t>
+            </a:r>
           </a:p>
           <a:p>
             <a:endParaRPr kumimoji="1" lang="zh-CN" altLang="en-US" dirty="0"/>
@@ -12360,7 +12382,7 @@
     </p:spTree>
     <p:extLst>
       <p:ext uri="{BB962C8B-B14F-4D97-AF65-F5344CB8AC3E}">
-        <p14:creationId xmlns:p14="http://schemas.microsoft.com/office/powerpoint/2010/main" val="2474116664"/>
+        <p14:creationId xmlns:p14="http://schemas.microsoft.com/office/powerpoint/2010/main" val="2861629590"/>
       </p:ext>
     </p:extLst>
   </p:cSld>
@@ -12392,7 +12414,7 @@
           <p:cNvPr id="2" name="标题 1">
             <a:extLst>
               <a:ext uri="{FF2B5EF4-FFF2-40B4-BE49-F238E27FC236}">
-                <a16:creationId xmlns:a16="http://schemas.microsoft.com/office/drawing/2014/main" id="{B747197F-2F66-3B42-8078-0CD639AFC1E8}"/>
+                <a16:creationId xmlns:a16="http://schemas.microsoft.com/office/drawing/2014/main" id="{AAA82EE9-91D9-DD44-9A2A-8BF8F7E5A3FD}"/>
               </a:ext>
             </a:extLst>
           </p:cNvPr>
@@ -12409,13 +12431,10 @@
           <a:lstStyle/>
           <a:p>
             <a:r>
-              <a:rPr kumimoji="1" lang="en-US" altLang="zh-CN" dirty="0" err="1"/>
-              <a:t>RocketMQ</a:t>
-            </a:r>
-            <a:r>
-              <a:rPr kumimoji="1" lang="zh-CN" altLang="en-US" dirty="0"/>
-              <a:t>延迟消息</a:t>
-            </a:r>
+              <a:rPr kumimoji="1" lang="en-US" altLang="zh-CN" dirty="0"/>
+              <a:t>Topic</a:t>
+            </a:r>
+            <a:endParaRPr kumimoji="1" lang="zh-CN" altLang="en-US" dirty="0"/>
           </a:p>
         </p:txBody>
       </p:sp>
@@ -12424,7 +12443,7 @@
           <p:cNvPr id="3" name="内容占位符 2">
             <a:extLst>
               <a:ext uri="{FF2B5EF4-FFF2-40B4-BE49-F238E27FC236}">
-                <a16:creationId xmlns:a16="http://schemas.microsoft.com/office/drawing/2014/main" id="{0343B139-4D01-8C40-8CC0-AD4696002E32}"/>
+                <a16:creationId xmlns:a16="http://schemas.microsoft.com/office/drawing/2014/main" id="{BB11095B-146A-AA40-888A-9D5D0057495A}"/>
               </a:ext>
             </a:extLst>
           </p:cNvPr>
@@ -12440,6 +12459,141 @@
           <a:bodyPr/>
           <a:lstStyle/>
           <a:p>
+            <a:r>
+              <a:rPr lang="en" altLang="zh-CN" dirty="0"/>
+              <a:t>​ Topic</a:t>
+            </a:r>
+            <a:r>
+              <a:rPr lang="zh-CN" altLang="en-US" dirty="0"/>
+              <a:t>是一个逻辑上的概念，实际上</a:t>
+            </a:r>
+            <a:r>
+              <a:rPr lang="en" altLang="zh-CN" dirty="0"/>
+              <a:t>Message</a:t>
+            </a:r>
+            <a:r>
+              <a:rPr lang="zh-CN" altLang="en-US" dirty="0"/>
+              <a:t>是在每个</a:t>
+            </a:r>
+            <a:r>
+              <a:rPr lang="en" altLang="zh-CN" dirty="0"/>
+              <a:t>Broker</a:t>
+            </a:r>
+            <a:r>
+              <a:rPr lang="zh-CN" altLang="en-US" dirty="0"/>
+              <a:t>上以</a:t>
+            </a:r>
+            <a:r>
+              <a:rPr lang="en" altLang="zh-CN" dirty="0"/>
+              <a:t>Queue</a:t>
+            </a:r>
+            <a:r>
+              <a:rPr lang="zh-CN" altLang="en-US" dirty="0"/>
+              <a:t>的形式记录。</a:t>
+            </a:r>
+            <a:endParaRPr lang="en-US" altLang="zh-CN" dirty="0"/>
+          </a:p>
+          <a:p>
+            <a:r>
+              <a:rPr lang="zh-CN" altLang="en-US" dirty="0"/>
+              <a:t>消费者发送的</a:t>
+            </a:r>
+            <a:r>
+              <a:rPr lang="en" altLang="zh-CN" dirty="0"/>
+              <a:t>Message</a:t>
+            </a:r>
+            <a:r>
+              <a:rPr lang="zh-CN" altLang="en-US" dirty="0"/>
+              <a:t>会在</a:t>
+            </a:r>
+            <a:r>
+              <a:rPr lang="en" altLang="zh-CN" dirty="0"/>
+              <a:t>Broker</a:t>
+            </a:r>
+            <a:r>
+              <a:rPr lang="zh-CN" altLang="en-US" dirty="0"/>
+              <a:t>中的</a:t>
+            </a:r>
+            <a:r>
+              <a:rPr lang="en" altLang="zh-CN" dirty="0"/>
+              <a:t>Queue</a:t>
+            </a:r>
+            <a:r>
+              <a:rPr lang="zh-CN" altLang="en-US" dirty="0"/>
+              <a:t>队列中记录。 </a:t>
+            </a:r>
+            <a:endParaRPr lang="en-US" altLang="zh-CN" dirty="0"/>
+          </a:p>
+          <a:p>
+            <a:r>
+              <a:rPr lang="zh-CN" altLang="en-US" dirty="0"/>
+              <a:t>一个</a:t>
+            </a:r>
+            <a:r>
+              <a:rPr lang="en" altLang="zh-CN" dirty="0"/>
+              <a:t>Topic</a:t>
+            </a:r>
+            <a:r>
+              <a:rPr lang="zh-CN" altLang="en-US" dirty="0"/>
+              <a:t>的数据可能会存在多个</a:t>
+            </a:r>
+            <a:r>
+              <a:rPr lang="en" altLang="zh-CN" dirty="0"/>
+              <a:t>Broker</a:t>
+            </a:r>
+            <a:r>
+              <a:rPr lang="zh-CN" altLang="en-US" dirty="0"/>
+              <a:t>中。</a:t>
+            </a:r>
+            <a:endParaRPr lang="en-US" altLang="zh-CN" dirty="0"/>
+          </a:p>
+          <a:p>
+            <a:r>
+              <a:rPr lang="zh-CN" altLang="en-US" dirty="0"/>
+              <a:t>一个</a:t>
+            </a:r>
+            <a:r>
+              <a:rPr lang="en" altLang="zh-CN" dirty="0"/>
+              <a:t>Broker</a:t>
+            </a:r>
+            <a:r>
+              <a:rPr lang="zh-CN" altLang="en-US" dirty="0"/>
+              <a:t>存在多个</a:t>
+            </a:r>
+            <a:r>
+              <a:rPr lang="en" altLang="zh-CN" dirty="0"/>
+              <a:t>Queue</a:t>
+            </a:r>
+            <a:r>
+              <a:rPr lang="zh-CN" altLang="en" dirty="0"/>
+              <a:t>。</a:t>
+            </a:r>
+            <a:r>
+              <a:rPr lang="en" altLang="zh-CN" dirty="0"/>
+              <a:t> </a:t>
+            </a:r>
+          </a:p>
+          <a:p>
+            <a:r>
+              <a:rPr lang="zh-CN" altLang="en-US" dirty="0"/>
+              <a:t>单个的</a:t>
+            </a:r>
+            <a:r>
+              <a:rPr lang="en" altLang="zh-CN" dirty="0"/>
+              <a:t>Queue</a:t>
+            </a:r>
+            <a:r>
+              <a:rPr lang="zh-CN" altLang="en-US" dirty="0"/>
+              <a:t>也可能存储多个</a:t>
+            </a:r>
+            <a:r>
+              <a:rPr lang="en" altLang="zh-CN" dirty="0"/>
+              <a:t>Topic</a:t>
+            </a:r>
+            <a:r>
+              <a:rPr lang="zh-CN" altLang="en-US" dirty="0"/>
+              <a:t>的消息。</a:t>
+            </a:r>
             <a:endParaRPr kumimoji="1" lang="zh-CN" altLang="en-US" dirty="0"/>
           </a:p>
         </p:txBody>
@@ -12447,7 +12601,7 @@
     </p:spTree>
     <p:extLst>
       <p:ext uri="{BB962C8B-B14F-4D97-AF65-F5344CB8AC3E}">
-        <p14:creationId xmlns:p14="http://schemas.microsoft.com/office/powerpoint/2010/main" val="4063166106"/>
+        <p14:creationId xmlns:p14="http://schemas.microsoft.com/office/powerpoint/2010/main" val="3261858290"/>
       </p:ext>
     </p:extLst>
   </p:cSld>

</xml_diff>

<commit_message>
RocketMQ简介.pptx by qiyu 2021-04-28
</commit_message>
<xml_diff>
--- a/doc/RocketMQ简介.pptx
+++ b/doc/RocketMQ简介.pptx
@@ -16,20 +16,21 @@
     <p:sldId id="281" r:id="rId10"/>
     <p:sldId id="282" r:id="rId11"/>
     <p:sldId id="283" r:id="rId12"/>
-    <p:sldId id="271" r:id="rId13"/>
-    <p:sldId id="284" r:id="rId14"/>
-    <p:sldId id="272" r:id="rId15"/>
-    <p:sldId id="264" r:id="rId16"/>
-    <p:sldId id="265" r:id="rId17"/>
-    <p:sldId id="260" r:id="rId18"/>
-    <p:sldId id="277" r:id="rId19"/>
-    <p:sldId id="273" r:id="rId20"/>
-    <p:sldId id="274" r:id="rId21"/>
-    <p:sldId id="262" r:id="rId22"/>
-    <p:sldId id="266" r:id="rId23"/>
-    <p:sldId id="261" r:id="rId24"/>
-    <p:sldId id="263" r:id="rId25"/>
-    <p:sldId id="267" r:id="rId26"/>
+    <p:sldId id="285" r:id="rId13"/>
+    <p:sldId id="271" r:id="rId14"/>
+    <p:sldId id="284" r:id="rId15"/>
+    <p:sldId id="272" r:id="rId16"/>
+    <p:sldId id="264" r:id="rId17"/>
+    <p:sldId id="265" r:id="rId18"/>
+    <p:sldId id="260" r:id="rId19"/>
+    <p:sldId id="277" r:id="rId20"/>
+    <p:sldId id="273" r:id="rId21"/>
+    <p:sldId id="274" r:id="rId22"/>
+    <p:sldId id="262" r:id="rId23"/>
+    <p:sldId id="266" r:id="rId24"/>
+    <p:sldId id="261" r:id="rId25"/>
+    <p:sldId id="263" r:id="rId26"/>
+    <p:sldId id="267" r:id="rId27"/>
   </p:sldIdLst>
   <p:sldSz cx="12192000" cy="6858000"/>
   <p:notesSz cx="6858000" cy="9144000"/>
@@ -325,7 +326,7 @@
             <a:fld id="{B61BEF0D-F0BB-DE4B-95CE-6DB70DBA9567}" type="datetimeFigureOut">
               <a:rPr lang="en-US" dirty="0"/>
               <a:pPr/>
-              <a:t>4/27/21</a:t>
+              <a:t>4/28/21</a:t>
             </a:fld>
             <a:endParaRPr lang="en-US" dirty="0"/>
           </a:p>
@@ -660,7 +661,7 @@
             <a:fld id="{B61BEF0D-F0BB-DE4B-95CE-6DB70DBA9567}" type="datetimeFigureOut">
               <a:rPr lang="en-US" dirty="0"/>
               <a:pPr/>
-              <a:t>4/27/21</a:t>
+              <a:t>4/28/21</a:t>
             </a:fld>
             <a:endParaRPr lang="en-US" dirty="0"/>
           </a:p>
@@ -1058,7 +1059,7 @@
             <a:fld id="{B61BEF0D-F0BB-DE4B-95CE-6DB70DBA9567}" type="datetimeFigureOut">
               <a:rPr lang="en-US" dirty="0"/>
               <a:pPr/>
-              <a:t>4/27/21</a:t>
+              <a:t>4/28/21</a:t>
             </a:fld>
             <a:endParaRPr lang="en-US" dirty="0"/>
           </a:p>
@@ -1391,7 +1392,7 @@
             <a:fld id="{B61BEF0D-F0BB-DE4B-95CE-6DB70DBA9567}" type="datetimeFigureOut">
               <a:rPr lang="en-US" dirty="0"/>
               <a:pPr/>
-              <a:t>4/27/21</a:t>
+              <a:t>4/28/21</a:t>
             </a:fld>
             <a:endParaRPr lang="en-US" dirty="0"/>
           </a:p>
@@ -1708,7 +1709,7 @@
             <a:fld id="{B61BEF0D-F0BB-DE4B-95CE-6DB70DBA9567}" type="datetimeFigureOut">
               <a:rPr lang="en-US" dirty="0"/>
               <a:pPr/>
-              <a:t>4/27/21</a:t>
+              <a:t>4/28/21</a:t>
             </a:fld>
             <a:endParaRPr lang="en-US" dirty="0"/>
           </a:p>
@@ -2101,7 +2102,7 @@
             <a:fld id="{B61BEF0D-F0BB-DE4B-95CE-6DB70DBA9567}" type="datetimeFigureOut">
               <a:rPr lang="en-US" dirty="0"/>
               <a:pPr/>
-              <a:t>4/27/21</a:t>
+              <a:t>4/28/21</a:t>
             </a:fld>
             <a:endParaRPr lang="en-US" dirty="0"/>
           </a:p>
@@ -2355,7 +2356,7 @@
             <a:fld id="{B61BEF0D-F0BB-DE4B-95CE-6DB70DBA9567}" type="datetimeFigureOut">
               <a:rPr lang="en-US" dirty="0"/>
               <a:pPr/>
-              <a:t>4/27/21</a:t>
+              <a:t>4/28/21</a:t>
             </a:fld>
             <a:endParaRPr lang="en-US" dirty="0"/>
           </a:p>
@@ -2614,7 +2615,7 @@
             <a:fld id="{B61BEF0D-F0BB-DE4B-95CE-6DB70DBA9567}" type="datetimeFigureOut">
               <a:rPr lang="en-US" dirty="0"/>
               <a:pPr/>
-              <a:t>4/27/21</a:t>
+              <a:t>4/28/21</a:t>
             </a:fld>
             <a:endParaRPr lang="en-US" dirty="0"/>
           </a:p>
@@ -2873,7 +2874,7 @@
             <a:fld id="{B61BEF0D-F0BB-DE4B-95CE-6DB70DBA9567}" type="datetimeFigureOut">
               <a:rPr lang="en-US" dirty="0"/>
               <a:pPr/>
-              <a:t>4/27/21</a:t>
+              <a:t>4/28/21</a:t>
             </a:fld>
             <a:endParaRPr lang="en-US" dirty="0"/>
           </a:p>
@@ -3199,7 +3200,7 @@
             <a:fld id="{B61BEF0D-F0BB-DE4B-95CE-6DB70DBA9567}" type="datetimeFigureOut">
               <a:rPr lang="en-US" dirty="0"/>
               <a:pPr/>
-              <a:t>4/27/21</a:t>
+              <a:t>4/28/21</a:t>
             </a:fld>
             <a:endParaRPr lang="en-US" dirty="0"/>
           </a:p>
@@ -3519,7 +3520,7 @@
             <a:fld id="{B61BEF0D-F0BB-DE4B-95CE-6DB70DBA9567}" type="datetimeFigureOut">
               <a:rPr lang="en-US" dirty="0"/>
               <a:pPr/>
-              <a:t>4/27/21</a:t>
+              <a:t>4/28/21</a:t>
             </a:fld>
             <a:endParaRPr lang="en-US" dirty="0"/>
           </a:p>
@@ -3973,7 +3974,7 @@
             <a:fld id="{B61BEF0D-F0BB-DE4B-95CE-6DB70DBA9567}" type="datetimeFigureOut">
               <a:rPr lang="en-US" dirty="0"/>
               <a:pPr/>
-              <a:t>4/27/21</a:t>
+              <a:t>4/28/21</a:t>
             </a:fld>
             <a:endParaRPr lang="en-US" dirty="0"/>
           </a:p>
@@ -4175,7 +4176,7 @@
             <a:fld id="{B61BEF0D-F0BB-DE4B-95CE-6DB70DBA9567}" type="datetimeFigureOut">
               <a:rPr lang="en-US" dirty="0"/>
               <a:pPr/>
-              <a:t>4/27/21</a:t>
+              <a:t>4/28/21</a:t>
             </a:fld>
             <a:endParaRPr lang="en-US" dirty="0"/>
           </a:p>
@@ -4349,7 +4350,7 @@
             <a:fld id="{B61BEF0D-F0BB-DE4B-95CE-6DB70DBA9567}" type="datetimeFigureOut">
               <a:rPr lang="en-US" dirty="0"/>
               <a:pPr/>
-              <a:t>4/27/21</a:t>
+              <a:t>4/28/21</a:t>
             </a:fld>
             <a:endParaRPr lang="en-US" dirty="0"/>
           </a:p>
@@ -4679,7 +4680,7 @@
             <a:fld id="{B61BEF0D-F0BB-DE4B-95CE-6DB70DBA9567}" type="datetimeFigureOut">
               <a:rPr lang="en-US" dirty="0"/>
               <a:pPr/>
-              <a:t>4/27/21</a:t>
+              <a:t>4/28/21</a:t>
             </a:fld>
             <a:endParaRPr lang="en-US" dirty="0"/>
           </a:p>
@@ -5021,7 +5022,7 @@
             <a:fld id="{B61BEF0D-F0BB-DE4B-95CE-6DB70DBA9567}" type="datetimeFigureOut">
               <a:rPr lang="en-US" dirty="0"/>
               <a:pPr/>
-              <a:t>4/27/21</a:t>
+              <a:t>4/28/21</a:t>
             </a:fld>
             <a:endParaRPr lang="en-US" dirty="0"/>
           </a:p>
@@ -7135,7 +7136,7 @@
             <a:fld id="{B61BEF0D-F0BB-DE4B-95CE-6DB70DBA9567}" type="datetimeFigureOut">
               <a:rPr lang="en-US" dirty="0"/>
               <a:pPr/>
-              <a:t>4/27/21</a:t>
+              <a:t>4/28/21</a:t>
             </a:fld>
             <a:endParaRPr lang="en-US" dirty="0"/>
           </a:p>
@@ -8064,7 +8065,7 @@
           <p:cNvPr id="2" name="标题 1">
             <a:extLst>
               <a:ext uri="{FF2B5EF4-FFF2-40B4-BE49-F238E27FC236}">
-                <a16:creationId xmlns:a16="http://schemas.microsoft.com/office/drawing/2014/main" id="{B747197F-2F66-3B42-8078-0CD639AFC1E8}"/>
+                <a16:creationId xmlns:a16="http://schemas.microsoft.com/office/drawing/2014/main" id="{4286D43A-3FDE-464B-8616-5E292B5E0A5C}"/>
               </a:ext>
             </a:extLst>
           </p:cNvPr>
@@ -8082,7 +8083,7 @@
           <a:p>
             <a:r>
               <a:rPr kumimoji="1" lang="zh-CN" altLang="en-US" dirty="0"/>
-              <a:t>延迟消息</a:t>
+              <a:t>自定义消息发送规则</a:t>
             </a:r>
           </a:p>
         </p:txBody>
@@ -8092,7 +8093,7 @@
           <p:cNvPr id="3" name="内容占位符 2">
             <a:extLst>
               <a:ext uri="{FF2B5EF4-FFF2-40B4-BE49-F238E27FC236}">
-                <a16:creationId xmlns:a16="http://schemas.microsoft.com/office/drawing/2014/main" id="{0343B139-4D01-8C40-8CC0-AD4696002E32}"/>
+                <a16:creationId xmlns:a16="http://schemas.microsoft.com/office/drawing/2014/main" id="{776A56A4-D962-0C46-884A-B74DF4AACEEE}"/>
               </a:ext>
             </a:extLst>
           </p:cNvPr>
@@ -8108,14 +8109,154 @@
           <a:bodyPr/>
           <a:lstStyle/>
           <a:p>
-            <a:endParaRPr kumimoji="1" lang="zh-CN" altLang="en-US" dirty="0"/>
+            <a:r>
+              <a:rPr lang="zh-CN" altLang="en-US" dirty="0"/>
+              <a:t>一个</a:t>
+            </a:r>
+            <a:r>
+              <a:rPr lang="en" altLang="zh-CN" dirty="0"/>
+              <a:t>Topic </a:t>
+            </a:r>
+            <a:r>
+              <a:rPr lang="zh-CN" altLang="en-US" dirty="0"/>
+              <a:t>会有多个</a:t>
+            </a:r>
+            <a:r>
+              <a:rPr lang="en" altLang="zh-CN" dirty="0"/>
+              <a:t>Message Queue</a:t>
+            </a:r>
+            <a:r>
+              <a:rPr kumimoji="1" lang="en-US" altLang="zh-CN" dirty="0"/>
+              <a:t>,</a:t>
+            </a:r>
+            <a:r>
+              <a:rPr kumimoji="1" lang="zh-CN" altLang="en-US" dirty="0"/>
+              <a:t>默认下</a:t>
+            </a:r>
+            <a:r>
+              <a:rPr kumimoji="1" lang="en-US" altLang="zh-CN" dirty="0"/>
+              <a:t>Producer</a:t>
+            </a:r>
+            <a:r>
+              <a:rPr kumimoji="1" lang="zh-CN" altLang="en-US" dirty="0"/>
+              <a:t>会轮流向这些</a:t>
+            </a:r>
+            <a:r>
+              <a:rPr lang="en" altLang="zh-CN" dirty="0"/>
+              <a:t>Message Queue</a:t>
+            </a:r>
+            <a:r>
+              <a:rPr lang="zh-CN" altLang="en" dirty="0"/>
+              <a:t>发送</a:t>
+            </a:r>
+            <a:r>
+              <a:rPr lang="zh-CN" altLang="en-US" dirty="0"/>
+              <a:t>消息。</a:t>
+            </a:r>
+            <a:r>
+              <a:rPr lang="en-US" altLang="zh-CN" dirty="0"/>
+              <a:t>Consumer</a:t>
+            </a:r>
+            <a:r>
+              <a:rPr lang="zh-CN" altLang="en-US" dirty="0"/>
+              <a:t>消费时会根据负载均衡策略消费被分配到</a:t>
+            </a:r>
+            <a:r>
+              <a:rPr lang="en" altLang="zh-CN" dirty="0"/>
+              <a:t>Message Queue</a:t>
+            </a:r>
+            <a:r>
+              <a:rPr lang="zh-CN" altLang="en-US" dirty="0"/>
+              <a:t>。可以通过</a:t>
+            </a:r>
+            <a:r>
+              <a:rPr lang="en" altLang="zh-CN" dirty="0" err="1"/>
+              <a:t>MessageQueueSelector</a:t>
+            </a:r>
+            <a:r>
+              <a:rPr lang="zh-CN" altLang="en-US" dirty="0"/>
+              <a:t>指定消息发送到特定的</a:t>
+            </a:r>
+            <a:r>
+              <a:rPr lang="en-US" altLang="zh-CN" dirty="0"/>
+              <a:t>queue</a:t>
+            </a:r>
+            <a:r>
+              <a:rPr lang="zh-CN" altLang="en-US" dirty="0"/>
+              <a:t>。</a:t>
+            </a:r>
+            <a:endParaRPr lang="en-US" altLang="zh-CN" dirty="0"/>
+          </a:p>
+          <a:p>
+            <a:r>
+              <a:rPr lang="en" altLang="zh-CN" dirty="0"/>
+              <a:t>public interface </a:t>
+            </a:r>
+            <a:r>
+              <a:rPr lang="en" altLang="zh-CN" dirty="0" err="1"/>
+              <a:t>MessageQueueSelector</a:t>
+            </a:r>
+            <a:r>
+              <a:rPr lang="en" altLang="zh-CN" dirty="0"/>
+              <a:t> {</a:t>
+            </a:r>
+            <a:br>
+              <a:rPr lang="en" altLang="zh-CN" dirty="0"/>
+            </a:br>
+            <a:r>
+              <a:rPr lang="en" altLang="zh-CN" dirty="0"/>
+              <a:t>    </a:t>
+            </a:r>
+            <a:r>
+              <a:rPr lang="en" altLang="zh-CN" dirty="0" err="1"/>
+              <a:t>MessageQueue</a:t>
+            </a:r>
+            <a:r>
+              <a:rPr lang="en" altLang="zh-CN" dirty="0"/>
+              <a:t> select(final List&lt;</a:t>
+            </a:r>
+            <a:r>
+              <a:rPr lang="en" altLang="zh-CN" dirty="0" err="1"/>
+              <a:t>MessageQueue</a:t>
+            </a:r>
+            <a:r>
+              <a:rPr lang="en" altLang="zh-CN" dirty="0"/>
+              <a:t>&gt; </a:t>
+            </a:r>
+            <a:r>
+              <a:rPr lang="en" altLang="zh-CN" dirty="0" err="1"/>
+              <a:t>mqs</a:t>
+            </a:r>
+            <a:r>
+              <a:rPr lang="en" altLang="zh-CN" dirty="0"/>
+              <a:t>, final Message msg, final Object </a:t>
+            </a:r>
+            <a:r>
+              <a:rPr lang="en" altLang="zh-CN" dirty="0" err="1"/>
+              <a:t>arg</a:t>
+            </a:r>
+            <a:r>
+              <a:rPr lang="en" altLang="zh-CN"/>
+              <a:t>);</a:t>
+            </a:r>
+            <a:br>
+              <a:rPr lang="en" altLang="zh-CN"/>
+            </a:br>
+            <a:r>
+              <a:rPr lang="en" altLang="zh-CN"/>
+              <a:t>}</a:t>
+            </a:r>
+            <a:br>
+              <a:rPr lang="en" altLang="zh-CN"/>
+            </a:br>
+            <a:endParaRPr lang="en" altLang="zh-CN" dirty="0"/>
           </a:p>
         </p:txBody>
       </p:sp>
     </p:spTree>
     <p:extLst>
       <p:ext uri="{BB962C8B-B14F-4D97-AF65-F5344CB8AC3E}">
-        <p14:creationId xmlns:p14="http://schemas.microsoft.com/office/powerpoint/2010/main" val="4063166106"/>
+        <p14:creationId xmlns:p14="http://schemas.microsoft.com/office/powerpoint/2010/main" val="3204187480"/>
       </p:ext>
     </p:extLst>
   </p:cSld>
@@ -8147,7 +8288,7 @@
           <p:cNvPr id="2" name="标题 1">
             <a:extLst>
               <a:ext uri="{FF2B5EF4-FFF2-40B4-BE49-F238E27FC236}">
-                <a16:creationId xmlns:a16="http://schemas.microsoft.com/office/drawing/2014/main" id="{3DED9C40-180B-8D40-89A0-94120786767C}"/>
+                <a16:creationId xmlns:a16="http://schemas.microsoft.com/office/drawing/2014/main" id="{B747197F-2F66-3B42-8078-0CD639AFC1E8}"/>
               </a:ext>
             </a:extLst>
           </p:cNvPr>
@@ -8165,7 +8306,7 @@
           <a:p>
             <a:r>
               <a:rPr kumimoji="1" lang="zh-CN" altLang="en-US" dirty="0"/>
-              <a:t>事务消息</a:t>
+              <a:t>延迟消息</a:t>
             </a:r>
           </a:p>
         </p:txBody>
@@ -8175,7 +8316,7 @@
           <p:cNvPr id="3" name="内容占位符 2">
             <a:extLst>
               <a:ext uri="{FF2B5EF4-FFF2-40B4-BE49-F238E27FC236}">
-                <a16:creationId xmlns:a16="http://schemas.microsoft.com/office/drawing/2014/main" id="{C606135D-D294-0E40-B41B-8036DE1D0794}"/>
+                <a16:creationId xmlns:a16="http://schemas.microsoft.com/office/drawing/2014/main" id="{0343B139-4D01-8C40-8CC0-AD4696002E32}"/>
               </a:ext>
             </a:extLst>
           </p:cNvPr>
@@ -8191,14 +8332,14 @@
           <a:bodyPr/>
           <a:lstStyle/>
           <a:p>
-            <a:endParaRPr kumimoji="1" lang="zh-CN" altLang="en-US"/>
+            <a:endParaRPr kumimoji="1" lang="zh-CN" altLang="en-US" dirty="0"/>
           </a:p>
         </p:txBody>
       </p:sp>
     </p:spTree>
     <p:extLst>
       <p:ext uri="{BB962C8B-B14F-4D97-AF65-F5344CB8AC3E}">
-        <p14:creationId xmlns:p14="http://schemas.microsoft.com/office/powerpoint/2010/main" val="3660366731"/>
+        <p14:creationId xmlns:p14="http://schemas.microsoft.com/office/powerpoint/2010/main" val="4063166106"/>
       </p:ext>
     </p:extLst>
   </p:cSld>
@@ -8230,7 +8371,7 @@
           <p:cNvPr id="2" name="标题 1">
             <a:extLst>
               <a:ext uri="{FF2B5EF4-FFF2-40B4-BE49-F238E27FC236}">
-                <a16:creationId xmlns:a16="http://schemas.microsoft.com/office/drawing/2014/main" id="{56B54089-DDA3-0546-9A46-36594C1BDD08}"/>
+                <a16:creationId xmlns:a16="http://schemas.microsoft.com/office/drawing/2014/main" id="{3DED9C40-180B-8D40-89A0-94120786767C}"/>
               </a:ext>
             </a:extLst>
           </p:cNvPr>
@@ -8248,7 +8389,7 @@
           <a:p>
             <a:r>
               <a:rPr kumimoji="1" lang="zh-CN" altLang="en-US" dirty="0"/>
-              <a:t>如何保证高可用</a:t>
+              <a:t>事务消息</a:t>
             </a:r>
           </a:p>
         </p:txBody>
@@ -8258,7 +8399,7 @@
           <p:cNvPr id="3" name="内容占位符 2">
             <a:extLst>
               <a:ext uri="{FF2B5EF4-FFF2-40B4-BE49-F238E27FC236}">
-                <a16:creationId xmlns:a16="http://schemas.microsoft.com/office/drawing/2014/main" id="{C69D53C2-376F-C947-8A16-315A869CD2F9}"/>
+                <a16:creationId xmlns:a16="http://schemas.microsoft.com/office/drawing/2014/main" id="{C606135D-D294-0E40-B41B-8036DE1D0794}"/>
               </a:ext>
             </a:extLst>
           </p:cNvPr>
@@ -8274,14 +8415,14 @@
           <a:bodyPr/>
           <a:lstStyle/>
           <a:p>
-            <a:endParaRPr kumimoji="1" lang="zh-CN" altLang="en-US" dirty="0"/>
+            <a:endParaRPr kumimoji="1" lang="zh-CN" altLang="en-US"/>
           </a:p>
         </p:txBody>
       </p:sp>
     </p:spTree>
     <p:extLst>
       <p:ext uri="{BB962C8B-B14F-4D97-AF65-F5344CB8AC3E}">
-        <p14:creationId xmlns:p14="http://schemas.microsoft.com/office/powerpoint/2010/main" val="1961592500"/>
+        <p14:creationId xmlns:p14="http://schemas.microsoft.com/office/powerpoint/2010/main" val="3660366731"/>
       </p:ext>
     </p:extLst>
   </p:cSld>
@@ -8313,7 +8454,7 @@
           <p:cNvPr id="2" name="标题 1">
             <a:extLst>
               <a:ext uri="{FF2B5EF4-FFF2-40B4-BE49-F238E27FC236}">
-                <a16:creationId xmlns:a16="http://schemas.microsoft.com/office/drawing/2014/main" id="{93913AE2-AC33-9149-966D-E50C42CFAADC}"/>
+                <a16:creationId xmlns:a16="http://schemas.microsoft.com/office/drawing/2014/main" id="{56B54089-DDA3-0546-9A46-36594C1BDD08}"/>
               </a:ext>
             </a:extLst>
           </p:cNvPr>
@@ -8331,7 +8472,7 @@
           <a:p>
             <a:r>
               <a:rPr kumimoji="1" lang="zh-CN" altLang="en-US" dirty="0"/>
-              <a:t>负载均衡机制</a:t>
+              <a:t>如何保证高可用</a:t>
             </a:r>
           </a:p>
         </p:txBody>
@@ -8341,7 +8482,7 @@
           <p:cNvPr id="3" name="内容占位符 2">
             <a:extLst>
               <a:ext uri="{FF2B5EF4-FFF2-40B4-BE49-F238E27FC236}">
-                <a16:creationId xmlns:a16="http://schemas.microsoft.com/office/drawing/2014/main" id="{6890FC5C-9645-6F41-83AB-4707FC922C3C}"/>
+                <a16:creationId xmlns:a16="http://schemas.microsoft.com/office/drawing/2014/main" id="{C69D53C2-376F-C947-8A16-315A869CD2F9}"/>
               </a:ext>
             </a:extLst>
           </p:cNvPr>
@@ -8357,14 +8498,14 @@
           <a:bodyPr/>
           <a:lstStyle/>
           <a:p>
-            <a:endParaRPr kumimoji="1" lang="zh-CN" altLang="en-US"/>
+            <a:endParaRPr kumimoji="1" lang="zh-CN" altLang="en-US" dirty="0"/>
           </a:p>
         </p:txBody>
       </p:sp>
     </p:spTree>
     <p:extLst>
       <p:ext uri="{BB962C8B-B14F-4D97-AF65-F5344CB8AC3E}">
-        <p14:creationId xmlns:p14="http://schemas.microsoft.com/office/powerpoint/2010/main" val="1446558323"/>
+        <p14:creationId xmlns:p14="http://schemas.microsoft.com/office/powerpoint/2010/main" val="1961592500"/>
       </p:ext>
     </p:extLst>
   </p:cSld>
@@ -8396,7 +8537,7 @@
           <p:cNvPr id="2" name="标题 1">
             <a:extLst>
               <a:ext uri="{FF2B5EF4-FFF2-40B4-BE49-F238E27FC236}">
-                <a16:creationId xmlns:a16="http://schemas.microsoft.com/office/drawing/2014/main" id="{F89226ED-61C1-F845-8DA6-35D525BDBFCF}"/>
+                <a16:creationId xmlns:a16="http://schemas.microsoft.com/office/drawing/2014/main" id="{93913AE2-AC33-9149-966D-E50C42CFAADC}"/>
               </a:ext>
             </a:extLst>
           </p:cNvPr>
@@ -8413,12 +8554,8 @@
           <a:lstStyle/>
           <a:p>
             <a:r>
-              <a:rPr kumimoji="1" lang="en-US" altLang="zh-CN" dirty="0" err="1"/>
-              <a:t>RocketMQ</a:t>
-            </a:r>
-            <a:r>
               <a:rPr kumimoji="1" lang="zh-CN" altLang="en-US" dirty="0"/>
-              <a:t>存储机制</a:t>
+              <a:t>负载均衡机制</a:t>
             </a:r>
           </a:p>
         </p:txBody>
@@ -8428,7 +8565,7 @@
           <p:cNvPr id="3" name="内容占位符 2">
             <a:extLst>
               <a:ext uri="{FF2B5EF4-FFF2-40B4-BE49-F238E27FC236}">
-                <a16:creationId xmlns:a16="http://schemas.microsoft.com/office/drawing/2014/main" id="{AE5F12A1-20A1-794B-9048-4A83D4115FD9}"/>
+                <a16:creationId xmlns:a16="http://schemas.microsoft.com/office/drawing/2014/main" id="{6890FC5C-9645-6F41-83AB-4707FC922C3C}"/>
               </a:ext>
             </a:extLst>
           </p:cNvPr>
@@ -8444,14 +8581,14 @@
           <a:bodyPr/>
           <a:lstStyle/>
           <a:p>
-            <a:endParaRPr kumimoji="1" lang="zh-CN" altLang="en-US" dirty="0"/>
+            <a:endParaRPr kumimoji="1" lang="zh-CN" altLang="en-US"/>
           </a:p>
         </p:txBody>
       </p:sp>
     </p:spTree>
     <p:extLst>
       <p:ext uri="{BB962C8B-B14F-4D97-AF65-F5344CB8AC3E}">
-        <p14:creationId xmlns:p14="http://schemas.microsoft.com/office/powerpoint/2010/main" val="3262638319"/>
+        <p14:creationId xmlns:p14="http://schemas.microsoft.com/office/powerpoint/2010/main" val="1446558323"/>
       </p:ext>
     </p:extLst>
   </p:cSld>
@@ -8483,6 +8620,93 @@
           <p:cNvPr id="2" name="标题 1">
             <a:extLst>
               <a:ext uri="{FF2B5EF4-FFF2-40B4-BE49-F238E27FC236}">
+                <a16:creationId xmlns:a16="http://schemas.microsoft.com/office/drawing/2014/main" id="{F89226ED-61C1-F845-8DA6-35D525BDBFCF}"/>
+              </a:ext>
+            </a:extLst>
+          </p:cNvPr>
+          <p:cNvSpPr>
+            <a:spLocks noGrp="1"/>
+          </p:cNvSpPr>
+          <p:nvPr>
+            <p:ph type="title"/>
+          </p:nvPr>
+        </p:nvSpPr>
+        <p:spPr/>
+        <p:txBody>
+          <a:bodyPr/>
+          <a:lstStyle/>
+          <a:p>
+            <a:r>
+              <a:rPr kumimoji="1" lang="en-US" altLang="zh-CN" dirty="0" err="1"/>
+              <a:t>RocketMQ</a:t>
+            </a:r>
+            <a:r>
+              <a:rPr kumimoji="1" lang="zh-CN" altLang="en-US" dirty="0"/>
+              <a:t>存储机制</a:t>
+            </a:r>
+          </a:p>
+        </p:txBody>
+      </p:sp>
+      <p:sp>
+        <p:nvSpPr>
+          <p:cNvPr id="3" name="内容占位符 2">
+            <a:extLst>
+              <a:ext uri="{FF2B5EF4-FFF2-40B4-BE49-F238E27FC236}">
+                <a16:creationId xmlns:a16="http://schemas.microsoft.com/office/drawing/2014/main" id="{AE5F12A1-20A1-794B-9048-4A83D4115FD9}"/>
+              </a:ext>
+            </a:extLst>
+          </p:cNvPr>
+          <p:cNvSpPr>
+            <a:spLocks noGrp="1"/>
+          </p:cNvSpPr>
+          <p:nvPr>
+            <p:ph idx="1"/>
+          </p:nvPr>
+        </p:nvSpPr>
+        <p:spPr/>
+        <p:txBody>
+          <a:bodyPr/>
+          <a:lstStyle/>
+          <a:p>
+            <a:endParaRPr kumimoji="1" lang="zh-CN" altLang="en-US" dirty="0"/>
+          </a:p>
+        </p:txBody>
+      </p:sp>
+    </p:spTree>
+    <p:extLst>
+      <p:ext uri="{BB962C8B-B14F-4D97-AF65-F5344CB8AC3E}">
+        <p14:creationId xmlns:p14="http://schemas.microsoft.com/office/powerpoint/2010/main" val="3262638319"/>
+      </p:ext>
+    </p:extLst>
+  </p:cSld>
+  <p:clrMapOvr>
+    <a:masterClrMapping/>
+  </p:clrMapOvr>
+</p:sld>
+</file>
+
+<file path=ppt/slides/slide18.xml><?xml version="1.0" encoding="utf-8"?>
+<p:sld xmlns:a="http://schemas.openxmlformats.org/drawingml/2006/main" xmlns:r="http://schemas.openxmlformats.org/officeDocument/2006/relationships" xmlns:p="http://schemas.openxmlformats.org/presentationml/2006/main">
+  <p:cSld>
+    <p:spTree>
+      <p:nvGrpSpPr>
+        <p:cNvPr id="1" name=""/>
+        <p:cNvGrpSpPr/>
+        <p:nvPr/>
+      </p:nvGrpSpPr>
+      <p:grpSpPr>
+        <a:xfrm>
+          <a:off x="0" y="0"/>
+          <a:ext cx="0" cy="0"/>
+          <a:chOff x="0" y="0"/>
+          <a:chExt cx="0" cy="0"/>
+        </a:xfrm>
+      </p:grpSpPr>
+      <p:sp>
+        <p:nvSpPr>
+          <p:cNvPr id="2" name="标题 1">
+            <a:extLst>
+              <a:ext uri="{FF2B5EF4-FFF2-40B4-BE49-F238E27FC236}">
                 <a16:creationId xmlns:a16="http://schemas.microsoft.com/office/drawing/2014/main" id="{63A09A91-A650-9D4B-BE61-62F8F8FF4EE8}"/>
               </a:ext>
             </a:extLst>
@@ -8525,7 +8749,7 @@
 </p:sld>
 </file>
 
-<file path=ppt/slides/slide18.xml><?xml version="1.0" encoding="utf-8"?>
+<file path=ppt/slides/slide19.xml><?xml version="1.0" encoding="utf-8"?>
 <p:sld xmlns:a="http://schemas.openxmlformats.org/drawingml/2006/main" xmlns:r="http://schemas.openxmlformats.org/officeDocument/2006/relationships" xmlns:p="http://schemas.openxmlformats.org/presentationml/2006/main">
   <p:cSld>
     <p:spTree>
@@ -8841,109 +9065,6 @@
 </p:sld>
 </file>
 
-<file path=ppt/slides/slide19.xml><?xml version="1.0" encoding="utf-8"?>
-<p:sld xmlns:a="http://schemas.openxmlformats.org/drawingml/2006/main" xmlns:r="http://schemas.openxmlformats.org/officeDocument/2006/relationships" xmlns:p="http://schemas.openxmlformats.org/presentationml/2006/main">
-  <p:cSld>
-    <p:spTree>
-      <p:nvGrpSpPr>
-        <p:cNvPr id="1" name=""/>
-        <p:cNvGrpSpPr/>
-        <p:nvPr/>
-      </p:nvGrpSpPr>
-      <p:grpSpPr>
-        <a:xfrm>
-          <a:off x="0" y="0"/>
-          <a:ext cx="0" cy="0"/>
-          <a:chOff x="0" y="0"/>
-          <a:chExt cx="0" cy="0"/>
-        </a:xfrm>
-      </p:grpSpPr>
-      <p:sp>
-        <p:nvSpPr>
-          <p:cNvPr id="2" name="标题 1">
-            <a:extLst>
-              <a:ext uri="{FF2B5EF4-FFF2-40B4-BE49-F238E27FC236}">
-                <a16:creationId xmlns:a16="http://schemas.microsoft.com/office/drawing/2014/main" id="{2A6980E2-634B-844C-B1B3-0CF020D27789}"/>
-              </a:ext>
-            </a:extLst>
-          </p:cNvPr>
-          <p:cNvSpPr>
-            <a:spLocks noGrp="1"/>
-          </p:cNvSpPr>
-          <p:nvPr>
-            <p:ph type="title"/>
-          </p:nvPr>
-        </p:nvSpPr>
-        <p:spPr/>
-        <p:txBody>
-          <a:bodyPr/>
-          <a:lstStyle/>
-          <a:p>
-            <a:r>
-              <a:rPr kumimoji="1" lang="en-US" altLang="zh-CN" dirty="0" err="1"/>
-              <a:t>RocketMQ</a:t>
-            </a:r>
-            <a:r>
-              <a:rPr kumimoji="1" lang="zh-CN" altLang="en-US" dirty="0"/>
-              <a:t>中</a:t>
-            </a:r>
-            <a:r>
-              <a:rPr kumimoji="1" lang="en-US" altLang="zh-CN" dirty="0" err="1"/>
-              <a:t>readQueue</a:t>
-            </a:r>
-            <a:r>
-              <a:rPr kumimoji="1" lang="zh-CN" altLang="en-US" dirty="0"/>
-              <a:t>和</a:t>
-            </a:r>
-            <a:r>
-              <a:rPr kumimoji="1" lang="en-US" altLang="zh-CN" dirty="0" err="1"/>
-              <a:t>WriteQueue</a:t>
-            </a:r>
-            <a:r>
-              <a:rPr kumimoji="1" lang="zh-CN" altLang="en-US" dirty="0"/>
-              <a:t>的概念</a:t>
-            </a:r>
-          </a:p>
-        </p:txBody>
-      </p:sp>
-      <p:sp>
-        <p:nvSpPr>
-          <p:cNvPr id="3" name="内容占位符 2">
-            <a:extLst>
-              <a:ext uri="{FF2B5EF4-FFF2-40B4-BE49-F238E27FC236}">
-                <a16:creationId xmlns:a16="http://schemas.microsoft.com/office/drawing/2014/main" id="{956746AE-E5A1-A543-890F-738B3C9CA93D}"/>
-              </a:ext>
-            </a:extLst>
-          </p:cNvPr>
-          <p:cNvSpPr>
-            <a:spLocks noGrp="1"/>
-          </p:cNvSpPr>
-          <p:nvPr>
-            <p:ph idx="1"/>
-          </p:nvPr>
-        </p:nvSpPr>
-        <p:spPr/>
-        <p:txBody>
-          <a:bodyPr/>
-          <a:lstStyle/>
-          <a:p>
-            <a:endParaRPr kumimoji="1" lang="zh-CN" altLang="en-US" dirty="0"/>
-          </a:p>
-        </p:txBody>
-      </p:sp>
-    </p:spTree>
-    <p:extLst>
-      <p:ext uri="{BB962C8B-B14F-4D97-AF65-F5344CB8AC3E}">
-        <p14:creationId xmlns:p14="http://schemas.microsoft.com/office/powerpoint/2010/main" val="2821253259"/>
-      </p:ext>
-    </p:extLst>
-  </p:cSld>
-  <p:clrMapOvr>
-    <a:masterClrMapping/>
-  </p:clrMapOvr>
-</p:sld>
-</file>
-
 <file path=ppt/slides/slide2.xml><?xml version="1.0" encoding="utf-8"?>
 <p:sld xmlns:a="http://schemas.openxmlformats.org/drawingml/2006/main" xmlns:r="http://schemas.openxmlformats.org/officeDocument/2006/relationships" xmlns:p="http://schemas.openxmlformats.org/presentationml/2006/main">
   <p:cSld>
@@ -9080,7 +9201,7 @@
           <p:cNvPr id="2" name="标题 1">
             <a:extLst>
               <a:ext uri="{FF2B5EF4-FFF2-40B4-BE49-F238E27FC236}">
-                <a16:creationId xmlns:a16="http://schemas.microsoft.com/office/drawing/2014/main" id="{C8EB042B-53C7-134F-B631-E706405B5E7C}"/>
+                <a16:creationId xmlns:a16="http://schemas.microsoft.com/office/drawing/2014/main" id="{2A6980E2-634B-844C-B1B3-0CF020D27789}"/>
               </a:ext>
             </a:extLst>
           </p:cNvPr>
@@ -9097,24 +9218,28 @@
           <a:lstStyle/>
           <a:p>
             <a:r>
+              <a:rPr kumimoji="1" lang="en-US" altLang="zh-CN" dirty="0" err="1"/>
+              <a:t>RocketMQ</a:t>
+            </a:r>
+            <a:r>
               <a:rPr kumimoji="1" lang="zh-CN" altLang="en-US" dirty="0"/>
-              <a:t>如果同一个消费者组的</a:t>
-            </a:r>
-            <a:r>
-              <a:rPr kumimoji="1" lang="en-US" altLang="zh-CN" dirty="0"/>
-              <a:t>Consumer</a:t>
+              <a:t>中</a:t>
+            </a:r>
+            <a:r>
+              <a:rPr kumimoji="1" lang="en-US" altLang="zh-CN" dirty="0" err="1"/>
+              <a:t>readQueue</a:t>
             </a:r>
             <a:r>
               <a:rPr kumimoji="1" lang="zh-CN" altLang="en-US" dirty="0"/>
-              <a:t>订阅了不同的</a:t>
-            </a:r>
-            <a:r>
-              <a:rPr kumimoji="1" lang="en-US" altLang="zh-CN" dirty="0"/>
-              <a:t>Topic</a:t>
+              <a:t>和</a:t>
+            </a:r>
+            <a:r>
+              <a:rPr kumimoji="1" lang="en-US" altLang="zh-CN" dirty="0" err="1"/>
+              <a:t>WriteQueue</a:t>
             </a:r>
             <a:r>
               <a:rPr kumimoji="1" lang="zh-CN" altLang="en-US" dirty="0"/>
-              <a:t>会怎么样？</a:t>
+              <a:t>的概念</a:t>
             </a:r>
           </a:p>
         </p:txBody>
@@ -9124,7 +9249,7 @@
           <p:cNvPr id="3" name="内容占位符 2">
             <a:extLst>
               <a:ext uri="{FF2B5EF4-FFF2-40B4-BE49-F238E27FC236}">
-                <a16:creationId xmlns:a16="http://schemas.microsoft.com/office/drawing/2014/main" id="{84841515-8274-AF4C-AAC2-F331F93B097B}"/>
+                <a16:creationId xmlns:a16="http://schemas.microsoft.com/office/drawing/2014/main" id="{956746AE-E5A1-A543-890F-738B3C9CA93D}"/>
               </a:ext>
             </a:extLst>
           </p:cNvPr>
@@ -9140,9 +9265,6 @@
           <a:bodyPr/>
           <a:lstStyle/>
           <a:p>
-            <a:pPr marL="0" indent="0">
-              <a:buNone/>
-            </a:pPr>
             <a:endParaRPr kumimoji="1" lang="zh-CN" altLang="en-US" dirty="0"/>
           </a:p>
         </p:txBody>
@@ -9150,7 +9272,7 @@
     </p:spTree>
     <p:extLst>
       <p:ext uri="{BB962C8B-B14F-4D97-AF65-F5344CB8AC3E}">
-        <p14:creationId xmlns:p14="http://schemas.microsoft.com/office/powerpoint/2010/main" val="2767276358"/>
+        <p14:creationId xmlns:p14="http://schemas.microsoft.com/office/powerpoint/2010/main" val="2821253259"/>
       </p:ext>
     </p:extLst>
   </p:cSld>
@@ -9182,7 +9304,7 @@
           <p:cNvPr id="2" name="标题 1">
             <a:extLst>
               <a:ext uri="{FF2B5EF4-FFF2-40B4-BE49-F238E27FC236}">
-                <a16:creationId xmlns:a16="http://schemas.microsoft.com/office/drawing/2014/main" id="{4605813C-1C8D-684C-972E-A7B35E17B52C}"/>
+                <a16:creationId xmlns:a16="http://schemas.microsoft.com/office/drawing/2014/main" id="{C8EB042B-53C7-134F-B631-E706405B5E7C}"/>
               </a:ext>
             </a:extLst>
           </p:cNvPr>
@@ -9200,23 +9322,23 @@
           <a:p>
             <a:r>
               <a:rPr kumimoji="1" lang="zh-CN" altLang="en-US" dirty="0"/>
-              <a:t>引入</a:t>
-            </a:r>
-            <a:r>
-              <a:rPr kumimoji="1" lang="en-US" altLang="zh-CN" dirty="0" err="1"/>
-              <a:t>RocketMQ</a:t>
+              <a:t>如果同一个消费者组的</a:t>
+            </a:r>
+            <a:r>
+              <a:rPr kumimoji="1" lang="en-US" altLang="zh-CN" dirty="0"/>
+              <a:t>Consumer</a:t>
             </a:r>
             <a:r>
               <a:rPr kumimoji="1" lang="zh-CN" altLang="en-US" dirty="0"/>
-              <a:t>（</a:t>
+              <a:t>订阅了不同的</a:t>
             </a:r>
             <a:r>
               <a:rPr kumimoji="1" lang="en-US" altLang="zh-CN" dirty="0"/>
-              <a:t>MQ</a:t>
+              <a:t>Topic</a:t>
             </a:r>
             <a:r>
               <a:rPr kumimoji="1" lang="zh-CN" altLang="en-US" dirty="0"/>
-              <a:t>）带来的问题</a:t>
+              <a:t>会怎么样？</a:t>
             </a:r>
           </a:p>
         </p:txBody>
@@ -9226,7 +9348,7 @@
           <p:cNvPr id="3" name="内容占位符 2">
             <a:extLst>
               <a:ext uri="{FF2B5EF4-FFF2-40B4-BE49-F238E27FC236}">
-                <a16:creationId xmlns:a16="http://schemas.microsoft.com/office/drawing/2014/main" id="{148033EE-4F04-5048-9BEC-24DDFAEE6177}"/>
+                <a16:creationId xmlns:a16="http://schemas.microsoft.com/office/drawing/2014/main" id="{84841515-8274-AF4C-AAC2-F331F93B097B}"/>
               </a:ext>
             </a:extLst>
           </p:cNvPr>
@@ -9237,151 +9359,22 @@
             <p:ph idx="1"/>
           </p:nvPr>
         </p:nvSpPr>
-        <p:spPr>
-          <a:xfrm>
-            <a:off x="2589212" y="1643974"/>
-            <a:ext cx="8915400" cy="4267248"/>
-          </a:xfrm>
-        </p:spPr>
-        <p:txBody>
-          <a:bodyPr>
-            <a:normAutofit lnSpcReduction="10000"/>
-          </a:bodyPr>
+        <p:spPr/>
+        <p:txBody>
+          <a:bodyPr/>
           <a:lstStyle/>
           <a:p>
-            <a:r>
-              <a:rPr kumimoji="1" lang="en-US" altLang="zh-CN" dirty="0"/>
-              <a:t> </a:t>
-            </a:r>
-            <a:r>
-              <a:rPr kumimoji="1" lang="zh-CN" altLang="en-US" dirty="0"/>
-              <a:t>增加了中间件，也就增加了单点故障的可能性。</a:t>
-            </a:r>
-            <a:endParaRPr kumimoji="1" lang="en-US" altLang="zh-CN" dirty="0"/>
-          </a:p>
-          <a:p>
-            <a:r>
-              <a:rPr kumimoji="1" lang="zh-CN" altLang="en-US" dirty="0"/>
-              <a:t>通过消息队列的形式属于异步形式，无法同步获取返回值。</a:t>
-            </a:r>
-            <a:endParaRPr kumimoji="1" lang="en-US" altLang="zh-CN" dirty="0"/>
-          </a:p>
-          <a:p>
-            <a:r>
-              <a:rPr kumimoji="1" lang="zh-CN" altLang="en-US" dirty="0"/>
-              <a:t>解决思路：</a:t>
-            </a:r>
-            <a:endParaRPr kumimoji="1" lang="en-US" altLang="zh-CN" dirty="0"/>
-          </a:p>
-          <a:p>
-            <a:r>
-              <a:rPr kumimoji="1" lang="en-US" altLang="zh-CN" dirty="0"/>
-              <a:t>1.</a:t>
-            </a:r>
-            <a:r>
-              <a:rPr kumimoji="1" lang="zh-CN" altLang="en-US" dirty="0"/>
-              <a:t> 消费者消费完成后，把返回消息放到另一个消息通道，生产者通过发生的消息</a:t>
-            </a:r>
-            <a:r>
-              <a:rPr kumimoji="1" lang="en-US" altLang="zh-CN" dirty="0"/>
-              <a:t>ID</a:t>
-            </a:r>
-            <a:r>
-              <a:rPr kumimoji="1" lang="zh-CN" altLang="en-US" dirty="0"/>
-              <a:t>来确定返回消息。</a:t>
-            </a:r>
-            <a:endParaRPr kumimoji="1" lang="en-US" altLang="zh-CN" dirty="0"/>
-          </a:p>
-          <a:p>
-            <a:r>
-              <a:rPr kumimoji="1" lang="en-US" altLang="zh-CN" dirty="0"/>
-              <a:t>2. </a:t>
-            </a:r>
-            <a:r>
-              <a:rPr kumimoji="1" lang="en-US" altLang="zh-CN" dirty="0" err="1"/>
-              <a:t>RocketMQ</a:t>
-            </a:r>
-            <a:r>
-              <a:rPr kumimoji="1" lang="zh-CN" altLang="en-US" dirty="0"/>
-              <a:t>支持</a:t>
-            </a:r>
-            <a:r>
-              <a:rPr lang="zh-CN" altLang="en-US" dirty="0"/>
-              <a:t>请求</a:t>
-            </a:r>
-            <a:r>
-              <a:rPr lang="en-US" altLang="zh-CN" dirty="0"/>
-              <a:t>/</a:t>
-            </a:r>
-            <a:r>
-              <a:rPr lang="zh-CN" altLang="en-US" dirty="0"/>
-              <a:t>应答 语义。可以通过</a:t>
-            </a:r>
-            <a:r>
-              <a:rPr lang="en-US" altLang="zh-CN" dirty="0" err="1"/>
-              <a:t>RocketMQ</a:t>
-            </a:r>
-            <a:r>
-              <a:rPr lang="zh-CN" altLang="en-US" dirty="0"/>
-              <a:t>的</a:t>
-            </a:r>
-            <a:r>
-              <a:rPr lang="en-US" altLang="zh-CN" dirty="0"/>
-              <a:t>API</a:t>
-            </a:r>
-            <a:r>
-              <a:rPr lang="zh-CN" altLang="en-US" dirty="0"/>
-              <a:t>进行消息和回复。</a:t>
-            </a:r>
-            <a:endParaRPr kumimoji="1" lang="en-US" altLang="zh-CN" dirty="0"/>
-          </a:p>
-          <a:p>
-            <a:r>
-              <a:rPr kumimoji="1" lang="en-US" altLang="zh-CN" dirty="0" err="1"/>
-              <a:t>RocketMQ</a:t>
-            </a:r>
-            <a:r>
-              <a:rPr kumimoji="1" lang="zh-CN" altLang="en-US" dirty="0"/>
-              <a:t>不同于数据库，没有</a:t>
-            </a:r>
-            <a:r>
-              <a:rPr kumimoji="1" lang="en-US" altLang="zh-CN" dirty="0"/>
-              <a:t>ACID</a:t>
-            </a:r>
-            <a:r>
-              <a:rPr kumimoji="1" lang="zh-CN" altLang="en-US" dirty="0"/>
-              <a:t>这样的本地事务。如何保证业务执行和消息发送在一个事务中？比如以下场景：用户下单，业务执行完成后发送了订单生成消息给下游系统，但是在事务提交的时候因为某些问题失败了，事务回退了，但是订单消息已经发送，无法回退。</a:t>
-            </a:r>
-            <a:endParaRPr kumimoji="1" lang="en-US" altLang="zh-CN" dirty="0"/>
-          </a:p>
-          <a:p>
-            <a:r>
-              <a:rPr kumimoji="1" lang="zh-CN" altLang="en-US" dirty="0"/>
-              <a:t>解决思路：</a:t>
-            </a:r>
-            <a:endParaRPr kumimoji="1" lang="en-US" altLang="zh-CN" dirty="0"/>
-          </a:p>
-          <a:p>
-            <a:r>
-              <a:rPr kumimoji="1" lang="zh-CN" altLang="en-US" dirty="0"/>
-              <a:t>发件箱模式。定义一个消息队列表，发送</a:t>
-            </a:r>
-            <a:r>
-              <a:rPr kumimoji="1" lang="en-US" altLang="zh-CN" dirty="0" err="1"/>
-              <a:t>mq</a:t>
-            </a:r>
-            <a:r>
-              <a:rPr kumimoji="1" lang="zh-CN" altLang="en-US" dirty="0"/>
-              <a:t>消息时，先将消息小如到消息表中，此时属于数据库本地事务。启用一个组件扫描发件箱并发送。</a:t>
-            </a:r>
-            <a:endParaRPr kumimoji="1" lang="en-US" altLang="zh-CN" dirty="0"/>
+            <a:pPr marL="0" indent="0">
+              <a:buNone/>
+            </a:pPr>
+            <a:endParaRPr kumimoji="1" lang="zh-CN" altLang="en-US" dirty="0"/>
           </a:p>
         </p:txBody>
       </p:sp>
     </p:spTree>
     <p:extLst>
       <p:ext uri="{BB962C8B-B14F-4D97-AF65-F5344CB8AC3E}">
-        <p14:creationId xmlns:p14="http://schemas.microsoft.com/office/powerpoint/2010/main" val="1962971040"/>
+        <p14:creationId xmlns:p14="http://schemas.microsoft.com/office/powerpoint/2010/main" val="2767276358"/>
       </p:ext>
     </p:extLst>
   </p:cSld>
@@ -9413,7 +9406,7 @@
           <p:cNvPr id="2" name="标题 1">
             <a:extLst>
               <a:ext uri="{FF2B5EF4-FFF2-40B4-BE49-F238E27FC236}">
-                <a16:creationId xmlns:a16="http://schemas.microsoft.com/office/drawing/2014/main" id="{13EC6E4E-9A46-DC4A-B9F2-FE4720A7C149}"/>
+                <a16:creationId xmlns:a16="http://schemas.microsoft.com/office/drawing/2014/main" id="{4605813C-1C8D-684C-972E-A7B35E17B52C}"/>
               </a:ext>
             </a:extLst>
           </p:cNvPr>
@@ -9430,12 +9423,24 @@
           <a:lstStyle/>
           <a:p>
             <a:r>
+              <a:rPr kumimoji="1" lang="zh-CN" altLang="en-US" dirty="0"/>
+              <a:t>引入</a:t>
+            </a:r>
+            <a:r>
               <a:rPr kumimoji="1" lang="en-US" altLang="zh-CN" dirty="0" err="1"/>
               <a:t>RocketMQ</a:t>
             </a:r>
             <a:r>
               <a:rPr kumimoji="1" lang="zh-CN" altLang="en-US" dirty="0"/>
-              <a:t>如何保证消息可靠性</a:t>
+              <a:t>（</a:t>
+            </a:r>
+            <a:r>
+              <a:rPr kumimoji="1" lang="en-US" altLang="zh-CN" dirty="0"/>
+              <a:t>MQ</a:t>
+            </a:r>
+            <a:r>
+              <a:rPr kumimoji="1" lang="zh-CN" altLang="en-US" dirty="0"/>
+              <a:t>）带来的问题</a:t>
             </a:r>
           </a:p>
         </p:txBody>
@@ -9445,7 +9450,7 @@
           <p:cNvPr id="3" name="内容占位符 2">
             <a:extLst>
               <a:ext uri="{FF2B5EF4-FFF2-40B4-BE49-F238E27FC236}">
-                <a16:creationId xmlns:a16="http://schemas.microsoft.com/office/drawing/2014/main" id="{4F031BC5-D296-224F-A766-C3D56C05B782}"/>
+                <a16:creationId xmlns:a16="http://schemas.microsoft.com/office/drawing/2014/main" id="{148033EE-4F04-5048-9BEC-24DDFAEE6177}"/>
               </a:ext>
             </a:extLst>
           </p:cNvPr>
@@ -9456,7 +9461,12 @@
             <p:ph idx="1"/>
           </p:nvPr>
         </p:nvSpPr>
-        <p:spPr/>
+        <p:spPr>
+          <a:xfrm>
+            <a:off x="2589212" y="1643974"/>
+            <a:ext cx="8915400" cy="4267248"/>
+          </a:xfrm>
+        </p:spPr>
         <p:txBody>
           <a:bodyPr>
             <a:normAutofit lnSpcReduction="10000"/>
@@ -9465,26 +9475,51 @@
           <a:p>
             <a:r>
               <a:rPr kumimoji="1" lang="en-US" altLang="zh-CN" dirty="0"/>
-              <a:t>Provider</a:t>
+              <a:t> </a:t>
             </a:r>
             <a:r>
               <a:rPr kumimoji="1" lang="zh-CN" altLang="en-US" dirty="0"/>
-              <a:t>端</a:t>
+              <a:t>增加了中间件，也就增加了单点故障的可能性。</a:t>
             </a:r>
             <a:endParaRPr kumimoji="1" lang="en-US" altLang="zh-CN" dirty="0"/>
           </a:p>
           <a:p>
             <a:r>
               <a:rPr kumimoji="1" lang="zh-CN" altLang="en-US" dirty="0"/>
-              <a:t>如果是同步消息，消息投递时</a:t>
-            </a:r>
+              <a:t>通过消息队列的形式属于异步形式，无法同步获取返回值。</a:t>
+            </a:r>
+            <a:endParaRPr kumimoji="1" lang="en-US" altLang="zh-CN" dirty="0"/>
+          </a:p>
+          <a:p>
+            <a:r>
+              <a:rPr kumimoji="1" lang="zh-CN" altLang="en-US" dirty="0"/>
+              <a:t>解决思路：</a:t>
+            </a:r>
+            <a:endParaRPr kumimoji="1" lang="en-US" altLang="zh-CN" dirty="0"/>
+          </a:p>
+          <a:p>
             <a:r>
               <a:rPr kumimoji="1" lang="en-US" altLang="zh-CN" dirty="0"/>
-              <a:t>Broker</a:t>
+              <a:t>1.</a:t>
             </a:r>
             <a:r>
               <a:rPr kumimoji="1" lang="zh-CN" altLang="en-US" dirty="0"/>
-              <a:t>返回失败，重新投递（</a:t>
+              <a:t> 消费者消费完成后，把返回消息放到另一个消息通道，生产者通过发生的消息</a:t>
+            </a:r>
+            <a:r>
+              <a:rPr kumimoji="1" lang="en-US" altLang="zh-CN" dirty="0"/>
+              <a:t>ID</a:t>
+            </a:r>
+            <a:r>
+              <a:rPr kumimoji="1" lang="zh-CN" altLang="en-US" dirty="0"/>
+              <a:t>来确定返回消息。</a:t>
+            </a:r>
+            <a:endParaRPr kumimoji="1" lang="en-US" altLang="zh-CN" dirty="0"/>
+          </a:p>
+          <a:p>
+            <a:r>
+              <a:rPr kumimoji="1" lang="en-US" altLang="zh-CN" dirty="0"/>
+              <a:t>2. </a:t>
             </a:r>
             <a:r>
               <a:rPr kumimoji="1" lang="en-US" altLang="zh-CN" dirty="0" err="1"/>
@@ -9492,68 +9527,85 @@
             </a:r>
             <a:r>
               <a:rPr kumimoji="1" lang="zh-CN" altLang="en-US" dirty="0"/>
-              <a:t>保证消息一定投递成功）</a:t>
+              <a:t>支持</a:t>
+            </a:r>
+            <a:r>
+              <a:rPr lang="zh-CN" altLang="en-US" dirty="0"/>
+              <a:t>请求</a:t>
+            </a:r>
+            <a:r>
+              <a:rPr lang="en-US" altLang="zh-CN" dirty="0"/>
+              <a:t>/</a:t>
+            </a:r>
+            <a:r>
+              <a:rPr lang="zh-CN" altLang="en-US" dirty="0"/>
+              <a:t>应答 语义。可以通过</a:t>
+            </a:r>
+            <a:r>
+              <a:rPr lang="en-US" altLang="zh-CN" dirty="0" err="1"/>
+              <a:t>RocketMQ</a:t>
+            </a:r>
+            <a:r>
+              <a:rPr lang="zh-CN" altLang="en-US" dirty="0"/>
+              <a:t>的</a:t>
+            </a:r>
+            <a:r>
+              <a:rPr lang="en-US" altLang="zh-CN" dirty="0"/>
+              <a:t>API</a:t>
+            </a:r>
+            <a:r>
+              <a:rPr lang="zh-CN" altLang="en-US" dirty="0"/>
+              <a:t>进行消息和回复。</a:t>
             </a:r>
             <a:endParaRPr kumimoji="1" lang="en-US" altLang="zh-CN" dirty="0"/>
           </a:p>
           <a:p>
             <a:r>
+              <a:rPr kumimoji="1" lang="en-US" altLang="zh-CN" dirty="0" err="1"/>
+              <a:t>RocketMQ</a:t>
+            </a:r>
+            <a:r>
               <a:rPr kumimoji="1" lang="zh-CN" altLang="en-US" dirty="0"/>
-              <a:t>如果是异步消息，在回调接口里根据投递状态决定是否重新投递。</a:t>
+              <a:t>不同于数据库，没有</a:t>
+            </a:r>
+            <a:r>
+              <a:rPr kumimoji="1" lang="en-US" altLang="zh-CN" dirty="0"/>
+              <a:t>ACID</a:t>
+            </a:r>
+            <a:r>
+              <a:rPr kumimoji="1" lang="zh-CN" altLang="en-US" dirty="0"/>
+              <a:t>这样的本地事务。如何保证业务执行和消息发送在一个事务中？比如以下场景：用户下单，业务执行完成后发送了订单生成消息给下游系统，但是在事务提交的时候因为某些问题失败了，事务回退了，但是订单消息已经发送，无法回退。</a:t>
             </a:r>
             <a:endParaRPr kumimoji="1" lang="en-US" altLang="zh-CN" dirty="0"/>
           </a:p>
           <a:p>
             <a:r>
-              <a:rPr kumimoji="1" lang="en-US" altLang="zh-CN" dirty="0"/>
-              <a:t>Broker</a:t>
-            </a:r>
-            <a:r>
               <a:rPr kumimoji="1" lang="zh-CN" altLang="en-US" dirty="0"/>
-              <a:t>端</a:t>
+              <a:t>解决思路：</a:t>
             </a:r>
             <a:endParaRPr kumimoji="1" lang="en-US" altLang="zh-CN" dirty="0"/>
           </a:p>
           <a:p>
             <a:r>
               <a:rPr kumimoji="1" lang="zh-CN" altLang="en-US" dirty="0"/>
-              <a:t>根据主从同步策略和消息刷盘策略来共同保证</a:t>
+              <a:t>发件箱模式。定义一个消息队列表，发送</a:t>
+            </a:r>
+            <a:r>
+              <a:rPr kumimoji="1" lang="en-US" altLang="zh-CN" dirty="0" err="1"/>
+              <a:t>mq</a:t>
+            </a:r>
+            <a:r>
+              <a:rPr kumimoji="1" lang="zh-CN" altLang="en-US" dirty="0"/>
+              <a:t>消息时，先将消息小如到消息表中，此时属于数据库本地事务。启用一个组件扫描发件箱并发送。</a:t>
             </a:r>
             <a:endParaRPr kumimoji="1" lang="en-US" altLang="zh-CN" dirty="0"/>
-          </a:p>
-          <a:p>
-            <a:r>
-              <a:rPr kumimoji="1" lang="zh-CN" altLang="en-US" dirty="0"/>
-              <a:t>同步复制，同步刷盘。最安全，不会丢失消息，但是性能最差。</a:t>
-            </a:r>
-            <a:endParaRPr kumimoji="1" lang="en-US" altLang="zh-CN" dirty="0"/>
-          </a:p>
-          <a:p>
-            <a:r>
-              <a:rPr kumimoji="1" lang="zh-CN" altLang="en-US" dirty="0"/>
-              <a:t>同步复制，异步刷盘。折中方案，可靠性和性能都比较好，除非主从同时故障。</a:t>
-            </a:r>
-            <a:endParaRPr kumimoji="1" lang="en-US" altLang="zh-CN" dirty="0"/>
-          </a:p>
-          <a:p>
-            <a:r>
-              <a:rPr kumimoji="1" lang="zh-CN" altLang="en-US" dirty="0"/>
-              <a:t>异步复制，同步刷盘。都同步刷盘了，意义不大。</a:t>
-            </a:r>
-            <a:endParaRPr kumimoji="1" lang="en-US" altLang="zh-CN" dirty="0"/>
-          </a:p>
-          <a:p>
-            <a:r>
-              <a:rPr kumimoji="1" lang="zh-CN" altLang="en-US" dirty="0"/>
-              <a:t>异步复制，异步刷盘。性能最好，如果主节点故障，消息丢失，不推荐。</a:t>
-            </a:r>
           </a:p>
         </p:txBody>
       </p:sp>
     </p:spTree>
     <p:extLst>
       <p:ext uri="{BB962C8B-B14F-4D97-AF65-F5344CB8AC3E}">
-        <p14:creationId xmlns:p14="http://schemas.microsoft.com/office/powerpoint/2010/main" val="1673429681"/>
+        <p14:creationId xmlns:p14="http://schemas.microsoft.com/office/powerpoint/2010/main" val="1962971040"/>
       </p:ext>
     </p:extLst>
   </p:cSld>
@@ -9585,7 +9637,7 @@
           <p:cNvPr id="2" name="标题 1">
             <a:extLst>
               <a:ext uri="{FF2B5EF4-FFF2-40B4-BE49-F238E27FC236}">
-                <a16:creationId xmlns:a16="http://schemas.microsoft.com/office/drawing/2014/main" id="{AF1DC664-2C41-7543-953E-7256D28E7422}"/>
+                <a16:creationId xmlns:a16="http://schemas.microsoft.com/office/drawing/2014/main" id="{13EC6E4E-9A46-DC4A-B9F2-FE4720A7C149}"/>
               </a:ext>
             </a:extLst>
           </p:cNvPr>
@@ -9607,7 +9659,7 @@
             </a:r>
             <a:r>
               <a:rPr kumimoji="1" lang="zh-CN" altLang="en-US" dirty="0"/>
-              <a:t>如何处理消息重复消费</a:t>
+              <a:t>如何保证消息可靠性</a:t>
             </a:r>
           </a:p>
         </p:txBody>
@@ -9617,7 +9669,7 @@
           <p:cNvPr id="3" name="内容占位符 2">
             <a:extLst>
               <a:ext uri="{FF2B5EF4-FFF2-40B4-BE49-F238E27FC236}">
-                <a16:creationId xmlns:a16="http://schemas.microsoft.com/office/drawing/2014/main" id="{8D92B3C3-CF9F-1D43-9D5D-D435D712EA06}"/>
+                <a16:creationId xmlns:a16="http://schemas.microsoft.com/office/drawing/2014/main" id="{4F031BC5-D296-224F-A766-C3D56C05B782}"/>
               </a:ext>
             </a:extLst>
           </p:cNvPr>
@@ -9630,73 +9682,102 @@
         </p:nvSpPr>
         <p:spPr/>
         <p:txBody>
-          <a:bodyPr/>
+          <a:bodyPr>
+            <a:normAutofit lnSpcReduction="10000"/>
+          </a:bodyPr>
           <a:lstStyle/>
           <a:p>
+            <a:r>
+              <a:rPr kumimoji="1" lang="en-US" altLang="zh-CN" dirty="0"/>
+              <a:t>Provider</a:t>
+            </a:r>
+            <a:r>
+              <a:rPr kumimoji="1" lang="zh-CN" altLang="en-US" dirty="0"/>
+              <a:t>端</a:t>
+            </a:r>
+            <a:endParaRPr kumimoji="1" lang="en-US" altLang="zh-CN" dirty="0"/>
+          </a:p>
+          <a:p>
+            <a:r>
+              <a:rPr kumimoji="1" lang="zh-CN" altLang="en-US" dirty="0"/>
+              <a:t>如果是同步消息，消息投递时</a:t>
+            </a:r>
+            <a:r>
+              <a:rPr kumimoji="1" lang="en-US" altLang="zh-CN" dirty="0"/>
+              <a:t>Broker</a:t>
+            </a:r>
+            <a:r>
+              <a:rPr kumimoji="1" lang="zh-CN" altLang="en-US" dirty="0"/>
+              <a:t>返回失败，重新投递（</a:t>
+            </a:r>
             <a:r>
               <a:rPr kumimoji="1" lang="en-US" altLang="zh-CN" dirty="0" err="1"/>
               <a:t>RocketMQ</a:t>
             </a:r>
             <a:r>
               <a:rPr kumimoji="1" lang="zh-CN" altLang="en-US" dirty="0"/>
-              <a:t>自身并不解决消息重复消费的问题。需要使用者自己解决。</a:t>
+              <a:t>保证消息一定投递成功）</a:t>
             </a:r>
             <a:endParaRPr kumimoji="1" lang="en-US" altLang="zh-CN" dirty="0"/>
           </a:p>
           <a:p>
             <a:r>
               <a:rPr kumimoji="1" lang="zh-CN" altLang="en-US" dirty="0"/>
-              <a:t>解决方案有</a:t>
-            </a:r>
+              <a:t>如果是异步消息，在回调接口里根据投递状态决定是否重新投递。</a:t>
+            </a:r>
+            <a:endParaRPr kumimoji="1" lang="en-US" altLang="zh-CN" dirty="0"/>
+          </a:p>
+          <a:p>
             <a:r>
               <a:rPr kumimoji="1" lang="en-US" altLang="zh-CN" dirty="0"/>
-              <a:t>2</a:t>
+              <a:t>Broker</a:t>
             </a:r>
             <a:r>
               <a:rPr kumimoji="1" lang="zh-CN" altLang="en-US" dirty="0"/>
-              <a:t>种：</a:t>
+              <a:t>端</a:t>
             </a:r>
             <a:endParaRPr kumimoji="1" lang="en-US" altLang="zh-CN" dirty="0"/>
           </a:p>
           <a:p>
             <a:r>
               <a:rPr kumimoji="1" lang="zh-CN" altLang="en-US" dirty="0"/>
-              <a:t>保证消费逻辑的幂等性。</a:t>
+              <a:t>根据主从同步策略和消息刷盘策略来共同保证</a:t>
             </a:r>
             <a:endParaRPr kumimoji="1" lang="en-US" altLang="zh-CN" dirty="0"/>
           </a:p>
           <a:p>
             <a:r>
               <a:rPr kumimoji="1" lang="zh-CN" altLang="en-US" dirty="0"/>
-              <a:t>维护一个已消费消息的记录。（比如在数据库或者</a:t>
-            </a:r>
-            <a:r>
-              <a:rPr kumimoji="1" lang="en-US" altLang="zh-CN" dirty="0"/>
-              <a:t>Redis</a:t>
-            </a:r>
+              <a:t>同步复制，同步刷盘。最安全，不会丢失消息，但是性能最差。</a:t>
+            </a:r>
+            <a:endParaRPr kumimoji="1" lang="en-US" altLang="zh-CN" dirty="0"/>
+          </a:p>
+          <a:p>
             <a:r>
               <a:rPr kumimoji="1" lang="zh-CN" altLang="en-US" dirty="0"/>
-              <a:t>中保存已经消费的消息</a:t>
-            </a:r>
-            <a:r>
-              <a:rPr kumimoji="1" lang="en-US" altLang="zh-CN" dirty="0"/>
-              <a:t>ID</a:t>
-            </a:r>
+              <a:t>同步复制，异步刷盘。折中方案，可靠性和性能都比较好，除非主从同时故障。</a:t>
+            </a:r>
+            <a:endParaRPr kumimoji="1" lang="en-US" altLang="zh-CN" dirty="0"/>
+          </a:p>
+          <a:p>
             <a:r>
               <a:rPr kumimoji="1" lang="zh-CN" altLang="en-US" dirty="0"/>
-              <a:t>）</a:t>
+              <a:t>异步复制，同步刷盘。都同步刷盘了，意义不大。</a:t>
             </a:r>
             <a:endParaRPr kumimoji="1" lang="en-US" altLang="zh-CN" dirty="0"/>
           </a:p>
           <a:p>
-            <a:endParaRPr kumimoji="1" lang="en-US" altLang="zh-CN" dirty="0"/>
+            <a:r>
+              <a:rPr kumimoji="1" lang="zh-CN" altLang="en-US" dirty="0"/>
+              <a:t>异步复制，异步刷盘。性能最好，如果主节点故障，消息丢失，不推荐。</a:t>
+            </a:r>
           </a:p>
         </p:txBody>
       </p:sp>
     </p:spTree>
     <p:extLst>
       <p:ext uri="{BB962C8B-B14F-4D97-AF65-F5344CB8AC3E}">
-        <p14:creationId xmlns:p14="http://schemas.microsoft.com/office/powerpoint/2010/main" val="3595485941"/>
+        <p14:creationId xmlns:p14="http://schemas.microsoft.com/office/powerpoint/2010/main" val="1673429681"/>
       </p:ext>
     </p:extLst>
   </p:cSld>
@@ -9728,6 +9809,149 @@
           <p:cNvPr id="2" name="标题 1">
             <a:extLst>
               <a:ext uri="{FF2B5EF4-FFF2-40B4-BE49-F238E27FC236}">
+                <a16:creationId xmlns:a16="http://schemas.microsoft.com/office/drawing/2014/main" id="{AF1DC664-2C41-7543-953E-7256D28E7422}"/>
+              </a:ext>
+            </a:extLst>
+          </p:cNvPr>
+          <p:cNvSpPr>
+            <a:spLocks noGrp="1"/>
+          </p:cNvSpPr>
+          <p:nvPr>
+            <p:ph type="title"/>
+          </p:nvPr>
+        </p:nvSpPr>
+        <p:spPr/>
+        <p:txBody>
+          <a:bodyPr/>
+          <a:lstStyle/>
+          <a:p>
+            <a:r>
+              <a:rPr kumimoji="1" lang="en-US" altLang="zh-CN" dirty="0" err="1"/>
+              <a:t>RocketMQ</a:t>
+            </a:r>
+            <a:r>
+              <a:rPr kumimoji="1" lang="zh-CN" altLang="en-US" dirty="0"/>
+              <a:t>如何处理消息重复消费</a:t>
+            </a:r>
+          </a:p>
+        </p:txBody>
+      </p:sp>
+      <p:sp>
+        <p:nvSpPr>
+          <p:cNvPr id="3" name="内容占位符 2">
+            <a:extLst>
+              <a:ext uri="{FF2B5EF4-FFF2-40B4-BE49-F238E27FC236}">
+                <a16:creationId xmlns:a16="http://schemas.microsoft.com/office/drawing/2014/main" id="{8D92B3C3-CF9F-1D43-9D5D-D435D712EA06}"/>
+              </a:ext>
+            </a:extLst>
+          </p:cNvPr>
+          <p:cNvSpPr>
+            <a:spLocks noGrp="1"/>
+          </p:cNvSpPr>
+          <p:nvPr>
+            <p:ph idx="1"/>
+          </p:nvPr>
+        </p:nvSpPr>
+        <p:spPr/>
+        <p:txBody>
+          <a:bodyPr/>
+          <a:lstStyle/>
+          <a:p>
+            <a:r>
+              <a:rPr kumimoji="1" lang="en-US" altLang="zh-CN" dirty="0" err="1"/>
+              <a:t>RocketMQ</a:t>
+            </a:r>
+            <a:r>
+              <a:rPr kumimoji="1" lang="zh-CN" altLang="en-US" dirty="0"/>
+              <a:t>自身并不解决消息重复消费的问题。需要使用者自己解决。</a:t>
+            </a:r>
+            <a:endParaRPr kumimoji="1" lang="en-US" altLang="zh-CN" dirty="0"/>
+          </a:p>
+          <a:p>
+            <a:r>
+              <a:rPr kumimoji="1" lang="zh-CN" altLang="en-US" dirty="0"/>
+              <a:t>解决方案有</a:t>
+            </a:r>
+            <a:r>
+              <a:rPr kumimoji="1" lang="en-US" altLang="zh-CN" dirty="0"/>
+              <a:t>2</a:t>
+            </a:r>
+            <a:r>
+              <a:rPr kumimoji="1" lang="zh-CN" altLang="en-US" dirty="0"/>
+              <a:t>种：</a:t>
+            </a:r>
+            <a:endParaRPr kumimoji="1" lang="en-US" altLang="zh-CN" dirty="0"/>
+          </a:p>
+          <a:p>
+            <a:r>
+              <a:rPr kumimoji="1" lang="zh-CN" altLang="en-US" dirty="0"/>
+              <a:t>保证消费逻辑的幂等性。</a:t>
+            </a:r>
+            <a:endParaRPr kumimoji="1" lang="en-US" altLang="zh-CN" dirty="0"/>
+          </a:p>
+          <a:p>
+            <a:r>
+              <a:rPr kumimoji="1" lang="zh-CN" altLang="en-US" dirty="0"/>
+              <a:t>维护一个已消费消息的记录。（比如在数据库或者</a:t>
+            </a:r>
+            <a:r>
+              <a:rPr kumimoji="1" lang="en-US" altLang="zh-CN" dirty="0"/>
+              <a:t>Redis</a:t>
+            </a:r>
+            <a:r>
+              <a:rPr kumimoji="1" lang="zh-CN" altLang="en-US" dirty="0"/>
+              <a:t>中保存已经消费的消息</a:t>
+            </a:r>
+            <a:r>
+              <a:rPr kumimoji="1" lang="en-US" altLang="zh-CN" dirty="0"/>
+              <a:t>ID</a:t>
+            </a:r>
+            <a:r>
+              <a:rPr kumimoji="1" lang="zh-CN" altLang="en-US" dirty="0"/>
+              <a:t>）</a:t>
+            </a:r>
+            <a:endParaRPr kumimoji="1" lang="en-US" altLang="zh-CN" dirty="0"/>
+          </a:p>
+          <a:p>
+            <a:endParaRPr kumimoji="1" lang="en-US" altLang="zh-CN" dirty="0"/>
+          </a:p>
+        </p:txBody>
+      </p:sp>
+    </p:spTree>
+    <p:extLst>
+      <p:ext uri="{BB962C8B-B14F-4D97-AF65-F5344CB8AC3E}">
+        <p14:creationId xmlns:p14="http://schemas.microsoft.com/office/powerpoint/2010/main" val="3595485941"/>
+      </p:ext>
+    </p:extLst>
+  </p:cSld>
+  <p:clrMapOvr>
+    <a:masterClrMapping/>
+  </p:clrMapOvr>
+</p:sld>
+</file>
+
+<file path=ppt/slides/slide25.xml><?xml version="1.0" encoding="utf-8"?>
+<p:sld xmlns:a="http://schemas.openxmlformats.org/drawingml/2006/main" xmlns:r="http://schemas.openxmlformats.org/officeDocument/2006/relationships" xmlns:p="http://schemas.openxmlformats.org/presentationml/2006/main">
+  <p:cSld>
+    <p:spTree>
+      <p:nvGrpSpPr>
+        <p:cNvPr id="1" name=""/>
+        <p:cNvGrpSpPr/>
+        <p:nvPr/>
+      </p:nvGrpSpPr>
+      <p:grpSpPr>
+        <a:xfrm>
+          <a:off x="0" y="0"/>
+          <a:ext cx="0" cy="0"/>
+          <a:chOff x="0" y="0"/>
+          <a:chExt cx="0" cy="0"/>
+        </a:xfrm>
+      </p:grpSpPr>
+      <p:sp>
+        <p:nvSpPr>
+          <p:cNvPr id="2" name="标题 1">
+            <a:extLst>
+              <a:ext uri="{FF2B5EF4-FFF2-40B4-BE49-F238E27FC236}">
                 <a16:creationId xmlns:a16="http://schemas.microsoft.com/office/drawing/2014/main" id="{29BD7B92-C53F-5048-A035-CD294FA54FCA}"/>
               </a:ext>
             </a:extLst>
@@ -9793,7 +10017,7 @@
 </p:sld>
 </file>
 
-<file path=ppt/slides/slide25.xml><?xml version="1.0" encoding="utf-8"?>
+<file path=ppt/slides/slide26.xml><?xml version="1.0" encoding="utf-8"?>
 <p:sld xmlns:a="http://schemas.openxmlformats.org/drawingml/2006/main" xmlns:r="http://schemas.openxmlformats.org/officeDocument/2006/relationships" xmlns:p="http://schemas.openxmlformats.org/presentationml/2006/main">
   <p:cSld>
     <p:spTree>

</xml_diff>

<commit_message>
RocketMQ文档 by yipin 2021-04-26
</commit_message>
<xml_diff>
--- a/doc/RocketMQ简介.pptx
+++ b/doc/RocketMQ简介.pptx
@@ -12440,8 +12440,25 @@
             </a:r>
             <a:r>
               <a:rPr lang="en" altLang="zh-CN" dirty="0"/>
-              <a:t>: </a:t>
-            </a:r>
+              <a:t>:</a:t>
+            </a:r>
+            <a:r>
+              <a:rPr lang="zh-CN" altLang="en-US" dirty="0"/>
+              <a:t> 已废弃，使用</a:t>
+            </a:r>
+            <a:r>
+              <a:rPr lang="en-US" altLang="zh-CN" dirty="0" err="1"/>
+              <a:t>DefaultLitePullConsumer</a:t>
+            </a:r>
+            <a:r>
+              <a:rPr lang="zh-CN" altLang="en-US"/>
+              <a:t>代替。</a:t>
+            </a:r>
+            <a:r>
+              <a:rPr lang="en" altLang="zh-CN"/>
+              <a:t> </a:t>
+            </a:r>
+            <a:endParaRPr lang="en" altLang="zh-CN" dirty="0"/>
           </a:p>
           <a:p>
             <a:endParaRPr lang="en" altLang="zh-CN" dirty="0"/>

</xml_diff>

<commit_message>
RocketMQ文档 by yipin 2021-04-29
</commit_message>
<xml_diff>
--- a/doc/RocketMQ简介.pptx
+++ b/doc/RocketMQ简介.pptx
@@ -12325,7 +12325,9 @@
         </p:nvSpPr>
         <p:spPr/>
         <p:txBody>
-          <a:bodyPr/>
+          <a:bodyPr>
+            <a:normAutofit fontScale="92500"/>
+          </a:bodyPr>
           <a:lstStyle/>
           <a:p>
             <a:r>
@@ -12444,21 +12446,86 @@
             </a:r>
             <a:r>
               <a:rPr lang="zh-CN" altLang="en-US" dirty="0"/>
-              <a:t> 已废弃，使用</a:t>
+              <a:t> 消费者消费某个</a:t>
+            </a:r>
+            <a:r>
+              <a:rPr lang="en-US" altLang="zh-CN" dirty="0"/>
+              <a:t>topic</a:t>
+            </a:r>
+            <a:r>
+              <a:rPr lang="zh-CN" altLang="en-US" dirty="0"/>
+              <a:t>的某个</a:t>
+            </a:r>
+            <a:r>
+              <a:rPr lang="en-US" altLang="zh-CN" dirty="0"/>
+              <a:t>queue</a:t>
+            </a:r>
+            <a:r>
+              <a:rPr lang="zh-CN" altLang="en-US" dirty="0"/>
+              <a:t>时，可以指定消费的具体位置。优点是比较灵活，可以跳过某些消息，也可以重新某个已经消费过的消息。在拉模式下，</a:t>
+            </a:r>
+            <a:r>
+              <a:rPr lang="en-US" altLang="zh-CN" dirty="0"/>
+              <a:t>consumer</a:t>
+            </a:r>
+            <a:r>
+              <a:rPr lang="zh-CN" altLang="en-US" dirty="0"/>
+              <a:t>可以根据自身的负载和消费能力来</a:t>
+            </a:r>
+            <a:r>
+              <a:rPr lang="zh-CN" altLang="en-US"/>
+              <a:t>拉去消息。</a:t>
+            </a:r>
+            <a:r>
+              <a:rPr lang="zh-CN" altLang="en-US" dirty="0"/>
+              <a:t>缺点是编码比较麻烦，而且需要自己维护</a:t>
+            </a:r>
+            <a:r>
+              <a:rPr lang="en-US" altLang="zh-CN" dirty="0"/>
+              <a:t>offset</a:t>
+            </a:r>
+            <a:r>
+              <a:rPr lang="zh-CN" altLang="en-US" dirty="0"/>
+              <a:t>，如果</a:t>
+            </a:r>
+            <a:r>
+              <a:rPr lang="en-US" altLang="zh-CN" dirty="0"/>
+              <a:t>offset</a:t>
+            </a:r>
+            <a:r>
+              <a:rPr lang="zh-CN" altLang="en-US" dirty="0"/>
+              <a:t>没有持久化，可能会丢失</a:t>
+            </a:r>
+            <a:r>
+              <a:rPr lang="en-US" altLang="zh-CN" dirty="0"/>
+              <a:t>offset</a:t>
+            </a:r>
+            <a:r>
+              <a:rPr lang="zh-CN" altLang="en-US" dirty="0"/>
+              <a:t>。</a:t>
+            </a:r>
+            <a:endParaRPr lang="en-US" altLang="zh-CN" dirty="0"/>
+          </a:p>
+          <a:p>
+            <a:pPr marL="0" indent="0">
+              <a:buNone/>
+            </a:pPr>
+            <a:r>
+              <a:rPr lang="zh-CN" altLang="en-US" dirty="0"/>
+              <a:t>     已废弃，使用</a:t>
             </a:r>
             <a:r>
               <a:rPr lang="en-US" altLang="zh-CN" dirty="0" err="1"/>
               <a:t>DefaultLitePullConsumer</a:t>
             </a:r>
             <a:r>
-              <a:rPr lang="zh-CN" altLang="en-US"/>
+              <a:rPr lang="zh-CN" altLang="en-US" dirty="0"/>
               <a:t>代替。</a:t>
             </a:r>
             <a:r>
-              <a:rPr lang="en" altLang="zh-CN"/>
+              <a:rPr lang="en" altLang="zh-CN" dirty="0"/>
               <a:t> </a:t>
             </a:r>
-            <a:endParaRPr lang="en" altLang="zh-CN" dirty="0"/>
           </a:p>
           <a:p>
             <a:endParaRPr lang="en" altLang="zh-CN" dirty="0"/>

</xml_diff>

<commit_message>
RocketMQ简介.pptx by qiyu 2021-05-06
</commit_message>
<xml_diff>
--- a/doc/RocketMQ简介.pptx
+++ b/doc/RocketMQ简介.pptx
@@ -326,7 +326,7 @@
             <a:fld id="{B61BEF0D-F0BB-DE4B-95CE-6DB70DBA9567}" type="datetimeFigureOut">
               <a:rPr lang="en-US" dirty="0"/>
               <a:pPr/>
-              <a:t>5/3/21</a:t>
+              <a:t>5/6/21</a:t>
             </a:fld>
             <a:endParaRPr lang="en-US" dirty="0"/>
           </a:p>
@@ -661,7 +661,7 @@
             <a:fld id="{B61BEF0D-F0BB-DE4B-95CE-6DB70DBA9567}" type="datetimeFigureOut">
               <a:rPr lang="en-US" dirty="0"/>
               <a:pPr/>
-              <a:t>5/3/21</a:t>
+              <a:t>5/6/21</a:t>
             </a:fld>
             <a:endParaRPr lang="en-US" dirty="0"/>
           </a:p>
@@ -1059,7 +1059,7 @@
             <a:fld id="{B61BEF0D-F0BB-DE4B-95CE-6DB70DBA9567}" type="datetimeFigureOut">
               <a:rPr lang="en-US" dirty="0"/>
               <a:pPr/>
-              <a:t>5/3/21</a:t>
+              <a:t>5/6/21</a:t>
             </a:fld>
             <a:endParaRPr lang="en-US" dirty="0"/>
           </a:p>
@@ -1392,7 +1392,7 @@
             <a:fld id="{B61BEF0D-F0BB-DE4B-95CE-6DB70DBA9567}" type="datetimeFigureOut">
               <a:rPr lang="en-US" dirty="0"/>
               <a:pPr/>
-              <a:t>5/3/21</a:t>
+              <a:t>5/6/21</a:t>
             </a:fld>
             <a:endParaRPr lang="en-US" dirty="0"/>
           </a:p>
@@ -1709,7 +1709,7 @@
             <a:fld id="{B61BEF0D-F0BB-DE4B-95CE-6DB70DBA9567}" type="datetimeFigureOut">
               <a:rPr lang="en-US" dirty="0"/>
               <a:pPr/>
-              <a:t>5/3/21</a:t>
+              <a:t>5/6/21</a:t>
             </a:fld>
             <a:endParaRPr lang="en-US" dirty="0"/>
           </a:p>
@@ -2102,7 +2102,7 @@
             <a:fld id="{B61BEF0D-F0BB-DE4B-95CE-6DB70DBA9567}" type="datetimeFigureOut">
               <a:rPr lang="en-US" dirty="0"/>
               <a:pPr/>
-              <a:t>5/3/21</a:t>
+              <a:t>5/6/21</a:t>
             </a:fld>
             <a:endParaRPr lang="en-US" dirty="0"/>
           </a:p>
@@ -2356,7 +2356,7 @@
             <a:fld id="{B61BEF0D-F0BB-DE4B-95CE-6DB70DBA9567}" type="datetimeFigureOut">
               <a:rPr lang="en-US" dirty="0"/>
               <a:pPr/>
-              <a:t>5/3/21</a:t>
+              <a:t>5/6/21</a:t>
             </a:fld>
             <a:endParaRPr lang="en-US" dirty="0"/>
           </a:p>
@@ -2615,7 +2615,7 @@
             <a:fld id="{B61BEF0D-F0BB-DE4B-95CE-6DB70DBA9567}" type="datetimeFigureOut">
               <a:rPr lang="en-US" dirty="0"/>
               <a:pPr/>
-              <a:t>5/3/21</a:t>
+              <a:t>5/6/21</a:t>
             </a:fld>
             <a:endParaRPr lang="en-US" dirty="0"/>
           </a:p>
@@ -2874,7 +2874,7 @@
             <a:fld id="{B61BEF0D-F0BB-DE4B-95CE-6DB70DBA9567}" type="datetimeFigureOut">
               <a:rPr lang="en-US" dirty="0"/>
               <a:pPr/>
-              <a:t>5/3/21</a:t>
+              <a:t>5/6/21</a:t>
             </a:fld>
             <a:endParaRPr lang="en-US" dirty="0"/>
           </a:p>
@@ -3200,7 +3200,7 @@
             <a:fld id="{B61BEF0D-F0BB-DE4B-95CE-6DB70DBA9567}" type="datetimeFigureOut">
               <a:rPr lang="en-US" dirty="0"/>
               <a:pPr/>
-              <a:t>5/3/21</a:t>
+              <a:t>5/6/21</a:t>
             </a:fld>
             <a:endParaRPr lang="en-US" dirty="0"/>
           </a:p>
@@ -3520,7 +3520,7 @@
             <a:fld id="{B61BEF0D-F0BB-DE4B-95CE-6DB70DBA9567}" type="datetimeFigureOut">
               <a:rPr lang="en-US" dirty="0"/>
               <a:pPr/>
-              <a:t>5/3/21</a:t>
+              <a:t>5/6/21</a:t>
             </a:fld>
             <a:endParaRPr lang="en-US" dirty="0"/>
           </a:p>
@@ -3974,7 +3974,7 @@
             <a:fld id="{B61BEF0D-F0BB-DE4B-95CE-6DB70DBA9567}" type="datetimeFigureOut">
               <a:rPr lang="en-US" dirty="0"/>
               <a:pPr/>
-              <a:t>5/3/21</a:t>
+              <a:t>5/6/21</a:t>
             </a:fld>
             <a:endParaRPr lang="en-US" dirty="0"/>
           </a:p>
@@ -4176,7 +4176,7 @@
             <a:fld id="{B61BEF0D-F0BB-DE4B-95CE-6DB70DBA9567}" type="datetimeFigureOut">
               <a:rPr lang="en-US" dirty="0"/>
               <a:pPr/>
-              <a:t>5/3/21</a:t>
+              <a:t>5/6/21</a:t>
             </a:fld>
             <a:endParaRPr lang="en-US" dirty="0"/>
           </a:p>
@@ -4350,7 +4350,7 @@
             <a:fld id="{B61BEF0D-F0BB-DE4B-95CE-6DB70DBA9567}" type="datetimeFigureOut">
               <a:rPr lang="en-US" dirty="0"/>
               <a:pPr/>
-              <a:t>5/3/21</a:t>
+              <a:t>5/6/21</a:t>
             </a:fld>
             <a:endParaRPr lang="en-US" dirty="0"/>
           </a:p>
@@ -4680,7 +4680,7 @@
             <a:fld id="{B61BEF0D-F0BB-DE4B-95CE-6DB70DBA9567}" type="datetimeFigureOut">
               <a:rPr lang="en-US" dirty="0"/>
               <a:pPr/>
-              <a:t>5/3/21</a:t>
+              <a:t>5/6/21</a:t>
             </a:fld>
             <a:endParaRPr lang="en-US" dirty="0"/>
           </a:p>
@@ -5022,7 +5022,7 @@
             <a:fld id="{B61BEF0D-F0BB-DE4B-95CE-6DB70DBA9567}" type="datetimeFigureOut">
               <a:rPr lang="en-US" dirty="0"/>
               <a:pPr/>
-              <a:t>5/3/21</a:t>
+              <a:t>5/6/21</a:t>
             </a:fld>
             <a:endParaRPr lang="en-US" dirty="0"/>
           </a:p>
@@ -7136,7 +7136,7 @@
             <a:fld id="{B61BEF0D-F0BB-DE4B-95CE-6DB70DBA9567}" type="datetimeFigureOut">
               <a:rPr lang="en-US" dirty="0"/>
               <a:pPr/>
-              <a:t>5/3/21</a:t>
+              <a:t>5/6/21</a:t>
             </a:fld>
             <a:endParaRPr lang="en-US" dirty="0"/>
           </a:p>
@@ -9468,22 +9468,19 @@
             <p:ph type="title"/>
           </p:nvPr>
         </p:nvSpPr>
-        <p:spPr/>
+        <p:spPr>
+          <a:xfrm>
+            <a:off x="2592925" y="624110"/>
+            <a:ext cx="8911687" cy="728829"/>
+          </a:xfrm>
+        </p:spPr>
         <p:txBody>
           <a:bodyPr/>
           <a:lstStyle/>
           <a:p>
             <a:r>
               <a:rPr kumimoji="1" lang="en-US" altLang="zh-CN" dirty="0" err="1"/>
-              <a:t>RocketMQ</a:t>
-            </a:r>
-            <a:r>
-              <a:rPr kumimoji="1" lang="zh-CN" altLang="en-US" dirty="0"/>
-              <a:t>中</a:t>
-            </a:r>
-            <a:r>
-              <a:rPr kumimoji="1" lang="en-US" altLang="zh-CN" dirty="0" err="1"/>
-              <a:t>readQueue</a:t>
+              <a:t>ReadQueue</a:t>
             </a:r>
             <a:r>
               <a:rPr kumimoji="1" lang="zh-CN" altLang="en-US" dirty="0"/>
@@ -9516,10 +9513,402 @@
             <p:ph idx="1"/>
           </p:nvPr>
         </p:nvSpPr>
-        <p:spPr/>
-        <p:txBody>
-          <a:bodyPr/>
+        <p:spPr>
+          <a:xfrm>
+            <a:off x="2589212" y="1530220"/>
+            <a:ext cx="8915400" cy="4381002"/>
+          </a:xfrm>
+        </p:spPr>
+        <p:txBody>
+          <a:bodyPr>
+            <a:normAutofit fontScale="92500" lnSpcReduction="20000"/>
+          </a:bodyPr>
           <a:lstStyle/>
+          <a:p>
+            <a:r>
+              <a:rPr kumimoji="1" lang="zh-CN" altLang="en-US" dirty="0"/>
+              <a:t>创建</a:t>
+            </a:r>
+            <a:r>
+              <a:rPr kumimoji="1" lang="en-US" altLang="zh-CN" dirty="0"/>
+              <a:t>Topic</a:t>
+            </a:r>
+            <a:r>
+              <a:rPr kumimoji="1" lang="zh-CN" altLang="en-US" dirty="0"/>
+              <a:t>时可以指定读写队列的数量</a:t>
+            </a:r>
+            <a:r>
+              <a:rPr kumimoji="1" lang="en-US" altLang="zh-CN" dirty="0"/>
+              <a:t>,</a:t>
+            </a:r>
+            <a:r>
+              <a:rPr kumimoji="1" lang="zh-CN" altLang="en-US" dirty="0"/>
+              <a:t>作用是信息路由</a:t>
+            </a:r>
+            <a:endParaRPr kumimoji="1" lang="en-US" altLang="zh-CN" dirty="0"/>
+          </a:p>
+          <a:p>
+            <a:r>
+              <a:rPr kumimoji="1" lang="en-US" altLang="zh-CN" dirty="0" err="1"/>
+              <a:t>ReadQueue</a:t>
+            </a:r>
+            <a:r>
+              <a:rPr kumimoji="1" lang="zh-CN" altLang="en-US" dirty="0"/>
+              <a:t>数量指定</a:t>
+            </a:r>
+            <a:r>
+              <a:rPr kumimoji="1" lang="en-US" altLang="zh-CN" dirty="0"/>
+              <a:t>Consumer</a:t>
+            </a:r>
+            <a:r>
+              <a:rPr kumimoji="1" lang="zh-CN" altLang="en-US" dirty="0"/>
+              <a:t>消费时可读队列的数量</a:t>
+            </a:r>
+            <a:endParaRPr kumimoji="1" lang="en-US" altLang="zh-CN" dirty="0"/>
+          </a:p>
+          <a:p>
+            <a:r>
+              <a:rPr kumimoji="1" lang="en-US" altLang="zh-CN" dirty="0" err="1"/>
+              <a:t>WriteQueue</a:t>
+            </a:r>
+            <a:r>
+              <a:rPr kumimoji="1" lang="zh-CN" altLang="en-US" dirty="0"/>
+              <a:t>数量指定</a:t>
+            </a:r>
+            <a:r>
+              <a:rPr kumimoji="1" lang="en-US" altLang="zh-CN" dirty="0"/>
+              <a:t>Producer</a:t>
+            </a:r>
+            <a:r>
+              <a:rPr kumimoji="1" lang="zh-CN" altLang="en-US" dirty="0"/>
+              <a:t>消费时可写队列的数量，也就是</a:t>
+            </a:r>
+            <a:r>
+              <a:rPr kumimoji="1" lang="en-US" altLang="zh-CN" dirty="0" err="1"/>
+              <a:t>consumequeue</a:t>
+            </a:r>
+            <a:r>
+              <a:rPr kumimoji="1" lang="zh-CN" altLang="en-US" dirty="0"/>
+              <a:t>的数量</a:t>
+            </a:r>
+            <a:endParaRPr kumimoji="1" lang="en-US" altLang="zh-CN" dirty="0"/>
+          </a:p>
+          <a:p>
+            <a:r>
+              <a:rPr kumimoji="1" lang="zh-CN" altLang="en-US" dirty="0"/>
+              <a:t>假如</a:t>
+            </a:r>
+            <a:r>
+              <a:rPr kumimoji="1" lang="en-US" altLang="zh-CN" dirty="0" err="1"/>
+              <a:t>ReadQueue</a:t>
+            </a:r>
+            <a:r>
+              <a:rPr kumimoji="1" lang="zh-CN" altLang="en-US" dirty="0"/>
+              <a:t>为</a:t>
+            </a:r>
+            <a:r>
+              <a:rPr kumimoji="1" lang="en-US" altLang="zh-CN" dirty="0"/>
+              <a:t>1</a:t>
+            </a:r>
+            <a:r>
+              <a:rPr kumimoji="1" lang="zh-CN" altLang="en-US" dirty="0"/>
+              <a:t>，</a:t>
+            </a:r>
+            <a:r>
+              <a:rPr kumimoji="1" lang="en-US" altLang="zh-CN" dirty="0"/>
+              <a:t> </a:t>
+            </a:r>
+            <a:r>
+              <a:rPr kumimoji="1" lang="en-US" altLang="zh-CN" dirty="0" err="1"/>
+              <a:t>WriteQueue</a:t>
+            </a:r>
+            <a:r>
+              <a:rPr kumimoji="1" lang="zh-CN" altLang="en-US" dirty="0"/>
+              <a:t>为</a:t>
+            </a:r>
+            <a:r>
+              <a:rPr kumimoji="1" lang="en-US" altLang="zh-CN" dirty="0"/>
+              <a:t>2</a:t>
+            </a:r>
+            <a:r>
+              <a:rPr kumimoji="1" lang="zh-CN" altLang="en-US" dirty="0"/>
+              <a:t>，则</a:t>
+            </a:r>
+            <a:r>
+              <a:rPr kumimoji="1" lang="en-US" altLang="zh-CN" dirty="0" err="1"/>
+              <a:t>consumequeue</a:t>
+            </a:r>
+            <a:r>
+              <a:rPr kumimoji="1" lang="zh-CN" altLang="en-US" dirty="0"/>
+              <a:t>为</a:t>
+            </a:r>
+            <a:r>
+              <a:rPr kumimoji="1" lang="en-US" altLang="zh-CN" dirty="0"/>
+              <a:t>2</a:t>
+            </a:r>
+            <a:r>
+              <a:rPr kumimoji="1" lang="zh-CN" altLang="en-US" dirty="0"/>
+              <a:t>，</a:t>
+            </a:r>
+            <a:r>
+              <a:rPr kumimoji="1" lang="en-US" altLang="zh-CN" dirty="0"/>
+              <a:t>Producer</a:t>
+            </a:r>
+            <a:r>
+              <a:rPr kumimoji="1" lang="zh-CN" altLang="en-US" dirty="0"/>
+              <a:t>会往</a:t>
+            </a:r>
+            <a:r>
+              <a:rPr kumimoji="1" lang="en-US" altLang="zh-CN" dirty="0"/>
+              <a:t>2</a:t>
+            </a:r>
+            <a:r>
+              <a:rPr kumimoji="1" lang="zh-CN" altLang="en-US" dirty="0"/>
+              <a:t>个队列都写入消息。但是因为</a:t>
+            </a:r>
+            <a:r>
+              <a:rPr kumimoji="1" lang="en-US" altLang="zh-CN" dirty="0" err="1"/>
+              <a:t>ReadQueue</a:t>
+            </a:r>
+            <a:r>
+              <a:rPr kumimoji="1" lang="zh-CN" altLang="en-US" dirty="0"/>
+              <a:t>为</a:t>
+            </a:r>
+            <a:r>
+              <a:rPr kumimoji="1" lang="en-US" altLang="zh-CN" dirty="0"/>
+              <a:t>1</a:t>
+            </a:r>
+            <a:r>
+              <a:rPr kumimoji="1" lang="zh-CN" altLang="en-US" dirty="0"/>
+              <a:t>，则只有</a:t>
+            </a:r>
+            <a:r>
+              <a:rPr kumimoji="1" lang="en-US" altLang="zh-CN" dirty="0"/>
+              <a:t>1</a:t>
+            </a:r>
+            <a:r>
+              <a:rPr kumimoji="1" lang="zh-CN" altLang="en-US" dirty="0"/>
+              <a:t>个</a:t>
+            </a:r>
+            <a:r>
+              <a:rPr kumimoji="1" lang="en-US" altLang="zh-CN" dirty="0"/>
+              <a:t>Consumer</a:t>
+            </a:r>
+            <a:r>
+              <a:rPr kumimoji="1" lang="zh-CN" altLang="en-US" dirty="0"/>
+              <a:t>可以消费其中一个队列（一个队列只能被一个</a:t>
+            </a:r>
+            <a:r>
+              <a:rPr kumimoji="1" lang="en-US" altLang="zh-CN" dirty="0"/>
+              <a:t>Consumer</a:t>
+            </a:r>
+            <a:r>
+              <a:rPr kumimoji="1" lang="zh-CN" altLang="en-US" dirty="0"/>
+              <a:t>消费），因此另一个队列的消息没有</a:t>
+            </a:r>
+            <a:r>
+              <a:rPr kumimoji="1" lang="en-US" altLang="zh-CN" dirty="0"/>
+              <a:t>Consumer</a:t>
+            </a:r>
+            <a:r>
+              <a:rPr kumimoji="1" lang="zh-CN" altLang="en-US" dirty="0"/>
+              <a:t>可以消费。</a:t>
+            </a:r>
+            <a:endParaRPr kumimoji="1" lang="en-US" altLang="zh-CN" dirty="0"/>
+          </a:p>
+          <a:p>
+            <a:r>
+              <a:rPr kumimoji="1" lang="zh-CN" altLang="en-US" dirty="0"/>
+              <a:t>假如</a:t>
+            </a:r>
+            <a:r>
+              <a:rPr kumimoji="1" lang="en-US" altLang="zh-CN" dirty="0" err="1"/>
+              <a:t>ReadQueue</a:t>
+            </a:r>
+            <a:r>
+              <a:rPr kumimoji="1" lang="zh-CN" altLang="en-US" dirty="0"/>
+              <a:t>为</a:t>
+            </a:r>
+            <a:r>
+              <a:rPr kumimoji="1" lang="en-US" altLang="zh-CN" dirty="0"/>
+              <a:t>2</a:t>
+            </a:r>
+            <a:r>
+              <a:rPr kumimoji="1" lang="zh-CN" altLang="en-US" dirty="0"/>
+              <a:t>，</a:t>
+            </a:r>
+            <a:r>
+              <a:rPr kumimoji="1" lang="en-US" altLang="zh-CN" dirty="0"/>
+              <a:t> </a:t>
+            </a:r>
+            <a:r>
+              <a:rPr kumimoji="1" lang="en-US" altLang="zh-CN" dirty="0" err="1"/>
+              <a:t>WriteQueue</a:t>
+            </a:r>
+            <a:r>
+              <a:rPr kumimoji="1" lang="zh-CN" altLang="en-US" dirty="0"/>
+              <a:t>为</a:t>
+            </a:r>
+            <a:r>
+              <a:rPr kumimoji="1" lang="en-US" altLang="zh-CN" dirty="0"/>
+              <a:t>1</a:t>
+            </a:r>
+            <a:r>
+              <a:rPr kumimoji="1" lang="zh-CN" altLang="en-US" dirty="0"/>
+              <a:t>，则</a:t>
+            </a:r>
+            <a:r>
+              <a:rPr kumimoji="1" lang="en-US" altLang="zh-CN" dirty="0" err="1"/>
+              <a:t>consumequeue</a:t>
+            </a:r>
+            <a:r>
+              <a:rPr kumimoji="1" lang="zh-CN" altLang="en-US" dirty="0"/>
+              <a:t>为</a:t>
+            </a:r>
+            <a:r>
+              <a:rPr kumimoji="1" lang="en-US" altLang="zh-CN" dirty="0"/>
+              <a:t>1</a:t>
+            </a:r>
+            <a:r>
+              <a:rPr kumimoji="1" lang="zh-CN" altLang="en-US" dirty="0"/>
+              <a:t>，</a:t>
+            </a:r>
+            <a:r>
+              <a:rPr kumimoji="1" lang="en-US" altLang="zh-CN" dirty="0"/>
+              <a:t>Producer</a:t>
+            </a:r>
+            <a:r>
+              <a:rPr kumimoji="1" lang="zh-CN" altLang="en-US" dirty="0"/>
+              <a:t>会往</a:t>
+            </a:r>
+            <a:r>
+              <a:rPr kumimoji="1" lang="en-US" altLang="zh-CN" dirty="0"/>
+              <a:t>1</a:t>
+            </a:r>
+            <a:r>
+              <a:rPr kumimoji="1" lang="zh-CN" altLang="en-US" dirty="0"/>
+              <a:t>个队列写入消息，但是只有</a:t>
+            </a:r>
+            <a:r>
+              <a:rPr kumimoji="1" lang="en-US" altLang="zh-CN" dirty="0"/>
+              <a:t>1</a:t>
+            </a:r>
+            <a:r>
+              <a:rPr kumimoji="1" lang="zh-CN" altLang="en-US" dirty="0"/>
+              <a:t>个</a:t>
+            </a:r>
+            <a:r>
+              <a:rPr kumimoji="1" lang="en-US" altLang="zh-CN" dirty="0"/>
+              <a:t>Consumer</a:t>
+            </a:r>
+            <a:r>
+              <a:rPr kumimoji="1" lang="zh-CN" altLang="en-US" dirty="0"/>
+              <a:t>可以成功消费到消息，其他的</a:t>
+            </a:r>
+            <a:r>
+              <a:rPr kumimoji="1" lang="en-US" altLang="zh-CN" dirty="0"/>
+              <a:t>Consumer</a:t>
+            </a:r>
+            <a:r>
+              <a:rPr kumimoji="1" lang="zh-CN" altLang="en-US" dirty="0"/>
+              <a:t>无法获取消息（因为根本没有队列。。）</a:t>
+            </a:r>
+            <a:endParaRPr kumimoji="1" lang="en-US" altLang="zh-CN" dirty="0"/>
+          </a:p>
+          <a:p>
+            <a:r>
+              <a:rPr kumimoji="1" lang="zh-CN" altLang="en-US" dirty="0"/>
+              <a:t>因此，</a:t>
+            </a:r>
+            <a:r>
+              <a:rPr lang="en" altLang="zh-CN" dirty="0" err="1"/>
+              <a:t>ReadQueueNums</a:t>
+            </a:r>
+            <a:r>
+              <a:rPr lang="en" altLang="zh-CN" dirty="0"/>
+              <a:t>&gt;=</a:t>
+            </a:r>
+            <a:r>
+              <a:rPr lang="en" altLang="zh-CN" dirty="0" err="1"/>
+              <a:t>WriteQueueNums</a:t>
+            </a:r>
+            <a:r>
+              <a:rPr lang="en" altLang="zh-CN" dirty="0"/>
+              <a:t>,</a:t>
+            </a:r>
+            <a:r>
+              <a:rPr lang="zh-CN" altLang="en-US" dirty="0"/>
+              <a:t>程序才能正常进行。最佳实践是</a:t>
+            </a:r>
+            <a:r>
+              <a:rPr lang="en" altLang="zh-CN" dirty="0" err="1"/>
+              <a:t>ReadQueueNums</a:t>
+            </a:r>
+            <a:r>
+              <a:rPr lang="en" altLang="zh-CN" dirty="0"/>
+              <a:t>=</a:t>
+            </a:r>
+            <a:r>
+              <a:rPr lang="en" altLang="zh-CN" dirty="0" err="1"/>
+              <a:t>WriteQueueNums</a:t>
+            </a:r>
+            <a:r>
+              <a:rPr lang="zh-CN" altLang="en" dirty="0"/>
+              <a:t>。</a:t>
+            </a:r>
+            <a:endParaRPr lang="en-US" altLang="zh-CN" dirty="0"/>
+          </a:p>
+          <a:p>
+            <a:r>
+              <a:rPr lang="zh-CN" altLang="en-US" dirty="0"/>
+              <a:t>为什么要设计出</a:t>
+            </a:r>
+            <a:r>
+              <a:rPr lang="en" altLang="zh-CN" dirty="0" err="1"/>
+              <a:t>ReadQueue</a:t>
+            </a:r>
+            <a:r>
+              <a:rPr lang="zh-CN" altLang="en" dirty="0"/>
+              <a:t>和</a:t>
+            </a:r>
+            <a:r>
+              <a:rPr lang="en" altLang="zh-CN" dirty="0" err="1"/>
+              <a:t>WriteQueue</a:t>
+            </a:r>
+            <a:r>
+              <a:rPr lang="zh-CN" altLang="en-US" dirty="0"/>
+              <a:t>？？</a:t>
+            </a:r>
+            <a:endParaRPr lang="en-US" altLang="zh-CN" dirty="0"/>
+          </a:p>
+          <a:p>
+            <a:r>
+              <a:rPr lang="zh-CN" altLang="en-US" dirty="0"/>
+              <a:t>我也不太明白，有人指出是为了方便队列的缩容和扩容。可以参考</a:t>
+            </a:r>
+            <a:r>
+              <a:rPr lang="en" altLang="zh-CN" dirty="0"/>
+              <a:t>https://</a:t>
+            </a:r>
+            <a:r>
+              <a:rPr lang="en" altLang="zh-CN" dirty="0" err="1"/>
+              <a:t>blog.csdn.net</a:t>
+            </a:r>
+            <a:r>
+              <a:rPr lang="en" altLang="zh-CN"/>
+              <a:t>/qian_348840260/article/details/108975241</a:t>
+            </a:r>
+            <a:endParaRPr lang="en-US" altLang="zh-CN"/>
+          </a:p>
+          <a:p>
+            <a:endParaRPr lang="en-US" altLang="zh-CN" dirty="0"/>
+          </a:p>
+          <a:p>
+            <a:pPr marL="0" indent="0">
+              <a:buNone/>
+            </a:pPr>
+            <a:endParaRPr kumimoji="1" lang="zh-CN" altLang="en-US" dirty="0"/>
+          </a:p>
           <a:p>
             <a:endParaRPr kumimoji="1" lang="zh-CN" altLang="en-US" dirty="0"/>
           </a:p>
@@ -10343,7 +10732,7 @@
           <a:bodyPr/>
           <a:lstStyle/>
           <a:p>
-            <a:endParaRPr kumimoji="1" lang="zh-CN" altLang="en-US"/>
+            <a:endParaRPr kumimoji="1" lang="zh-CN" altLang="en-US" dirty="0"/>
           </a:p>
         </p:txBody>
       </p:sp>

</xml_diff>

<commit_message>
RocketMQ文档 by yipin 2021-05-08
</commit_message>
<xml_diff>
--- a/doc/RocketMQ简介.pptx
+++ b/doc/RocketMQ简介.pptx
@@ -17,20 +17,22 @@
     <p:sldId id="282" r:id="rId11"/>
     <p:sldId id="283" r:id="rId12"/>
     <p:sldId id="285" r:id="rId13"/>
-    <p:sldId id="271" r:id="rId14"/>
-    <p:sldId id="284" r:id="rId15"/>
-    <p:sldId id="272" r:id="rId16"/>
-    <p:sldId id="264" r:id="rId17"/>
-    <p:sldId id="265" r:id="rId18"/>
-    <p:sldId id="260" r:id="rId19"/>
-    <p:sldId id="277" r:id="rId20"/>
-    <p:sldId id="273" r:id="rId21"/>
-    <p:sldId id="274" r:id="rId22"/>
-    <p:sldId id="262" r:id="rId23"/>
-    <p:sldId id="266" r:id="rId24"/>
-    <p:sldId id="261" r:id="rId25"/>
-    <p:sldId id="263" r:id="rId26"/>
-    <p:sldId id="267" r:id="rId27"/>
+    <p:sldId id="286" r:id="rId14"/>
+    <p:sldId id="287" r:id="rId15"/>
+    <p:sldId id="271" r:id="rId16"/>
+    <p:sldId id="284" r:id="rId17"/>
+    <p:sldId id="264" r:id="rId18"/>
+    <p:sldId id="265" r:id="rId19"/>
+    <p:sldId id="260" r:id="rId20"/>
+    <p:sldId id="272" r:id="rId21"/>
+    <p:sldId id="266" r:id="rId22"/>
+    <p:sldId id="277" r:id="rId23"/>
+    <p:sldId id="273" r:id="rId24"/>
+    <p:sldId id="274" r:id="rId25"/>
+    <p:sldId id="262" r:id="rId26"/>
+    <p:sldId id="261" r:id="rId27"/>
+    <p:sldId id="263" r:id="rId28"/>
+    <p:sldId id="267" r:id="rId29"/>
   </p:sldIdLst>
   <p:sldSz cx="12192000" cy="6858000"/>
   <p:notesSz cx="6858000" cy="9144000"/>
@@ -8288,7 +8290,7 @@
           <p:cNvPr id="2" name="标题 1">
             <a:extLst>
               <a:ext uri="{FF2B5EF4-FFF2-40B4-BE49-F238E27FC236}">
-                <a16:creationId xmlns:a16="http://schemas.microsoft.com/office/drawing/2014/main" id="{B747197F-2F66-3B42-8078-0CD639AFC1E8}"/>
+                <a16:creationId xmlns:a16="http://schemas.microsoft.com/office/drawing/2014/main" id="{DC92767C-F0CB-AC46-BE23-9CE8679FE739}"/>
               </a:ext>
             </a:extLst>
           </p:cNvPr>
@@ -8306,7 +8308,15 @@
           <a:p>
             <a:r>
               <a:rPr kumimoji="1" lang="zh-CN" altLang="en-US" dirty="0"/>
-              <a:t>延迟消息</a:t>
+              <a:t>基于</a:t>
+            </a:r>
+            <a:r>
+              <a:rPr kumimoji="1" lang="en-US" altLang="zh-CN" dirty="0"/>
+              <a:t>Tag</a:t>
+            </a:r>
+            <a:r>
+              <a:rPr kumimoji="1" lang="zh-CN" altLang="en-US" dirty="0"/>
+              <a:t>的消息过滤</a:t>
             </a:r>
           </a:p>
         </p:txBody>
@@ -8316,7 +8326,7 @@
           <p:cNvPr id="3" name="内容占位符 2">
             <a:extLst>
               <a:ext uri="{FF2B5EF4-FFF2-40B4-BE49-F238E27FC236}">
-                <a16:creationId xmlns:a16="http://schemas.microsoft.com/office/drawing/2014/main" id="{0343B139-4D01-8C40-8CC0-AD4696002E32}"/>
+                <a16:creationId xmlns:a16="http://schemas.microsoft.com/office/drawing/2014/main" id="{C35F4819-37DE-F649-8DDE-5AF003C1A061}"/>
               </a:ext>
             </a:extLst>
           </p:cNvPr>
@@ -8332,6 +8342,271 @@
           <a:bodyPr/>
           <a:lstStyle/>
           <a:p>
+            <a:r>
+              <a:rPr kumimoji="1" lang="zh-CN" altLang="en-US" dirty="0"/>
+              <a:t>消息发送时，可以指定</a:t>
+            </a:r>
+            <a:r>
+              <a:rPr kumimoji="1" lang="en-US" altLang="zh-CN" dirty="0"/>
+              <a:t>tag</a:t>
+            </a:r>
+            <a:r>
+              <a:rPr kumimoji="1" lang="zh-CN" altLang="en-US" dirty="0"/>
+              <a:t>。消费者可以指定消费的</a:t>
+            </a:r>
+            <a:r>
+              <a:rPr kumimoji="1" lang="en-US" altLang="zh-CN" dirty="0"/>
+              <a:t>Tag</a:t>
+            </a:r>
+            <a:r>
+              <a:rPr kumimoji="1" lang="zh-CN" altLang="en-US" dirty="0"/>
+              <a:t>列表（</a:t>
+            </a:r>
+            <a:r>
+              <a:rPr lang="zh-CN" altLang="en-US" dirty="0"/>
+              <a:t>用</a:t>
+            </a:r>
+            <a:r>
+              <a:rPr lang="en-US" altLang="zh-CN" dirty="0"/>
+              <a:t>||</a:t>
+            </a:r>
+            <a:r>
+              <a:rPr lang="zh-CN" altLang="en-US" dirty="0"/>
+              <a:t>分隔</a:t>
+            </a:r>
+            <a:r>
+              <a:rPr kumimoji="1" lang="zh-CN" altLang="en-US" dirty="0"/>
+              <a:t>）。</a:t>
+            </a:r>
+            <a:endParaRPr kumimoji="1" lang="en-US" altLang="zh-CN" dirty="0"/>
+          </a:p>
+          <a:p>
+            <a:r>
+              <a:rPr kumimoji="1" lang="en-US" altLang="zh-CN" dirty="0" err="1"/>
+              <a:t>consumequque</a:t>
+            </a:r>
+            <a:r>
+              <a:rPr kumimoji="1" lang="zh-CN" altLang="en-US" dirty="0"/>
+              <a:t>中每个条目为定长</a:t>
+            </a:r>
+            <a:r>
+              <a:rPr kumimoji="1" lang="en-US" altLang="zh-CN" dirty="0"/>
+              <a:t>20</a:t>
+            </a:r>
+            <a:r>
+              <a:rPr kumimoji="1" lang="zh-CN" altLang="en-US" dirty="0"/>
+              <a:t>字节，最后</a:t>
+            </a:r>
+            <a:r>
+              <a:rPr kumimoji="1" lang="en-US" altLang="zh-CN" dirty="0"/>
+              <a:t>8</a:t>
+            </a:r>
+            <a:r>
+              <a:rPr kumimoji="1" lang="zh-CN" altLang="en-US" dirty="0"/>
+              <a:t>字节存储了消息的</a:t>
+            </a:r>
+            <a:r>
+              <a:rPr kumimoji="1" lang="en-US" altLang="zh-CN" dirty="0"/>
+              <a:t>Tag</a:t>
+            </a:r>
+            <a:r>
+              <a:rPr kumimoji="1" lang="zh-CN" altLang="en-US" dirty="0"/>
+              <a:t>的</a:t>
+            </a:r>
+            <a:r>
+              <a:rPr kumimoji="1" lang="en-US" altLang="zh-CN" dirty="0"/>
+              <a:t>hash</a:t>
+            </a:r>
+            <a:r>
+              <a:rPr kumimoji="1" lang="zh-CN" altLang="en-US" dirty="0"/>
+              <a:t>值。</a:t>
+            </a:r>
+            <a:endParaRPr kumimoji="1" lang="en-US" altLang="zh-CN" dirty="0"/>
+          </a:p>
+          <a:p>
+            <a:r>
+              <a:rPr kumimoji="1" lang="zh-CN" altLang="en-US" dirty="0"/>
+              <a:t>使用</a:t>
+            </a:r>
+            <a:r>
+              <a:rPr kumimoji="1" lang="en-US" altLang="zh-CN" dirty="0"/>
+              <a:t>Tag</a:t>
+            </a:r>
+            <a:r>
+              <a:rPr kumimoji="1" lang="zh-CN" altLang="en-US" dirty="0"/>
+              <a:t>的</a:t>
+            </a:r>
+            <a:r>
+              <a:rPr kumimoji="1" lang="en-US" altLang="zh-CN" dirty="0"/>
+              <a:t>hash</a:t>
+            </a:r>
+            <a:r>
+              <a:rPr kumimoji="1" lang="zh-CN" altLang="en-US" dirty="0"/>
+              <a:t>值是为了使条目是定长，而且避免</a:t>
+            </a:r>
+            <a:r>
+              <a:rPr kumimoji="1" lang="en-US" altLang="zh-CN" dirty="0"/>
+              <a:t>Tag</a:t>
+            </a:r>
+            <a:r>
+              <a:rPr kumimoji="1" lang="zh-CN" altLang="en-US" dirty="0"/>
+              <a:t>过长。（</a:t>
+            </a:r>
+            <a:r>
+              <a:rPr kumimoji="1" lang="en-US" altLang="zh-CN" dirty="0" err="1"/>
+              <a:t>hashcode</a:t>
+            </a:r>
+            <a:r>
+              <a:rPr kumimoji="1" lang="zh-CN" altLang="en-US" dirty="0"/>
+              <a:t>的长度一般是</a:t>
+            </a:r>
+            <a:r>
+              <a:rPr kumimoji="1" lang="en-US" altLang="zh-CN" dirty="0"/>
+              <a:t>int</a:t>
+            </a:r>
+            <a:r>
+              <a:rPr kumimoji="1" lang="zh-CN" altLang="en-US" dirty="0"/>
+              <a:t> </a:t>
+            </a:r>
+            <a:r>
+              <a:rPr kumimoji="1" lang="en-US" altLang="zh-CN" dirty="0"/>
+              <a:t>4</a:t>
+            </a:r>
+            <a:r>
+              <a:rPr kumimoji="1" lang="zh-CN" altLang="en-US" dirty="0"/>
+              <a:t>个字节，这里为什么用</a:t>
+            </a:r>
+            <a:r>
+              <a:rPr kumimoji="1" lang="en-US" altLang="zh-CN" dirty="0"/>
+              <a:t>8</a:t>
+            </a:r>
+            <a:r>
+              <a:rPr kumimoji="1" lang="zh-CN" altLang="en-US" dirty="0"/>
+              <a:t>字节？）</a:t>
+            </a:r>
+            <a:endParaRPr kumimoji="1" lang="en-US" altLang="zh-CN" dirty="0"/>
+          </a:p>
+          <a:p>
+            <a:r>
+              <a:rPr lang="en-US" altLang="zh-CN" dirty="0"/>
+              <a:t>Consumer</a:t>
+            </a:r>
+            <a:r>
+              <a:rPr lang="zh-CN" altLang="en-US" dirty="0"/>
+              <a:t>会将这个订阅请求构建成一个 </a:t>
+            </a:r>
+            <a:r>
+              <a:rPr lang="en-US" altLang="zh-CN" dirty="0" err="1"/>
+              <a:t>SubscriptionData</a:t>
+            </a:r>
+            <a:r>
+              <a:rPr lang="zh-CN" altLang="en-US" dirty="0"/>
+              <a:t>，发送一个</a:t>
+            </a:r>
+            <a:r>
+              <a:rPr lang="en-US" altLang="zh-CN" dirty="0"/>
+              <a:t>Pull</a:t>
+            </a:r>
+            <a:r>
+              <a:rPr lang="zh-CN" altLang="en-US" dirty="0"/>
+              <a:t>消息的请求给</a:t>
+            </a:r>
+            <a:r>
+              <a:rPr lang="en-US" altLang="zh-CN" dirty="0"/>
+              <a:t>Broker</a:t>
+            </a:r>
+            <a:r>
+              <a:rPr lang="zh-CN" altLang="en-US" dirty="0"/>
+              <a:t>端。</a:t>
+            </a:r>
+            <a:r>
+              <a:rPr lang="en-US" altLang="zh-CN" dirty="0"/>
+              <a:t>Broker</a:t>
+            </a:r>
+            <a:r>
+              <a:rPr lang="zh-CN" altLang="en-US" dirty="0"/>
+              <a:t>端从</a:t>
+            </a:r>
+            <a:r>
+              <a:rPr lang="en-US" altLang="zh-CN" dirty="0" err="1"/>
+              <a:t>RocketMQ</a:t>
+            </a:r>
+            <a:r>
+              <a:rPr lang="zh-CN" altLang="en-US" dirty="0"/>
+              <a:t>的文件存储层</a:t>
+            </a:r>
+            <a:r>
+              <a:rPr lang="en-US" altLang="zh-CN" dirty="0"/>
+              <a:t>—Store</a:t>
+            </a:r>
+            <a:r>
+              <a:rPr lang="zh-CN" altLang="en-US" dirty="0"/>
+              <a:t>读取数据之前，会用这些数据先构建一个</a:t>
+            </a:r>
+            <a:r>
+              <a:rPr lang="en-US" altLang="zh-CN" dirty="0" err="1"/>
+              <a:t>MessageFilter</a:t>
+            </a:r>
+            <a:r>
+              <a:rPr lang="zh-CN" altLang="en-US" dirty="0"/>
+              <a:t>，然后传给</a:t>
+            </a:r>
+            <a:r>
+              <a:rPr lang="en-US" altLang="zh-CN" dirty="0"/>
+              <a:t>Store</a:t>
+            </a:r>
+            <a:r>
+              <a:rPr lang="zh-CN" altLang="en-US" dirty="0"/>
+              <a:t>。</a:t>
+            </a:r>
+            <a:r>
+              <a:rPr lang="en-US" altLang="zh-CN" dirty="0"/>
+              <a:t>Store</a:t>
+            </a:r>
+            <a:r>
+              <a:rPr lang="zh-CN" altLang="en-US" dirty="0"/>
+              <a:t>从 </a:t>
+            </a:r>
+            <a:r>
+              <a:rPr lang="en-US" altLang="zh-CN" dirty="0" err="1"/>
+              <a:t>ConsumeQueue</a:t>
+            </a:r>
+            <a:r>
+              <a:rPr lang="zh-CN" altLang="en-US" dirty="0"/>
+              <a:t>读取到一条记录后，会用它记录的消息</a:t>
+            </a:r>
+            <a:r>
+              <a:rPr lang="en-US" altLang="zh-CN" dirty="0"/>
+              <a:t>tag hash</a:t>
+            </a:r>
+            <a:r>
+              <a:rPr lang="zh-CN" altLang="en-US" dirty="0"/>
+              <a:t>值去做过滤，由于在服务端只是根据</a:t>
+            </a:r>
+            <a:r>
+              <a:rPr lang="en-US" altLang="zh-CN" dirty="0" err="1"/>
+              <a:t>hashcode</a:t>
+            </a:r>
+            <a:r>
+              <a:rPr lang="zh-CN" altLang="en-US" dirty="0"/>
+              <a:t>进行判断，无法精确对</a:t>
+            </a:r>
+            <a:r>
+              <a:rPr lang="en-US" altLang="zh-CN" dirty="0"/>
+              <a:t>tag</a:t>
+            </a:r>
+            <a:r>
+              <a:rPr lang="zh-CN" altLang="en-US" dirty="0"/>
+              <a:t>原始字符串进行过滤，故在消息消费端拉取到消息后，还需要对消息的原始</a:t>
+            </a:r>
+            <a:r>
+              <a:rPr lang="en-US" altLang="zh-CN" dirty="0"/>
+              <a:t>tag</a:t>
+            </a:r>
+            <a:r>
+              <a:rPr lang="zh-CN" altLang="en-US" dirty="0"/>
+              <a:t>字符串进行比对，如果不同，则丢弃该消息，不进行消息消费。</a:t>
+            </a:r>
             <a:endParaRPr kumimoji="1" lang="zh-CN" altLang="en-US" dirty="0"/>
           </a:p>
         </p:txBody>
@@ -8339,7 +8614,7 @@
     </p:spTree>
     <p:extLst>
       <p:ext uri="{BB962C8B-B14F-4D97-AF65-F5344CB8AC3E}">
-        <p14:creationId xmlns:p14="http://schemas.microsoft.com/office/powerpoint/2010/main" val="4063166106"/>
+        <p14:creationId xmlns:p14="http://schemas.microsoft.com/office/powerpoint/2010/main" val="3731031600"/>
       </p:ext>
     </p:extLst>
   </p:cSld>
@@ -8371,7 +8646,7 @@
           <p:cNvPr id="2" name="标题 1">
             <a:extLst>
               <a:ext uri="{FF2B5EF4-FFF2-40B4-BE49-F238E27FC236}">
-                <a16:creationId xmlns:a16="http://schemas.microsoft.com/office/drawing/2014/main" id="{3DED9C40-180B-8D40-89A0-94120786767C}"/>
+                <a16:creationId xmlns:a16="http://schemas.microsoft.com/office/drawing/2014/main" id="{BDFDC259-44EC-4340-86B0-61AFF758C19B}"/>
               </a:ext>
             </a:extLst>
           </p:cNvPr>
@@ -8389,7 +8664,15 @@
           <a:p>
             <a:r>
               <a:rPr kumimoji="1" lang="zh-CN" altLang="en-US" dirty="0"/>
-              <a:t>事务消息</a:t>
+              <a:t>使用</a:t>
+            </a:r>
+            <a:r>
+              <a:rPr kumimoji="1" lang="en-US" altLang="zh-CN" dirty="0"/>
+              <a:t>Tag</a:t>
+            </a:r>
+            <a:r>
+              <a:rPr kumimoji="1" lang="zh-CN" altLang="en-US" dirty="0"/>
+              <a:t>存在的问题</a:t>
             </a:r>
           </a:p>
         </p:txBody>
@@ -8399,7 +8682,7 @@
           <p:cNvPr id="3" name="内容占位符 2">
             <a:extLst>
               <a:ext uri="{FF2B5EF4-FFF2-40B4-BE49-F238E27FC236}">
-                <a16:creationId xmlns:a16="http://schemas.microsoft.com/office/drawing/2014/main" id="{C606135D-D294-0E40-B41B-8036DE1D0794}"/>
+                <a16:creationId xmlns:a16="http://schemas.microsoft.com/office/drawing/2014/main" id="{F12F3949-F9A2-524A-B46C-0A0B4981A652}"/>
               </a:ext>
             </a:extLst>
           </p:cNvPr>
@@ -8415,14 +8698,14 @@
           <a:bodyPr/>
           <a:lstStyle/>
           <a:p>
-            <a:endParaRPr kumimoji="1" lang="zh-CN" altLang="en-US"/>
+            <a:endParaRPr kumimoji="1" lang="zh-CN" altLang="en-US" dirty="0"/>
           </a:p>
         </p:txBody>
       </p:sp>
     </p:spTree>
     <p:extLst>
       <p:ext uri="{BB962C8B-B14F-4D97-AF65-F5344CB8AC3E}">
-        <p14:creationId xmlns:p14="http://schemas.microsoft.com/office/powerpoint/2010/main" val="3660366731"/>
+        <p14:creationId xmlns:p14="http://schemas.microsoft.com/office/powerpoint/2010/main" val="1438997714"/>
       </p:ext>
     </p:extLst>
   </p:cSld>
@@ -8454,7 +8737,7 @@
           <p:cNvPr id="2" name="标题 1">
             <a:extLst>
               <a:ext uri="{FF2B5EF4-FFF2-40B4-BE49-F238E27FC236}">
-                <a16:creationId xmlns:a16="http://schemas.microsoft.com/office/drawing/2014/main" id="{56B54089-DDA3-0546-9A46-36594C1BDD08}"/>
+                <a16:creationId xmlns:a16="http://schemas.microsoft.com/office/drawing/2014/main" id="{B747197F-2F66-3B42-8078-0CD639AFC1E8}"/>
               </a:ext>
             </a:extLst>
           </p:cNvPr>
@@ -8472,7 +8755,7 @@
           <a:p>
             <a:r>
               <a:rPr kumimoji="1" lang="zh-CN" altLang="en-US" dirty="0"/>
-              <a:t>如何保证高可用</a:t>
+              <a:t>延迟消息</a:t>
             </a:r>
           </a:p>
         </p:txBody>
@@ -8482,7 +8765,7 @@
           <p:cNvPr id="3" name="内容占位符 2">
             <a:extLst>
               <a:ext uri="{FF2B5EF4-FFF2-40B4-BE49-F238E27FC236}">
-                <a16:creationId xmlns:a16="http://schemas.microsoft.com/office/drawing/2014/main" id="{C69D53C2-376F-C947-8A16-315A869CD2F9}"/>
+                <a16:creationId xmlns:a16="http://schemas.microsoft.com/office/drawing/2014/main" id="{0343B139-4D01-8C40-8CC0-AD4696002E32}"/>
               </a:ext>
             </a:extLst>
           </p:cNvPr>
@@ -8495,273 +8778,17 @@
         </p:nvSpPr>
         <p:spPr/>
         <p:txBody>
-          <a:bodyPr>
-            <a:normAutofit/>
-          </a:bodyPr>
+          <a:bodyPr/>
           <a:lstStyle/>
           <a:p>
-            <a:pPr marL="0" indent="0">
-              <a:buNone/>
-            </a:pPr>
-            <a:endParaRPr kumimoji="1" lang="en-US" altLang="zh-CN" dirty="0"/>
-          </a:p>
-          <a:p>
-            <a:r>
-              <a:rPr kumimoji="1" lang="zh-CN" altLang="en-US" dirty="0"/>
-              <a:t>通过</a:t>
-            </a:r>
-            <a:r>
-              <a:rPr kumimoji="1" lang="en-US" altLang="zh-CN" dirty="0"/>
-              <a:t>Master</a:t>
-            </a:r>
-            <a:r>
-              <a:rPr kumimoji="1" lang="zh-CN" altLang="en-US" dirty="0"/>
-              <a:t>和</a:t>
-            </a:r>
-            <a:r>
-              <a:rPr kumimoji="1" lang="en-US" altLang="zh-CN" dirty="0"/>
-              <a:t>slave</a:t>
-            </a:r>
-            <a:r>
-              <a:rPr kumimoji="1" lang="zh-CN" altLang="en-US" dirty="0"/>
-              <a:t>配合来实现。在</a:t>
-            </a:r>
-            <a:r>
-              <a:rPr kumimoji="1" lang="en-US" altLang="zh-CN" dirty="0"/>
-              <a:t>Broker </a:t>
-            </a:r>
-            <a:r>
-              <a:rPr kumimoji="1" lang="zh-CN" altLang="en-US" dirty="0"/>
-              <a:t>的配置文件中，参数</a:t>
-            </a:r>
-            <a:r>
-              <a:rPr kumimoji="1" lang="en-US" altLang="zh-CN" dirty="0" err="1"/>
-              <a:t>brokerId</a:t>
-            </a:r>
-            <a:r>
-              <a:rPr kumimoji="1" lang="zh-CN" altLang="en-US" dirty="0"/>
-              <a:t>的值为</a:t>
-            </a:r>
-            <a:r>
-              <a:rPr kumimoji="1" lang="en-US" altLang="zh-CN" dirty="0"/>
-              <a:t>0 </a:t>
-            </a:r>
-            <a:r>
-              <a:rPr kumimoji="1" lang="zh-CN" altLang="en-US" dirty="0"/>
-              <a:t>是</a:t>
-            </a:r>
-            <a:r>
-              <a:rPr kumimoji="1" lang="en-US" altLang="zh-CN" dirty="0"/>
-              <a:t>Master </a:t>
-            </a:r>
-            <a:r>
-              <a:rPr kumimoji="1" lang="zh-CN" altLang="en-US" dirty="0"/>
-              <a:t>，大于</a:t>
-            </a:r>
-            <a:r>
-              <a:rPr kumimoji="1" lang="en-US" altLang="zh-CN" dirty="0"/>
-              <a:t>0 </a:t>
-            </a:r>
-            <a:r>
-              <a:rPr kumimoji="1" lang="zh-CN" altLang="en-US" dirty="0"/>
-              <a:t>是</a:t>
-            </a:r>
-            <a:r>
-              <a:rPr kumimoji="1" lang="en-US" altLang="zh-CN" dirty="0"/>
-              <a:t>Slave </a:t>
-            </a:r>
-            <a:r>
-              <a:rPr kumimoji="1" lang="zh-CN" altLang="en-US" dirty="0"/>
-              <a:t>，同时</a:t>
-            </a:r>
-            <a:r>
-              <a:rPr kumimoji="1" lang="en-US" altLang="zh-CN" dirty="0"/>
-              <a:t>broker Role </a:t>
-            </a:r>
-            <a:r>
-              <a:rPr kumimoji="1" lang="zh-CN" altLang="en-US" dirty="0"/>
-              <a:t>参数也会说明这个</a:t>
-            </a:r>
-            <a:r>
-              <a:rPr kumimoji="1" lang="en-US" altLang="zh-CN" dirty="0"/>
-              <a:t>Broker </a:t>
-            </a:r>
-            <a:r>
-              <a:rPr kumimoji="1" lang="zh-CN" altLang="en-US" dirty="0"/>
-              <a:t>是</a:t>
-            </a:r>
-            <a:r>
-              <a:rPr kumimoji="1" lang="en-US" altLang="zh-CN" dirty="0"/>
-              <a:t>Master </a:t>
-            </a:r>
-            <a:r>
-              <a:rPr kumimoji="1" lang="zh-CN" altLang="en-US" dirty="0"/>
-              <a:t>还是</a:t>
-            </a:r>
-            <a:r>
-              <a:rPr kumimoji="1" lang="en-US" altLang="zh-CN" dirty="0"/>
-              <a:t>Slave</a:t>
-            </a:r>
-            <a:r>
-              <a:rPr kumimoji="1" lang="zh-CN" altLang="en-US" dirty="0"/>
-              <a:t>。</a:t>
-            </a:r>
-            <a:endParaRPr kumimoji="1" lang="en-US" altLang="zh-CN"/>
-          </a:p>
-          <a:p>
-            <a:r>
-              <a:rPr kumimoji="1" lang="en-US" altLang="zh-CN"/>
-              <a:t>Master</a:t>
-            </a:r>
-            <a:r>
-              <a:rPr kumimoji="1" lang="zh-CN" altLang="en-US" dirty="0"/>
-              <a:t>支持读写，</a:t>
-            </a:r>
-            <a:r>
-              <a:rPr kumimoji="1" lang="en-US" altLang="zh-CN" dirty="0"/>
-              <a:t>Slave</a:t>
-            </a:r>
-            <a:r>
-              <a:rPr kumimoji="1" lang="zh-CN" altLang="en-US" dirty="0"/>
-              <a:t>只支持读。如果</a:t>
-            </a:r>
-            <a:r>
-              <a:rPr kumimoji="1" lang="en-US" altLang="zh-CN" dirty="0"/>
-              <a:t>Master</a:t>
-            </a:r>
-            <a:r>
-              <a:rPr kumimoji="1" lang="zh-CN" altLang="en-US" dirty="0"/>
-              <a:t>不可用或者繁忙时，</a:t>
-            </a:r>
-            <a:r>
-              <a:rPr kumimoji="1" lang="en-US" altLang="zh-CN" dirty="0"/>
-              <a:t>Consumer</a:t>
-            </a:r>
-            <a:r>
-              <a:rPr kumimoji="1" lang="zh-CN" altLang="en-US" dirty="0"/>
-              <a:t>会自动切换到</a:t>
-            </a:r>
-            <a:r>
-              <a:rPr kumimoji="1" lang="en-US" altLang="zh-CN" dirty="0"/>
-              <a:t>Broker</a:t>
-            </a:r>
-            <a:r>
-              <a:rPr kumimoji="1" lang="zh-CN" altLang="en-US" dirty="0"/>
-              <a:t>进行消费。</a:t>
-            </a:r>
-            <a:endParaRPr kumimoji="1" lang="en-US" altLang="zh-CN" dirty="0"/>
-          </a:p>
-          <a:p>
-            <a:r>
-              <a:rPr kumimoji="1" lang="en-US" altLang="zh-CN" dirty="0"/>
-              <a:t>4.5.0</a:t>
-            </a:r>
-            <a:r>
-              <a:rPr kumimoji="1" lang="zh-CN" altLang="en-US" dirty="0"/>
-              <a:t>版本前，不支持</a:t>
-            </a:r>
-            <a:r>
-              <a:rPr kumimoji="1" lang="en-US" altLang="zh-CN" dirty="0"/>
-              <a:t>Slave</a:t>
-            </a:r>
-            <a:r>
-              <a:rPr kumimoji="1" lang="zh-CN" altLang="en-US" dirty="0"/>
-              <a:t>自动转换成</a:t>
-            </a:r>
-            <a:r>
-              <a:rPr kumimoji="1" lang="en-US" altLang="zh-CN" dirty="0"/>
-              <a:t>Master</a:t>
-            </a:r>
-            <a:r>
-              <a:rPr kumimoji="1" lang="zh-CN" altLang="en-US" dirty="0"/>
-              <a:t>。</a:t>
-            </a:r>
-            <a:endParaRPr kumimoji="1" lang="en-US" altLang="zh-CN" dirty="0"/>
-          </a:p>
-          <a:p>
-            <a:r>
-              <a:rPr kumimoji="1" lang="en-US" altLang="zh-CN" dirty="0"/>
-              <a:t>4.5.0</a:t>
-            </a:r>
-            <a:r>
-              <a:rPr kumimoji="1" lang="zh-CN" altLang="en-US" dirty="0"/>
-              <a:t>版本引入了 </a:t>
-            </a:r>
-            <a:r>
-              <a:rPr kumimoji="1" lang="en-US" altLang="zh-CN" dirty="0" err="1"/>
-              <a:t>Dledger</a:t>
-            </a:r>
-            <a:r>
-              <a:rPr kumimoji="1" lang="en-US" altLang="zh-CN" dirty="0"/>
-              <a:t> </a:t>
-            </a:r>
-            <a:r>
-              <a:rPr kumimoji="1" lang="zh-CN" altLang="en-US" dirty="0"/>
-              <a:t>的多副本技术。 是指一组相同名称的 </a:t>
-            </a:r>
-            <a:r>
-              <a:rPr kumimoji="1" lang="en-US" altLang="zh-CN" dirty="0"/>
-              <a:t>Broker</a:t>
-            </a:r>
-            <a:r>
-              <a:rPr kumimoji="1" lang="zh-CN" altLang="en-US" dirty="0"/>
-              <a:t>，至少需要 </a:t>
-            </a:r>
-            <a:r>
-              <a:rPr kumimoji="1" lang="en-US" altLang="zh-CN" dirty="0"/>
-              <a:t>3 </a:t>
-            </a:r>
-            <a:r>
-              <a:rPr kumimoji="1" lang="zh-CN" altLang="en-US" dirty="0"/>
-              <a:t>个节点，通过 </a:t>
-            </a:r>
-            <a:r>
-              <a:rPr kumimoji="1" lang="en-US" altLang="zh-CN" dirty="0"/>
-              <a:t>Raft </a:t>
-            </a:r>
-            <a:r>
-              <a:rPr kumimoji="1" lang="zh-CN" altLang="en-US" dirty="0"/>
-              <a:t>自动选举出一个 </a:t>
-            </a:r>
-            <a:r>
-              <a:rPr kumimoji="1" lang="en-US" altLang="zh-CN" dirty="0"/>
-              <a:t>Leader</a:t>
-            </a:r>
-            <a:r>
-              <a:rPr kumimoji="1" lang="zh-CN" altLang="en-US" dirty="0"/>
-              <a:t>，其余节点 作为 </a:t>
-            </a:r>
-            <a:r>
-              <a:rPr kumimoji="1" lang="en-US" altLang="zh-CN" dirty="0"/>
-              <a:t>Follower</a:t>
-            </a:r>
-            <a:r>
-              <a:rPr kumimoji="1" lang="zh-CN" altLang="en-US" dirty="0"/>
-              <a:t>，并在 </a:t>
-            </a:r>
-            <a:r>
-              <a:rPr kumimoji="1" lang="en-US" altLang="zh-CN" dirty="0"/>
-              <a:t>Leader </a:t>
-            </a:r>
-            <a:r>
-              <a:rPr kumimoji="1" lang="zh-CN" altLang="en-US" dirty="0"/>
-              <a:t>和 </a:t>
-            </a:r>
-            <a:r>
-              <a:rPr kumimoji="1" lang="en-US" altLang="zh-CN" dirty="0"/>
-              <a:t>Follower </a:t>
-            </a:r>
-            <a:r>
-              <a:rPr kumimoji="1" lang="zh-CN" altLang="en-US" dirty="0"/>
-              <a:t>之间复制数据以保证高可用。（此功能默认关闭，需要在配置文件中启用）</a:t>
-            </a:r>
+            <a:endParaRPr kumimoji="1" lang="zh-CN" altLang="en-US" dirty="0"/>
           </a:p>
         </p:txBody>
       </p:sp>
     </p:spTree>
     <p:extLst>
       <p:ext uri="{BB962C8B-B14F-4D97-AF65-F5344CB8AC3E}">
-        <p14:creationId xmlns:p14="http://schemas.microsoft.com/office/powerpoint/2010/main" val="1961592500"/>
+        <p14:creationId xmlns:p14="http://schemas.microsoft.com/office/powerpoint/2010/main" val="4063166106"/>
       </p:ext>
     </p:extLst>
   </p:cSld>
@@ -8793,7 +8820,7 @@
           <p:cNvPr id="2" name="标题 1">
             <a:extLst>
               <a:ext uri="{FF2B5EF4-FFF2-40B4-BE49-F238E27FC236}">
-                <a16:creationId xmlns:a16="http://schemas.microsoft.com/office/drawing/2014/main" id="{93913AE2-AC33-9149-966D-E50C42CFAADC}"/>
+                <a16:creationId xmlns:a16="http://schemas.microsoft.com/office/drawing/2014/main" id="{3DED9C40-180B-8D40-89A0-94120786767C}"/>
               </a:ext>
             </a:extLst>
           </p:cNvPr>
@@ -8811,7 +8838,7 @@
           <a:p>
             <a:r>
               <a:rPr kumimoji="1" lang="zh-CN" altLang="en-US" dirty="0"/>
-              <a:t>负载均衡机制</a:t>
+              <a:t>事务消息</a:t>
             </a:r>
           </a:p>
         </p:txBody>
@@ -8821,7 +8848,7 @@
           <p:cNvPr id="3" name="内容占位符 2">
             <a:extLst>
               <a:ext uri="{FF2B5EF4-FFF2-40B4-BE49-F238E27FC236}">
-                <a16:creationId xmlns:a16="http://schemas.microsoft.com/office/drawing/2014/main" id="{6890FC5C-9645-6F41-83AB-4707FC922C3C}"/>
+                <a16:creationId xmlns:a16="http://schemas.microsoft.com/office/drawing/2014/main" id="{C606135D-D294-0E40-B41B-8036DE1D0794}"/>
               </a:ext>
             </a:extLst>
           </p:cNvPr>
@@ -8844,7 +8871,7 @@
     </p:spTree>
     <p:extLst>
       <p:ext uri="{BB962C8B-B14F-4D97-AF65-F5344CB8AC3E}">
-        <p14:creationId xmlns:p14="http://schemas.microsoft.com/office/powerpoint/2010/main" val="1446558323"/>
+        <p14:creationId xmlns:p14="http://schemas.microsoft.com/office/powerpoint/2010/main" val="3660366731"/>
       </p:ext>
     </p:extLst>
   </p:cSld>
@@ -8876,7 +8903,7 @@
           <p:cNvPr id="2" name="标题 1">
             <a:extLst>
               <a:ext uri="{FF2B5EF4-FFF2-40B4-BE49-F238E27FC236}">
-                <a16:creationId xmlns:a16="http://schemas.microsoft.com/office/drawing/2014/main" id="{F89226ED-61C1-F845-8DA6-35D525BDBFCF}"/>
+                <a16:creationId xmlns:a16="http://schemas.microsoft.com/office/drawing/2014/main" id="{93913AE2-AC33-9149-966D-E50C42CFAADC}"/>
               </a:ext>
             </a:extLst>
           </p:cNvPr>
@@ -8893,12 +8920,8 @@
           <a:lstStyle/>
           <a:p>
             <a:r>
-              <a:rPr kumimoji="1" lang="en-US" altLang="zh-CN" dirty="0" err="1"/>
-              <a:t>RocketMQ</a:t>
-            </a:r>
-            <a:r>
-              <a:rPr kumimoji="1" lang="zh-CN" altLang="en-US" dirty="0"/>
-              <a:t>存储机制</a:t>
+              <a:rPr kumimoji="1" lang="zh-CN" altLang="en-US" dirty="0"/>
+              <a:t>负载均衡机制</a:t>
             </a:r>
           </a:p>
         </p:txBody>
@@ -8908,7 +8931,7 @@
           <p:cNvPr id="3" name="内容占位符 2">
             <a:extLst>
               <a:ext uri="{FF2B5EF4-FFF2-40B4-BE49-F238E27FC236}">
-                <a16:creationId xmlns:a16="http://schemas.microsoft.com/office/drawing/2014/main" id="{AE5F12A1-20A1-794B-9048-4A83D4115FD9}"/>
+                <a16:creationId xmlns:a16="http://schemas.microsoft.com/office/drawing/2014/main" id="{6890FC5C-9645-6F41-83AB-4707FC922C3C}"/>
               </a:ext>
             </a:extLst>
           </p:cNvPr>
@@ -8924,14 +8947,14 @@
           <a:bodyPr/>
           <a:lstStyle/>
           <a:p>
-            <a:endParaRPr kumimoji="1" lang="zh-CN" altLang="en-US" dirty="0"/>
+            <a:endParaRPr kumimoji="1" lang="zh-CN" altLang="en-US"/>
           </a:p>
         </p:txBody>
       </p:sp>
     </p:spTree>
     <p:extLst>
       <p:ext uri="{BB962C8B-B14F-4D97-AF65-F5344CB8AC3E}">
-        <p14:creationId xmlns:p14="http://schemas.microsoft.com/office/powerpoint/2010/main" val="3262638319"/>
+        <p14:creationId xmlns:p14="http://schemas.microsoft.com/office/powerpoint/2010/main" val="1446558323"/>
       </p:ext>
     </p:extLst>
   </p:cSld>
@@ -8963,6 +8986,93 @@
           <p:cNvPr id="2" name="标题 1">
             <a:extLst>
               <a:ext uri="{FF2B5EF4-FFF2-40B4-BE49-F238E27FC236}">
+                <a16:creationId xmlns:a16="http://schemas.microsoft.com/office/drawing/2014/main" id="{F89226ED-61C1-F845-8DA6-35D525BDBFCF}"/>
+              </a:ext>
+            </a:extLst>
+          </p:cNvPr>
+          <p:cNvSpPr>
+            <a:spLocks noGrp="1"/>
+          </p:cNvSpPr>
+          <p:nvPr>
+            <p:ph type="title"/>
+          </p:nvPr>
+        </p:nvSpPr>
+        <p:spPr/>
+        <p:txBody>
+          <a:bodyPr/>
+          <a:lstStyle/>
+          <a:p>
+            <a:r>
+              <a:rPr kumimoji="1" lang="en-US" altLang="zh-CN" dirty="0" err="1"/>
+              <a:t>RocketMQ</a:t>
+            </a:r>
+            <a:r>
+              <a:rPr kumimoji="1" lang="zh-CN" altLang="en-US" dirty="0"/>
+              <a:t>存储机制</a:t>
+            </a:r>
+          </a:p>
+        </p:txBody>
+      </p:sp>
+      <p:sp>
+        <p:nvSpPr>
+          <p:cNvPr id="3" name="内容占位符 2">
+            <a:extLst>
+              <a:ext uri="{FF2B5EF4-FFF2-40B4-BE49-F238E27FC236}">
+                <a16:creationId xmlns:a16="http://schemas.microsoft.com/office/drawing/2014/main" id="{AE5F12A1-20A1-794B-9048-4A83D4115FD9}"/>
+              </a:ext>
+            </a:extLst>
+          </p:cNvPr>
+          <p:cNvSpPr>
+            <a:spLocks noGrp="1"/>
+          </p:cNvSpPr>
+          <p:nvPr>
+            <p:ph idx="1"/>
+          </p:nvPr>
+        </p:nvSpPr>
+        <p:spPr/>
+        <p:txBody>
+          <a:bodyPr/>
+          <a:lstStyle/>
+          <a:p>
+            <a:endParaRPr kumimoji="1" lang="zh-CN" altLang="en-US" dirty="0"/>
+          </a:p>
+        </p:txBody>
+      </p:sp>
+    </p:spTree>
+    <p:extLst>
+      <p:ext uri="{BB962C8B-B14F-4D97-AF65-F5344CB8AC3E}">
+        <p14:creationId xmlns:p14="http://schemas.microsoft.com/office/powerpoint/2010/main" val="3262638319"/>
+      </p:ext>
+    </p:extLst>
+  </p:cSld>
+  <p:clrMapOvr>
+    <a:masterClrMapping/>
+  </p:clrMapOvr>
+</p:sld>
+</file>
+
+<file path=ppt/slides/slide19.xml><?xml version="1.0" encoding="utf-8"?>
+<p:sld xmlns:a="http://schemas.openxmlformats.org/drawingml/2006/main" xmlns:r="http://schemas.openxmlformats.org/officeDocument/2006/relationships" xmlns:p="http://schemas.openxmlformats.org/presentationml/2006/main">
+  <p:cSld>
+    <p:spTree>
+      <p:nvGrpSpPr>
+        <p:cNvPr id="1" name=""/>
+        <p:cNvGrpSpPr/>
+        <p:nvPr/>
+      </p:nvGrpSpPr>
+      <p:grpSpPr>
+        <a:xfrm>
+          <a:off x="0" y="0"/>
+          <a:ext cx="0" cy="0"/>
+          <a:chOff x="0" y="0"/>
+          <a:chExt cx="0" cy="0"/>
+        </a:xfrm>
+      </p:grpSpPr>
+      <p:sp>
+        <p:nvSpPr>
+          <p:cNvPr id="2" name="标题 1">
+            <a:extLst>
+              <a:ext uri="{FF2B5EF4-FFF2-40B4-BE49-F238E27FC236}">
                 <a16:creationId xmlns:a16="http://schemas.microsoft.com/office/drawing/2014/main" id="{63A09A91-A650-9D4B-BE61-62F8F8FF4EE8}"/>
               </a:ext>
             </a:extLst>
@@ -9005,7 +9115,632 @@
 </p:sld>
 </file>
 
-<file path=ppt/slides/slide19.xml><?xml version="1.0" encoding="utf-8"?>
+<file path=ppt/slides/slide2.xml><?xml version="1.0" encoding="utf-8"?>
+<p:sld xmlns:a="http://schemas.openxmlformats.org/drawingml/2006/main" xmlns:r="http://schemas.openxmlformats.org/officeDocument/2006/relationships" xmlns:p="http://schemas.openxmlformats.org/presentationml/2006/main">
+  <p:cSld>
+    <p:spTree>
+      <p:nvGrpSpPr>
+        <p:cNvPr id="1" name=""/>
+        <p:cNvGrpSpPr/>
+        <p:nvPr/>
+      </p:nvGrpSpPr>
+      <p:grpSpPr>
+        <a:xfrm>
+          <a:off x="0" y="0"/>
+          <a:ext cx="0" cy="0"/>
+          <a:chOff x="0" y="0"/>
+          <a:chExt cx="0" cy="0"/>
+        </a:xfrm>
+      </p:grpSpPr>
+      <p:sp>
+        <p:nvSpPr>
+          <p:cNvPr id="2" name="标题 1">
+            <a:extLst>
+              <a:ext uri="{FF2B5EF4-FFF2-40B4-BE49-F238E27FC236}">
+                <a16:creationId xmlns:a16="http://schemas.microsoft.com/office/drawing/2014/main" id="{31409E60-AE0B-F440-9B7F-730A06746102}"/>
+              </a:ext>
+            </a:extLst>
+          </p:cNvPr>
+          <p:cNvSpPr>
+            <a:spLocks noGrp="1"/>
+          </p:cNvSpPr>
+          <p:nvPr>
+            <p:ph type="title"/>
+          </p:nvPr>
+        </p:nvSpPr>
+        <p:spPr/>
+        <p:txBody>
+          <a:bodyPr/>
+          <a:lstStyle/>
+          <a:p>
+            <a:r>
+              <a:rPr kumimoji="1" lang="zh-CN" altLang="en-US" dirty="0"/>
+              <a:t>什么是</a:t>
+            </a:r>
+            <a:r>
+              <a:rPr kumimoji="1" lang="en-US" altLang="zh-CN" dirty="0" err="1"/>
+              <a:t>RocketMQ</a:t>
+            </a:r>
+            <a:endParaRPr kumimoji="1" lang="zh-CN" altLang="en-US" dirty="0"/>
+          </a:p>
+        </p:txBody>
+      </p:sp>
+      <p:sp>
+        <p:nvSpPr>
+          <p:cNvPr id="3" name="内容占位符 2">
+            <a:extLst>
+              <a:ext uri="{FF2B5EF4-FFF2-40B4-BE49-F238E27FC236}">
+                <a16:creationId xmlns:a16="http://schemas.microsoft.com/office/drawing/2014/main" id="{FD11AE4B-9C6A-C642-8595-57F111C2D97E}"/>
+              </a:ext>
+            </a:extLst>
+          </p:cNvPr>
+          <p:cNvSpPr>
+            <a:spLocks noGrp="1"/>
+          </p:cNvSpPr>
+          <p:nvPr>
+            <p:ph idx="1"/>
+          </p:nvPr>
+        </p:nvSpPr>
+        <p:spPr/>
+        <p:txBody>
+          <a:bodyPr/>
+          <a:lstStyle/>
+          <a:p>
+            <a:r>
+              <a:rPr lang="en-US" altLang="zh-CN" dirty="0" err="1"/>
+              <a:t>RcoketMQ</a:t>
+            </a:r>
+            <a:r>
+              <a:rPr lang="en-US" altLang="zh-CN" dirty="0"/>
+              <a:t> </a:t>
+            </a:r>
+            <a:r>
+              <a:rPr lang="zh-CN" altLang="en-US" dirty="0"/>
+              <a:t>是一款低延迟、高可靠、可伸缩、易于使用的消息中间件</a:t>
+            </a:r>
+            <a:endParaRPr lang="en-US" altLang="zh-CN" dirty="0"/>
+          </a:p>
+          <a:p>
+            <a:r>
+              <a:rPr lang="en-US" altLang="zh-CN" dirty="0" err="1"/>
+              <a:t>RockeMQ</a:t>
+            </a:r>
+            <a:r>
+              <a:rPr lang="zh-CN" altLang="en-US" dirty="0"/>
+              <a:t>使用场景：解耦，异步，消峰，消息分发</a:t>
+            </a:r>
+            <a:endParaRPr lang="en-US" altLang="zh-CN" dirty="0"/>
+          </a:p>
+          <a:p>
+            <a:endParaRPr kumimoji="1" lang="zh-CN" altLang="en-US" dirty="0"/>
+          </a:p>
+        </p:txBody>
+      </p:sp>
+    </p:spTree>
+    <p:extLst>
+      <p:ext uri="{BB962C8B-B14F-4D97-AF65-F5344CB8AC3E}">
+        <p14:creationId xmlns:p14="http://schemas.microsoft.com/office/powerpoint/2010/main" val="3550855111"/>
+      </p:ext>
+    </p:extLst>
+  </p:cSld>
+  <p:clrMapOvr>
+    <a:masterClrMapping/>
+  </p:clrMapOvr>
+</p:sld>
+</file>
+
+<file path=ppt/slides/slide20.xml><?xml version="1.0" encoding="utf-8"?>
+<p:sld xmlns:a="http://schemas.openxmlformats.org/drawingml/2006/main" xmlns:r="http://schemas.openxmlformats.org/officeDocument/2006/relationships" xmlns:p="http://schemas.openxmlformats.org/presentationml/2006/main">
+  <p:cSld>
+    <p:spTree>
+      <p:nvGrpSpPr>
+        <p:cNvPr id="1" name=""/>
+        <p:cNvGrpSpPr/>
+        <p:nvPr/>
+      </p:nvGrpSpPr>
+      <p:grpSpPr>
+        <a:xfrm>
+          <a:off x="0" y="0"/>
+          <a:ext cx="0" cy="0"/>
+          <a:chOff x="0" y="0"/>
+          <a:chExt cx="0" cy="0"/>
+        </a:xfrm>
+      </p:grpSpPr>
+      <p:sp>
+        <p:nvSpPr>
+          <p:cNvPr id="2" name="标题 1">
+            <a:extLst>
+              <a:ext uri="{FF2B5EF4-FFF2-40B4-BE49-F238E27FC236}">
+                <a16:creationId xmlns:a16="http://schemas.microsoft.com/office/drawing/2014/main" id="{56B54089-DDA3-0546-9A46-36594C1BDD08}"/>
+              </a:ext>
+            </a:extLst>
+          </p:cNvPr>
+          <p:cNvSpPr>
+            <a:spLocks noGrp="1"/>
+          </p:cNvSpPr>
+          <p:nvPr>
+            <p:ph type="title"/>
+          </p:nvPr>
+        </p:nvSpPr>
+        <p:spPr/>
+        <p:txBody>
+          <a:bodyPr/>
+          <a:lstStyle/>
+          <a:p>
+            <a:r>
+              <a:rPr kumimoji="1" lang="zh-CN" altLang="en-US" dirty="0"/>
+              <a:t>如何保证高可用</a:t>
+            </a:r>
+          </a:p>
+        </p:txBody>
+      </p:sp>
+      <p:sp>
+        <p:nvSpPr>
+          <p:cNvPr id="3" name="内容占位符 2">
+            <a:extLst>
+              <a:ext uri="{FF2B5EF4-FFF2-40B4-BE49-F238E27FC236}">
+                <a16:creationId xmlns:a16="http://schemas.microsoft.com/office/drawing/2014/main" id="{C69D53C2-376F-C947-8A16-315A869CD2F9}"/>
+              </a:ext>
+            </a:extLst>
+          </p:cNvPr>
+          <p:cNvSpPr>
+            <a:spLocks noGrp="1"/>
+          </p:cNvSpPr>
+          <p:nvPr>
+            <p:ph idx="1"/>
+          </p:nvPr>
+        </p:nvSpPr>
+        <p:spPr/>
+        <p:txBody>
+          <a:bodyPr>
+            <a:normAutofit/>
+          </a:bodyPr>
+          <a:lstStyle/>
+          <a:p>
+            <a:pPr marL="0" indent="0">
+              <a:buNone/>
+            </a:pPr>
+            <a:endParaRPr kumimoji="1" lang="en-US" altLang="zh-CN" dirty="0"/>
+          </a:p>
+          <a:p>
+            <a:r>
+              <a:rPr kumimoji="1" lang="zh-CN" altLang="en-US" dirty="0"/>
+              <a:t>通过</a:t>
+            </a:r>
+            <a:r>
+              <a:rPr kumimoji="1" lang="en-US" altLang="zh-CN" dirty="0"/>
+              <a:t>Master</a:t>
+            </a:r>
+            <a:r>
+              <a:rPr kumimoji="1" lang="zh-CN" altLang="en-US" dirty="0"/>
+              <a:t>和</a:t>
+            </a:r>
+            <a:r>
+              <a:rPr kumimoji="1" lang="en-US" altLang="zh-CN" dirty="0"/>
+              <a:t>slave</a:t>
+            </a:r>
+            <a:r>
+              <a:rPr kumimoji="1" lang="zh-CN" altLang="en-US" dirty="0"/>
+              <a:t>配合来实现。在</a:t>
+            </a:r>
+            <a:r>
+              <a:rPr kumimoji="1" lang="en-US" altLang="zh-CN" dirty="0"/>
+              <a:t>Broker </a:t>
+            </a:r>
+            <a:r>
+              <a:rPr kumimoji="1" lang="zh-CN" altLang="en-US" dirty="0"/>
+              <a:t>的配置文件中，参数</a:t>
+            </a:r>
+            <a:r>
+              <a:rPr kumimoji="1" lang="en-US" altLang="zh-CN" dirty="0" err="1"/>
+              <a:t>brokerId</a:t>
+            </a:r>
+            <a:r>
+              <a:rPr kumimoji="1" lang="zh-CN" altLang="en-US" dirty="0"/>
+              <a:t>的值为</a:t>
+            </a:r>
+            <a:r>
+              <a:rPr kumimoji="1" lang="en-US" altLang="zh-CN" dirty="0"/>
+              <a:t>0 </a:t>
+            </a:r>
+            <a:r>
+              <a:rPr kumimoji="1" lang="zh-CN" altLang="en-US" dirty="0"/>
+              <a:t>是</a:t>
+            </a:r>
+            <a:r>
+              <a:rPr kumimoji="1" lang="en-US" altLang="zh-CN" dirty="0"/>
+              <a:t>Master </a:t>
+            </a:r>
+            <a:r>
+              <a:rPr kumimoji="1" lang="zh-CN" altLang="en-US" dirty="0"/>
+              <a:t>，大于</a:t>
+            </a:r>
+            <a:r>
+              <a:rPr kumimoji="1" lang="en-US" altLang="zh-CN" dirty="0"/>
+              <a:t>0 </a:t>
+            </a:r>
+            <a:r>
+              <a:rPr kumimoji="1" lang="zh-CN" altLang="en-US" dirty="0"/>
+              <a:t>是</a:t>
+            </a:r>
+            <a:r>
+              <a:rPr kumimoji="1" lang="en-US" altLang="zh-CN" dirty="0"/>
+              <a:t>Slave </a:t>
+            </a:r>
+            <a:r>
+              <a:rPr kumimoji="1" lang="zh-CN" altLang="en-US" dirty="0"/>
+              <a:t>，同时</a:t>
+            </a:r>
+            <a:r>
+              <a:rPr kumimoji="1" lang="en-US" altLang="zh-CN" dirty="0"/>
+              <a:t>broker Role </a:t>
+            </a:r>
+            <a:r>
+              <a:rPr kumimoji="1" lang="zh-CN" altLang="en-US" dirty="0"/>
+              <a:t>参数也会说明这个</a:t>
+            </a:r>
+            <a:r>
+              <a:rPr kumimoji="1" lang="en-US" altLang="zh-CN" dirty="0"/>
+              <a:t>Broker </a:t>
+            </a:r>
+            <a:r>
+              <a:rPr kumimoji="1" lang="zh-CN" altLang="en-US" dirty="0"/>
+              <a:t>是</a:t>
+            </a:r>
+            <a:r>
+              <a:rPr kumimoji="1" lang="en-US" altLang="zh-CN" dirty="0"/>
+              <a:t>Master </a:t>
+            </a:r>
+            <a:r>
+              <a:rPr kumimoji="1" lang="zh-CN" altLang="en-US" dirty="0"/>
+              <a:t>还是</a:t>
+            </a:r>
+            <a:r>
+              <a:rPr kumimoji="1" lang="en-US" altLang="zh-CN" dirty="0"/>
+              <a:t>Slave</a:t>
+            </a:r>
+            <a:r>
+              <a:rPr kumimoji="1" lang="zh-CN" altLang="en-US" dirty="0"/>
+              <a:t>。</a:t>
+            </a:r>
+            <a:endParaRPr kumimoji="1" lang="en-US" altLang="zh-CN"/>
+          </a:p>
+          <a:p>
+            <a:r>
+              <a:rPr kumimoji="1" lang="en-US" altLang="zh-CN"/>
+              <a:t>Master</a:t>
+            </a:r>
+            <a:r>
+              <a:rPr kumimoji="1" lang="zh-CN" altLang="en-US" dirty="0"/>
+              <a:t>支持读写，</a:t>
+            </a:r>
+            <a:r>
+              <a:rPr kumimoji="1" lang="en-US" altLang="zh-CN" dirty="0"/>
+              <a:t>Slave</a:t>
+            </a:r>
+            <a:r>
+              <a:rPr kumimoji="1" lang="zh-CN" altLang="en-US" dirty="0"/>
+              <a:t>只支持读。如果</a:t>
+            </a:r>
+            <a:r>
+              <a:rPr kumimoji="1" lang="en-US" altLang="zh-CN" dirty="0"/>
+              <a:t>Master</a:t>
+            </a:r>
+            <a:r>
+              <a:rPr kumimoji="1" lang="zh-CN" altLang="en-US" dirty="0"/>
+              <a:t>不可用或者繁忙时，</a:t>
+            </a:r>
+            <a:r>
+              <a:rPr kumimoji="1" lang="en-US" altLang="zh-CN" dirty="0"/>
+              <a:t>Consumer</a:t>
+            </a:r>
+            <a:r>
+              <a:rPr kumimoji="1" lang="zh-CN" altLang="en-US" dirty="0"/>
+              <a:t>会自动切换到</a:t>
+            </a:r>
+            <a:r>
+              <a:rPr kumimoji="1" lang="en-US" altLang="zh-CN" dirty="0"/>
+              <a:t>Broker</a:t>
+            </a:r>
+            <a:r>
+              <a:rPr kumimoji="1" lang="zh-CN" altLang="en-US" dirty="0"/>
+              <a:t>进行消费。</a:t>
+            </a:r>
+            <a:endParaRPr kumimoji="1" lang="en-US" altLang="zh-CN" dirty="0"/>
+          </a:p>
+          <a:p>
+            <a:r>
+              <a:rPr kumimoji="1" lang="en-US" altLang="zh-CN" dirty="0"/>
+              <a:t>4.5.0</a:t>
+            </a:r>
+            <a:r>
+              <a:rPr kumimoji="1" lang="zh-CN" altLang="en-US" dirty="0"/>
+              <a:t>版本前，不支持</a:t>
+            </a:r>
+            <a:r>
+              <a:rPr kumimoji="1" lang="en-US" altLang="zh-CN" dirty="0"/>
+              <a:t>Slave</a:t>
+            </a:r>
+            <a:r>
+              <a:rPr kumimoji="1" lang="zh-CN" altLang="en-US" dirty="0"/>
+              <a:t>自动转换成</a:t>
+            </a:r>
+            <a:r>
+              <a:rPr kumimoji="1" lang="en-US" altLang="zh-CN" dirty="0"/>
+              <a:t>Master</a:t>
+            </a:r>
+            <a:r>
+              <a:rPr kumimoji="1" lang="zh-CN" altLang="en-US" dirty="0"/>
+              <a:t>。</a:t>
+            </a:r>
+            <a:endParaRPr kumimoji="1" lang="en-US" altLang="zh-CN" dirty="0"/>
+          </a:p>
+          <a:p>
+            <a:r>
+              <a:rPr kumimoji="1" lang="en-US" altLang="zh-CN" dirty="0"/>
+              <a:t>4.5.0</a:t>
+            </a:r>
+            <a:r>
+              <a:rPr kumimoji="1" lang="zh-CN" altLang="en-US" dirty="0"/>
+              <a:t>版本引入了 </a:t>
+            </a:r>
+            <a:r>
+              <a:rPr kumimoji="1" lang="en-US" altLang="zh-CN" dirty="0" err="1"/>
+              <a:t>Dledger</a:t>
+            </a:r>
+            <a:r>
+              <a:rPr kumimoji="1" lang="en-US" altLang="zh-CN" dirty="0"/>
+              <a:t> </a:t>
+            </a:r>
+            <a:r>
+              <a:rPr kumimoji="1" lang="zh-CN" altLang="en-US" dirty="0"/>
+              <a:t>的多副本技术。 是指一组相同名称的 </a:t>
+            </a:r>
+            <a:r>
+              <a:rPr kumimoji="1" lang="en-US" altLang="zh-CN" dirty="0"/>
+              <a:t>Broker</a:t>
+            </a:r>
+            <a:r>
+              <a:rPr kumimoji="1" lang="zh-CN" altLang="en-US" dirty="0"/>
+              <a:t>，至少需要 </a:t>
+            </a:r>
+            <a:r>
+              <a:rPr kumimoji="1" lang="en-US" altLang="zh-CN" dirty="0"/>
+              <a:t>3 </a:t>
+            </a:r>
+            <a:r>
+              <a:rPr kumimoji="1" lang="zh-CN" altLang="en-US" dirty="0"/>
+              <a:t>个节点，通过 </a:t>
+            </a:r>
+            <a:r>
+              <a:rPr kumimoji="1" lang="en-US" altLang="zh-CN" dirty="0"/>
+              <a:t>Raft </a:t>
+            </a:r>
+            <a:r>
+              <a:rPr kumimoji="1" lang="zh-CN" altLang="en-US" dirty="0"/>
+              <a:t>自动选举出一个 </a:t>
+            </a:r>
+            <a:r>
+              <a:rPr kumimoji="1" lang="en-US" altLang="zh-CN" dirty="0"/>
+              <a:t>Leader</a:t>
+            </a:r>
+            <a:r>
+              <a:rPr kumimoji="1" lang="zh-CN" altLang="en-US" dirty="0"/>
+              <a:t>，其余节点 作为 </a:t>
+            </a:r>
+            <a:r>
+              <a:rPr kumimoji="1" lang="en-US" altLang="zh-CN" dirty="0"/>
+              <a:t>Follower</a:t>
+            </a:r>
+            <a:r>
+              <a:rPr kumimoji="1" lang="zh-CN" altLang="en-US" dirty="0"/>
+              <a:t>，并在 </a:t>
+            </a:r>
+            <a:r>
+              <a:rPr kumimoji="1" lang="en-US" altLang="zh-CN" dirty="0"/>
+              <a:t>Leader </a:t>
+            </a:r>
+            <a:r>
+              <a:rPr kumimoji="1" lang="zh-CN" altLang="en-US" dirty="0"/>
+              <a:t>和 </a:t>
+            </a:r>
+            <a:r>
+              <a:rPr kumimoji="1" lang="en-US" altLang="zh-CN" dirty="0"/>
+              <a:t>Follower </a:t>
+            </a:r>
+            <a:r>
+              <a:rPr kumimoji="1" lang="zh-CN" altLang="en-US" dirty="0"/>
+              <a:t>之间复制数据以保证高可用。（此功能默认关闭，需要在配置文件中启用）</a:t>
+            </a:r>
+          </a:p>
+        </p:txBody>
+      </p:sp>
+    </p:spTree>
+    <p:extLst>
+      <p:ext uri="{BB962C8B-B14F-4D97-AF65-F5344CB8AC3E}">
+        <p14:creationId xmlns:p14="http://schemas.microsoft.com/office/powerpoint/2010/main" val="1961592500"/>
+      </p:ext>
+    </p:extLst>
+  </p:cSld>
+  <p:clrMapOvr>
+    <a:masterClrMapping/>
+  </p:clrMapOvr>
+</p:sld>
+</file>
+
+<file path=ppt/slides/slide21.xml><?xml version="1.0" encoding="utf-8"?>
+<p:sld xmlns:a="http://schemas.openxmlformats.org/drawingml/2006/main" xmlns:r="http://schemas.openxmlformats.org/officeDocument/2006/relationships" xmlns:p="http://schemas.openxmlformats.org/presentationml/2006/main">
+  <p:cSld>
+    <p:spTree>
+      <p:nvGrpSpPr>
+        <p:cNvPr id="1" name=""/>
+        <p:cNvGrpSpPr/>
+        <p:nvPr/>
+      </p:nvGrpSpPr>
+      <p:grpSpPr>
+        <a:xfrm>
+          <a:off x="0" y="0"/>
+          <a:ext cx="0" cy="0"/>
+          <a:chOff x="0" y="0"/>
+          <a:chExt cx="0" cy="0"/>
+        </a:xfrm>
+      </p:grpSpPr>
+      <p:sp>
+        <p:nvSpPr>
+          <p:cNvPr id="2" name="标题 1">
+            <a:extLst>
+              <a:ext uri="{FF2B5EF4-FFF2-40B4-BE49-F238E27FC236}">
+                <a16:creationId xmlns:a16="http://schemas.microsoft.com/office/drawing/2014/main" id="{13EC6E4E-9A46-DC4A-B9F2-FE4720A7C149}"/>
+              </a:ext>
+            </a:extLst>
+          </p:cNvPr>
+          <p:cNvSpPr>
+            <a:spLocks noGrp="1"/>
+          </p:cNvSpPr>
+          <p:nvPr>
+            <p:ph type="title"/>
+          </p:nvPr>
+        </p:nvSpPr>
+        <p:spPr/>
+        <p:txBody>
+          <a:bodyPr/>
+          <a:lstStyle/>
+          <a:p>
+            <a:r>
+              <a:rPr kumimoji="1" lang="en-US" altLang="zh-CN" dirty="0" err="1"/>
+              <a:t>RocketMQ</a:t>
+            </a:r>
+            <a:r>
+              <a:rPr kumimoji="1" lang="zh-CN" altLang="en-US" dirty="0"/>
+              <a:t>如何保证消息可靠性</a:t>
+            </a:r>
+          </a:p>
+        </p:txBody>
+      </p:sp>
+      <p:sp>
+        <p:nvSpPr>
+          <p:cNvPr id="3" name="内容占位符 2">
+            <a:extLst>
+              <a:ext uri="{FF2B5EF4-FFF2-40B4-BE49-F238E27FC236}">
+                <a16:creationId xmlns:a16="http://schemas.microsoft.com/office/drawing/2014/main" id="{4F031BC5-D296-224F-A766-C3D56C05B782}"/>
+              </a:ext>
+            </a:extLst>
+          </p:cNvPr>
+          <p:cNvSpPr>
+            <a:spLocks noGrp="1"/>
+          </p:cNvSpPr>
+          <p:nvPr>
+            <p:ph idx="1"/>
+          </p:nvPr>
+        </p:nvSpPr>
+        <p:spPr/>
+        <p:txBody>
+          <a:bodyPr>
+            <a:normAutofit lnSpcReduction="10000"/>
+          </a:bodyPr>
+          <a:lstStyle/>
+          <a:p>
+            <a:r>
+              <a:rPr kumimoji="1" lang="en-US" altLang="zh-CN" dirty="0"/>
+              <a:t>Provider</a:t>
+            </a:r>
+            <a:r>
+              <a:rPr kumimoji="1" lang="zh-CN" altLang="en-US" dirty="0"/>
+              <a:t>端</a:t>
+            </a:r>
+            <a:endParaRPr kumimoji="1" lang="en-US" altLang="zh-CN" dirty="0"/>
+          </a:p>
+          <a:p>
+            <a:r>
+              <a:rPr kumimoji="1" lang="zh-CN" altLang="en-US" dirty="0"/>
+              <a:t>如果是同步消息，消息投递时</a:t>
+            </a:r>
+            <a:r>
+              <a:rPr kumimoji="1" lang="en-US" altLang="zh-CN" dirty="0"/>
+              <a:t>Broker</a:t>
+            </a:r>
+            <a:r>
+              <a:rPr kumimoji="1" lang="zh-CN" altLang="en-US" dirty="0"/>
+              <a:t>返回失败，重新投递（</a:t>
+            </a:r>
+            <a:r>
+              <a:rPr kumimoji="1" lang="en-US" altLang="zh-CN" dirty="0" err="1"/>
+              <a:t>RocketMQ</a:t>
+            </a:r>
+            <a:r>
+              <a:rPr kumimoji="1" lang="zh-CN" altLang="en-US" dirty="0"/>
+              <a:t>保证消息一定投递成功）</a:t>
+            </a:r>
+            <a:endParaRPr kumimoji="1" lang="en-US" altLang="zh-CN" dirty="0"/>
+          </a:p>
+          <a:p>
+            <a:r>
+              <a:rPr kumimoji="1" lang="zh-CN" altLang="en-US" dirty="0"/>
+              <a:t>如果是异步消息，在回调接口里根据投递状态决定是否重新投递。</a:t>
+            </a:r>
+            <a:endParaRPr kumimoji="1" lang="en-US" altLang="zh-CN" dirty="0"/>
+          </a:p>
+          <a:p>
+            <a:r>
+              <a:rPr kumimoji="1" lang="en-US" altLang="zh-CN" dirty="0"/>
+              <a:t>Broker</a:t>
+            </a:r>
+            <a:r>
+              <a:rPr kumimoji="1" lang="zh-CN" altLang="en-US" dirty="0"/>
+              <a:t>端</a:t>
+            </a:r>
+            <a:endParaRPr kumimoji="1" lang="en-US" altLang="zh-CN" dirty="0"/>
+          </a:p>
+          <a:p>
+            <a:r>
+              <a:rPr kumimoji="1" lang="zh-CN" altLang="en-US" dirty="0"/>
+              <a:t>根据主从同步策略和消息刷盘策略来共同保证</a:t>
+            </a:r>
+            <a:endParaRPr kumimoji="1" lang="en-US" altLang="zh-CN" dirty="0"/>
+          </a:p>
+          <a:p>
+            <a:r>
+              <a:rPr kumimoji="1" lang="zh-CN" altLang="en-US" dirty="0"/>
+              <a:t>同步复制，同步刷盘。最安全，不会丢失消息，但是性能最差。</a:t>
+            </a:r>
+            <a:endParaRPr kumimoji="1" lang="en-US" altLang="zh-CN" dirty="0"/>
+          </a:p>
+          <a:p>
+            <a:r>
+              <a:rPr kumimoji="1" lang="zh-CN" altLang="en-US" dirty="0"/>
+              <a:t>同步复制，异步刷盘。折中方案，可靠性和性能都比较好，除非主从同时故障。</a:t>
+            </a:r>
+            <a:endParaRPr kumimoji="1" lang="en-US" altLang="zh-CN" dirty="0"/>
+          </a:p>
+          <a:p>
+            <a:r>
+              <a:rPr kumimoji="1" lang="zh-CN" altLang="en-US" dirty="0"/>
+              <a:t>异步复制，同步刷盘。都同步刷盘了，意义不大。</a:t>
+            </a:r>
+            <a:endParaRPr kumimoji="1" lang="en-US" altLang="zh-CN" dirty="0"/>
+          </a:p>
+          <a:p>
+            <a:r>
+              <a:rPr kumimoji="1" lang="zh-CN" altLang="en-US" dirty="0"/>
+              <a:t>异步复制，异步刷盘。性能最好，如果主节点故障，消息丢失，不推荐。</a:t>
+            </a:r>
+          </a:p>
+        </p:txBody>
+      </p:sp>
+    </p:spTree>
+    <p:extLst>
+      <p:ext uri="{BB962C8B-B14F-4D97-AF65-F5344CB8AC3E}">
+        <p14:creationId xmlns:p14="http://schemas.microsoft.com/office/powerpoint/2010/main" val="1673429681"/>
+      </p:ext>
+    </p:extLst>
+  </p:cSld>
+  <p:clrMapOvr>
+    <a:masterClrMapping/>
+  </p:clrMapOvr>
+</p:sld>
+</file>
+
+<file path=ppt/slides/slide22.xml><?xml version="1.0" encoding="utf-8"?>
 <p:sld xmlns:a="http://schemas.openxmlformats.org/drawingml/2006/main" xmlns:r="http://schemas.openxmlformats.org/officeDocument/2006/relationships" xmlns:p="http://schemas.openxmlformats.org/presentationml/2006/main">
   <p:cSld>
     <p:spTree>
@@ -9321,946 +10056,6 @@
 </p:sld>
 </file>
 
-<file path=ppt/slides/slide2.xml><?xml version="1.0" encoding="utf-8"?>
-<p:sld xmlns:a="http://schemas.openxmlformats.org/drawingml/2006/main" xmlns:r="http://schemas.openxmlformats.org/officeDocument/2006/relationships" xmlns:p="http://schemas.openxmlformats.org/presentationml/2006/main">
-  <p:cSld>
-    <p:spTree>
-      <p:nvGrpSpPr>
-        <p:cNvPr id="1" name=""/>
-        <p:cNvGrpSpPr/>
-        <p:nvPr/>
-      </p:nvGrpSpPr>
-      <p:grpSpPr>
-        <a:xfrm>
-          <a:off x="0" y="0"/>
-          <a:ext cx="0" cy="0"/>
-          <a:chOff x="0" y="0"/>
-          <a:chExt cx="0" cy="0"/>
-        </a:xfrm>
-      </p:grpSpPr>
-      <p:sp>
-        <p:nvSpPr>
-          <p:cNvPr id="2" name="标题 1">
-            <a:extLst>
-              <a:ext uri="{FF2B5EF4-FFF2-40B4-BE49-F238E27FC236}">
-                <a16:creationId xmlns:a16="http://schemas.microsoft.com/office/drawing/2014/main" id="{31409E60-AE0B-F440-9B7F-730A06746102}"/>
-              </a:ext>
-            </a:extLst>
-          </p:cNvPr>
-          <p:cNvSpPr>
-            <a:spLocks noGrp="1"/>
-          </p:cNvSpPr>
-          <p:nvPr>
-            <p:ph type="title"/>
-          </p:nvPr>
-        </p:nvSpPr>
-        <p:spPr/>
-        <p:txBody>
-          <a:bodyPr/>
-          <a:lstStyle/>
-          <a:p>
-            <a:r>
-              <a:rPr kumimoji="1" lang="zh-CN" altLang="en-US" dirty="0"/>
-              <a:t>什么是</a:t>
-            </a:r>
-            <a:r>
-              <a:rPr kumimoji="1" lang="en-US" altLang="zh-CN" dirty="0" err="1"/>
-              <a:t>RocketMQ</a:t>
-            </a:r>
-            <a:endParaRPr kumimoji="1" lang="zh-CN" altLang="en-US" dirty="0"/>
-          </a:p>
-        </p:txBody>
-      </p:sp>
-      <p:sp>
-        <p:nvSpPr>
-          <p:cNvPr id="3" name="内容占位符 2">
-            <a:extLst>
-              <a:ext uri="{FF2B5EF4-FFF2-40B4-BE49-F238E27FC236}">
-                <a16:creationId xmlns:a16="http://schemas.microsoft.com/office/drawing/2014/main" id="{FD11AE4B-9C6A-C642-8595-57F111C2D97E}"/>
-              </a:ext>
-            </a:extLst>
-          </p:cNvPr>
-          <p:cNvSpPr>
-            <a:spLocks noGrp="1"/>
-          </p:cNvSpPr>
-          <p:nvPr>
-            <p:ph idx="1"/>
-          </p:nvPr>
-        </p:nvSpPr>
-        <p:spPr/>
-        <p:txBody>
-          <a:bodyPr/>
-          <a:lstStyle/>
-          <a:p>
-            <a:r>
-              <a:rPr lang="en-US" altLang="zh-CN" dirty="0" err="1"/>
-              <a:t>RcoketMQ</a:t>
-            </a:r>
-            <a:r>
-              <a:rPr lang="en-US" altLang="zh-CN" dirty="0"/>
-              <a:t> </a:t>
-            </a:r>
-            <a:r>
-              <a:rPr lang="zh-CN" altLang="en-US" dirty="0"/>
-              <a:t>是一款低延迟、高可靠、可伸缩、易于使用的消息中间件</a:t>
-            </a:r>
-            <a:endParaRPr lang="en-US" altLang="zh-CN" dirty="0"/>
-          </a:p>
-          <a:p>
-            <a:r>
-              <a:rPr lang="en-US" altLang="zh-CN" dirty="0" err="1"/>
-              <a:t>RockeMQ</a:t>
-            </a:r>
-            <a:r>
-              <a:rPr lang="zh-CN" altLang="en-US" dirty="0"/>
-              <a:t>使用场景：解耦，异步，消峰，消息分发</a:t>
-            </a:r>
-            <a:endParaRPr lang="en-US" altLang="zh-CN" dirty="0"/>
-          </a:p>
-          <a:p>
-            <a:endParaRPr kumimoji="1" lang="zh-CN" altLang="en-US" dirty="0"/>
-          </a:p>
-        </p:txBody>
-      </p:sp>
-    </p:spTree>
-    <p:extLst>
-      <p:ext uri="{BB962C8B-B14F-4D97-AF65-F5344CB8AC3E}">
-        <p14:creationId xmlns:p14="http://schemas.microsoft.com/office/powerpoint/2010/main" val="3550855111"/>
-      </p:ext>
-    </p:extLst>
-  </p:cSld>
-  <p:clrMapOvr>
-    <a:masterClrMapping/>
-  </p:clrMapOvr>
-</p:sld>
-</file>
-
-<file path=ppt/slides/slide20.xml><?xml version="1.0" encoding="utf-8"?>
-<p:sld xmlns:a="http://schemas.openxmlformats.org/drawingml/2006/main" xmlns:r="http://schemas.openxmlformats.org/officeDocument/2006/relationships" xmlns:p="http://schemas.openxmlformats.org/presentationml/2006/main">
-  <p:cSld>
-    <p:spTree>
-      <p:nvGrpSpPr>
-        <p:cNvPr id="1" name=""/>
-        <p:cNvGrpSpPr/>
-        <p:nvPr/>
-      </p:nvGrpSpPr>
-      <p:grpSpPr>
-        <a:xfrm>
-          <a:off x="0" y="0"/>
-          <a:ext cx="0" cy="0"/>
-          <a:chOff x="0" y="0"/>
-          <a:chExt cx="0" cy="0"/>
-        </a:xfrm>
-      </p:grpSpPr>
-      <p:sp>
-        <p:nvSpPr>
-          <p:cNvPr id="2" name="标题 1">
-            <a:extLst>
-              <a:ext uri="{FF2B5EF4-FFF2-40B4-BE49-F238E27FC236}">
-                <a16:creationId xmlns:a16="http://schemas.microsoft.com/office/drawing/2014/main" id="{2A6980E2-634B-844C-B1B3-0CF020D27789}"/>
-              </a:ext>
-            </a:extLst>
-          </p:cNvPr>
-          <p:cNvSpPr>
-            <a:spLocks noGrp="1"/>
-          </p:cNvSpPr>
-          <p:nvPr>
-            <p:ph type="title"/>
-          </p:nvPr>
-        </p:nvSpPr>
-        <p:spPr>
-          <a:xfrm>
-            <a:off x="2592925" y="624110"/>
-            <a:ext cx="8911687" cy="728829"/>
-          </a:xfrm>
-        </p:spPr>
-        <p:txBody>
-          <a:bodyPr/>
-          <a:lstStyle/>
-          <a:p>
-            <a:r>
-              <a:rPr kumimoji="1" lang="en-US" altLang="zh-CN" dirty="0" err="1"/>
-              <a:t>ReadQueue</a:t>
-            </a:r>
-            <a:r>
-              <a:rPr kumimoji="1" lang="zh-CN" altLang="en-US" dirty="0"/>
-              <a:t>和</a:t>
-            </a:r>
-            <a:r>
-              <a:rPr kumimoji="1" lang="en-US" altLang="zh-CN" dirty="0" err="1"/>
-              <a:t>WriteQueue</a:t>
-            </a:r>
-            <a:r>
-              <a:rPr kumimoji="1" lang="zh-CN" altLang="en-US" dirty="0"/>
-              <a:t>的概念</a:t>
-            </a:r>
-          </a:p>
-        </p:txBody>
-      </p:sp>
-      <p:sp>
-        <p:nvSpPr>
-          <p:cNvPr id="3" name="内容占位符 2">
-            <a:extLst>
-              <a:ext uri="{FF2B5EF4-FFF2-40B4-BE49-F238E27FC236}">
-                <a16:creationId xmlns:a16="http://schemas.microsoft.com/office/drawing/2014/main" id="{956746AE-E5A1-A543-890F-738B3C9CA93D}"/>
-              </a:ext>
-            </a:extLst>
-          </p:cNvPr>
-          <p:cNvSpPr>
-            <a:spLocks noGrp="1"/>
-          </p:cNvSpPr>
-          <p:nvPr>
-            <p:ph idx="1"/>
-          </p:nvPr>
-        </p:nvSpPr>
-        <p:spPr>
-          <a:xfrm>
-            <a:off x="2589212" y="1530220"/>
-            <a:ext cx="8915400" cy="4381002"/>
-          </a:xfrm>
-        </p:spPr>
-        <p:txBody>
-          <a:bodyPr>
-            <a:normAutofit fontScale="92500" lnSpcReduction="20000"/>
-          </a:bodyPr>
-          <a:lstStyle/>
-          <a:p>
-            <a:r>
-              <a:rPr kumimoji="1" lang="zh-CN" altLang="en-US" dirty="0"/>
-              <a:t>创建</a:t>
-            </a:r>
-            <a:r>
-              <a:rPr kumimoji="1" lang="en-US" altLang="zh-CN" dirty="0"/>
-              <a:t>Topic</a:t>
-            </a:r>
-            <a:r>
-              <a:rPr kumimoji="1" lang="zh-CN" altLang="en-US" dirty="0"/>
-              <a:t>时可以指定读写队列的数量</a:t>
-            </a:r>
-            <a:r>
-              <a:rPr kumimoji="1" lang="en-US" altLang="zh-CN" dirty="0"/>
-              <a:t>,</a:t>
-            </a:r>
-            <a:r>
-              <a:rPr kumimoji="1" lang="zh-CN" altLang="en-US" dirty="0"/>
-              <a:t>作用是信息路由</a:t>
-            </a:r>
-            <a:endParaRPr kumimoji="1" lang="en-US" altLang="zh-CN" dirty="0"/>
-          </a:p>
-          <a:p>
-            <a:r>
-              <a:rPr kumimoji="1" lang="en-US" altLang="zh-CN" dirty="0" err="1"/>
-              <a:t>ReadQueue</a:t>
-            </a:r>
-            <a:r>
-              <a:rPr kumimoji="1" lang="zh-CN" altLang="en-US" dirty="0"/>
-              <a:t>数量指定</a:t>
-            </a:r>
-            <a:r>
-              <a:rPr kumimoji="1" lang="en-US" altLang="zh-CN" dirty="0"/>
-              <a:t>Consumer</a:t>
-            </a:r>
-            <a:r>
-              <a:rPr kumimoji="1" lang="zh-CN" altLang="en-US" dirty="0"/>
-              <a:t>消费时可读队列的数量</a:t>
-            </a:r>
-            <a:endParaRPr kumimoji="1" lang="en-US" altLang="zh-CN" dirty="0"/>
-          </a:p>
-          <a:p>
-            <a:r>
-              <a:rPr kumimoji="1" lang="en-US" altLang="zh-CN" dirty="0" err="1"/>
-              <a:t>WriteQueue</a:t>
-            </a:r>
-            <a:r>
-              <a:rPr kumimoji="1" lang="zh-CN" altLang="en-US" dirty="0"/>
-              <a:t>数量指定</a:t>
-            </a:r>
-            <a:r>
-              <a:rPr kumimoji="1" lang="en-US" altLang="zh-CN" dirty="0"/>
-              <a:t>Producer</a:t>
-            </a:r>
-            <a:r>
-              <a:rPr kumimoji="1" lang="zh-CN" altLang="en-US" dirty="0"/>
-              <a:t>消费时可写队列的数量，也就是</a:t>
-            </a:r>
-            <a:r>
-              <a:rPr kumimoji="1" lang="en-US" altLang="zh-CN" dirty="0" err="1"/>
-              <a:t>consumequeue</a:t>
-            </a:r>
-            <a:r>
-              <a:rPr kumimoji="1" lang="zh-CN" altLang="en-US" dirty="0"/>
-              <a:t>的数量</a:t>
-            </a:r>
-            <a:endParaRPr kumimoji="1" lang="en-US" altLang="zh-CN" dirty="0"/>
-          </a:p>
-          <a:p>
-            <a:r>
-              <a:rPr kumimoji="1" lang="zh-CN" altLang="en-US" dirty="0"/>
-              <a:t>假如</a:t>
-            </a:r>
-            <a:r>
-              <a:rPr kumimoji="1" lang="en-US" altLang="zh-CN" dirty="0" err="1"/>
-              <a:t>ReadQueue</a:t>
-            </a:r>
-            <a:r>
-              <a:rPr kumimoji="1" lang="zh-CN" altLang="en-US" dirty="0"/>
-              <a:t>为</a:t>
-            </a:r>
-            <a:r>
-              <a:rPr kumimoji="1" lang="en-US" altLang="zh-CN" dirty="0"/>
-              <a:t>1</a:t>
-            </a:r>
-            <a:r>
-              <a:rPr kumimoji="1" lang="zh-CN" altLang="en-US" dirty="0"/>
-              <a:t>，</a:t>
-            </a:r>
-            <a:r>
-              <a:rPr kumimoji="1" lang="en-US" altLang="zh-CN" dirty="0"/>
-              <a:t> </a:t>
-            </a:r>
-            <a:r>
-              <a:rPr kumimoji="1" lang="en-US" altLang="zh-CN" dirty="0" err="1"/>
-              <a:t>WriteQueue</a:t>
-            </a:r>
-            <a:r>
-              <a:rPr kumimoji="1" lang="zh-CN" altLang="en-US" dirty="0"/>
-              <a:t>为</a:t>
-            </a:r>
-            <a:r>
-              <a:rPr kumimoji="1" lang="en-US" altLang="zh-CN" dirty="0"/>
-              <a:t>2</a:t>
-            </a:r>
-            <a:r>
-              <a:rPr kumimoji="1" lang="zh-CN" altLang="en-US" dirty="0"/>
-              <a:t>，则</a:t>
-            </a:r>
-            <a:r>
-              <a:rPr kumimoji="1" lang="en-US" altLang="zh-CN" dirty="0" err="1"/>
-              <a:t>consumequeue</a:t>
-            </a:r>
-            <a:r>
-              <a:rPr kumimoji="1" lang="zh-CN" altLang="en-US" dirty="0"/>
-              <a:t>为</a:t>
-            </a:r>
-            <a:r>
-              <a:rPr kumimoji="1" lang="en-US" altLang="zh-CN" dirty="0"/>
-              <a:t>2</a:t>
-            </a:r>
-            <a:r>
-              <a:rPr kumimoji="1" lang="zh-CN" altLang="en-US" dirty="0"/>
-              <a:t>，</a:t>
-            </a:r>
-            <a:r>
-              <a:rPr kumimoji="1" lang="en-US" altLang="zh-CN" dirty="0"/>
-              <a:t>Producer</a:t>
-            </a:r>
-            <a:r>
-              <a:rPr kumimoji="1" lang="zh-CN" altLang="en-US" dirty="0"/>
-              <a:t>会往</a:t>
-            </a:r>
-            <a:r>
-              <a:rPr kumimoji="1" lang="en-US" altLang="zh-CN" dirty="0"/>
-              <a:t>2</a:t>
-            </a:r>
-            <a:r>
-              <a:rPr kumimoji="1" lang="zh-CN" altLang="en-US" dirty="0"/>
-              <a:t>个队列都写入消息。但是因为</a:t>
-            </a:r>
-            <a:r>
-              <a:rPr kumimoji="1" lang="en-US" altLang="zh-CN" dirty="0" err="1"/>
-              <a:t>ReadQueue</a:t>
-            </a:r>
-            <a:r>
-              <a:rPr kumimoji="1" lang="zh-CN" altLang="en-US" dirty="0"/>
-              <a:t>为</a:t>
-            </a:r>
-            <a:r>
-              <a:rPr kumimoji="1" lang="en-US" altLang="zh-CN" dirty="0"/>
-              <a:t>1</a:t>
-            </a:r>
-            <a:r>
-              <a:rPr kumimoji="1" lang="zh-CN" altLang="en-US" dirty="0"/>
-              <a:t>，则只有</a:t>
-            </a:r>
-            <a:r>
-              <a:rPr kumimoji="1" lang="en-US" altLang="zh-CN" dirty="0"/>
-              <a:t>1</a:t>
-            </a:r>
-            <a:r>
-              <a:rPr kumimoji="1" lang="zh-CN" altLang="en-US" dirty="0"/>
-              <a:t>个</a:t>
-            </a:r>
-            <a:r>
-              <a:rPr kumimoji="1" lang="en-US" altLang="zh-CN" dirty="0"/>
-              <a:t>Consumer</a:t>
-            </a:r>
-            <a:r>
-              <a:rPr kumimoji="1" lang="zh-CN" altLang="en-US" dirty="0"/>
-              <a:t>可以消费其中一个队列（一个队列只能被一个</a:t>
-            </a:r>
-            <a:r>
-              <a:rPr kumimoji="1" lang="en-US" altLang="zh-CN" dirty="0"/>
-              <a:t>Consumer</a:t>
-            </a:r>
-            <a:r>
-              <a:rPr kumimoji="1" lang="zh-CN" altLang="en-US" dirty="0"/>
-              <a:t>消费），因此另一个队列的消息没有</a:t>
-            </a:r>
-            <a:r>
-              <a:rPr kumimoji="1" lang="en-US" altLang="zh-CN" dirty="0"/>
-              <a:t>Consumer</a:t>
-            </a:r>
-            <a:r>
-              <a:rPr kumimoji="1" lang="zh-CN" altLang="en-US" dirty="0"/>
-              <a:t>可以消费。</a:t>
-            </a:r>
-            <a:endParaRPr kumimoji="1" lang="en-US" altLang="zh-CN" dirty="0"/>
-          </a:p>
-          <a:p>
-            <a:r>
-              <a:rPr kumimoji="1" lang="zh-CN" altLang="en-US" dirty="0"/>
-              <a:t>假如</a:t>
-            </a:r>
-            <a:r>
-              <a:rPr kumimoji="1" lang="en-US" altLang="zh-CN" dirty="0" err="1"/>
-              <a:t>ReadQueue</a:t>
-            </a:r>
-            <a:r>
-              <a:rPr kumimoji="1" lang="zh-CN" altLang="en-US" dirty="0"/>
-              <a:t>为</a:t>
-            </a:r>
-            <a:r>
-              <a:rPr kumimoji="1" lang="en-US" altLang="zh-CN" dirty="0"/>
-              <a:t>2</a:t>
-            </a:r>
-            <a:r>
-              <a:rPr kumimoji="1" lang="zh-CN" altLang="en-US" dirty="0"/>
-              <a:t>，</a:t>
-            </a:r>
-            <a:r>
-              <a:rPr kumimoji="1" lang="en-US" altLang="zh-CN" dirty="0"/>
-              <a:t> </a:t>
-            </a:r>
-            <a:r>
-              <a:rPr kumimoji="1" lang="en-US" altLang="zh-CN" dirty="0" err="1"/>
-              <a:t>WriteQueue</a:t>
-            </a:r>
-            <a:r>
-              <a:rPr kumimoji="1" lang="zh-CN" altLang="en-US" dirty="0"/>
-              <a:t>为</a:t>
-            </a:r>
-            <a:r>
-              <a:rPr kumimoji="1" lang="en-US" altLang="zh-CN" dirty="0"/>
-              <a:t>1</a:t>
-            </a:r>
-            <a:r>
-              <a:rPr kumimoji="1" lang="zh-CN" altLang="en-US" dirty="0"/>
-              <a:t>，则</a:t>
-            </a:r>
-            <a:r>
-              <a:rPr kumimoji="1" lang="en-US" altLang="zh-CN" dirty="0" err="1"/>
-              <a:t>consumequeue</a:t>
-            </a:r>
-            <a:r>
-              <a:rPr kumimoji="1" lang="zh-CN" altLang="en-US" dirty="0"/>
-              <a:t>为</a:t>
-            </a:r>
-            <a:r>
-              <a:rPr kumimoji="1" lang="en-US" altLang="zh-CN" dirty="0"/>
-              <a:t>1</a:t>
-            </a:r>
-            <a:r>
-              <a:rPr kumimoji="1" lang="zh-CN" altLang="en-US" dirty="0"/>
-              <a:t>，</a:t>
-            </a:r>
-            <a:r>
-              <a:rPr kumimoji="1" lang="en-US" altLang="zh-CN" dirty="0"/>
-              <a:t>Producer</a:t>
-            </a:r>
-            <a:r>
-              <a:rPr kumimoji="1" lang="zh-CN" altLang="en-US" dirty="0"/>
-              <a:t>会往</a:t>
-            </a:r>
-            <a:r>
-              <a:rPr kumimoji="1" lang="en-US" altLang="zh-CN" dirty="0"/>
-              <a:t>1</a:t>
-            </a:r>
-            <a:r>
-              <a:rPr kumimoji="1" lang="zh-CN" altLang="en-US" dirty="0"/>
-              <a:t>个队列写入消息，但是只有</a:t>
-            </a:r>
-            <a:r>
-              <a:rPr kumimoji="1" lang="en-US" altLang="zh-CN" dirty="0"/>
-              <a:t>1</a:t>
-            </a:r>
-            <a:r>
-              <a:rPr kumimoji="1" lang="zh-CN" altLang="en-US" dirty="0"/>
-              <a:t>个</a:t>
-            </a:r>
-            <a:r>
-              <a:rPr kumimoji="1" lang="en-US" altLang="zh-CN" dirty="0"/>
-              <a:t>Consumer</a:t>
-            </a:r>
-            <a:r>
-              <a:rPr kumimoji="1" lang="zh-CN" altLang="en-US" dirty="0"/>
-              <a:t>可以成功消费到消息，其他的</a:t>
-            </a:r>
-            <a:r>
-              <a:rPr kumimoji="1" lang="en-US" altLang="zh-CN" dirty="0"/>
-              <a:t>Consumer</a:t>
-            </a:r>
-            <a:r>
-              <a:rPr kumimoji="1" lang="zh-CN" altLang="en-US" dirty="0"/>
-              <a:t>无法获取消息（因为根本没有队列。。）</a:t>
-            </a:r>
-            <a:endParaRPr kumimoji="1" lang="en-US" altLang="zh-CN" dirty="0"/>
-          </a:p>
-          <a:p>
-            <a:r>
-              <a:rPr kumimoji="1" lang="zh-CN" altLang="en-US" dirty="0"/>
-              <a:t>因此，</a:t>
-            </a:r>
-            <a:r>
-              <a:rPr lang="en" altLang="zh-CN" dirty="0" err="1"/>
-              <a:t>ReadQueueNums</a:t>
-            </a:r>
-            <a:r>
-              <a:rPr lang="en" altLang="zh-CN" dirty="0"/>
-              <a:t>&gt;=</a:t>
-            </a:r>
-            <a:r>
-              <a:rPr lang="en" altLang="zh-CN" dirty="0" err="1"/>
-              <a:t>WriteQueueNums</a:t>
-            </a:r>
-            <a:r>
-              <a:rPr lang="en" altLang="zh-CN" dirty="0"/>
-              <a:t>,</a:t>
-            </a:r>
-            <a:r>
-              <a:rPr lang="zh-CN" altLang="en-US" dirty="0"/>
-              <a:t>程序才能正常进行。最佳实践是</a:t>
-            </a:r>
-            <a:r>
-              <a:rPr lang="en" altLang="zh-CN" dirty="0" err="1"/>
-              <a:t>ReadQueueNums</a:t>
-            </a:r>
-            <a:r>
-              <a:rPr lang="en" altLang="zh-CN" dirty="0"/>
-              <a:t>=</a:t>
-            </a:r>
-            <a:r>
-              <a:rPr lang="en" altLang="zh-CN" dirty="0" err="1"/>
-              <a:t>WriteQueueNums</a:t>
-            </a:r>
-            <a:r>
-              <a:rPr lang="zh-CN" altLang="en" dirty="0"/>
-              <a:t>。</a:t>
-            </a:r>
-            <a:endParaRPr lang="en-US" altLang="zh-CN" dirty="0"/>
-          </a:p>
-          <a:p>
-            <a:r>
-              <a:rPr lang="zh-CN" altLang="en-US" dirty="0"/>
-              <a:t>为什么要设计出</a:t>
-            </a:r>
-            <a:r>
-              <a:rPr lang="en" altLang="zh-CN" dirty="0" err="1"/>
-              <a:t>ReadQueue</a:t>
-            </a:r>
-            <a:r>
-              <a:rPr lang="zh-CN" altLang="en" dirty="0"/>
-              <a:t>和</a:t>
-            </a:r>
-            <a:r>
-              <a:rPr lang="en" altLang="zh-CN" dirty="0" err="1"/>
-              <a:t>WriteQueue</a:t>
-            </a:r>
-            <a:r>
-              <a:rPr lang="zh-CN" altLang="en-US" dirty="0"/>
-              <a:t>？？</a:t>
-            </a:r>
-            <a:endParaRPr lang="en-US" altLang="zh-CN" dirty="0"/>
-          </a:p>
-          <a:p>
-            <a:r>
-              <a:rPr lang="zh-CN" altLang="en-US" dirty="0"/>
-              <a:t>我也不太明白，有人指出是为了方便队列的缩容和扩容。可以参考</a:t>
-            </a:r>
-            <a:r>
-              <a:rPr lang="en" altLang="zh-CN" dirty="0"/>
-              <a:t>https://</a:t>
-            </a:r>
-            <a:r>
-              <a:rPr lang="en" altLang="zh-CN" dirty="0" err="1"/>
-              <a:t>blog.csdn.net</a:t>
-            </a:r>
-            <a:r>
-              <a:rPr lang="en" altLang="zh-CN" dirty="0"/>
-              <a:t>/qian_348840260/article/details</a:t>
-            </a:r>
-            <a:r>
-              <a:rPr lang="en" altLang="zh-CN"/>
-              <a:t>/108975241</a:t>
-            </a:r>
-            <a:endParaRPr lang="en-US" altLang="zh-CN" dirty="0"/>
-          </a:p>
-          <a:p>
-            <a:pPr marL="0" indent="0">
-              <a:buNone/>
-            </a:pPr>
-            <a:endParaRPr kumimoji="1" lang="zh-CN" altLang="en-US" dirty="0"/>
-          </a:p>
-          <a:p>
-            <a:endParaRPr kumimoji="1" lang="zh-CN" altLang="en-US" dirty="0"/>
-          </a:p>
-        </p:txBody>
-      </p:sp>
-    </p:spTree>
-    <p:extLst>
-      <p:ext uri="{BB962C8B-B14F-4D97-AF65-F5344CB8AC3E}">
-        <p14:creationId xmlns:p14="http://schemas.microsoft.com/office/powerpoint/2010/main" val="2821253259"/>
-      </p:ext>
-    </p:extLst>
-  </p:cSld>
-  <p:clrMapOvr>
-    <a:masterClrMapping/>
-  </p:clrMapOvr>
-</p:sld>
-</file>
-
-<file path=ppt/slides/slide21.xml><?xml version="1.0" encoding="utf-8"?>
-<p:sld xmlns:a="http://schemas.openxmlformats.org/drawingml/2006/main" xmlns:r="http://schemas.openxmlformats.org/officeDocument/2006/relationships" xmlns:p="http://schemas.openxmlformats.org/presentationml/2006/main">
-  <p:cSld>
-    <p:spTree>
-      <p:nvGrpSpPr>
-        <p:cNvPr id="1" name=""/>
-        <p:cNvGrpSpPr/>
-        <p:nvPr/>
-      </p:nvGrpSpPr>
-      <p:grpSpPr>
-        <a:xfrm>
-          <a:off x="0" y="0"/>
-          <a:ext cx="0" cy="0"/>
-          <a:chOff x="0" y="0"/>
-          <a:chExt cx="0" cy="0"/>
-        </a:xfrm>
-      </p:grpSpPr>
-      <p:sp>
-        <p:nvSpPr>
-          <p:cNvPr id="2" name="标题 1">
-            <a:extLst>
-              <a:ext uri="{FF2B5EF4-FFF2-40B4-BE49-F238E27FC236}">
-                <a16:creationId xmlns:a16="http://schemas.microsoft.com/office/drawing/2014/main" id="{C8EB042B-53C7-134F-B631-E706405B5E7C}"/>
-              </a:ext>
-            </a:extLst>
-          </p:cNvPr>
-          <p:cNvSpPr>
-            <a:spLocks noGrp="1"/>
-          </p:cNvSpPr>
-          <p:nvPr>
-            <p:ph type="title"/>
-          </p:nvPr>
-        </p:nvSpPr>
-        <p:spPr/>
-        <p:txBody>
-          <a:bodyPr/>
-          <a:lstStyle/>
-          <a:p>
-            <a:r>
-              <a:rPr kumimoji="1" lang="zh-CN" altLang="en-US" dirty="0"/>
-              <a:t>如果同一个消费者组的</a:t>
-            </a:r>
-            <a:r>
-              <a:rPr kumimoji="1" lang="en-US" altLang="zh-CN" dirty="0"/>
-              <a:t>Consumer</a:t>
-            </a:r>
-            <a:r>
-              <a:rPr kumimoji="1" lang="zh-CN" altLang="en-US" dirty="0"/>
-              <a:t>订阅了不同的</a:t>
-            </a:r>
-            <a:r>
-              <a:rPr kumimoji="1" lang="en-US" altLang="zh-CN" dirty="0"/>
-              <a:t>Topic</a:t>
-            </a:r>
-            <a:r>
-              <a:rPr kumimoji="1" lang="zh-CN" altLang="en-US" dirty="0"/>
-              <a:t>会怎么样？</a:t>
-            </a:r>
-          </a:p>
-        </p:txBody>
-      </p:sp>
-      <p:sp>
-        <p:nvSpPr>
-          <p:cNvPr id="3" name="内容占位符 2">
-            <a:extLst>
-              <a:ext uri="{FF2B5EF4-FFF2-40B4-BE49-F238E27FC236}">
-                <a16:creationId xmlns:a16="http://schemas.microsoft.com/office/drawing/2014/main" id="{84841515-8274-AF4C-AAC2-F331F93B097B}"/>
-              </a:ext>
-            </a:extLst>
-          </p:cNvPr>
-          <p:cNvSpPr>
-            <a:spLocks noGrp="1"/>
-          </p:cNvSpPr>
-          <p:nvPr>
-            <p:ph idx="1"/>
-          </p:nvPr>
-        </p:nvSpPr>
-        <p:spPr/>
-        <p:txBody>
-          <a:bodyPr/>
-          <a:lstStyle/>
-          <a:p>
-            <a:pPr marL="0" indent="0">
-              <a:buNone/>
-            </a:pPr>
-            <a:endParaRPr kumimoji="1" lang="zh-CN" altLang="en-US" dirty="0"/>
-          </a:p>
-        </p:txBody>
-      </p:sp>
-    </p:spTree>
-    <p:extLst>
-      <p:ext uri="{BB962C8B-B14F-4D97-AF65-F5344CB8AC3E}">
-        <p14:creationId xmlns:p14="http://schemas.microsoft.com/office/powerpoint/2010/main" val="2767276358"/>
-      </p:ext>
-    </p:extLst>
-  </p:cSld>
-  <p:clrMapOvr>
-    <a:masterClrMapping/>
-  </p:clrMapOvr>
-</p:sld>
-</file>
-
-<file path=ppt/slides/slide22.xml><?xml version="1.0" encoding="utf-8"?>
-<p:sld xmlns:a="http://schemas.openxmlformats.org/drawingml/2006/main" xmlns:r="http://schemas.openxmlformats.org/officeDocument/2006/relationships" xmlns:p="http://schemas.openxmlformats.org/presentationml/2006/main">
-  <p:cSld>
-    <p:spTree>
-      <p:nvGrpSpPr>
-        <p:cNvPr id="1" name=""/>
-        <p:cNvGrpSpPr/>
-        <p:nvPr/>
-      </p:nvGrpSpPr>
-      <p:grpSpPr>
-        <a:xfrm>
-          <a:off x="0" y="0"/>
-          <a:ext cx="0" cy="0"/>
-          <a:chOff x="0" y="0"/>
-          <a:chExt cx="0" cy="0"/>
-        </a:xfrm>
-      </p:grpSpPr>
-      <p:sp>
-        <p:nvSpPr>
-          <p:cNvPr id="2" name="标题 1">
-            <a:extLst>
-              <a:ext uri="{FF2B5EF4-FFF2-40B4-BE49-F238E27FC236}">
-                <a16:creationId xmlns:a16="http://schemas.microsoft.com/office/drawing/2014/main" id="{4605813C-1C8D-684C-972E-A7B35E17B52C}"/>
-              </a:ext>
-            </a:extLst>
-          </p:cNvPr>
-          <p:cNvSpPr>
-            <a:spLocks noGrp="1"/>
-          </p:cNvSpPr>
-          <p:nvPr>
-            <p:ph type="title"/>
-          </p:nvPr>
-        </p:nvSpPr>
-        <p:spPr/>
-        <p:txBody>
-          <a:bodyPr/>
-          <a:lstStyle/>
-          <a:p>
-            <a:r>
-              <a:rPr kumimoji="1" lang="zh-CN" altLang="en-US" dirty="0"/>
-              <a:t>引入</a:t>
-            </a:r>
-            <a:r>
-              <a:rPr kumimoji="1" lang="en-US" altLang="zh-CN" dirty="0" err="1"/>
-              <a:t>RocketMQ</a:t>
-            </a:r>
-            <a:r>
-              <a:rPr kumimoji="1" lang="zh-CN" altLang="en-US" dirty="0"/>
-              <a:t>（</a:t>
-            </a:r>
-            <a:r>
-              <a:rPr kumimoji="1" lang="en-US" altLang="zh-CN" dirty="0"/>
-              <a:t>MQ</a:t>
-            </a:r>
-            <a:r>
-              <a:rPr kumimoji="1" lang="zh-CN" altLang="en-US" dirty="0"/>
-              <a:t>）带来的问题</a:t>
-            </a:r>
-          </a:p>
-        </p:txBody>
-      </p:sp>
-      <p:sp>
-        <p:nvSpPr>
-          <p:cNvPr id="3" name="内容占位符 2">
-            <a:extLst>
-              <a:ext uri="{FF2B5EF4-FFF2-40B4-BE49-F238E27FC236}">
-                <a16:creationId xmlns:a16="http://schemas.microsoft.com/office/drawing/2014/main" id="{148033EE-4F04-5048-9BEC-24DDFAEE6177}"/>
-              </a:ext>
-            </a:extLst>
-          </p:cNvPr>
-          <p:cNvSpPr>
-            <a:spLocks noGrp="1"/>
-          </p:cNvSpPr>
-          <p:nvPr>
-            <p:ph idx="1"/>
-          </p:nvPr>
-        </p:nvSpPr>
-        <p:spPr>
-          <a:xfrm>
-            <a:off x="2589212" y="1643974"/>
-            <a:ext cx="8915400" cy="4267248"/>
-          </a:xfrm>
-        </p:spPr>
-        <p:txBody>
-          <a:bodyPr>
-            <a:normAutofit lnSpcReduction="10000"/>
-          </a:bodyPr>
-          <a:lstStyle/>
-          <a:p>
-            <a:r>
-              <a:rPr kumimoji="1" lang="en-US" altLang="zh-CN" dirty="0"/>
-              <a:t> </a:t>
-            </a:r>
-            <a:r>
-              <a:rPr kumimoji="1" lang="zh-CN" altLang="en-US" dirty="0"/>
-              <a:t>增加了中间件，也就增加了单点故障的可能性。</a:t>
-            </a:r>
-            <a:endParaRPr kumimoji="1" lang="en-US" altLang="zh-CN" dirty="0"/>
-          </a:p>
-          <a:p>
-            <a:r>
-              <a:rPr kumimoji="1" lang="zh-CN" altLang="en-US" dirty="0"/>
-              <a:t>通过消息队列的形式属于异步形式，无法同步获取返回值。</a:t>
-            </a:r>
-            <a:endParaRPr kumimoji="1" lang="en-US" altLang="zh-CN" dirty="0"/>
-          </a:p>
-          <a:p>
-            <a:r>
-              <a:rPr kumimoji="1" lang="zh-CN" altLang="en-US" dirty="0"/>
-              <a:t>解决思路：</a:t>
-            </a:r>
-            <a:endParaRPr kumimoji="1" lang="en-US" altLang="zh-CN" dirty="0"/>
-          </a:p>
-          <a:p>
-            <a:r>
-              <a:rPr kumimoji="1" lang="en-US" altLang="zh-CN" dirty="0"/>
-              <a:t>1.</a:t>
-            </a:r>
-            <a:r>
-              <a:rPr kumimoji="1" lang="zh-CN" altLang="en-US" dirty="0"/>
-              <a:t> 消费者消费完成后，把返回消息放到另一个消息通道，生产者通过发生的消息</a:t>
-            </a:r>
-            <a:r>
-              <a:rPr kumimoji="1" lang="en-US" altLang="zh-CN" dirty="0"/>
-              <a:t>ID</a:t>
-            </a:r>
-            <a:r>
-              <a:rPr kumimoji="1" lang="zh-CN" altLang="en-US" dirty="0"/>
-              <a:t>来确定返回消息。</a:t>
-            </a:r>
-            <a:endParaRPr kumimoji="1" lang="en-US" altLang="zh-CN" dirty="0"/>
-          </a:p>
-          <a:p>
-            <a:r>
-              <a:rPr kumimoji="1" lang="en-US" altLang="zh-CN" dirty="0"/>
-              <a:t>2. </a:t>
-            </a:r>
-            <a:r>
-              <a:rPr kumimoji="1" lang="en-US" altLang="zh-CN" dirty="0" err="1"/>
-              <a:t>RocketMQ</a:t>
-            </a:r>
-            <a:r>
-              <a:rPr kumimoji="1" lang="zh-CN" altLang="en-US" dirty="0"/>
-              <a:t>支持</a:t>
-            </a:r>
-            <a:r>
-              <a:rPr lang="zh-CN" altLang="en-US" dirty="0"/>
-              <a:t>请求</a:t>
-            </a:r>
-            <a:r>
-              <a:rPr lang="en-US" altLang="zh-CN" dirty="0"/>
-              <a:t>/</a:t>
-            </a:r>
-            <a:r>
-              <a:rPr lang="zh-CN" altLang="en-US" dirty="0"/>
-              <a:t>应答 语义。可以通过</a:t>
-            </a:r>
-            <a:r>
-              <a:rPr lang="en-US" altLang="zh-CN" dirty="0" err="1"/>
-              <a:t>RocketMQ</a:t>
-            </a:r>
-            <a:r>
-              <a:rPr lang="zh-CN" altLang="en-US" dirty="0"/>
-              <a:t>的</a:t>
-            </a:r>
-            <a:r>
-              <a:rPr lang="en-US" altLang="zh-CN" dirty="0"/>
-              <a:t>API</a:t>
-            </a:r>
-            <a:r>
-              <a:rPr lang="zh-CN" altLang="en-US" dirty="0"/>
-              <a:t>进行消息和回复。</a:t>
-            </a:r>
-            <a:endParaRPr kumimoji="1" lang="en-US" altLang="zh-CN" dirty="0"/>
-          </a:p>
-          <a:p>
-            <a:r>
-              <a:rPr kumimoji="1" lang="en-US" altLang="zh-CN" dirty="0" err="1"/>
-              <a:t>RocketMQ</a:t>
-            </a:r>
-            <a:r>
-              <a:rPr kumimoji="1" lang="zh-CN" altLang="en-US" dirty="0"/>
-              <a:t>不同于数据库，没有</a:t>
-            </a:r>
-            <a:r>
-              <a:rPr kumimoji="1" lang="en-US" altLang="zh-CN" dirty="0"/>
-              <a:t>ACID</a:t>
-            </a:r>
-            <a:r>
-              <a:rPr kumimoji="1" lang="zh-CN" altLang="en-US" dirty="0"/>
-              <a:t>这样的本地事务。如何保证业务执行和消息发送在一个事务中？比如以下场景：用户下单，业务执行完成后发送了订单生成消息给下游系统，但是在事务提交的时候因为某些问题失败了，事务回退了，但是订单消息已经发送，无法回退。</a:t>
-            </a:r>
-            <a:endParaRPr kumimoji="1" lang="en-US" altLang="zh-CN" dirty="0"/>
-          </a:p>
-          <a:p>
-            <a:r>
-              <a:rPr kumimoji="1" lang="zh-CN" altLang="en-US" dirty="0"/>
-              <a:t>解决思路：</a:t>
-            </a:r>
-            <a:endParaRPr kumimoji="1" lang="en-US" altLang="zh-CN" dirty="0"/>
-          </a:p>
-          <a:p>
-            <a:r>
-              <a:rPr kumimoji="1" lang="zh-CN" altLang="en-US" dirty="0"/>
-              <a:t>发件箱模式。定义一个消息队列表，发送</a:t>
-            </a:r>
-            <a:r>
-              <a:rPr kumimoji="1" lang="en-US" altLang="zh-CN" dirty="0" err="1"/>
-              <a:t>mq</a:t>
-            </a:r>
-            <a:r>
-              <a:rPr kumimoji="1" lang="zh-CN" altLang="en-US" dirty="0"/>
-              <a:t>消息时，先将消息小如到消息表中，此时属于数据库本地事务。启用一个组件扫描发件箱并发送。</a:t>
-            </a:r>
-            <a:endParaRPr kumimoji="1" lang="en-US" altLang="zh-CN" dirty="0"/>
-          </a:p>
-        </p:txBody>
-      </p:sp>
-    </p:spTree>
-    <p:extLst>
-      <p:ext uri="{BB962C8B-B14F-4D97-AF65-F5344CB8AC3E}">
-        <p14:creationId xmlns:p14="http://schemas.microsoft.com/office/powerpoint/2010/main" val="1962971040"/>
-      </p:ext>
-    </p:extLst>
-  </p:cSld>
-  <p:clrMapOvr>
-    <a:masterClrMapping/>
-  </p:clrMapOvr>
-</p:sld>
-</file>
-
 <file path=ppt/slides/slide23.xml><?xml version="1.0" encoding="utf-8"?>
 <p:sld xmlns:a="http://schemas.openxmlformats.org/drawingml/2006/main" xmlns:r="http://schemas.openxmlformats.org/officeDocument/2006/relationships" xmlns:p="http://schemas.openxmlformats.org/presentationml/2006/main">
   <p:cSld>
@@ -10283,7 +10078,7 @@
           <p:cNvPr id="2" name="标题 1">
             <a:extLst>
               <a:ext uri="{FF2B5EF4-FFF2-40B4-BE49-F238E27FC236}">
-                <a16:creationId xmlns:a16="http://schemas.microsoft.com/office/drawing/2014/main" id="{13EC6E4E-9A46-DC4A-B9F2-FE4720A7C149}"/>
+                <a16:creationId xmlns:a16="http://schemas.microsoft.com/office/drawing/2014/main" id="{2A6980E2-634B-844C-B1B3-0CF020D27789}"/>
               </a:ext>
             </a:extLst>
           </p:cNvPr>
@@ -10294,18 +10089,31 @@
             <p:ph type="title"/>
           </p:nvPr>
         </p:nvSpPr>
-        <p:spPr/>
+        <p:spPr>
+          <a:xfrm>
+            <a:off x="2592925" y="624110"/>
+            <a:ext cx="8911687" cy="728829"/>
+          </a:xfrm>
+        </p:spPr>
         <p:txBody>
           <a:bodyPr/>
           <a:lstStyle/>
           <a:p>
             <a:r>
               <a:rPr kumimoji="1" lang="en-US" altLang="zh-CN" dirty="0" err="1"/>
-              <a:t>RocketMQ</a:t>
-            </a:r>
-            <a:r>
-              <a:rPr kumimoji="1" lang="zh-CN" altLang="en-US" dirty="0"/>
-              <a:t>如何保证消息可靠性</a:t>
+              <a:t>ReadQueue</a:t>
+            </a:r>
+            <a:r>
+              <a:rPr kumimoji="1" lang="zh-CN" altLang="en-US" dirty="0"/>
+              <a:t>和</a:t>
+            </a:r>
+            <a:r>
+              <a:rPr kumimoji="1" lang="en-US" altLang="zh-CN" dirty="0" err="1"/>
+              <a:t>WriteQueue</a:t>
+            </a:r>
+            <a:r>
+              <a:rPr kumimoji="1" lang="zh-CN" altLang="en-US" dirty="0"/>
+              <a:t>的概念</a:t>
             </a:r>
           </a:p>
         </p:txBody>
@@ -10315,7 +10123,7 @@
           <p:cNvPr id="3" name="内容占位符 2">
             <a:extLst>
               <a:ext uri="{FF2B5EF4-FFF2-40B4-BE49-F238E27FC236}">
-                <a16:creationId xmlns:a16="http://schemas.microsoft.com/office/drawing/2014/main" id="{4F031BC5-D296-224F-A766-C3D56C05B782}"/>
+                <a16:creationId xmlns:a16="http://schemas.microsoft.com/office/drawing/2014/main" id="{956746AE-E5A1-A543-890F-738B3C9CA93D}"/>
               </a:ext>
             </a:extLst>
           </p:cNvPr>
@@ -10326,104 +10134,412 @@
             <p:ph idx="1"/>
           </p:nvPr>
         </p:nvSpPr>
-        <p:spPr/>
+        <p:spPr>
+          <a:xfrm>
+            <a:off x="2589212" y="1530220"/>
+            <a:ext cx="8915400" cy="4381002"/>
+          </a:xfrm>
+        </p:spPr>
         <p:txBody>
           <a:bodyPr>
-            <a:normAutofit lnSpcReduction="10000"/>
+            <a:normAutofit fontScale="92500" lnSpcReduction="20000"/>
           </a:bodyPr>
           <a:lstStyle/>
           <a:p>
             <a:r>
+              <a:rPr kumimoji="1" lang="zh-CN" altLang="en-US" dirty="0"/>
+              <a:t>创建</a:t>
+            </a:r>
+            <a:r>
               <a:rPr kumimoji="1" lang="en-US" altLang="zh-CN" dirty="0"/>
-              <a:t>Provider</a:t>
-            </a:r>
-            <a:r>
-              <a:rPr kumimoji="1" lang="zh-CN" altLang="en-US" dirty="0"/>
-              <a:t>端</a:t>
+              <a:t>Topic</a:t>
+            </a:r>
+            <a:r>
+              <a:rPr kumimoji="1" lang="zh-CN" altLang="en-US" dirty="0"/>
+              <a:t>时可以指定读写队列的数量</a:t>
+            </a:r>
+            <a:r>
+              <a:rPr kumimoji="1" lang="en-US" altLang="zh-CN" dirty="0"/>
+              <a:t>,</a:t>
+            </a:r>
+            <a:r>
+              <a:rPr kumimoji="1" lang="zh-CN" altLang="en-US" dirty="0"/>
+              <a:t>作用是信息路由</a:t>
             </a:r>
             <a:endParaRPr kumimoji="1" lang="en-US" altLang="zh-CN" dirty="0"/>
           </a:p>
           <a:p>
             <a:r>
-              <a:rPr kumimoji="1" lang="zh-CN" altLang="en-US" dirty="0"/>
-              <a:t>如果是同步消息，消息投递时</a:t>
+              <a:rPr kumimoji="1" lang="en-US" altLang="zh-CN" dirty="0" err="1"/>
+              <a:t>ReadQueue</a:t>
+            </a:r>
+            <a:r>
+              <a:rPr kumimoji="1" lang="zh-CN" altLang="en-US" dirty="0"/>
+              <a:t>数量指定</a:t>
             </a:r>
             <a:r>
               <a:rPr kumimoji="1" lang="en-US" altLang="zh-CN" dirty="0"/>
-              <a:t>Broker</a:t>
-            </a:r>
-            <a:r>
-              <a:rPr kumimoji="1" lang="zh-CN" altLang="en-US" dirty="0"/>
-              <a:t>返回失败，重新投递（</a:t>
-            </a:r>
+              <a:t>Consumer</a:t>
+            </a:r>
+            <a:r>
+              <a:rPr kumimoji="1" lang="zh-CN" altLang="en-US" dirty="0"/>
+              <a:t>消费时可读队列的数量</a:t>
+            </a:r>
+            <a:endParaRPr kumimoji="1" lang="en-US" altLang="zh-CN" dirty="0"/>
+          </a:p>
+          <a:p>
             <a:r>
               <a:rPr kumimoji="1" lang="en-US" altLang="zh-CN" dirty="0" err="1"/>
-              <a:t>RocketMQ</a:t>
-            </a:r>
-            <a:r>
-              <a:rPr kumimoji="1" lang="zh-CN" altLang="en-US" dirty="0"/>
-              <a:t>保证消息一定投递成功）</a:t>
+              <a:t>WriteQueue</a:t>
+            </a:r>
+            <a:r>
+              <a:rPr kumimoji="1" lang="zh-CN" altLang="en-US" dirty="0"/>
+              <a:t>数量指定</a:t>
+            </a:r>
+            <a:r>
+              <a:rPr kumimoji="1" lang="en-US" altLang="zh-CN" dirty="0"/>
+              <a:t>Producer</a:t>
+            </a:r>
+            <a:r>
+              <a:rPr kumimoji="1" lang="zh-CN" altLang="en-US" dirty="0"/>
+              <a:t>消费时可写队列的数量，也就是</a:t>
+            </a:r>
+            <a:r>
+              <a:rPr kumimoji="1" lang="en-US" altLang="zh-CN" dirty="0" err="1"/>
+              <a:t>consumequeue</a:t>
+            </a:r>
+            <a:r>
+              <a:rPr kumimoji="1" lang="zh-CN" altLang="en-US" dirty="0"/>
+              <a:t>的数量</a:t>
             </a:r>
             <a:endParaRPr kumimoji="1" lang="en-US" altLang="zh-CN" dirty="0"/>
           </a:p>
           <a:p>
             <a:r>
               <a:rPr kumimoji="1" lang="zh-CN" altLang="en-US" dirty="0"/>
-              <a:t>如果是异步消息，在回调接口里根据投递状态决定是否重新投递。</a:t>
+              <a:t>假如</a:t>
+            </a:r>
+            <a:r>
+              <a:rPr kumimoji="1" lang="en-US" altLang="zh-CN" dirty="0" err="1"/>
+              <a:t>ReadQueue</a:t>
+            </a:r>
+            <a:r>
+              <a:rPr kumimoji="1" lang="zh-CN" altLang="en-US" dirty="0"/>
+              <a:t>为</a:t>
+            </a:r>
+            <a:r>
+              <a:rPr kumimoji="1" lang="en-US" altLang="zh-CN" dirty="0"/>
+              <a:t>1</a:t>
+            </a:r>
+            <a:r>
+              <a:rPr kumimoji="1" lang="zh-CN" altLang="en-US" dirty="0"/>
+              <a:t>，</a:t>
+            </a:r>
+            <a:r>
+              <a:rPr kumimoji="1" lang="en-US" altLang="zh-CN" dirty="0"/>
+              <a:t> </a:t>
+            </a:r>
+            <a:r>
+              <a:rPr kumimoji="1" lang="en-US" altLang="zh-CN" dirty="0" err="1"/>
+              <a:t>WriteQueue</a:t>
+            </a:r>
+            <a:r>
+              <a:rPr kumimoji="1" lang="zh-CN" altLang="en-US" dirty="0"/>
+              <a:t>为</a:t>
+            </a:r>
+            <a:r>
+              <a:rPr kumimoji="1" lang="en-US" altLang="zh-CN" dirty="0"/>
+              <a:t>2</a:t>
+            </a:r>
+            <a:r>
+              <a:rPr kumimoji="1" lang="zh-CN" altLang="en-US" dirty="0"/>
+              <a:t>，则</a:t>
+            </a:r>
+            <a:r>
+              <a:rPr kumimoji="1" lang="en-US" altLang="zh-CN" dirty="0" err="1"/>
+              <a:t>consumequeue</a:t>
+            </a:r>
+            <a:r>
+              <a:rPr kumimoji="1" lang="zh-CN" altLang="en-US" dirty="0"/>
+              <a:t>为</a:t>
+            </a:r>
+            <a:r>
+              <a:rPr kumimoji="1" lang="en-US" altLang="zh-CN" dirty="0"/>
+              <a:t>2</a:t>
+            </a:r>
+            <a:r>
+              <a:rPr kumimoji="1" lang="zh-CN" altLang="en-US" dirty="0"/>
+              <a:t>，</a:t>
+            </a:r>
+            <a:r>
+              <a:rPr kumimoji="1" lang="en-US" altLang="zh-CN" dirty="0"/>
+              <a:t>Producer</a:t>
+            </a:r>
+            <a:r>
+              <a:rPr kumimoji="1" lang="zh-CN" altLang="en-US" dirty="0"/>
+              <a:t>会往</a:t>
+            </a:r>
+            <a:r>
+              <a:rPr kumimoji="1" lang="en-US" altLang="zh-CN" dirty="0"/>
+              <a:t>2</a:t>
+            </a:r>
+            <a:r>
+              <a:rPr kumimoji="1" lang="zh-CN" altLang="en-US" dirty="0"/>
+              <a:t>个队列都写入消息。但是因为</a:t>
+            </a:r>
+            <a:r>
+              <a:rPr kumimoji="1" lang="en-US" altLang="zh-CN" dirty="0" err="1"/>
+              <a:t>ReadQueue</a:t>
+            </a:r>
+            <a:r>
+              <a:rPr kumimoji="1" lang="zh-CN" altLang="en-US" dirty="0"/>
+              <a:t>为</a:t>
+            </a:r>
+            <a:r>
+              <a:rPr kumimoji="1" lang="en-US" altLang="zh-CN" dirty="0"/>
+              <a:t>1</a:t>
+            </a:r>
+            <a:r>
+              <a:rPr kumimoji="1" lang="zh-CN" altLang="en-US" dirty="0"/>
+              <a:t>，则只有</a:t>
+            </a:r>
+            <a:r>
+              <a:rPr kumimoji="1" lang="en-US" altLang="zh-CN" dirty="0"/>
+              <a:t>1</a:t>
+            </a:r>
+            <a:r>
+              <a:rPr kumimoji="1" lang="zh-CN" altLang="en-US" dirty="0"/>
+              <a:t>个</a:t>
+            </a:r>
+            <a:r>
+              <a:rPr kumimoji="1" lang="en-US" altLang="zh-CN" dirty="0"/>
+              <a:t>Consumer</a:t>
+            </a:r>
+            <a:r>
+              <a:rPr kumimoji="1" lang="zh-CN" altLang="en-US" dirty="0"/>
+              <a:t>可以消费其中一个队列（一个队列只能被一个</a:t>
+            </a:r>
+            <a:r>
+              <a:rPr kumimoji="1" lang="en-US" altLang="zh-CN" dirty="0"/>
+              <a:t>Consumer</a:t>
+            </a:r>
+            <a:r>
+              <a:rPr kumimoji="1" lang="zh-CN" altLang="en-US" dirty="0"/>
+              <a:t>消费），因此另一个队列的消息没有</a:t>
+            </a:r>
+            <a:r>
+              <a:rPr kumimoji="1" lang="en-US" altLang="zh-CN" dirty="0"/>
+              <a:t>Consumer</a:t>
+            </a:r>
+            <a:r>
+              <a:rPr kumimoji="1" lang="zh-CN" altLang="en-US" dirty="0"/>
+              <a:t>可以消费。</a:t>
             </a:r>
             <a:endParaRPr kumimoji="1" lang="en-US" altLang="zh-CN" dirty="0"/>
           </a:p>
           <a:p>
             <a:r>
+              <a:rPr kumimoji="1" lang="zh-CN" altLang="en-US" dirty="0"/>
+              <a:t>假如</a:t>
+            </a:r>
+            <a:r>
+              <a:rPr kumimoji="1" lang="en-US" altLang="zh-CN" dirty="0" err="1"/>
+              <a:t>ReadQueue</a:t>
+            </a:r>
+            <a:r>
+              <a:rPr kumimoji="1" lang="zh-CN" altLang="en-US" dirty="0"/>
+              <a:t>为</a:t>
+            </a:r>
+            <a:r>
               <a:rPr kumimoji="1" lang="en-US" altLang="zh-CN" dirty="0"/>
-              <a:t>Broker</a:t>
-            </a:r>
-            <a:r>
-              <a:rPr kumimoji="1" lang="zh-CN" altLang="en-US" dirty="0"/>
-              <a:t>端</a:t>
+              <a:t>2</a:t>
+            </a:r>
+            <a:r>
+              <a:rPr kumimoji="1" lang="zh-CN" altLang="en-US" dirty="0"/>
+              <a:t>，</a:t>
+            </a:r>
+            <a:r>
+              <a:rPr kumimoji="1" lang="en-US" altLang="zh-CN" dirty="0"/>
+              <a:t> </a:t>
+            </a:r>
+            <a:r>
+              <a:rPr kumimoji="1" lang="en-US" altLang="zh-CN" dirty="0" err="1"/>
+              <a:t>WriteQueue</a:t>
+            </a:r>
+            <a:r>
+              <a:rPr kumimoji="1" lang="zh-CN" altLang="en-US" dirty="0"/>
+              <a:t>为</a:t>
+            </a:r>
+            <a:r>
+              <a:rPr kumimoji="1" lang="en-US" altLang="zh-CN" dirty="0"/>
+              <a:t>1</a:t>
+            </a:r>
+            <a:r>
+              <a:rPr kumimoji="1" lang="zh-CN" altLang="en-US" dirty="0"/>
+              <a:t>，则</a:t>
+            </a:r>
+            <a:r>
+              <a:rPr kumimoji="1" lang="en-US" altLang="zh-CN" dirty="0" err="1"/>
+              <a:t>consumequeue</a:t>
+            </a:r>
+            <a:r>
+              <a:rPr kumimoji="1" lang="zh-CN" altLang="en-US" dirty="0"/>
+              <a:t>为</a:t>
+            </a:r>
+            <a:r>
+              <a:rPr kumimoji="1" lang="en-US" altLang="zh-CN" dirty="0"/>
+              <a:t>1</a:t>
+            </a:r>
+            <a:r>
+              <a:rPr kumimoji="1" lang="zh-CN" altLang="en-US" dirty="0"/>
+              <a:t>，</a:t>
+            </a:r>
+            <a:r>
+              <a:rPr kumimoji="1" lang="en-US" altLang="zh-CN" dirty="0"/>
+              <a:t>Producer</a:t>
+            </a:r>
+            <a:r>
+              <a:rPr kumimoji="1" lang="zh-CN" altLang="en-US" dirty="0"/>
+              <a:t>会往</a:t>
+            </a:r>
+            <a:r>
+              <a:rPr kumimoji="1" lang="en-US" altLang="zh-CN" dirty="0"/>
+              <a:t>1</a:t>
+            </a:r>
+            <a:r>
+              <a:rPr kumimoji="1" lang="zh-CN" altLang="en-US" dirty="0"/>
+              <a:t>个队列写入消息，但是只有</a:t>
+            </a:r>
+            <a:r>
+              <a:rPr kumimoji="1" lang="en-US" altLang="zh-CN" dirty="0"/>
+              <a:t>1</a:t>
+            </a:r>
+            <a:r>
+              <a:rPr kumimoji="1" lang="zh-CN" altLang="en-US" dirty="0"/>
+              <a:t>个</a:t>
+            </a:r>
+            <a:r>
+              <a:rPr kumimoji="1" lang="en-US" altLang="zh-CN" dirty="0"/>
+              <a:t>Consumer</a:t>
+            </a:r>
+            <a:r>
+              <a:rPr kumimoji="1" lang="zh-CN" altLang="en-US" dirty="0"/>
+              <a:t>可以成功消费到消息，其他的</a:t>
+            </a:r>
+            <a:r>
+              <a:rPr kumimoji="1" lang="en-US" altLang="zh-CN" dirty="0"/>
+              <a:t>Consumer</a:t>
+            </a:r>
+            <a:r>
+              <a:rPr kumimoji="1" lang="zh-CN" altLang="en-US" dirty="0"/>
+              <a:t>无法获取消息（因为根本没有队列。。）</a:t>
             </a:r>
             <a:endParaRPr kumimoji="1" lang="en-US" altLang="zh-CN" dirty="0"/>
           </a:p>
           <a:p>
             <a:r>
               <a:rPr kumimoji="1" lang="zh-CN" altLang="en-US" dirty="0"/>
-              <a:t>根据主从同步策略和消息刷盘策略来共同保证</a:t>
-            </a:r>
-            <a:endParaRPr kumimoji="1" lang="en-US" altLang="zh-CN" dirty="0"/>
-          </a:p>
-          <a:p>
-            <a:r>
-              <a:rPr kumimoji="1" lang="zh-CN" altLang="en-US" dirty="0"/>
-              <a:t>同步复制，同步刷盘。最安全，不会丢失消息，但是性能最差。</a:t>
-            </a:r>
-            <a:endParaRPr kumimoji="1" lang="en-US" altLang="zh-CN" dirty="0"/>
-          </a:p>
-          <a:p>
-            <a:r>
-              <a:rPr kumimoji="1" lang="zh-CN" altLang="en-US" dirty="0"/>
-              <a:t>同步复制，异步刷盘。折中方案，可靠性和性能都比较好，除非主从同时故障。</a:t>
-            </a:r>
-            <a:endParaRPr kumimoji="1" lang="en-US" altLang="zh-CN" dirty="0"/>
-          </a:p>
-          <a:p>
-            <a:r>
-              <a:rPr kumimoji="1" lang="zh-CN" altLang="en-US" dirty="0"/>
-              <a:t>异步复制，同步刷盘。都同步刷盘了，意义不大。</a:t>
-            </a:r>
-            <a:endParaRPr kumimoji="1" lang="en-US" altLang="zh-CN" dirty="0"/>
-          </a:p>
-          <a:p>
-            <a:r>
-              <a:rPr kumimoji="1" lang="zh-CN" altLang="en-US" dirty="0"/>
-              <a:t>异步复制，异步刷盘。性能最好，如果主节点故障，消息丢失，不推荐。</a:t>
-            </a:r>
+              <a:t>因此，</a:t>
+            </a:r>
+            <a:r>
+              <a:rPr lang="en" altLang="zh-CN" dirty="0" err="1"/>
+              <a:t>ReadQueueNums</a:t>
+            </a:r>
+            <a:r>
+              <a:rPr lang="en" altLang="zh-CN" dirty="0"/>
+              <a:t>&gt;=</a:t>
+            </a:r>
+            <a:r>
+              <a:rPr lang="en" altLang="zh-CN" dirty="0" err="1"/>
+              <a:t>WriteQueueNums</a:t>
+            </a:r>
+            <a:r>
+              <a:rPr lang="en" altLang="zh-CN" dirty="0"/>
+              <a:t>,</a:t>
+            </a:r>
+            <a:r>
+              <a:rPr lang="zh-CN" altLang="en-US" dirty="0"/>
+              <a:t>程序才能正常进行。最佳实践是</a:t>
+            </a:r>
+            <a:r>
+              <a:rPr lang="en" altLang="zh-CN" dirty="0" err="1"/>
+              <a:t>ReadQueueNums</a:t>
+            </a:r>
+            <a:r>
+              <a:rPr lang="en" altLang="zh-CN" dirty="0"/>
+              <a:t>=</a:t>
+            </a:r>
+            <a:r>
+              <a:rPr lang="en" altLang="zh-CN" dirty="0" err="1"/>
+              <a:t>WriteQueueNums</a:t>
+            </a:r>
+            <a:r>
+              <a:rPr lang="zh-CN" altLang="en" dirty="0"/>
+              <a:t>。</a:t>
+            </a:r>
+            <a:endParaRPr lang="en-US" altLang="zh-CN" dirty="0"/>
+          </a:p>
+          <a:p>
+            <a:r>
+              <a:rPr lang="zh-CN" altLang="en-US" dirty="0"/>
+              <a:t>为什么要设计出</a:t>
+            </a:r>
+            <a:r>
+              <a:rPr lang="en" altLang="zh-CN" dirty="0" err="1"/>
+              <a:t>ReadQueue</a:t>
+            </a:r>
+            <a:r>
+              <a:rPr lang="zh-CN" altLang="en" dirty="0"/>
+              <a:t>和</a:t>
+            </a:r>
+            <a:r>
+              <a:rPr lang="en" altLang="zh-CN" dirty="0" err="1"/>
+              <a:t>WriteQueue</a:t>
+            </a:r>
+            <a:r>
+              <a:rPr lang="zh-CN" altLang="en-US" dirty="0"/>
+              <a:t>？？</a:t>
+            </a:r>
+            <a:endParaRPr lang="en-US" altLang="zh-CN" dirty="0"/>
+          </a:p>
+          <a:p>
+            <a:r>
+              <a:rPr lang="zh-CN" altLang="en-US" dirty="0"/>
+              <a:t>我也不太明白，有人指出是为了方便队列的缩容和扩容。可以参考</a:t>
+            </a:r>
+            <a:r>
+              <a:rPr lang="en" altLang="zh-CN" dirty="0"/>
+              <a:t>https://</a:t>
+            </a:r>
+            <a:r>
+              <a:rPr lang="en" altLang="zh-CN" dirty="0" err="1"/>
+              <a:t>blog.csdn.net</a:t>
+            </a:r>
+            <a:r>
+              <a:rPr lang="en" altLang="zh-CN" dirty="0"/>
+              <a:t>/qian_348840260/article/details</a:t>
+            </a:r>
+            <a:r>
+              <a:rPr lang="en" altLang="zh-CN"/>
+              <a:t>/108975241</a:t>
+            </a:r>
+            <a:endParaRPr lang="en-US" altLang="zh-CN" dirty="0"/>
+          </a:p>
+          <a:p>
+            <a:pPr marL="0" indent="0">
+              <a:buNone/>
+            </a:pPr>
+            <a:endParaRPr kumimoji="1" lang="zh-CN" altLang="en-US" dirty="0"/>
+          </a:p>
+          <a:p>
+            <a:endParaRPr kumimoji="1" lang="zh-CN" altLang="en-US" dirty="0"/>
           </a:p>
         </p:txBody>
       </p:sp>
     </p:spTree>
     <p:extLst>
       <p:ext uri="{BB962C8B-B14F-4D97-AF65-F5344CB8AC3E}">
-        <p14:creationId xmlns:p14="http://schemas.microsoft.com/office/powerpoint/2010/main" val="1673429681"/>
+        <p14:creationId xmlns:p14="http://schemas.microsoft.com/office/powerpoint/2010/main" val="2821253259"/>
       </p:ext>
     </p:extLst>
   </p:cSld>
@@ -10455,7 +10571,7 @@
           <p:cNvPr id="2" name="标题 1">
             <a:extLst>
               <a:ext uri="{FF2B5EF4-FFF2-40B4-BE49-F238E27FC236}">
-                <a16:creationId xmlns:a16="http://schemas.microsoft.com/office/drawing/2014/main" id="{AF1DC664-2C41-7543-953E-7256D28E7422}"/>
+                <a16:creationId xmlns:a16="http://schemas.microsoft.com/office/drawing/2014/main" id="{C8EB042B-53C7-134F-B631-E706405B5E7C}"/>
               </a:ext>
             </a:extLst>
           </p:cNvPr>
@@ -10472,12 +10588,24 @@
           <a:lstStyle/>
           <a:p>
             <a:r>
-              <a:rPr kumimoji="1" lang="en-US" altLang="zh-CN" dirty="0" err="1"/>
-              <a:t>RocketMQ</a:t>
-            </a:r>
-            <a:r>
-              <a:rPr kumimoji="1" lang="zh-CN" altLang="en-US" dirty="0"/>
-              <a:t>如何处理消息重复消费</a:t>
+              <a:rPr kumimoji="1" lang="zh-CN" altLang="en-US" dirty="0"/>
+              <a:t>如果同一个消费者组的</a:t>
+            </a:r>
+            <a:r>
+              <a:rPr kumimoji="1" lang="en-US" altLang="zh-CN" dirty="0"/>
+              <a:t>Consumer</a:t>
+            </a:r>
+            <a:r>
+              <a:rPr kumimoji="1" lang="zh-CN" altLang="en-US" dirty="0"/>
+              <a:t>订阅了不同的</a:t>
+            </a:r>
+            <a:r>
+              <a:rPr kumimoji="1" lang="en-US" altLang="zh-CN" dirty="0"/>
+              <a:t>Topic</a:t>
+            </a:r>
+            <a:r>
+              <a:rPr kumimoji="1" lang="zh-CN" altLang="en-US" dirty="0"/>
+              <a:t>会怎么样？</a:t>
             </a:r>
           </a:p>
         </p:txBody>
@@ -10487,7 +10615,7 @@
           <p:cNvPr id="3" name="内容占位符 2">
             <a:extLst>
               <a:ext uri="{FF2B5EF4-FFF2-40B4-BE49-F238E27FC236}">
-                <a16:creationId xmlns:a16="http://schemas.microsoft.com/office/drawing/2014/main" id="{8D92B3C3-CF9F-1D43-9D5D-D435D712EA06}"/>
+                <a16:creationId xmlns:a16="http://schemas.microsoft.com/office/drawing/2014/main" id="{84841515-8274-AF4C-AAC2-F331F93B097B}"/>
               </a:ext>
             </a:extLst>
           </p:cNvPr>
@@ -10503,70 +10631,17 @@
           <a:bodyPr/>
           <a:lstStyle/>
           <a:p>
-            <a:r>
-              <a:rPr kumimoji="1" lang="en-US" altLang="zh-CN" dirty="0" err="1"/>
-              <a:t>RocketMQ</a:t>
-            </a:r>
-            <a:r>
-              <a:rPr kumimoji="1" lang="zh-CN" altLang="en-US" dirty="0"/>
-              <a:t>自身并不解决消息重复消费的问题。需要使用者自己解决。</a:t>
-            </a:r>
-            <a:endParaRPr kumimoji="1" lang="en-US" altLang="zh-CN" dirty="0"/>
-          </a:p>
-          <a:p>
-            <a:r>
-              <a:rPr kumimoji="1" lang="zh-CN" altLang="en-US" dirty="0"/>
-              <a:t>解决方案有</a:t>
-            </a:r>
-            <a:r>
-              <a:rPr kumimoji="1" lang="en-US" altLang="zh-CN" dirty="0"/>
-              <a:t>2</a:t>
-            </a:r>
-            <a:r>
-              <a:rPr kumimoji="1" lang="zh-CN" altLang="en-US" dirty="0"/>
-              <a:t>种：</a:t>
-            </a:r>
-            <a:endParaRPr kumimoji="1" lang="en-US" altLang="zh-CN" dirty="0"/>
-          </a:p>
-          <a:p>
-            <a:r>
-              <a:rPr kumimoji="1" lang="zh-CN" altLang="en-US" dirty="0"/>
-              <a:t>保证消费逻辑的幂等性。</a:t>
-            </a:r>
-            <a:endParaRPr kumimoji="1" lang="en-US" altLang="zh-CN" dirty="0"/>
-          </a:p>
-          <a:p>
-            <a:r>
-              <a:rPr kumimoji="1" lang="zh-CN" altLang="en-US" dirty="0"/>
-              <a:t>维护一个已消费消息的记录。（比如在数据库或者</a:t>
-            </a:r>
-            <a:r>
-              <a:rPr kumimoji="1" lang="en-US" altLang="zh-CN" dirty="0"/>
-              <a:t>Redis</a:t>
-            </a:r>
-            <a:r>
-              <a:rPr kumimoji="1" lang="zh-CN" altLang="en-US" dirty="0"/>
-              <a:t>中保存已经消费的消息</a:t>
-            </a:r>
-            <a:r>
-              <a:rPr kumimoji="1" lang="en-US" altLang="zh-CN" dirty="0"/>
-              <a:t>ID</a:t>
-            </a:r>
-            <a:r>
-              <a:rPr kumimoji="1" lang="zh-CN" altLang="en-US" dirty="0"/>
-              <a:t>）</a:t>
-            </a:r>
-            <a:endParaRPr kumimoji="1" lang="en-US" altLang="zh-CN" dirty="0"/>
-          </a:p>
-          <a:p>
-            <a:endParaRPr kumimoji="1" lang="en-US" altLang="zh-CN" dirty="0"/>
+            <a:pPr marL="0" indent="0">
+              <a:buNone/>
+            </a:pPr>
+            <a:endParaRPr kumimoji="1" lang="zh-CN" altLang="en-US" dirty="0"/>
           </a:p>
         </p:txBody>
       </p:sp>
     </p:spTree>
     <p:extLst>
       <p:ext uri="{BB962C8B-B14F-4D97-AF65-F5344CB8AC3E}">
-        <p14:creationId xmlns:p14="http://schemas.microsoft.com/office/powerpoint/2010/main" val="3595485941"/>
+        <p14:creationId xmlns:p14="http://schemas.microsoft.com/office/powerpoint/2010/main" val="2767276358"/>
       </p:ext>
     </p:extLst>
   </p:cSld>
@@ -10598,6 +10673,380 @@
           <p:cNvPr id="2" name="标题 1">
             <a:extLst>
               <a:ext uri="{FF2B5EF4-FFF2-40B4-BE49-F238E27FC236}">
+                <a16:creationId xmlns:a16="http://schemas.microsoft.com/office/drawing/2014/main" id="{4605813C-1C8D-684C-972E-A7B35E17B52C}"/>
+              </a:ext>
+            </a:extLst>
+          </p:cNvPr>
+          <p:cNvSpPr>
+            <a:spLocks noGrp="1"/>
+          </p:cNvSpPr>
+          <p:nvPr>
+            <p:ph type="title"/>
+          </p:nvPr>
+        </p:nvSpPr>
+        <p:spPr/>
+        <p:txBody>
+          <a:bodyPr/>
+          <a:lstStyle/>
+          <a:p>
+            <a:r>
+              <a:rPr kumimoji="1" lang="zh-CN" altLang="en-US" dirty="0"/>
+              <a:t>引入</a:t>
+            </a:r>
+            <a:r>
+              <a:rPr kumimoji="1" lang="en-US" altLang="zh-CN" dirty="0" err="1"/>
+              <a:t>RocketMQ</a:t>
+            </a:r>
+            <a:r>
+              <a:rPr kumimoji="1" lang="zh-CN" altLang="en-US" dirty="0"/>
+              <a:t>（</a:t>
+            </a:r>
+            <a:r>
+              <a:rPr kumimoji="1" lang="en-US" altLang="zh-CN" dirty="0"/>
+              <a:t>MQ</a:t>
+            </a:r>
+            <a:r>
+              <a:rPr kumimoji="1" lang="zh-CN" altLang="en-US" dirty="0"/>
+              <a:t>）带来的问题</a:t>
+            </a:r>
+          </a:p>
+        </p:txBody>
+      </p:sp>
+      <p:sp>
+        <p:nvSpPr>
+          <p:cNvPr id="3" name="内容占位符 2">
+            <a:extLst>
+              <a:ext uri="{FF2B5EF4-FFF2-40B4-BE49-F238E27FC236}">
+                <a16:creationId xmlns:a16="http://schemas.microsoft.com/office/drawing/2014/main" id="{148033EE-4F04-5048-9BEC-24DDFAEE6177}"/>
+              </a:ext>
+            </a:extLst>
+          </p:cNvPr>
+          <p:cNvSpPr>
+            <a:spLocks noGrp="1"/>
+          </p:cNvSpPr>
+          <p:nvPr>
+            <p:ph idx="1"/>
+          </p:nvPr>
+        </p:nvSpPr>
+        <p:spPr>
+          <a:xfrm>
+            <a:off x="2589212" y="1643974"/>
+            <a:ext cx="8915400" cy="4267248"/>
+          </a:xfrm>
+        </p:spPr>
+        <p:txBody>
+          <a:bodyPr>
+            <a:normAutofit lnSpcReduction="10000"/>
+          </a:bodyPr>
+          <a:lstStyle/>
+          <a:p>
+            <a:r>
+              <a:rPr kumimoji="1" lang="en-US" altLang="zh-CN" dirty="0"/>
+              <a:t> </a:t>
+            </a:r>
+            <a:r>
+              <a:rPr kumimoji="1" lang="zh-CN" altLang="en-US" dirty="0"/>
+              <a:t>增加了中间件，也就增加了单点故障的可能性。</a:t>
+            </a:r>
+            <a:endParaRPr kumimoji="1" lang="en-US" altLang="zh-CN" dirty="0"/>
+          </a:p>
+          <a:p>
+            <a:r>
+              <a:rPr kumimoji="1" lang="zh-CN" altLang="en-US" dirty="0"/>
+              <a:t>通过消息队列的形式属于异步形式，无法同步获取返回值。</a:t>
+            </a:r>
+            <a:endParaRPr kumimoji="1" lang="en-US" altLang="zh-CN" dirty="0"/>
+          </a:p>
+          <a:p>
+            <a:r>
+              <a:rPr kumimoji="1" lang="zh-CN" altLang="en-US" dirty="0"/>
+              <a:t>解决思路：</a:t>
+            </a:r>
+            <a:endParaRPr kumimoji="1" lang="en-US" altLang="zh-CN" dirty="0"/>
+          </a:p>
+          <a:p>
+            <a:r>
+              <a:rPr kumimoji="1" lang="en-US" altLang="zh-CN" dirty="0"/>
+              <a:t>1.</a:t>
+            </a:r>
+            <a:r>
+              <a:rPr kumimoji="1" lang="zh-CN" altLang="en-US" dirty="0"/>
+              <a:t> 消费者消费完成后，把返回消息放到另一个消息通道，生产者通过发生的消息</a:t>
+            </a:r>
+            <a:r>
+              <a:rPr kumimoji="1" lang="en-US" altLang="zh-CN" dirty="0"/>
+              <a:t>ID</a:t>
+            </a:r>
+            <a:r>
+              <a:rPr kumimoji="1" lang="zh-CN" altLang="en-US" dirty="0"/>
+              <a:t>来确定返回消息。</a:t>
+            </a:r>
+            <a:endParaRPr kumimoji="1" lang="en-US" altLang="zh-CN" dirty="0"/>
+          </a:p>
+          <a:p>
+            <a:r>
+              <a:rPr kumimoji="1" lang="en-US" altLang="zh-CN" dirty="0"/>
+              <a:t>2. </a:t>
+            </a:r>
+            <a:r>
+              <a:rPr kumimoji="1" lang="en-US" altLang="zh-CN" dirty="0" err="1"/>
+              <a:t>RocketMQ</a:t>
+            </a:r>
+            <a:r>
+              <a:rPr kumimoji="1" lang="zh-CN" altLang="en-US" dirty="0"/>
+              <a:t>支持</a:t>
+            </a:r>
+            <a:r>
+              <a:rPr lang="zh-CN" altLang="en-US" dirty="0"/>
+              <a:t>请求</a:t>
+            </a:r>
+            <a:r>
+              <a:rPr lang="en-US" altLang="zh-CN" dirty="0"/>
+              <a:t>/</a:t>
+            </a:r>
+            <a:r>
+              <a:rPr lang="zh-CN" altLang="en-US" dirty="0"/>
+              <a:t>应答 语义。可以通过</a:t>
+            </a:r>
+            <a:r>
+              <a:rPr lang="en-US" altLang="zh-CN" dirty="0" err="1"/>
+              <a:t>RocketMQ</a:t>
+            </a:r>
+            <a:r>
+              <a:rPr lang="zh-CN" altLang="en-US" dirty="0"/>
+              <a:t>的</a:t>
+            </a:r>
+            <a:r>
+              <a:rPr lang="en-US" altLang="zh-CN" dirty="0"/>
+              <a:t>API</a:t>
+            </a:r>
+            <a:r>
+              <a:rPr lang="zh-CN" altLang="en-US" dirty="0"/>
+              <a:t>进行消息和回复。</a:t>
+            </a:r>
+            <a:endParaRPr kumimoji="1" lang="en-US" altLang="zh-CN" dirty="0"/>
+          </a:p>
+          <a:p>
+            <a:r>
+              <a:rPr kumimoji="1" lang="en-US" altLang="zh-CN" dirty="0" err="1"/>
+              <a:t>RocketMQ</a:t>
+            </a:r>
+            <a:r>
+              <a:rPr kumimoji="1" lang="zh-CN" altLang="en-US" dirty="0"/>
+              <a:t>不同于数据库，没有</a:t>
+            </a:r>
+            <a:r>
+              <a:rPr kumimoji="1" lang="en-US" altLang="zh-CN" dirty="0"/>
+              <a:t>ACID</a:t>
+            </a:r>
+            <a:r>
+              <a:rPr kumimoji="1" lang="zh-CN" altLang="en-US" dirty="0"/>
+              <a:t>这样的本地事务。如何保证业务执行和消息发送在一个事务中？比如以下场景：用户下单，业务执行完成后发送了订单生成消息给下游系统，但是在事务提交的时候因为某些问题失败了，事务回退了，但是订单消息已经发送，无法回退。</a:t>
+            </a:r>
+            <a:endParaRPr kumimoji="1" lang="en-US" altLang="zh-CN" dirty="0"/>
+          </a:p>
+          <a:p>
+            <a:r>
+              <a:rPr kumimoji="1" lang="zh-CN" altLang="en-US" dirty="0"/>
+              <a:t>解决思路：</a:t>
+            </a:r>
+            <a:endParaRPr kumimoji="1" lang="en-US" altLang="zh-CN" dirty="0"/>
+          </a:p>
+          <a:p>
+            <a:r>
+              <a:rPr kumimoji="1" lang="zh-CN" altLang="en-US" dirty="0"/>
+              <a:t>发件箱模式。定义一个消息队列表，发送</a:t>
+            </a:r>
+            <a:r>
+              <a:rPr kumimoji="1" lang="en-US" altLang="zh-CN" dirty="0" err="1"/>
+              <a:t>mq</a:t>
+            </a:r>
+            <a:r>
+              <a:rPr kumimoji="1" lang="zh-CN" altLang="en-US" dirty="0"/>
+              <a:t>消息时，先将消息小如到消息表中，此时属于数据库本地事务。启用一个组件扫描发件箱并发送。</a:t>
+            </a:r>
+            <a:endParaRPr kumimoji="1" lang="en-US" altLang="zh-CN" dirty="0"/>
+          </a:p>
+        </p:txBody>
+      </p:sp>
+    </p:spTree>
+    <p:extLst>
+      <p:ext uri="{BB962C8B-B14F-4D97-AF65-F5344CB8AC3E}">
+        <p14:creationId xmlns:p14="http://schemas.microsoft.com/office/powerpoint/2010/main" val="1962971040"/>
+      </p:ext>
+    </p:extLst>
+  </p:cSld>
+  <p:clrMapOvr>
+    <a:masterClrMapping/>
+  </p:clrMapOvr>
+</p:sld>
+</file>
+
+<file path=ppt/slides/slide26.xml><?xml version="1.0" encoding="utf-8"?>
+<p:sld xmlns:a="http://schemas.openxmlformats.org/drawingml/2006/main" xmlns:r="http://schemas.openxmlformats.org/officeDocument/2006/relationships" xmlns:p="http://schemas.openxmlformats.org/presentationml/2006/main">
+  <p:cSld>
+    <p:spTree>
+      <p:nvGrpSpPr>
+        <p:cNvPr id="1" name=""/>
+        <p:cNvGrpSpPr/>
+        <p:nvPr/>
+      </p:nvGrpSpPr>
+      <p:grpSpPr>
+        <a:xfrm>
+          <a:off x="0" y="0"/>
+          <a:ext cx="0" cy="0"/>
+          <a:chOff x="0" y="0"/>
+          <a:chExt cx="0" cy="0"/>
+        </a:xfrm>
+      </p:grpSpPr>
+      <p:sp>
+        <p:nvSpPr>
+          <p:cNvPr id="2" name="标题 1">
+            <a:extLst>
+              <a:ext uri="{FF2B5EF4-FFF2-40B4-BE49-F238E27FC236}">
+                <a16:creationId xmlns:a16="http://schemas.microsoft.com/office/drawing/2014/main" id="{AF1DC664-2C41-7543-953E-7256D28E7422}"/>
+              </a:ext>
+            </a:extLst>
+          </p:cNvPr>
+          <p:cNvSpPr>
+            <a:spLocks noGrp="1"/>
+          </p:cNvSpPr>
+          <p:nvPr>
+            <p:ph type="title"/>
+          </p:nvPr>
+        </p:nvSpPr>
+        <p:spPr/>
+        <p:txBody>
+          <a:bodyPr/>
+          <a:lstStyle/>
+          <a:p>
+            <a:r>
+              <a:rPr kumimoji="1" lang="en-US" altLang="zh-CN" dirty="0" err="1"/>
+              <a:t>RocketMQ</a:t>
+            </a:r>
+            <a:r>
+              <a:rPr kumimoji="1" lang="zh-CN" altLang="en-US" dirty="0"/>
+              <a:t>如何处理消息重复消费</a:t>
+            </a:r>
+          </a:p>
+        </p:txBody>
+      </p:sp>
+      <p:sp>
+        <p:nvSpPr>
+          <p:cNvPr id="3" name="内容占位符 2">
+            <a:extLst>
+              <a:ext uri="{FF2B5EF4-FFF2-40B4-BE49-F238E27FC236}">
+                <a16:creationId xmlns:a16="http://schemas.microsoft.com/office/drawing/2014/main" id="{8D92B3C3-CF9F-1D43-9D5D-D435D712EA06}"/>
+              </a:ext>
+            </a:extLst>
+          </p:cNvPr>
+          <p:cNvSpPr>
+            <a:spLocks noGrp="1"/>
+          </p:cNvSpPr>
+          <p:nvPr>
+            <p:ph idx="1"/>
+          </p:nvPr>
+        </p:nvSpPr>
+        <p:spPr/>
+        <p:txBody>
+          <a:bodyPr/>
+          <a:lstStyle/>
+          <a:p>
+            <a:r>
+              <a:rPr kumimoji="1" lang="en-US" altLang="zh-CN" dirty="0" err="1"/>
+              <a:t>RocketMQ</a:t>
+            </a:r>
+            <a:r>
+              <a:rPr kumimoji="1" lang="zh-CN" altLang="en-US" dirty="0"/>
+              <a:t>自身并不解决消息重复消费的问题。需要使用者自己解决。</a:t>
+            </a:r>
+            <a:endParaRPr kumimoji="1" lang="en-US" altLang="zh-CN" dirty="0"/>
+          </a:p>
+          <a:p>
+            <a:r>
+              <a:rPr kumimoji="1" lang="zh-CN" altLang="en-US" dirty="0"/>
+              <a:t>解决方案有</a:t>
+            </a:r>
+            <a:r>
+              <a:rPr kumimoji="1" lang="en-US" altLang="zh-CN" dirty="0"/>
+              <a:t>2</a:t>
+            </a:r>
+            <a:r>
+              <a:rPr kumimoji="1" lang="zh-CN" altLang="en-US" dirty="0"/>
+              <a:t>种：</a:t>
+            </a:r>
+            <a:endParaRPr kumimoji="1" lang="en-US" altLang="zh-CN" dirty="0"/>
+          </a:p>
+          <a:p>
+            <a:r>
+              <a:rPr kumimoji="1" lang="zh-CN" altLang="en-US" dirty="0"/>
+              <a:t>保证消费逻辑的幂等性。</a:t>
+            </a:r>
+            <a:endParaRPr kumimoji="1" lang="en-US" altLang="zh-CN" dirty="0"/>
+          </a:p>
+          <a:p>
+            <a:r>
+              <a:rPr kumimoji="1" lang="zh-CN" altLang="en-US" dirty="0"/>
+              <a:t>维护一个已消费消息的记录。（比如在数据库或者</a:t>
+            </a:r>
+            <a:r>
+              <a:rPr kumimoji="1" lang="en-US" altLang="zh-CN" dirty="0"/>
+              <a:t>Redis</a:t>
+            </a:r>
+            <a:r>
+              <a:rPr kumimoji="1" lang="zh-CN" altLang="en-US" dirty="0"/>
+              <a:t>中保存已经消费的消息</a:t>
+            </a:r>
+            <a:r>
+              <a:rPr kumimoji="1" lang="en-US" altLang="zh-CN" dirty="0"/>
+              <a:t>ID</a:t>
+            </a:r>
+            <a:r>
+              <a:rPr kumimoji="1" lang="zh-CN" altLang="en-US" dirty="0"/>
+              <a:t>）</a:t>
+            </a:r>
+            <a:endParaRPr kumimoji="1" lang="en-US" altLang="zh-CN" dirty="0"/>
+          </a:p>
+          <a:p>
+            <a:endParaRPr kumimoji="1" lang="en-US" altLang="zh-CN" dirty="0"/>
+          </a:p>
+        </p:txBody>
+      </p:sp>
+    </p:spTree>
+    <p:extLst>
+      <p:ext uri="{BB962C8B-B14F-4D97-AF65-F5344CB8AC3E}">
+        <p14:creationId xmlns:p14="http://schemas.microsoft.com/office/powerpoint/2010/main" val="3595485941"/>
+      </p:ext>
+    </p:extLst>
+  </p:cSld>
+  <p:clrMapOvr>
+    <a:masterClrMapping/>
+  </p:clrMapOvr>
+</p:sld>
+</file>
+
+<file path=ppt/slides/slide27.xml><?xml version="1.0" encoding="utf-8"?>
+<p:sld xmlns:a="http://schemas.openxmlformats.org/drawingml/2006/main" xmlns:r="http://schemas.openxmlformats.org/officeDocument/2006/relationships" xmlns:p="http://schemas.openxmlformats.org/presentationml/2006/main">
+  <p:cSld>
+    <p:spTree>
+      <p:nvGrpSpPr>
+        <p:cNvPr id="1" name=""/>
+        <p:cNvGrpSpPr/>
+        <p:nvPr/>
+      </p:nvGrpSpPr>
+      <p:grpSpPr>
+        <a:xfrm>
+          <a:off x="0" y="0"/>
+          <a:ext cx="0" cy="0"/>
+          <a:chOff x="0" y="0"/>
+          <a:chExt cx="0" cy="0"/>
+        </a:xfrm>
+      </p:grpSpPr>
+      <p:sp>
+        <p:nvSpPr>
+          <p:cNvPr id="2" name="标题 1">
+            <a:extLst>
+              <a:ext uri="{FF2B5EF4-FFF2-40B4-BE49-F238E27FC236}">
                 <a16:creationId xmlns:a16="http://schemas.microsoft.com/office/drawing/2014/main" id="{29BD7B92-C53F-5048-A035-CD294FA54FCA}"/>
               </a:ext>
             </a:extLst>
@@ -10840,7 +11289,7 @@
 </p:sld>
 </file>
 
-<file path=ppt/slides/slide26.xml><?xml version="1.0" encoding="utf-8"?>
+<file path=ppt/slides/slide28.xml><?xml version="1.0" encoding="utf-8"?>
 <p:sld xmlns:a="http://schemas.openxmlformats.org/drawingml/2006/main" xmlns:r="http://schemas.openxmlformats.org/officeDocument/2006/relationships" xmlns:p="http://schemas.openxmlformats.org/presentationml/2006/main">
   <p:cSld>
     <p:spTree>
@@ -13389,14 +13838,6 @@
           <a:lstStyle/>
           <a:p>
             <a:r>
-              <a:rPr kumimoji="1" lang="en-US" altLang="zh-CN" dirty="0" err="1"/>
-              <a:t>RocketMQ</a:t>
-            </a:r>
-            <a:r>
-              <a:rPr kumimoji="1" lang="zh-CN" altLang="en-US" dirty="0"/>
-              <a:t> </a:t>
-            </a:r>
-            <a:r>
               <a:rPr kumimoji="1" lang="en-US" altLang="zh-CN" dirty="0"/>
               <a:t>Consumer</a:t>
             </a:r>
@@ -13567,15 +14008,7 @@
             </a:r>
             <a:r>
               <a:rPr lang="zh-CN" altLang="en-US" dirty="0"/>
-              <a:t>可以根据自身的负载和消费能力来</a:t>
-            </a:r>
-            <a:r>
-              <a:rPr lang="zh-CN" altLang="en-US"/>
-              <a:t>拉去消息。</a:t>
-            </a:r>
-            <a:r>
-              <a:rPr lang="zh-CN" altLang="en-US" dirty="0"/>
-              <a:t>缺点是编码比较麻烦，而且需要自己维护</a:t>
+              <a:t>可以根据自身的负载和消费能力来拉去消息。缺点是编码比较麻烦，而且需要自己维护</a:t>
             </a:r>
             <a:r>
               <a:rPr lang="en-US" altLang="zh-CN" dirty="0"/>

</xml_diff>

<commit_message>
RocketMQ简介.pptx by qiyu 2021-05-08
</commit_message>
<xml_diff>
--- a/doc/RocketMQ简介.pptx
+++ b/doc/RocketMQ简介.pptx
@@ -8695,9 +8695,722 @@
         </p:nvSpPr>
         <p:spPr/>
         <p:txBody>
-          <a:bodyPr/>
+          <a:bodyPr>
+            <a:normAutofit fontScale="70000" lnSpcReduction="20000"/>
+          </a:bodyPr>
           <a:lstStyle/>
           <a:p>
+            <a:r>
+              <a:rPr kumimoji="1" lang="zh-CN" altLang="en-US" dirty="0"/>
+              <a:t>场景：</a:t>
+            </a:r>
+            <a:r>
+              <a:rPr kumimoji="1" lang="en-US" altLang="zh-CN" dirty="0"/>
+              <a:t>2</a:t>
+            </a:r>
+            <a:r>
+              <a:rPr kumimoji="1" lang="zh-CN" altLang="en-US" dirty="0"/>
+              <a:t>个</a:t>
+            </a:r>
+            <a:r>
+              <a:rPr kumimoji="1" lang="en-US" altLang="zh-CN" dirty="0"/>
+              <a:t>Consumer</a:t>
+            </a:r>
+            <a:r>
+              <a:rPr kumimoji="1" lang="zh-CN" altLang="en-US" dirty="0"/>
+              <a:t>，属于同一个</a:t>
+            </a:r>
+            <a:r>
+              <a:rPr kumimoji="1" lang="en-US" altLang="zh-CN" dirty="0"/>
+              <a:t>group</a:t>
+            </a:r>
+            <a:r>
+              <a:rPr kumimoji="1" lang="zh-CN" altLang="en-US" dirty="0"/>
+              <a:t>，都订阅</a:t>
+            </a:r>
+            <a:r>
+              <a:rPr kumimoji="1" lang="en-US" altLang="zh-CN" dirty="0"/>
+              <a:t>Topic1</a:t>
+            </a:r>
+            <a:r>
+              <a:rPr kumimoji="1" lang="zh-CN" altLang="en-US" dirty="0"/>
+              <a:t>（假设</a:t>
+            </a:r>
+            <a:r>
+              <a:rPr kumimoji="1" lang="en-US" altLang="zh-CN" dirty="0"/>
+              <a:t>2</a:t>
+            </a:r>
+            <a:r>
+              <a:rPr kumimoji="1" lang="zh-CN" altLang="en-US" dirty="0"/>
+              <a:t>个</a:t>
+            </a:r>
+            <a:r>
+              <a:rPr kumimoji="1" lang="en-US" altLang="zh-CN" dirty="0"/>
+              <a:t>queue</a:t>
+            </a:r>
+            <a:r>
+              <a:rPr kumimoji="1" lang="zh-CN" altLang="en-US" dirty="0"/>
+              <a:t>），其中</a:t>
+            </a:r>
+            <a:r>
+              <a:rPr kumimoji="1" lang="en-US" altLang="zh-CN" dirty="0" err="1"/>
+              <a:t>ConsumerA</a:t>
+            </a:r>
+            <a:r>
+              <a:rPr kumimoji="1" lang="zh-CN" altLang="en-US" dirty="0"/>
+              <a:t>订阅</a:t>
+            </a:r>
+            <a:r>
+              <a:rPr kumimoji="1" lang="en-US" altLang="zh-CN" dirty="0"/>
+              <a:t>tag1||tag2,</a:t>
+            </a:r>
+            <a:r>
+              <a:rPr kumimoji="1" lang="zh-CN" altLang="en-US" dirty="0"/>
+              <a:t> </a:t>
+            </a:r>
+            <a:r>
+              <a:rPr kumimoji="1" lang="en-US" altLang="zh-CN" dirty="0" err="1"/>
+              <a:t>ConsumerB</a:t>
+            </a:r>
+            <a:r>
+              <a:rPr kumimoji="1" lang="zh-CN" altLang="en-US" dirty="0"/>
+              <a:t>订阅</a:t>
+            </a:r>
+            <a:r>
+              <a:rPr kumimoji="1" lang="en-US" altLang="zh-CN" dirty="0"/>
+              <a:t>tag3</a:t>
+            </a:r>
+            <a:r>
+              <a:rPr kumimoji="1" lang="zh-CN" altLang="en-US" dirty="0"/>
+              <a:t>。先启动</a:t>
+            </a:r>
+            <a:r>
+              <a:rPr kumimoji="1" lang="en-US" altLang="zh-CN" dirty="0" err="1"/>
+              <a:t>ConsumerB</a:t>
+            </a:r>
+            <a:r>
+              <a:rPr kumimoji="1" lang="zh-CN" altLang="en-US" dirty="0"/>
+              <a:t>，再启动</a:t>
+            </a:r>
+            <a:r>
+              <a:rPr kumimoji="1" lang="en-US" altLang="zh-CN" dirty="0" err="1"/>
+              <a:t>ConsumerA</a:t>
+            </a:r>
+            <a:r>
+              <a:rPr kumimoji="1" lang="zh-CN" altLang="en-US" dirty="0"/>
+              <a:t>，然后</a:t>
+            </a:r>
+            <a:r>
+              <a:rPr kumimoji="1" lang="en-US" altLang="zh-CN" dirty="0"/>
+              <a:t>Producer</a:t>
+            </a:r>
+            <a:r>
+              <a:rPr kumimoji="1" lang="zh-CN" altLang="en-US" dirty="0"/>
+              <a:t>往</a:t>
+            </a:r>
+            <a:r>
+              <a:rPr kumimoji="1" lang="en-US" altLang="zh-CN" dirty="0"/>
+              <a:t>Topic1</a:t>
+            </a:r>
+            <a:r>
+              <a:rPr kumimoji="1" lang="zh-CN" altLang="en-US" dirty="0"/>
+              <a:t>发送</a:t>
+            </a:r>
+            <a:r>
+              <a:rPr kumimoji="1" lang="en-US" altLang="zh-CN" dirty="0"/>
+              <a:t>tag1</a:t>
+            </a:r>
+            <a:r>
+              <a:rPr kumimoji="1" lang="zh-CN" altLang="en-US" dirty="0"/>
+              <a:t>，</a:t>
+            </a:r>
+            <a:r>
+              <a:rPr kumimoji="1" lang="en-US" altLang="zh-CN" dirty="0"/>
+              <a:t>tag2</a:t>
+            </a:r>
+            <a:r>
+              <a:rPr kumimoji="1" lang="zh-CN" altLang="en-US" dirty="0"/>
+              <a:t>，</a:t>
+            </a:r>
+            <a:r>
+              <a:rPr kumimoji="1" lang="en-US" altLang="zh-CN" dirty="0"/>
+              <a:t>tag3</a:t>
+            </a:r>
+            <a:r>
+              <a:rPr kumimoji="1" lang="zh-CN" altLang="en-US" dirty="0"/>
+              <a:t>的消息各</a:t>
+            </a:r>
+            <a:r>
+              <a:rPr kumimoji="1" lang="en-US" altLang="zh-CN" dirty="0"/>
+              <a:t>N</a:t>
+            </a:r>
+            <a:r>
+              <a:rPr kumimoji="1" lang="zh-CN" altLang="en-US" dirty="0"/>
+              <a:t>条，结果发现</a:t>
+            </a:r>
+            <a:r>
+              <a:rPr kumimoji="1" lang="en-US" altLang="zh-CN" dirty="0" err="1"/>
+              <a:t>ConsumerA</a:t>
+            </a:r>
+            <a:r>
+              <a:rPr kumimoji="1" lang="zh-CN" altLang="en-US" dirty="0"/>
+              <a:t>成功消费</a:t>
+            </a:r>
+            <a:r>
+              <a:rPr kumimoji="1" lang="en-US" altLang="zh-CN" dirty="0"/>
+              <a:t>tag1</a:t>
+            </a:r>
+            <a:r>
+              <a:rPr kumimoji="1" lang="zh-CN" altLang="en-US" dirty="0"/>
+              <a:t>和</a:t>
+            </a:r>
+            <a:r>
+              <a:rPr kumimoji="1" lang="en-US" altLang="zh-CN" dirty="0"/>
+              <a:t>tag2</a:t>
+            </a:r>
+            <a:r>
+              <a:rPr kumimoji="1" lang="zh-CN" altLang="en-US" dirty="0"/>
+              <a:t>的（部分）消息，</a:t>
+            </a:r>
+            <a:r>
+              <a:rPr kumimoji="1" lang="en-US" altLang="zh-CN" dirty="0" err="1"/>
+              <a:t>ConsumerB</a:t>
+            </a:r>
+            <a:r>
+              <a:rPr kumimoji="1" lang="zh-CN" altLang="en-US" dirty="0"/>
+              <a:t>没有消费</a:t>
+            </a:r>
+            <a:r>
+              <a:rPr kumimoji="1" lang="en-US" altLang="zh-CN" dirty="0"/>
+              <a:t>tag3</a:t>
+            </a:r>
+            <a:r>
+              <a:rPr kumimoji="1" lang="zh-CN" altLang="en-US" dirty="0"/>
+              <a:t>的消息，但是</a:t>
+            </a:r>
+            <a:r>
+              <a:rPr kumimoji="1" lang="en-US" altLang="zh-CN" dirty="0"/>
+              <a:t>Broker</a:t>
+            </a:r>
+            <a:r>
+              <a:rPr kumimoji="1" lang="zh-CN" altLang="en-US" dirty="0"/>
+              <a:t>中</a:t>
+            </a:r>
+            <a:r>
+              <a:rPr kumimoji="1" lang="en-US" altLang="zh-CN" dirty="0"/>
+              <a:t>tag3</a:t>
+            </a:r>
+            <a:r>
+              <a:rPr kumimoji="1" lang="zh-CN" altLang="en-US" dirty="0"/>
+              <a:t>消息的状态是</a:t>
+            </a:r>
+            <a:r>
+              <a:rPr kumimoji="1" lang="en-US" altLang="zh-CN" dirty="0" err="1"/>
+              <a:t>consumerd_but_filtered</a:t>
+            </a:r>
+            <a:r>
+              <a:rPr kumimoji="1" lang="zh-CN" altLang="en-US" dirty="0"/>
+              <a:t>（消费但是被过滤，可以理解为被丢弃）。此时关闭</a:t>
+            </a:r>
+            <a:r>
+              <a:rPr kumimoji="1" lang="en-US" altLang="zh-CN" dirty="0" err="1"/>
+              <a:t>ConsumerA</a:t>
+            </a:r>
+            <a:r>
+              <a:rPr kumimoji="1" lang="en-US" altLang="zh-CN" dirty="0"/>
+              <a:t>,</a:t>
+            </a:r>
+            <a:r>
+              <a:rPr kumimoji="1" lang="zh-CN" altLang="en-US" dirty="0"/>
+              <a:t>重启</a:t>
+            </a:r>
+            <a:r>
+              <a:rPr kumimoji="1" lang="en-US" altLang="zh-CN" dirty="0" err="1"/>
+              <a:t>ConsumerB</a:t>
+            </a:r>
+            <a:r>
+              <a:rPr kumimoji="1" lang="zh-CN" altLang="en-US" dirty="0"/>
+              <a:t>，</a:t>
+            </a:r>
+            <a:r>
+              <a:rPr kumimoji="1" lang="en-US" altLang="zh-CN" dirty="0"/>
+              <a:t>tag3</a:t>
+            </a:r>
+            <a:r>
+              <a:rPr kumimoji="1" lang="zh-CN" altLang="en-US" dirty="0"/>
+              <a:t>的消息依然不能被重新消费。</a:t>
+            </a:r>
+            <a:endParaRPr kumimoji="1" lang="en-US" altLang="zh-CN" dirty="0"/>
+          </a:p>
+          <a:p>
+            <a:r>
+              <a:rPr kumimoji="1" lang="zh-CN" altLang="en-US" dirty="0"/>
+              <a:t>原因：</a:t>
+            </a:r>
+            <a:r>
+              <a:rPr kumimoji="1" lang="en-US" altLang="zh-CN" dirty="0"/>
+              <a:t>C</a:t>
+            </a:r>
+            <a:r>
+              <a:rPr lang="en" altLang="zh-CN" dirty="0" err="1"/>
+              <a:t>onsumer</a:t>
+            </a:r>
+            <a:r>
+              <a:rPr lang="zh-CN" altLang="en-US" dirty="0"/>
+              <a:t>订阅时，会将订阅信息注册到到服务端。后启动的</a:t>
+            </a:r>
+            <a:r>
+              <a:rPr lang="en-US" altLang="zh-CN" dirty="0"/>
+              <a:t>consumer</a:t>
+            </a:r>
+            <a:r>
+              <a:rPr lang="zh-CN" altLang="en-US" dirty="0"/>
+              <a:t>的</a:t>
+            </a:r>
+            <a:r>
+              <a:rPr lang="en-US" altLang="zh-CN" dirty="0"/>
+              <a:t>tag</a:t>
+            </a:r>
+            <a:r>
+              <a:rPr lang="zh-CN" altLang="en-US" dirty="0"/>
+              <a:t>覆盖了先启动的</a:t>
+            </a:r>
+            <a:r>
+              <a:rPr lang="en-US" altLang="zh-CN" dirty="0"/>
+              <a:t>Consumer</a:t>
+            </a:r>
+            <a:r>
+              <a:rPr lang="zh-CN" altLang="en-US" dirty="0"/>
+              <a:t>的</a:t>
+            </a:r>
+            <a:r>
+              <a:rPr lang="en-US" altLang="zh-CN" dirty="0"/>
+              <a:t>tag</a:t>
+            </a:r>
+            <a:r>
+              <a:rPr lang="zh-CN" altLang="en-US" dirty="0"/>
+              <a:t>，即同一个</a:t>
+            </a:r>
+            <a:r>
+              <a:rPr lang="en-US" altLang="zh-CN" dirty="0"/>
+              <a:t>Consumer</a:t>
+            </a:r>
+            <a:r>
+              <a:rPr lang="zh-CN" altLang="en-US" dirty="0"/>
+              <a:t> </a:t>
+            </a:r>
+            <a:r>
+              <a:rPr lang="en-US" altLang="zh-CN" dirty="0"/>
+              <a:t>group</a:t>
+            </a:r>
+            <a:r>
+              <a:rPr lang="zh-CN" altLang="en-US" dirty="0"/>
+              <a:t>的订阅关系只有一个。消息消费时，</a:t>
+            </a:r>
+            <a:r>
+              <a:rPr lang="en-US" altLang="zh-CN" dirty="0"/>
+              <a:t>broker</a:t>
+            </a:r>
+            <a:r>
+              <a:rPr lang="zh-CN" altLang="en-US" dirty="0"/>
+              <a:t>会根据</a:t>
+            </a:r>
+            <a:r>
+              <a:rPr lang="en-US" altLang="zh-CN" dirty="0"/>
+              <a:t>Consumer</a:t>
+            </a:r>
+            <a:r>
+              <a:rPr lang="zh-CN" altLang="en-US" dirty="0"/>
+              <a:t> </a:t>
+            </a:r>
+            <a:r>
+              <a:rPr lang="en-US" altLang="zh-CN" dirty="0"/>
+              <a:t>group</a:t>
+            </a:r>
+            <a:r>
+              <a:rPr lang="zh-CN" altLang="en-US" dirty="0"/>
+              <a:t>订阅的</a:t>
+            </a:r>
+            <a:r>
+              <a:rPr lang="en-US" altLang="zh-CN" dirty="0"/>
+              <a:t>tag</a:t>
+            </a:r>
+            <a:r>
+              <a:rPr lang="zh-CN" altLang="en-US" dirty="0"/>
+              <a:t>进行过滤，导致</a:t>
+            </a:r>
+            <a:r>
+              <a:rPr lang="en-US" altLang="zh-CN" dirty="0"/>
+              <a:t>tag3</a:t>
+            </a:r>
+            <a:r>
+              <a:rPr lang="zh-CN" altLang="en-US" dirty="0"/>
+              <a:t>的消息被成功消费，但是被</a:t>
+            </a:r>
+            <a:r>
+              <a:rPr lang="en-US" altLang="zh-CN" dirty="0"/>
+              <a:t>broker</a:t>
+            </a:r>
+            <a:r>
+              <a:rPr lang="zh-CN" altLang="en-US" dirty="0"/>
+              <a:t>过滤。</a:t>
+            </a:r>
+            <a:r>
+              <a:rPr lang="en-US" altLang="zh-CN" dirty="0" err="1"/>
+              <a:t>ConsumerA</a:t>
+            </a:r>
+            <a:r>
+              <a:rPr lang="zh-CN" altLang="en-US" dirty="0"/>
+              <a:t>（假设分配</a:t>
+            </a:r>
+            <a:r>
+              <a:rPr lang="en-US" altLang="zh-CN" dirty="0"/>
+              <a:t>queue1</a:t>
+            </a:r>
+            <a:r>
+              <a:rPr lang="zh-CN" altLang="en-US" dirty="0"/>
+              <a:t>）拉取到</a:t>
+            </a:r>
+            <a:r>
+              <a:rPr lang="en-US" altLang="zh-CN" dirty="0"/>
+              <a:t>tag1</a:t>
+            </a:r>
+            <a:r>
+              <a:rPr lang="zh-CN" altLang="en-US" dirty="0"/>
+              <a:t>和</a:t>
+            </a:r>
+            <a:r>
+              <a:rPr lang="en-US" altLang="zh-CN" dirty="0"/>
+              <a:t>tag2</a:t>
+            </a:r>
+            <a:r>
+              <a:rPr lang="zh-CN" altLang="en-US" dirty="0"/>
+              <a:t>的消息，在</a:t>
+            </a:r>
+            <a:r>
+              <a:rPr lang="en-US" altLang="zh-CN" dirty="0"/>
+              <a:t>consumer</a:t>
+            </a:r>
+            <a:r>
+              <a:rPr lang="zh-CN" altLang="en-US" dirty="0"/>
+              <a:t>过滤时发现</a:t>
+            </a:r>
+            <a:r>
+              <a:rPr lang="en-US" altLang="zh-CN" dirty="0"/>
+              <a:t>tag</a:t>
+            </a:r>
+            <a:r>
+              <a:rPr lang="zh-CN" altLang="en-US" dirty="0"/>
+              <a:t>符合，消费成功。</a:t>
+            </a:r>
+            <a:r>
+              <a:rPr lang="en-US" altLang="zh-CN" dirty="0" err="1"/>
+              <a:t>ConsumerB</a:t>
+            </a:r>
+            <a:r>
+              <a:rPr lang="zh-CN" altLang="en-US" dirty="0"/>
+              <a:t>（假设分配到</a:t>
+            </a:r>
+            <a:r>
+              <a:rPr lang="en-US" altLang="zh-CN" dirty="0"/>
+              <a:t>queue2</a:t>
+            </a:r>
+            <a:r>
+              <a:rPr lang="zh-CN" altLang="en-US" dirty="0"/>
+              <a:t>）拉取到</a:t>
+            </a:r>
+            <a:r>
+              <a:rPr lang="en-US" altLang="zh-CN" dirty="0"/>
+              <a:t>tag1</a:t>
+            </a:r>
+            <a:r>
+              <a:rPr lang="zh-CN" altLang="en-US" dirty="0"/>
+              <a:t>和</a:t>
+            </a:r>
+            <a:r>
+              <a:rPr lang="en-US" altLang="zh-CN" dirty="0"/>
+              <a:t>tag2</a:t>
+            </a:r>
+            <a:r>
+              <a:rPr lang="zh-CN" altLang="en-US" dirty="0"/>
+              <a:t>的消息， 但是在</a:t>
+            </a:r>
+            <a:r>
+              <a:rPr lang="en-US" altLang="zh-CN" dirty="0"/>
+              <a:t>consumer</a:t>
+            </a:r>
+            <a:r>
+              <a:rPr lang="zh-CN" altLang="en-US" dirty="0"/>
+              <a:t>过滤时发现不是</a:t>
+            </a:r>
+            <a:r>
+              <a:rPr lang="en-US" altLang="zh-CN" dirty="0"/>
+              <a:t>tag3</a:t>
+            </a:r>
+            <a:r>
+              <a:rPr lang="zh-CN" altLang="en-US" dirty="0"/>
+              <a:t>，直接丢弃。导致</a:t>
+            </a:r>
+            <a:r>
+              <a:rPr lang="en-US" altLang="zh-CN" dirty="0"/>
+              <a:t>Topic1</a:t>
+            </a:r>
+            <a:r>
+              <a:rPr lang="zh-CN" altLang="en-US" dirty="0"/>
+              <a:t>的</a:t>
+            </a:r>
+            <a:r>
+              <a:rPr lang="en-US" altLang="zh-CN" dirty="0"/>
+              <a:t>tag3</a:t>
+            </a:r>
+            <a:r>
+              <a:rPr lang="zh-CN" altLang="en-US" dirty="0"/>
+              <a:t>消息全部被过滤，而</a:t>
+            </a:r>
+            <a:r>
+              <a:rPr lang="en-US" altLang="zh-CN" dirty="0"/>
+              <a:t>queue2</a:t>
+            </a:r>
+            <a:r>
+              <a:rPr lang="zh-CN" altLang="en-US" dirty="0"/>
+              <a:t>的</a:t>
+            </a:r>
+            <a:r>
+              <a:rPr lang="en-US" altLang="zh-CN" dirty="0"/>
+              <a:t>tag1</a:t>
+            </a:r>
+            <a:r>
+              <a:rPr lang="zh-CN" altLang="en-US" dirty="0"/>
+              <a:t>和</a:t>
+            </a:r>
+            <a:r>
+              <a:rPr lang="en-US" altLang="zh-CN" dirty="0"/>
+              <a:t>tag2</a:t>
+            </a:r>
+            <a:r>
+              <a:rPr lang="zh-CN" altLang="en-US" dirty="0"/>
+              <a:t>的消息也没有被消费。</a:t>
+            </a:r>
+            <a:endParaRPr lang="en-US" altLang="zh-CN" dirty="0"/>
+          </a:p>
+          <a:p>
+            <a:r>
+              <a:rPr lang="zh-CN" altLang="en-US" dirty="0"/>
+              <a:t>阿里云上提到同一个消费者</a:t>
+            </a:r>
+            <a:r>
+              <a:rPr lang="en" altLang="zh-CN" dirty="0"/>
+              <a:t>Group ID</a:t>
+            </a:r>
+            <a:r>
+              <a:rPr lang="zh-CN" altLang="en-US" dirty="0"/>
+              <a:t>下所有</a:t>
+            </a:r>
+            <a:r>
+              <a:rPr lang="en" altLang="zh-CN" dirty="0"/>
+              <a:t>Consumer</a:t>
+            </a:r>
+            <a:r>
+              <a:rPr lang="zh-CN" altLang="en-US" dirty="0"/>
+              <a:t>实例所订阅的</a:t>
+            </a:r>
+            <a:r>
+              <a:rPr lang="en" altLang="zh-CN" dirty="0"/>
+              <a:t>Topic</a:t>
+            </a:r>
+            <a:r>
+              <a:rPr lang="zh-CN" altLang="en" dirty="0"/>
+              <a:t>、</a:t>
+            </a:r>
+            <a:r>
+              <a:rPr lang="en" altLang="zh-CN" dirty="0"/>
+              <a:t>Group ID</a:t>
+            </a:r>
+            <a:r>
+              <a:rPr lang="zh-CN" altLang="en" dirty="0"/>
+              <a:t>、</a:t>
+            </a:r>
+            <a:r>
+              <a:rPr lang="en" altLang="zh-CN" dirty="0"/>
+              <a:t>Tag</a:t>
+            </a:r>
+            <a:r>
+              <a:rPr lang="zh-CN" altLang="en-US" dirty="0"/>
+              <a:t>必须完全一致，否则消息消费的逻辑就会混乱，甚至导致消息丢失。</a:t>
+            </a:r>
+            <a:r>
+              <a:rPr lang="en" altLang="zh-CN" dirty="0"/>
+              <a:t> </a:t>
+            </a:r>
+            <a:r>
+              <a:rPr lang="en" altLang="zh-CN" dirty="0">
+                <a:hlinkClick r:id="rId2"/>
+              </a:rPr>
+              <a:t>https://help.aliyun.com/document_detail/43523.html?spm=a2c4g.11186623.4.1.179338cbbwlJXC</a:t>
+            </a:r>
+            <a:endParaRPr lang="en" altLang="zh-CN" dirty="0"/>
+          </a:p>
+          <a:p>
+            <a:r>
+              <a:rPr lang="zh-CN" altLang="en-US" dirty="0"/>
+              <a:t>同时阿里云建议</a:t>
+            </a:r>
+            <a:r>
+              <a:rPr lang="en" altLang="zh-CN" dirty="0"/>
+              <a:t>Topic</a:t>
+            </a:r>
+            <a:r>
+              <a:rPr lang="zh-CN" altLang="en-US" dirty="0"/>
+              <a:t>与</a:t>
+            </a:r>
+            <a:r>
+              <a:rPr lang="en" altLang="zh-CN" dirty="0"/>
+              <a:t>Tag</a:t>
+            </a:r>
+            <a:r>
+              <a:rPr lang="zh-CN" altLang="en-US" dirty="0"/>
+              <a:t>最佳实践是</a:t>
+            </a:r>
+            <a:r>
+              <a:rPr lang="en" altLang="zh-CN" dirty="0"/>
+              <a:t>Topic</a:t>
+            </a:r>
+            <a:r>
+              <a:rPr lang="zh-CN" altLang="en-US" dirty="0"/>
+              <a:t>是一级分类，而</a:t>
+            </a:r>
+            <a:r>
+              <a:rPr lang="en" altLang="zh-CN" dirty="0"/>
+              <a:t>Tag</a:t>
+            </a:r>
+            <a:r>
+              <a:rPr lang="zh-CN" altLang="en-US" dirty="0"/>
+              <a:t>是二级分类。比如订单创建是</a:t>
+            </a:r>
+            <a:r>
+              <a:rPr lang="en-US" altLang="zh-CN" dirty="0"/>
+              <a:t>topic-order-create</a:t>
+            </a:r>
+            <a:r>
+              <a:rPr lang="zh-CN" altLang="en-US" dirty="0"/>
+              <a:t>，但是女性订单是</a:t>
+            </a:r>
+            <a:r>
+              <a:rPr lang="en-US" altLang="zh-CN" dirty="0" err="1"/>
+              <a:t>tagWomen</a:t>
+            </a:r>
+            <a:r>
+              <a:rPr lang="zh-CN" altLang="en-US" dirty="0"/>
+              <a:t>，小孩订单是</a:t>
+            </a:r>
+            <a:r>
+              <a:rPr lang="en-US" altLang="zh-CN" dirty="0" err="1"/>
+              <a:t>tagKid</a:t>
+            </a:r>
+            <a:r>
+              <a:rPr lang="zh-CN" altLang="en-US" dirty="0"/>
+              <a:t>，宠物订单是</a:t>
+            </a:r>
+            <a:r>
+              <a:rPr lang="en-US" altLang="zh-CN" dirty="0" err="1"/>
+              <a:t>tagPet</a:t>
+            </a:r>
+            <a:r>
+              <a:rPr lang="zh-CN" altLang="en-US" dirty="0"/>
+              <a:t>。同时这</a:t>
+            </a:r>
+            <a:r>
+              <a:rPr lang="en-US" altLang="zh-CN" dirty="0"/>
+              <a:t>3</a:t>
+            </a:r>
+            <a:r>
+              <a:rPr lang="zh-CN" altLang="en-US" dirty="0"/>
+              <a:t>种订单要用不同的</a:t>
+            </a:r>
+            <a:r>
+              <a:rPr lang="en-US" altLang="zh-CN" dirty="0" err="1"/>
+              <a:t>ConsumerGroup</a:t>
+            </a:r>
+            <a:r>
+              <a:rPr lang="zh-CN" altLang="en-US" dirty="0"/>
+              <a:t>去消费。</a:t>
+            </a:r>
+            <a:endParaRPr lang="en-US" altLang="zh-CN" dirty="0"/>
+          </a:p>
+          <a:p>
+            <a:pPr marL="0" indent="0">
+              <a:buNone/>
+            </a:pPr>
+            <a:r>
+              <a:rPr lang="zh-CN" altLang="en-US" dirty="0"/>
+              <a:t>        </a:t>
+            </a:r>
+            <a:r>
+              <a:rPr lang="en-US" altLang="zh-CN" dirty="0"/>
+              <a:t>https://</a:t>
+            </a:r>
+            <a:r>
+              <a:rPr lang="en-US" altLang="zh-CN" dirty="0" err="1"/>
+              <a:t>help.aliyun.com</a:t>
+            </a:r>
+            <a:r>
+              <a:rPr lang="en-US" altLang="zh-CN" dirty="0"/>
+              <a:t>/</a:t>
+            </a:r>
+            <a:r>
+              <a:rPr lang="en-US" altLang="zh-CN" dirty="0" err="1"/>
+              <a:t>document_detail</a:t>
+            </a:r>
+            <a:r>
+              <a:rPr lang="en-US" altLang="zh-CN" dirty="0"/>
+              <a:t>/95837.html?spm=a2c4g.11186623.6.730.7bd353981tHGJT</a:t>
+            </a:r>
+          </a:p>
+          <a:p>
+            <a:r>
+              <a:rPr lang="zh-CN" altLang="en-US" dirty="0"/>
+              <a:t>个人建议直接用多个</a:t>
+            </a:r>
+            <a:r>
+              <a:rPr lang="en-US" altLang="zh-CN" dirty="0"/>
+              <a:t>topic</a:t>
+            </a:r>
+            <a:r>
+              <a:rPr lang="zh-CN" altLang="en-US" dirty="0"/>
+              <a:t>区分就好，多个</a:t>
+            </a:r>
+            <a:r>
+              <a:rPr lang="en-US" altLang="zh-CN" dirty="0"/>
+              <a:t>topic</a:t>
+            </a:r>
+            <a:r>
+              <a:rPr lang="zh-CN" altLang="en-US" dirty="0"/>
+              <a:t>对</a:t>
+            </a:r>
+            <a:r>
+              <a:rPr lang="en-US" altLang="zh-CN" dirty="0" err="1"/>
+              <a:t>RocketMQ</a:t>
+            </a:r>
+            <a:r>
+              <a:rPr lang="zh-CN" altLang="en-US" dirty="0"/>
+              <a:t>并没有太大</a:t>
+            </a:r>
+            <a:r>
+              <a:rPr lang="zh-CN" altLang="en-US"/>
+              <a:t>的性能问题。</a:t>
+            </a:r>
+            <a:endParaRPr lang="zh-CN" altLang="en-US" dirty="0"/>
+          </a:p>
+          <a:p>
+            <a:endParaRPr lang="en-US" altLang="zh-CN" dirty="0"/>
+          </a:p>
+          <a:p>
+            <a:endParaRPr lang="zh-CN" altLang="en-US" dirty="0"/>
+          </a:p>
+          <a:p>
+            <a:pPr marL="0" indent="0">
+              <a:buNone/>
+            </a:pPr>
             <a:endParaRPr kumimoji="1" lang="zh-CN" altLang="en-US" dirty="0"/>
           </a:p>
         </p:txBody>

</xml_diff>

<commit_message>
RocketMQ文档 by yipin 2021-05-19
</commit_message>
<xml_diff>
--- a/doc/RocketMQ简介.pptx
+++ b/doc/RocketMQ简介.pptx
@@ -26,16 +26,17 @@
     <p:sldId id="264" r:id="rId20"/>
     <p:sldId id="265" r:id="rId21"/>
     <p:sldId id="260" r:id="rId22"/>
-    <p:sldId id="272" r:id="rId23"/>
-    <p:sldId id="266" r:id="rId24"/>
-    <p:sldId id="277" r:id="rId25"/>
-    <p:sldId id="274" r:id="rId26"/>
-    <p:sldId id="262" r:id="rId27"/>
-    <p:sldId id="261" r:id="rId28"/>
-    <p:sldId id="263" r:id="rId29"/>
-    <p:sldId id="267" r:id="rId30"/>
-    <p:sldId id="288" r:id="rId31"/>
-    <p:sldId id="289" r:id="rId32"/>
+    <p:sldId id="291" r:id="rId23"/>
+    <p:sldId id="272" r:id="rId24"/>
+    <p:sldId id="266" r:id="rId25"/>
+    <p:sldId id="277" r:id="rId26"/>
+    <p:sldId id="274" r:id="rId27"/>
+    <p:sldId id="262" r:id="rId28"/>
+    <p:sldId id="261" r:id="rId29"/>
+    <p:sldId id="263" r:id="rId30"/>
+    <p:sldId id="267" r:id="rId31"/>
+    <p:sldId id="288" r:id="rId32"/>
+    <p:sldId id="289" r:id="rId33"/>
   </p:sldIdLst>
   <p:sldSz cx="12192000" cy="6858000"/>
   <p:notesSz cx="6858000" cy="9144000"/>
@@ -8669,7 +8670,7 @@
             </a:r>
             <a:r>
               <a:rPr lang="en-US" altLang="zh-CN" dirty="0" err="1"/>
-              <a:t>messagequeue</a:t>
+              <a:t>MessageQueue</a:t>
             </a:r>
             <a:r>
               <a:rPr lang="zh-CN" altLang="en-US" dirty="0"/>
@@ -8749,6 +8750,65 @@
             <a:r>
               <a:rPr lang="zh-CN" altLang="en-US" dirty="0"/>
               <a:t>。</a:t>
+            </a:r>
+            <a:endParaRPr lang="en-US" altLang="zh-CN" dirty="0"/>
+          </a:p>
+          <a:p>
+            <a:r>
+              <a:rPr lang="en-US" altLang="zh-CN" dirty="0" err="1"/>
+              <a:t>MessageQueue</a:t>
+            </a:r>
+            <a:r>
+              <a:rPr lang="zh-CN" altLang="en-US" dirty="0"/>
+              <a:t>选择机制：使用</a:t>
+            </a:r>
+            <a:r>
+              <a:rPr lang="en-US" altLang="zh-CN" dirty="0" err="1"/>
+              <a:t>ThreadLocalIndex</a:t>
+            </a:r>
+            <a:r>
+              <a:rPr lang="zh-CN" altLang="en-US" dirty="0"/>
+              <a:t>保存当前</a:t>
+            </a:r>
+            <a:r>
+              <a:rPr lang="en-US" altLang="zh-CN" dirty="0"/>
+              <a:t>Topic</a:t>
+            </a:r>
+            <a:r>
+              <a:rPr lang="zh-CN" altLang="en-US" dirty="0"/>
+              <a:t>下的</a:t>
+            </a:r>
+            <a:r>
+              <a:rPr lang="en-US" altLang="zh-CN" dirty="0" err="1"/>
+              <a:t>MessageQueue</a:t>
+            </a:r>
+            <a:r>
+              <a:rPr lang="zh-CN" altLang="en-US" dirty="0"/>
+              <a:t>下标（初始为一个随机数），后面采用</a:t>
+            </a:r>
+            <a:r>
+              <a:rPr lang="en-US" altLang="zh-CN" dirty="0"/>
+              <a:t>Index</a:t>
+            </a:r>
+            <a:r>
+              <a:rPr lang="zh-CN" altLang="en-US" dirty="0"/>
+              <a:t>递增和</a:t>
+            </a:r>
+            <a:r>
+              <a:rPr lang="en-US" altLang="zh-CN" dirty="0" err="1"/>
+              <a:t>MessageQueue</a:t>
+            </a:r>
+            <a:r>
+              <a:rPr lang="zh-CN" altLang="en-US" dirty="0"/>
+              <a:t>列表长度取模的形式获取消息发送的</a:t>
+            </a:r>
+            <a:r>
+              <a:rPr lang="en-US" altLang="zh-CN" dirty="0" err="1"/>
+              <a:t>MessageQueue</a:t>
+            </a:r>
+            <a:r>
+              <a:rPr lang="zh-CN" altLang="en-US" dirty="0"/>
+              <a:t>（相当于轮询）</a:t>
             </a:r>
             <a:endParaRPr kumimoji="1" lang="zh-CN" altLang="en-US" dirty="0"/>
           </a:p>
@@ -10668,7 +10728,7 @@
           <p:cNvPr id="2" name="标题 1">
             <a:extLst>
               <a:ext uri="{FF2B5EF4-FFF2-40B4-BE49-F238E27FC236}">
-                <a16:creationId xmlns:a16="http://schemas.microsoft.com/office/drawing/2014/main" id="{56B54089-DDA3-0546-9A46-36594C1BDD08}"/>
+                <a16:creationId xmlns:a16="http://schemas.microsoft.com/office/drawing/2014/main" id="{C5C2788B-DB38-6142-8226-92CE9D0728A4}"/>
               </a:ext>
             </a:extLst>
           </p:cNvPr>
@@ -10686,7 +10746,23 @@
           <a:p>
             <a:r>
               <a:rPr kumimoji="1" lang="zh-CN" altLang="en-US" dirty="0"/>
-              <a:t>如何保证高可用</a:t>
+              <a:t>一个</a:t>
+            </a:r>
+            <a:r>
+              <a:rPr kumimoji="1" lang="en-US" altLang="zh-CN" dirty="0"/>
+              <a:t>JVM</a:t>
+            </a:r>
+            <a:r>
+              <a:rPr kumimoji="1" lang="zh-CN" altLang="en-US" dirty="0"/>
+              <a:t>进程是否可以启动多个</a:t>
+            </a:r>
+            <a:r>
+              <a:rPr kumimoji="1" lang="en-US" altLang="zh-CN" dirty="0"/>
+              <a:t>Producer</a:t>
+            </a:r>
+            <a:r>
+              <a:rPr kumimoji="1" lang="zh-CN" altLang="en-US" dirty="0"/>
+              <a:t>？</a:t>
             </a:r>
           </a:p>
         </p:txBody>
@@ -10696,7 +10772,7 @@
           <p:cNvPr id="3" name="内容占位符 2">
             <a:extLst>
               <a:ext uri="{FF2B5EF4-FFF2-40B4-BE49-F238E27FC236}">
-                <a16:creationId xmlns:a16="http://schemas.microsoft.com/office/drawing/2014/main" id="{C69D53C2-376F-C947-8A16-315A869CD2F9}"/>
+                <a16:creationId xmlns:a16="http://schemas.microsoft.com/office/drawing/2014/main" id="{48776989-19A6-2E4C-B84E-04404D23FEFD}"/>
               </a:ext>
             </a:extLst>
           </p:cNvPr>
@@ -10714,268 +10790,289 @@
           </a:bodyPr>
           <a:lstStyle/>
           <a:p>
+            <a:r>
+              <a:rPr kumimoji="1" lang="zh-CN" altLang="en-US" dirty="0"/>
+              <a:t>可以。</a:t>
+            </a:r>
+            <a:r>
+              <a:rPr kumimoji="1" lang="en-US" altLang="zh-CN" dirty="0"/>
+              <a:t>Producer</a:t>
+            </a:r>
+            <a:r>
+              <a:rPr kumimoji="1" lang="zh-CN" altLang="en-US" dirty="0"/>
+              <a:t>有</a:t>
+            </a:r>
+            <a:r>
+              <a:rPr kumimoji="1" lang="en-US" altLang="zh-CN" dirty="0"/>
+              <a:t>2</a:t>
+            </a:r>
+            <a:r>
+              <a:rPr kumimoji="1" lang="zh-CN" altLang="en-US" dirty="0"/>
+              <a:t>个参数</a:t>
+            </a:r>
+            <a:endParaRPr kumimoji="1" lang="en-US" altLang="zh-CN" dirty="0"/>
+          </a:p>
+          <a:p>
+            <a:r>
+              <a:rPr lang="en-US" altLang="zh-CN" dirty="0" err="1"/>
+              <a:t>instanceName</a:t>
+            </a:r>
+            <a:r>
+              <a:rPr lang="zh-CN" altLang="en-US" dirty="0"/>
+              <a:t>：实例名，默认为</a:t>
+            </a:r>
+            <a:r>
+              <a:rPr lang="en-US" altLang="zh-CN" dirty="0"/>
+              <a:t>DEFAULT</a:t>
+            </a:r>
+            <a:r>
+              <a:rPr lang="zh-CN" altLang="en-US" dirty="0"/>
+              <a:t>，启动时如果为默认值，则会被改写成</a:t>
+            </a:r>
+            <a:endParaRPr lang="en-US" altLang="zh-CN" dirty="0"/>
+          </a:p>
+          <a:p>
             <a:pPr marL="0" indent="0">
               <a:buNone/>
             </a:pPr>
-            <a:endParaRPr kumimoji="1" lang="en-US" altLang="zh-CN" dirty="0"/>
-          </a:p>
-          <a:p>
-            <a:r>
-              <a:rPr kumimoji="1" lang="zh-CN" altLang="en-US" dirty="0"/>
-              <a:t>通过</a:t>
-            </a:r>
-            <a:r>
-              <a:rPr kumimoji="1" lang="en-US" altLang="zh-CN" dirty="0"/>
-              <a:t>Master</a:t>
-            </a:r>
-            <a:r>
-              <a:rPr kumimoji="1" lang="zh-CN" altLang="en-US" dirty="0"/>
-              <a:t>和</a:t>
-            </a:r>
-            <a:r>
-              <a:rPr kumimoji="1" lang="en-US" altLang="zh-CN" dirty="0"/>
-              <a:t>slave</a:t>
-            </a:r>
-            <a:r>
-              <a:rPr kumimoji="1" lang="zh-CN" altLang="en-US" dirty="0"/>
-              <a:t>配合来实现。在</a:t>
-            </a:r>
-            <a:r>
-              <a:rPr kumimoji="1" lang="en-US" altLang="zh-CN" dirty="0"/>
-              <a:t>Broker </a:t>
-            </a:r>
-            <a:r>
-              <a:rPr kumimoji="1" lang="zh-CN" altLang="en-US" dirty="0"/>
-              <a:t>的配置文件中，参数</a:t>
-            </a:r>
-            <a:r>
-              <a:rPr kumimoji="1" lang="en-US" altLang="zh-CN" dirty="0" err="1"/>
-              <a:t>brokerId</a:t>
-            </a:r>
-            <a:r>
-              <a:rPr kumimoji="1" lang="zh-CN" altLang="en-US" dirty="0"/>
-              <a:t>的值为</a:t>
-            </a:r>
-            <a:r>
-              <a:rPr kumimoji="1" lang="en-US" altLang="zh-CN" dirty="0"/>
-              <a:t>0 </a:t>
-            </a:r>
-            <a:r>
-              <a:rPr kumimoji="1" lang="zh-CN" altLang="en-US" dirty="0"/>
-              <a:t>是</a:t>
-            </a:r>
-            <a:r>
-              <a:rPr kumimoji="1" lang="en-US" altLang="zh-CN" dirty="0"/>
-              <a:t>Master </a:t>
-            </a:r>
-            <a:r>
-              <a:rPr kumimoji="1" lang="zh-CN" altLang="en-US" dirty="0"/>
-              <a:t>，大于</a:t>
-            </a:r>
-            <a:r>
-              <a:rPr kumimoji="1" lang="en-US" altLang="zh-CN" dirty="0"/>
-              <a:t>0 </a:t>
-            </a:r>
-            <a:r>
-              <a:rPr kumimoji="1" lang="zh-CN" altLang="en-US" dirty="0"/>
-              <a:t>是</a:t>
-            </a:r>
-            <a:r>
-              <a:rPr kumimoji="1" lang="en-US" altLang="zh-CN" dirty="0"/>
-              <a:t>Slave </a:t>
-            </a:r>
-            <a:r>
-              <a:rPr kumimoji="1" lang="zh-CN" altLang="en-US" dirty="0"/>
-              <a:t>，同时</a:t>
-            </a:r>
-            <a:r>
-              <a:rPr kumimoji="1" lang="en-US" altLang="zh-CN" dirty="0"/>
-              <a:t>broker Role </a:t>
-            </a:r>
-            <a:r>
-              <a:rPr kumimoji="1" lang="zh-CN" altLang="en-US" dirty="0"/>
-              <a:t>参数也会说明这个</a:t>
-            </a:r>
-            <a:r>
-              <a:rPr kumimoji="1" lang="en-US" altLang="zh-CN" dirty="0"/>
-              <a:t>Broker </a:t>
-            </a:r>
-            <a:r>
-              <a:rPr kumimoji="1" lang="zh-CN" altLang="en-US" dirty="0"/>
-              <a:t>是</a:t>
-            </a:r>
-            <a:r>
-              <a:rPr kumimoji="1" lang="en-US" altLang="zh-CN" dirty="0"/>
-              <a:t>Master </a:t>
-            </a:r>
-            <a:r>
-              <a:rPr kumimoji="1" lang="zh-CN" altLang="en-US" dirty="0"/>
-              <a:t>还是</a:t>
-            </a:r>
-            <a:r>
-              <a:rPr kumimoji="1" lang="en-US" altLang="zh-CN" dirty="0"/>
-              <a:t>Slave</a:t>
-            </a:r>
-            <a:r>
-              <a:rPr kumimoji="1" lang="zh-CN" altLang="en-US" dirty="0"/>
+            <a:r>
+              <a:rPr lang="en-US" altLang="zh-CN" dirty="0"/>
+              <a:t>	PID</a:t>
+            </a:r>
+            <a:r>
+              <a:rPr lang="zh-CN" altLang="en-US" dirty="0"/>
+              <a:t>。这里有个概念，</a:t>
+            </a:r>
+            <a:r>
+              <a:rPr lang="en-US" altLang="zh-CN" dirty="0" err="1"/>
+              <a:t>MQClientInstance</a:t>
+            </a:r>
+            <a:r>
+              <a:rPr lang="zh-CN" altLang="en-US" dirty="0"/>
+              <a:t>，封装了和</a:t>
+            </a:r>
+            <a:r>
+              <a:rPr lang="en-US" altLang="zh-CN" dirty="0" err="1"/>
+              <a:t>Netty</a:t>
+            </a:r>
+            <a:r>
+              <a:rPr lang="zh-CN" altLang="en-US" dirty="0"/>
+              <a:t>通信相关的功能，代表</a:t>
+            </a:r>
+            <a:r>
+              <a:rPr lang="en-US" altLang="zh-CN" dirty="0"/>
+              <a:t>		</a:t>
+            </a:r>
+            <a:r>
+              <a:rPr lang="zh-CN" altLang="en-US" dirty="0"/>
+              <a:t>和一个</a:t>
+            </a:r>
+            <a:r>
+              <a:rPr lang="en-US" altLang="zh-CN" dirty="0" err="1"/>
+              <a:t>RocketMQ</a:t>
+            </a:r>
+            <a:r>
+              <a:rPr lang="zh-CN" altLang="en-US" dirty="0"/>
+              <a:t>集群的通信。在一个</a:t>
+            </a:r>
+            <a:r>
+              <a:rPr lang="en-US" altLang="zh-CN" dirty="0"/>
+              <a:t>JVM</a:t>
+            </a:r>
+            <a:r>
+              <a:rPr lang="zh-CN" altLang="en-US" dirty="0"/>
+              <a:t>进程中，可以有多</a:t>
+            </a:r>
+            <a:r>
+              <a:rPr lang="en-US" altLang="zh-CN" dirty="0" err="1"/>
+              <a:t>MQClientInstance</a:t>
+            </a:r>
+            <a:r>
+              <a:rPr lang="zh-CN" altLang="en-US" dirty="0"/>
+              <a:t>，</a:t>
+            </a:r>
+            <a:r>
+              <a:rPr lang="en-US" altLang="zh-CN" dirty="0"/>
+              <a:t> 	</a:t>
+            </a:r>
+            <a:r>
+              <a:rPr lang="en-US" altLang="zh-CN" dirty="0" err="1"/>
+              <a:t>clientId</a:t>
+            </a:r>
+            <a:r>
+              <a:rPr lang="zh-CN" altLang="en-US" dirty="0"/>
+              <a:t>为</a:t>
+            </a:r>
+            <a:r>
+              <a:rPr lang="en-US" altLang="zh-CN" dirty="0"/>
+              <a:t>IP+ </a:t>
+            </a:r>
+            <a:r>
+              <a:rPr lang="en-US" altLang="zh-CN" dirty="0" err="1"/>
+              <a:t>instanceName</a:t>
+            </a:r>
+            <a:r>
+              <a:rPr lang="en-US" altLang="zh-CN" dirty="0"/>
+              <a:t>	</a:t>
+            </a:r>
+            <a:r>
+              <a:rPr lang="zh-CN" altLang="en-US" dirty="0"/>
+              <a:t>的形式。也就是说，相同实例名的</a:t>
+            </a:r>
+            <a:r>
+              <a:rPr lang="en-US" altLang="zh-CN" dirty="0"/>
+              <a:t>	</a:t>
+            </a:r>
+            <a:r>
+              <a:rPr lang="en-US" altLang="zh-CN" dirty="0" err="1"/>
+              <a:t>MQClientInstance</a:t>
+            </a:r>
+            <a:r>
+              <a:rPr lang="zh-CN" altLang="en-US" dirty="0"/>
+              <a:t>可以复用。</a:t>
+            </a:r>
+            <a:endParaRPr lang="en-US" altLang="zh-CN" dirty="0"/>
+          </a:p>
+          <a:p>
+            <a:r>
+              <a:rPr lang="en-US" altLang="zh-CN" dirty="0" err="1"/>
+              <a:t>producerGroup</a:t>
+            </a:r>
+            <a:r>
+              <a:rPr lang="en-US" altLang="zh-CN" dirty="0"/>
+              <a:t>: </a:t>
+            </a:r>
+            <a:r>
+              <a:rPr lang="zh-CN" altLang="en-US" dirty="0"/>
+              <a:t>生产者组，只有在事务消息的状态回查中有用。一个</a:t>
+            </a:r>
+            <a:r>
+              <a:rPr lang="en-US" altLang="zh-CN" dirty="0"/>
+              <a:t>	</a:t>
+            </a:r>
+            <a:r>
+              <a:rPr lang="en-US" altLang="zh-CN" dirty="0" err="1"/>
+              <a:t>MQClientInstance</a:t>
+            </a:r>
+            <a:r>
+              <a:rPr lang="zh-CN" altLang="en-US" dirty="0"/>
+              <a:t>中，每个</a:t>
+            </a:r>
+            <a:r>
+              <a:rPr lang="en-US" altLang="zh-CN" dirty="0" err="1"/>
+              <a:t>producerGroup</a:t>
+            </a:r>
+            <a:r>
+              <a:rPr lang="zh-CN" altLang="en-US" dirty="0"/>
+              <a:t>只能注册一个</a:t>
+            </a:r>
+            <a:r>
+              <a:rPr lang="en-US" altLang="zh-CN" dirty="0"/>
+              <a:t>Producer</a:t>
+            </a:r>
+            <a:r>
+              <a:rPr lang="zh-CN" altLang="en-US" dirty="0"/>
               <a:t>。</a:t>
             </a:r>
-            <a:endParaRPr kumimoji="1" lang="en-US" altLang="zh-CN"/>
-          </a:p>
-          <a:p>
-            <a:r>
-              <a:rPr kumimoji="1" lang="en-US" altLang="zh-CN"/>
-              <a:t>Master</a:t>
-            </a:r>
-            <a:r>
-              <a:rPr kumimoji="1" lang="zh-CN" altLang="en-US" dirty="0"/>
-              <a:t>支持读写，</a:t>
-            </a:r>
-            <a:r>
-              <a:rPr kumimoji="1" lang="en-US" altLang="zh-CN" dirty="0"/>
-              <a:t>Slave</a:t>
-            </a:r>
-            <a:r>
-              <a:rPr kumimoji="1" lang="zh-CN" altLang="en-US" dirty="0"/>
-              <a:t>只支持读。如果</a:t>
-            </a:r>
-            <a:r>
-              <a:rPr kumimoji="1" lang="en-US" altLang="zh-CN" dirty="0"/>
-              <a:t>Master</a:t>
-            </a:r>
-            <a:r>
-              <a:rPr kumimoji="1" lang="zh-CN" altLang="en-US" dirty="0"/>
-              <a:t>不可用或者繁忙时，</a:t>
-            </a:r>
-            <a:r>
-              <a:rPr kumimoji="1" lang="en-US" altLang="zh-CN" dirty="0"/>
-              <a:t>Consumer</a:t>
-            </a:r>
-            <a:r>
-              <a:rPr kumimoji="1" lang="zh-CN" altLang="en-US" dirty="0"/>
-              <a:t>会自动切换到</a:t>
-            </a:r>
-            <a:r>
-              <a:rPr kumimoji="1" lang="en-US" altLang="zh-CN" dirty="0"/>
-              <a:t>Broker</a:t>
-            </a:r>
-            <a:r>
-              <a:rPr kumimoji="1" lang="zh-CN" altLang="en-US" dirty="0"/>
-              <a:t>进行消费。</a:t>
-            </a:r>
-            <a:endParaRPr kumimoji="1" lang="en-US" altLang="zh-CN" dirty="0"/>
-          </a:p>
-          <a:p>
-            <a:r>
-              <a:rPr kumimoji="1" lang="en-US" altLang="zh-CN" dirty="0"/>
-              <a:t>4.5.0</a:t>
-            </a:r>
-            <a:r>
-              <a:rPr kumimoji="1" lang="zh-CN" altLang="en-US" dirty="0"/>
-              <a:t>版本前，不支持</a:t>
-            </a:r>
-            <a:r>
-              <a:rPr kumimoji="1" lang="en-US" altLang="zh-CN" dirty="0"/>
-              <a:t>Slave</a:t>
-            </a:r>
-            <a:r>
-              <a:rPr kumimoji="1" lang="zh-CN" altLang="en-US" dirty="0"/>
-              <a:t>自动转换成</a:t>
-            </a:r>
-            <a:r>
-              <a:rPr kumimoji="1" lang="en-US" altLang="zh-CN" dirty="0"/>
-              <a:t>Master</a:t>
-            </a:r>
-            <a:r>
-              <a:rPr kumimoji="1" lang="zh-CN" altLang="en-US" dirty="0"/>
+            <a:endParaRPr lang="en-US" altLang="zh-CN" dirty="0"/>
+          </a:p>
+          <a:p>
+            <a:pPr marL="0" indent="0">
+              <a:buNone/>
+            </a:pPr>
+            <a:r>
+              <a:rPr lang="en-US" altLang="zh-CN" dirty="0"/>
+              <a:t>	</a:t>
+            </a:r>
+            <a:r>
+              <a:rPr lang="zh-CN" altLang="en-US" dirty="0"/>
+              <a:t>所以启动多个属于同一</a:t>
+            </a:r>
+            <a:r>
+              <a:rPr lang="en-US" altLang="zh-CN" dirty="0" err="1"/>
+              <a:t>producerGroup</a:t>
+            </a:r>
+            <a:r>
+              <a:rPr lang="zh-CN" altLang="en-US" dirty="0"/>
+              <a:t>的</a:t>
+            </a:r>
+            <a:r>
+              <a:rPr lang="en-US" altLang="zh-CN" dirty="0"/>
+              <a:t>producer</a:t>
+            </a:r>
+            <a:r>
+              <a:rPr lang="zh-CN" altLang="en-US" dirty="0"/>
+              <a:t>会失败。</a:t>
+            </a:r>
+            <a:r>
+              <a:rPr lang="en-US" altLang="zh-CN" dirty="0"/>
+              <a:t>	</a:t>
+            </a:r>
+          </a:p>
+          <a:p>
+            <a:pPr marL="0" indent="0">
+              <a:buNone/>
+            </a:pPr>
+            <a:r>
+              <a:rPr lang="zh-CN" altLang="en-US" dirty="0"/>
+              <a:t> 因此，如果一个</a:t>
+            </a:r>
+            <a:r>
+              <a:rPr lang="en-US" altLang="zh-CN" dirty="0"/>
+              <a:t>JVM</a:t>
+            </a:r>
+            <a:r>
+              <a:rPr lang="zh-CN" altLang="en-US" dirty="0"/>
+              <a:t>进程需要和多个</a:t>
+            </a:r>
+            <a:r>
+              <a:rPr lang="en-US" altLang="zh-CN" dirty="0" err="1"/>
+              <a:t>RocketMQ</a:t>
+            </a:r>
+            <a:r>
+              <a:rPr lang="zh-CN" altLang="en-US" dirty="0"/>
+              <a:t>集群通信，可以启动多个</a:t>
+            </a:r>
+            <a:r>
+              <a:rPr lang="en-US" altLang="zh-CN" dirty="0" err="1"/>
+              <a:t>instanceName</a:t>
+            </a:r>
+            <a:r>
+              <a:rPr lang="zh-CN" altLang="en-US" dirty="0"/>
+              <a:t>不同的</a:t>
+            </a:r>
+            <a:r>
+              <a:rPr lang="en-US" altLang="zh-CN" dirty="0"/>
+              <a:t>Producer</a:t>
+            </a:r>
+            <a:r>
+              <a:rPr lang="zh-CN" altLang="en-US" dirty="0"/>
+              <a:t>。但是一个</a:t>
+            </a:r>
+            <a:r>
+              <a:rPr lang="en-US" altLang="zh-CN" dirty="0" err="1"/>
+              <a:t>producerGroup</a:t>
+            </a:r>
+            <a:r>
+              <a:rPr lang="zh-CN" altLang="en-US" dirty="0"/>
+              <a:t>只需要一个</a:t>
+            </a:r>
+            <a:r>
+              <a:rPr lang="en-US" altLang="zh-CN" dirty="0"/>
+              <a:t>Producer</a:t>
+            </a:r>
+            <a:r>
+              <a:rPr lang="zh-CN" altLang="en-US" dirty="0"/>
               <a:t>。</a:t>
             </a:r>
-            <a:endParaRPr kumimoji="1" lang="en-US" altLang="zh-CN" dirty="0"/>
-          </a:p>
-          <a:p>
-            <a:r>
-              <a:rPr kumimoji="1" lang="en-US" altLang="zh-CN" dirty="0"/>
-              <a:t>4.5.0</a:t>
-            </a:r>
-            <a:r>
-              <a:rPr kumimoji="1" lang="zh-CN" altLang="en-US" dirty="0"/>
-              <a:t>版本引入了 </a:t>
-            </a:r>
-            <a:r>
-              <a:rPr kumimoji="1" lang="en-US" altLang="zh-CN" dirty="0" err="1"/>
-              <a:t>Dledger</a:t>
-            </a:r>
-            <a:r>
-              <a:rPr kumimoji="1" lang="en-US" altLang="zh-CN" dirty="0"/>
-              <a:t> </a:t>
-            </a:r>
-            <a:r>
-              <a:rPr kumimoji="1" lang="zh-CN" altLang="en-US" dirty="0"/>
-              <a:t>的多副本技术。 是指一组相同名称的 </a:t>
-            </a:r>
-            <a:r>
-              <a:rPr kumimoji="1" lang="en-US" altLang="zh-CN" dirty="0"/>
-              <a:t>Broker</a:t>
-            </a:r>
-            <a:r>
-              <a:rPr kumimoji="1" lang="zh-CN" altLang="en-US" dirty="0"/>
-              <a:t>，至少需要 </a:t>
-            </a:r>
-            <a:r>
-              <a:rPr kumimoji="1" lang="en-US" altLang="zh-CN" dirty="0"/>
-              <a:t>3 </a:t>
-            </a:r>
-            <a:r>
-              <a:rPr kumimoji="1" lang="zh-CN" altLang="en-US" dirty="0"/>
-              <a:t>个节点，通过 </a:t>
-            </a:r>
-            <a:r>
-              <a:rPr kumimoji="1" lang="en-US" altLang="zh-CN" dirty="0"/>
-              <a:t>Raft </a:t>
-            </a:r>
-            <a:r>
-              <a:rPr kumimoji="1" lang="zh-CN" altLang="en-US" dirty="0"/>
-              <a:t>自动选举出一个 </a:t>
-            </a:r>
-            <a:r>
-              <a:rPr kumimoji="1" lang="en-US" altLang="zh-CN" dirty="0"/>
-              <a:t>Leader</a:t>
-            </a:r>
-            <a:r>
-              <a:rPr kumimoji="1" lang="zh-CN" altLang="en-US" dirty="0"/>
-              <a:t>，其余节点 作为 </a:t>
-            </a:r>
-            <a:r>
-              <a:rPr kumimoji="1" lang="en-US" altLang="zh-CN" dirty="0"/>
-              <a:t>Follower</a:t>
-            </a:r>
-            <a:r>
-              <a:rPr kumimoji="1" lang="zh-CN" altLang="en-US" dirty="0"/>
-              <a:t>，并在 </a:t>
-            </a:r>
-            <a:r>
-              <a:rPr kumimoji="1" lang="en-US" altLang="zh-CN" dirty="0"/>
-              <a:t>Leader </a:t>
-            </a:r>
-            <a:r>
-              <a:rPr kumimoji="1" lang="zh-CN" altLang="en-US" dirty="0"/>
-              <a:t>和 </a:t>
-            </a:r>
-            <a:r>
-              <a:rPr kumimoji="1" lang="en-US" altLang="zh-CN" dirty="0"/>
-              <a:t>Follower </a:t>
-            </a:r>
-            <a:r>
-              <a:rPr kumimoji="1" lang="zh-CN" altLang="en-US" dirty="0"/>
-              <a:t>之间复制数据以保证高可用。（此功能默认关闭，需要在配置文件中启用）</a:t>
-            </a:r>
+            <a:endParaRPr lang="en-US" altLang="zh-CN" dirty="0"/>
           </a:p>
         </p:txBody>
       </p:sp>
     </p:spTree>
     <p:extLst>
       <p:ext uri="{BB962C8B-B14F-4D97-AF65-F5344CB8AC3E}">
-        <p14:creationId xmlns:p14="http://schemas.microsoft.com/office/powerpoint/2010/main" val="1961592500"/>
+        <p14:creationId xmlns:p14="http://schemas.microsoft.com/office/powerpoint/2010/main" val="629307628"/>
       </p:ext>
     </p:extLst>
   </p:cSld>
@@ -11007,6 +11104,345 @@
           <p:cNvPr id="2" name="标题 1">
             <a:extLst>
               <a:ext uri="{FF2B5EF4-FFF2-40B4-BE49-F238E27FC236}">
+                <a16:creationId xmlns:a16="http://schemas.microsoft.com/office/drawing/2014/main" id="{56B54089-DDA3-0546-9A46-36594C1BDD08}"/>
+              </a:ext>
+            </a:extLst>
+          </p:cNvPr>
+          <p:cNvSpPr>
+            <a:spLocks noGrp="1"/>
+          </p:cNvSpPr>
+          <p:nvPr>
+            <p:ph type="title"/>
+          </p:nvPr>
+        </p:nvSpPr>
+        <p:spPr/>
+        <p:txBody>
+          <a:bodyPr/>
+          <a:lstStyle/>
+          <a:p>
+            <a:r>
+              <a:rPr kumimoji="1" lang="zh-CN" altLang="en-US" dirty="0"/>
+              <a:t>如何保证高可用</a:t>
+            </a:r>
+          </a:p>
+        </p:txBody>
+      </p:sp>
+      <p:sp>
+        <p:nvSpPr>
+          <p:cNvPr id="3" name="内容占位符 2">
+            <a:extLst>
+              <a:ext uri="{FF2B5EF4-FFF2-40B4-BE49-F238E27FC236}">
+                <a16:creationId xmlns:a16="http://schemas.microsoft.com/office/drawing/2014/main" id="{C69D53C2-376F-C947-8A16-315A869CD2F9}"/>
+              </a:ext>
+            </a:extLst>
+          </p:cNvPr>
+          <p:cNvSpPr>
+            <a:spLocks noGrp="1"/>
+          </p:cNvSpPr>
+          <p:nvPr>
+            <p:ph idx="1"/>
+          </p:nvPr>
+        </p:nvSpPr>
+        <p:spPr/>
+        <p:txBody>
+          <a:bodyPr>
+            <a:normAutofit/>
+          </a:bodyPr>
+          <a:lstStyle/>
+          <a:p>
+            <a:pPr marL="0" indent="0">
+              <a:buNone/>
+            </a:pPr>
+            <a:endParaRPr kumimoji="1" lang="en-US" altLang="zh-CN" dirty="0"/>
+          </a:p>
+          <a:p>
+            <a:r>
+              <a:rPr kumimoji="1" lang="zh-CN" altLang="en-US" dirty="0"/>
+              <a:t>通过</a:t>
+            </a:r>
+            <a:r>
+              <a:rPr kumimoji="1" lang="en-US" altLang="zh-CN" dirty="0"/>
+              <a:t>Master</a:t>
+            </a:r>
+            <a:r>
+              <a:rPr kumimoji="1" lang="zh-CN" altLang="en-US" dirty="0"/>
+              <a:t>和</a:t>
+            </a:r>
+            <a:r>
+              <a:rPr kumimoji="1" lang="en-US" altLang="zh-CN" dirty="0"/>
+              <a:t>slave</a:t>
+            </a:r>
+            <a:r>
+              <a:rPr kumimoji="1" lang="zh-CN" altLang="en-US" dirty="0"/>
+              <a:t>配合来实现。在</a:t>
+            </a:r>
+            <a:r>
+              <a:rPr kumimoji="1" lang="en-US" altLang="zh-CN" dirty="0"/>
+              <a:t>Broker </a:t>
+            </a:r>
+            <a:r>
+              <a:rPr kumimoji="1" lang="zh-CN" altLang="en-US" dirty="0"/>
+              <a:t>的配置文件中，参数</a:t>
+            </a:r>
+            <a:r>
+              <a:rPr kumimoji="1" lang="en-US" altLang="zh-CN" dirty="0" err="1"/>
+              <a:t>brokerId</a:t>
+            </a:r>
+            <a:r>
+              <a:rPr kumimoji="1" lang="zh-CN" altLang="en-US" dirty="0"/>
+              <a:t>的值为</a:t>
+            </a:r>
+            <a:r>
+              <a:rPr kumimoji="1" lang="en-US" altLang="zh-CN" dirty="0"/>
+              <a:t>0 </a:t>
+            </a:r>
+            <a:r>
+              <a:rPr kumimoji="1" lang="zh-CN" altLang="en-US" dirty="0"/>
+              <a:t>是</a:t>
+            </a:r>
+            <a:r>
+              <a:rPr kumimoji="1" lang="en-US" altLang="zh-CN" dirty="0"/>
+              <a:t>Master </a:t>
+            </a:r>
+            <a:r>
+              <a:rPr kumimoji="1" lang="zh-CN" altLang="en-US" dirty="0"/>
+              <a:t>，大于</a:t>
+            </a:r>
+            <a:r>
+              <a:rPr kumimoji="1" lang="en-US" altLang="zh-CN" dirty="0"/>
+              <a:t>0 </a:t>
+            </a:r>
+            <a:r>
+              <a:rPr kumimoji="1" lang="zh-CN" altLang="en-US" dirty="0"/>
+              <a:t>是</a:t>
+            </a:r>
+            <a:r>
+              <a:rPr kumimoji="1" lang="en-US" altLang="zh-CN" dirty="0"/>
+              <a:t>Slave </a:t>
+            </a:r>
+            <a:r>
+              <a:rPr kumimoji="1" lang="zh-CN" altLang="en-US" dirty="0"/>
+              <a:t>，同时</a:t>
+            </a:r>
+            <a:r>
+              <a:rPr kumimoji="1" lang="en-US" altLang="zh-CN" dirty="0"/>
+              <a:t>broker Role </a:t>
+            </a:r>
+            <a:r>
+              <a:rPr kumimoji="1" lang="zh-CN" altLang="en-US" dirty="0"/>
+              <a:t>参数也会说明这个</a:t>
+            </a:r>
+            <a:r>
+              <a:rPr kumimoji="1" lang="en-US" altLang="zh-CN" dirty="0"/>
+              <a:t>Broker </a:t>
+            </a:r>
+            <a:r>
+              <a:rPr kumimoji="1" lang="zh-CN" altLang="en-US" dirty="0"/>
+              <a:t>是</a:t>
+            </a:r>
+            <a:r>
+              <a:rPr kumimoji="1" lang="en-US" altLang="zh-CN" dirty="0"/>
+              <a:t>Master </a:t>
+            </a:r>
+            <a:r>
+              <a:rPr kumimoji="1" lang="zh-CN" altLang="en-US" dirty="0"/>
+              <a:t>还是</a:t>
+            </a:r>
+            <a:r>
+              <a:rPr kumimoji="1" lang="en-US" altLang="zh-CN" dirty="0"/>
+              <a:t>Slave</a:t>
+            </a:r>
+            <a:r>
+              <a:rPr kumimoji="1" lang="zh-CN" altLang="en-US" dirty="0"/>
+              <a:t>。</a:t>
+            </a:r>
+            <a:endParaRPr kumimoji="1" lang="en-US" altLang="zh-CN"/>
+          </a:p>
+          <a:p>
+            <a:r>
+              <a:rPr kumimoji="1" lang="en-US" altLang="zh-CN"/>
+              <a:t>Master</a:t>
+            </a:r>
+            <a:r>
+              <a:rPr kumimoji="1" lang="zh-CN" altLang="en-US" dirty="0"/>
+              <a:t>支持读写，</a:t>
+            </a:r>
+            <a:r>
+              <a:rPr kumimoji="1" lang="en-US" altLang="zh-CN" dirty="0"/>
+              <a:t>Slave</a:t>
+            </a:r>
+            <a:r>
+              <a:rPr kumimoji="1" lang="zh-CN" altLang="en-US" dirty="0"/>
+              <a:t>只支持读。如果</a:t>
+            </a:r>
+            <a:r>
+              <a:rPr kumimoji="1" lang="en-US" altLang="zh-CN" dirty="0"/>
+              <a:t>Master</a:t>
+            </a:r>
+            <a:r>
+              <a:rPr kumimoji="1" lang="zh-CN" altLang="en-US" dirty="0"/>
+              <a:t>不可用或者繁忙时，</a:t>
+            </a:r>
+            <a:r>
+              <a:rPr kumimoji="1" lang="en-US" altLang="zh-CN" dirty="0"/>
+              <a:t>Consumer</a:t>
+            </a:r>
+            <a:r>
+              <a:rPr kumimoji="1" lang="zh-CN" altLang="en-US" dirty="0"/>
+              <a:t>会自动切换到</a:t>
+            </a:r>
+            <a:r>
+              <a:rPr kumimoji="1" lang="en-US" altLang="zh-CN" dirty="0"/>
+              <a:t>Broker</a:t>
+            </a:r>
+            <a:r>
+              <a:rPr kumimoji="1" lang="zh-CN" altLang="en-US" dirty="0"/>
+              <a:t>进行消费。</a:t>
+            </a:r>
+            <a:endParaRPr kumimoji="1" lang="en-US" altLang="zh-CN" dirty="0"/>
+          </a:p>
+          <a:p>
+            <a:r>
+              <a:rPr kumimoji="1" lang="en-US" altLang="zh-CN" dirty="0"/>
+              <a:t>4.5.0</a:t>
+            </a:r>
+            <a:r>
+              <a:rPr kumimoji="1" lang="zh-CN" altLang="en-US" dirty="0"/>
+              <a:t>版本前，不支持</a:t>
+            </a:r>
+            <a:r>
+              <a:rPr kumimoji="1" lang="en-US" altLang="zh-CN" dirty="0"/>
+              <a:t>Slave</a:t>
+            </a:r>
+            <a:r>
+              <a:rPr kumimoji="1" lang="zh-CN" altLang="en-US" dirty="0"/>
+              <a:t>自动转换成</a:t>
+            </a:r>
+            <a:r>
+              <a:rPr kumimoji="1" lang="en-US" altLang="zh-CN" dirty="0"/>
+              <a:t>Master</a:t>
+            </a:r>
+            <a:r>
+              <a:rPr kumimoji="1" lang="zh-CN" altLang="en-US" dirty="0"/>
+              <a:t>。</a:t>
+            </a:r>
+            <a:endParaRPr kumimoji="1" lang="en-US" altLang="zh-CN" dirty="0"/>
+          </a:p>
+          <a:p>
+            <a:r>
+              <a:rPr kumimoji="1" lang="en-US" altLang="zh-CN" dirty="0"/>
+              <a:t>4.5.0</a:t>
+            </a:r>
+            <a:r>
+              <a:rPr kumimoji="1" lang="zh-CN" altLang="en-US" dirty="0"/>
+              <a:t>版本引入了 </a:t>
+            </a:r>
+            <a:r>
+              <a:rPr kumimoji="1" lang="en-US" altLang="zh-CN" dirty="0" err="1"/>
+              <a:t>Dledger</a:t>
+            </a:r>
+            <a:r>
+              <a:rPr kumimoji="1" lang="en-US" altLang="zh-CN" dirty="0"/>
+              <a:t> </a:t>
+            </a:r>
+            <a:r>
+              <a:rPr kumimoji="1" lang="zh-CN" altLang="en-US" dirty="0"/>
+              <a:t>的多副本技术。 是指一组相同名称的 </a:t>
+            </a:r>
+            <a:r>
+              <a:rPr kumimoji="1" lang="en-US" altLang="zh-CN" dirty="0"/>
+              <a:t>Broker</a:t>
+            </a:r>
+            <a:r>
+              <a:rPr kumimoji="1" lang="zh-CN" altLang="en-US" dirty="0"/>
+              <a:t>，至少需要 </a:t>
+            </a:r>
+            <a:r>
+              <a:rPr kumimoji="1" lang="en-US" altLang="zh-CN" dirty="0"/>
+              <a:t>3 </a:t>
+            </a:r>
+            <a:r>
+              <a:rPr kumimoji="1" lang="zh-CN" altLang="en-US" dirty="0"/>
+              <a:t>个节点，通过 </a:t>
+            </a:r>
+            <a:r>
+              <a:rPr kumimoji="1" lang="en-US" altLang="zh-CN" dirty="0"/>
+              <a:t>Raft </a:t>
+            </a:r>
+            <a:r>
+              <a:rPr kumimoji="1" lang="zh-CN" altLang="en-US" dirty="0"/>
+              <a:t>自动选举出一个 </a:t>
+            </a:r>
+            <a:r>
+              <a:rPr kumimoji="1" lang="en-US" altLang="zh-CN" dirty="0"/>
+              <a:t>Leader</a:t>
+            </a:r>
+            <a:r>
+              <a:rPr kumimoji="1" lang="zh-CN" altLang="en-US" dirty="0"/>
+              <a:t>，其余节点 作为 </a:t>
+            </a:r>
+            <a:r>
+              <a:rPr kumimoji="1" lang="en-US" altLang="zh-CN" dirty="0"/>
+              <a:t>Follower</a:t>
+            </a:r>
+            <a:r>
+              <a:rPr kumimoji="1" lang="zh-CN" altLang="en-US" dirty="0"/>
+              <a:t>，并在 </a:t>
+            </a:r>
+            <a:r>
+              <a:rPr kumimoji="1" lang="en-US" altLang="zh-CN" dirty="0"/>
+              <a:t>Leader </a:t>
+            </a:r>
+            <a:r>
+              <a:rPr kumimoji="1" lang="zh-CN" altLang="en-US" dirty="0"/>
+              <a:t>和 </a:t>
+            </a:r>
+            <a:r>
+              <a:rPr kumimoji="1" lang="en-US" altLang="zh-CN" dirty="0"/>
+              <a:t>Follower </a:t>
+            </a:r>
+            <a:r>
+              <a:rPr kumimoji="1" lang="zh-CN" altLang="en-US" dirty="0"/>
+              <a:t>之间复制数据以保证高可用。（此功能默认关闭，需要在配置文件中启用）</a:t>
+            </a:r>
+          </a:p>
+        </p:txBody>
+      </p:sp>
+    </p:spTree>
+    <p:extLst>
+      <p:ext uri="{BB962C8B-B14F-4D97-AF65-F5344CB8AC3E}">
+        <p14:creationId xmlns:p14="http://schemas.microsoft.com/office/powerpoint/2010/main" val="1961592500"/>
+      </p:ext>
+    </p:extLst>
+  </p:cSld>
+  <p:clrMapOvr>
+    <a:masterClrMapping/>
+  </p:clrMapOvr>
+</p:sld>
+</file>
+
+<file path=ppt/slides/slide24.xml><?xml version="1.0" encoding="utf-8"?>
+<p:sld xmlns:a="http://schemas.openxmlformats.org/drawingml/2006/main" xmlns:r="http://schemas.openxmlformats.org/officeDocument/2006/relationships" xmlns:p="http://schemas.openxmlformats.org/presentationml/2006/main">
+  <p:cSld>
+    <p:spTree>
+      <p:nvGrpSpPr>
+        <p:cNvPr id="1" name=""/>
+        <p:cNvGrpSpPr/>
+        <p:nvPr/>
+      </p:nvGrpSpPr>
+      <p:grpSpPr>
+        <a:xfrm>
+          <a:off x="0" y="0"/>
+          <a:ext cx="0" cy="0"/>
+          <a:chOff x="0" y="0"/>
+          <a:chExt cx="0" cy="0"/>
+        </a:xfrm>
+      </p:grpSpPr>
+      <p:sp>
+        <p:nvSpPr>
+          <p:cNvPr id="2" name="标题 1">
+            <a:extLst>
+              <a:ext uri="{FF2B5EF4-FFF2-40B4-BE49-F238E27FC236}">
                 <a16:creationId xmlns:a16="http://schemas.microsoft.com/office/drawing/2014/main" id="{13EC6E4E-9A46-DC4A-B9F2-FE4720A7C149}"/>
               </a:ext>
             </a:extLst>
@@ -11157,7 +11593,7 @@
 </p:sld>
 </file>
 
-<file path=ppt/slides/slide24.xml><?xml version="1.0" encoding="utf-8"?>
+<file path=ppt/slides/slide25.xml><?xml version="1.0" encoding="utf-8"?>
 <p:sld xmlns:a="http://schemas.openxmlformats.org/drawingml/2006/main" xmlns:r="http://schemas.openxmlformats.org/officeDocument/2006/relationships" xmlns:p="http://schemas.openxmlformats.org/presentationml/2006/main">
   <p:cSld>
     <p:spTree>
@@ -11473,108 +11909,6 @@
 </p:sld>
 </file>
 
-<file path=ppt/slides/slide25.xml><?xml version="1.0" encoding="utf-8"?>
-<p:sld xmlns:a="http://schemas.openxmlformats.org/drawingml/2006/main" xmlns:r="http://schemas.openxmlformats.org/officeDocument/2006/relationships" xmlns:p="http://schemas.openxmlformats.org/presentationml/2006/main">
-  <p:cSld>
-    <p:spTree>
-      <p:nvGrpSpPr>
-        <p:cNvPr id="1" name=""/>
-        <p:cNvGrpSpPr/>
-        <p:nvPr/>
-      </p:nvGrpSpPr>
-      <p:grpSpPr>
-        <a:xfrm>
-          <a:off x="0" y="0"/>
-          <a:ext cx="0" cy="0"/>
-          <a:chOff x="0" y="0"/>
-          <a:chExt cx="0" cy="0"/>
-        </a:xfrm>
-      </p:grpSpPr>
-      <p:sp>
-        <p:nvSpPr>
-          <p:cNvPr id="2" name="标题 1">
-            <a:extLst>
-              <a:ext uri="{FF2B5EF4-FFF2-40B4-BE49-F238E27FC236}">
-                <a16:creationId xmlns:a16="http://schemas.microsoft.com/office/drawing/2014/main" id="{C8EB042B-53C7-134F-B631-E706405B5E7C}"/>
-              </a:ext>
-            </a:extLst>
-          </p:cNvPr>
-          <p:cNvSpPr>
-            <a:spLocks noGrp="1"/>
-          </p:cNvSpPr>
-          <p:nvPr>
-            <p:ph type="title"/>
-          </p:nvPr>
-        </p:nvSpPr>
-        <p:spPr/>
-        <p:txBody>
-          <a:bodyPr/>
-          <a:lstStyle/>
-          <a:p>
-            <a:r>
-              <a:rPr kumimoji="1" lang="zh-CN" altLang="en-US" dirty="0"/>
-              <a:t>如果同一个消费者组的</a:t>
-            </a:r>
-            <a:r>
-              <a:rPr kumimoji="1" lang="en-US" altLang="zh-CN" dirty="0"/>
-              <a:t>Consumer</a:t>
-            </a:r>
-            <a:r>
-              <a:rPr kumimoji="1" lang="zh-CN" altLang="en-US" dirty="0"/>
-              <a:t>订阅了不同的</a:t>
-            </a:r>
-            <a:r>
-              <a:rPr kumimoji="1" lang="en-US" altLang="zh-CN" dirty="0"/>
-              <a:t>Topic</a:t>
-            </a:r>
-            <a:r>
-              <a:rPr kumimoji="1" lang="zh-CN" altLang="en-US" dirty="0"/>
-              <a:t>会怎么样？</a:t>
-            </a:r>
-          </a:p>
-        </p:txBody>
-      </p:sp>
-      <p:sp>
-        <p:nvSpPr>
-          <p:cNvPr id="3" name="内容占位符 2">
-            <a:extLst>
-              <a:ext uri="{FF2B5EF4-FFF2-40B4-BE49-F238E27FC236}">
-                <a16:creationId xmlns:a16="http://schemas.microsoft.com/office/drawing/2014/main" id="{84841515-8274-AF4C-AAC2-F331F93B097B}"/>
-              </a:ext>
-            </a:extLst>
-          </p:cNvPr>
-          <p:cNvSpPr>
-            <a:spLocks noGrp="1"/>
-          </p:cNvSpPr>
-          <p:nvPr>
-            <p:ph idx="1"/>
-          </p:nvPr>
-        </p:nvSpPr>
-        <p:spPr/>
-        <p:txBody>
-          <a:bodyPr/>
-          <a:lstStyle/>
-          <a:p>
-            <a:pPr marL="0" indent="0">
-              <a:buNone/>
-            </a:pPr>
-            <a:endParaRPr kumimoji="1" lang="zh-CN" altLang="en-US" dirty="0"/>
-          </a:p>
-        </p:txBody>
-      </p:sp>
-    </p:spTree>
-    <p:extLst>
-      <p:ext uri="{BB962C8B-B14F-4D97-AF65-F5344CB8AC3E}">
-        <p14:creationId xmlns:p14="http://schemas.microsoft.com/office/powerpoint/2010/main" val="2767276358"/>
-      </p:ext>
-    </p:extLst>
-  </p:cSld>
-  <p:clrMapOvr>
-    <a:masterClrMapping/>
-  </p:clrMapOvr>
-</p:sld>
-</file>
-
 <file path=ppt/slides/slide26.xml><?xml version="1.0" encoding="utf-8"?>
 <p:sld xmlns:a="http://schemas.openxmlformats.org/drawingml/2006/main" xmlns:r="http://schemas.openxmlformats.org/officeDocument/2006/relationships" xmlns:p="http://schemas.openxmlformats.org/presentationml/2006/main">
   <p:cSld>
@@ -11597,7 +11931,7 @@
           <p:cNvPr id="2" name="标题 1">
             <a:extLst>
               <a:ext uri="{FF2B5EF4-FFF2-40B4-BE49-F238E27FC236}">
-                <a16:creationId xmlns:a16="http://schemas.microsoft.com/office/drawing/2014/main" id="{4605813C-1C8D-684C-972E-A7B35E17B52C}"/>
+                <a16:creationId xmlns:a16="http://schemas.microsoft.com/office/drawing/2014/main" id="{C8EB042B-53C7-134F-B631-E706405B5E7C}"/>
               </a:ext>
             </a:extLst>
           </p:cNvPr>
@@ -11615,23 +11949,23 @@
           <a:p>
             <a:r>
               <a:rPr kumimoji="1" lang="zh-CN" altLang="en-US" dirty="0"/>
-              <a:t>引入</a:t>
-            </a:r>
-            <a:r>
-              <a:rPr kumimoji="1" lang="en-US" altLang="zh-CN" dirty="0" err="1"/>
-              <a:t>RocketMQ</a:t>
-            </a:r>
-            <a:r>
-              <a:rPr kumimoji="1" lang="zh-CN" altLang="en-US" dirty="0"/>
-              <a:t>（</a:t>
-            </a:r>
-            <a:r>
-              <a:rPr kumimoji="1" lang="en-US" altLang="zh-CN" dirty="0"/>
-              <a:t>MQ</a:t>
-            </a:r>
-            <a:r>
-              <a:rPr kumimoji="1" lang="zh-CN" altLang="en-US" dirty="0"/>
-              <a:t>）带来的问题</a:t>
+              <a:t>如果同一个消费者组的</a:t>
+            </a:r>
+            <a:r>
+              <a:rPr kumimoji="1" lang="en-US" altLang="zh-CN" dirty="0"/>
+              <a:t>Consumer</a:t>
+            </a:r>
+            <a:r>
+              <a:rPr kumimoji="1" lang="zh-CN" altLang="en-US" dirty="0"/>
+              <a:t>订阅了不同的</a:t>
+            </a:r>
+            <a:r>
+              <a:rPr kumimoji="1" lang="en-US" altLang="zh-CN" dirty="0"/>
+              <a:t>Topic</a:t>
+            </a:r>
+            <a:r>
+              <a:rPr kumimoji="1" lang="zh-CN" altLang="en-US" dirty="0"/>
+              <a:t>会怎么样？</a:t>
             </a:r>
           </a:p>
         </p:txBody>
@@ -11641,7 +11975,7 @@
           <p:cNvPr id="3" name="内容占位符 2">
             <a:extLst>
               <a:ext uri="{FF2B5EF4-FFF2-40B4-BE49-F238E27FC236}">
-                <a16:creationId xmlns:a16="http://schemas.microsoft.com/office/drawing/2014/main" id="{148033EE-4F04-5048-9BEC-24DDFAEE6177}"/>
+                <a16:creationId xmlns:a16="http://schemas.microsoft.com/office/drawing/2014/main" id="{84841515-8274-AF4C-AAC2-F331F93B097B}"/>
               </a:ext>
             </a:extLst>
           </p:cNvPr>
@@ -11652,151 +11986,22 @@
             <p:ph idx="1"/>
           </p:nvPr>
         </p:nvSpPr>
-        <p:spPr>
-          <a:xfrm>
-            <a:off x="2589212" y="1643974"/>
-            <a:ext cx="8915400" cy="4267248"/>
-          </a:xfrm>
-        </p:spPr>
+        <p:spPr/>
         <p:txBody>
-          <a:bodyPr>
-            <a:normAutofit lnSpcReduction="10000"/>
-          </a:bodyPr>
+          <a:bodyPr/>
           <a:lstStyle/>
           <a:p>
-            <a:r>
-              <a:rPr kumimoji="1" lang="en-US" altLang="zh-CN" dirty="0"/>
-              <a:t> </a:t>
-            </a:r>
-            <a:r>
-              <a:rPr kumimoji="1" lang="zh-CN" altLang="en-US" dirty="0"/>
-              <a:t>增加了中间件，也就增加了单点故障的可能性。</a:t>
-            </a:r>
-            <a:endParaRPr kumimoji="1" lang="en-US" altLang="zh-CN" dirty="0"/>
-          </a:p>
-          <a:p>
-            <a:r>
-              <a:rPr kumimoji="1" lang="zh-CN" altLang="en-US" dirty="0"/>
-              <a:t>通过消息队列的形式属于异步形式，无法同步获取返回值。</a:t>
-            </a:r>
-            <a:endParaRPr kumimoji="1" lang="en-US" altLang="zh-CN" dirty="0"/>
-          </a:p>
-          <a:p>
-            <a:r>
-              <a:rPr kumimoji="1" lang="zh-CN" altLang="en-US" dirty="0"/>
-              <a:t>解决思路：</a:t>
-            </a:r>
-            <a:endParaRPr kumimoji="1" lang="en-US" altLang="zh-CN" dirty="0"/>
-          </a:p>
-          <a:p>
-            <a:r>
-              <a:rPr kumimoji="1" lang="en-US" altLang="zh-CN" dirty="0"/>
-              <a:t>1.</a:t>
-            </a:r>
-            <a:r>
-              <a:rPr kumimoji="1" lang="zh-CN" altLang="en-US" dirty="0"/>
-              <a:t> 消费者消费完成后，把返回消息放到另一个消息通道，生产者通过发生的消息</a:t>
-            </a:r>
-            <a:r>
-              <a:rPr kumimoji="1" lang="en-US" altLang="zh-CN" dirty="0"/>
-              <a:t>ID</a:t>
-            </a:r>
-            <a:r>
-              <a:rPr kumimoji="1" lang="zh-CN" altLang="en-US" dirty="0"/>
-              <a:t>来确定返回消息。</a:t>
-            </a:r>
-            <a:endParaRPr kumimoji="1" lang="en-US" altLang="zh-CN" dirty="0"/>
-          </a:p>
-          <a:p>
-            <a:r>
-              <a:rPr kumimoji="1" lang="en-US" altLang="zh-CN" dirty="0"/>
-              <a:t>2. </a:t>
-            </a:r>
-            <a:r>
-              <a:rPr kumimoji="1" lang="en-US" altLang="zh-CN" dirty="0" err="1"/>
-              <a:t>RocketMQ</a:t>
-            </a:r>
-            <a:r>
-              <a:rPr kumimoji="1" lang="zh-CN" altLang="en-US" dirty="0"/>
-              <a:t>支持</a:t>
-            </a:r>
-            <a:r>
-              <a:rPr lang="zh-CN" altLang="en-US" dirty="0"/>
-              <a:t>请求</a:t>
-            </a:r>
-            <a:r>
-              <a:rPr lang="en-US" altLang="zh-CN" dirty="0"/>
-              <a:t>/</a:t>
-            </a:r>
-            <a:r>
-              <a:rPr lang="zh-CN" altLang="en-US" dirty="0"/>
-              <a:t>应答 语义。可以通过</a:t>
-            </a:r>
-            <a:r>
-              <a:rPr lang="en-US" altLang="zh-CN" dirty="0" err="1"/>
-              <a:t>RocketMQ</a:t>
-            </a:r>
-            <a:r>
-              <a:rPr lang="zh-CN" altLang="en-US" dirty="0"/>
-              <a:t>的</a:t>
-            </a:r>
-            <a:r>
-              <a:rPr lang="en-US" altLang="zh-CN" dirty="0"/>
-              <a:t>API</a:t>
-            </a:r>
-            <a:r>
-              <a:rPr lang="zh-CN" altLang="en-US" dirty="0"/>
-              <a:t>进行消息和回复。</a:t>
-            </a:r>
-            <a:endParaRPr kumimoji="1" lang="en-US" altLang="zh-CN" dirty="0"/>
-          </a:p>
-          <a:p>
-            <a:r>
-              <a:rPr kumimoji="1" lang="en-US" altLang="zh-CN" dirty="0" err="1"/>
-              <a:t>RocketMQ</a:t>
-            </a:r>
-            <a:r>
-              <a:rPr kumimoji="1" lang="zh-CN" altLang="en-US" dirty="0"/>
-              <a:t>不同于数据库，没有</a:t>
-            </a:r>
-            <a:r>
-              <a:rPr kumimoji="1" lang="en-US" altLang="zh-CN" dirty="0"/>
-              <a:t>ACID</a:t>
-            </a:r>
-            <a:r>
-              <a:rPr kumimoji="1" lang="zh-CN" altLang="en-US" dirty="0"/>
-              <a:t>这样的本地事务。如何保证业务执行和消息发送在一个事务中？比如以下场景：用户下单，业务执行完成后发送了订单生成消息给下游系统，但是在事务提交的时候因为某些问题失败了，事务回退了，但是订单消息已经发送，无法回退。</a:t>
-            </a:r>
-            <a:endParaRPr kumimoji="1" lang="en-US" altLang="zh-CN" dirty="0"/>
-          </a:p>
-          <a:p>
-            <a:r>
-              <a:rPr kumimoji="1" lang="zh-CN" altLang="en-US" dirty="0"/>
-              <a:t>解决思路：</a:t>
-            </a:r>
-            <a:endParaRPr kumimoji="1" lang="en-US" altLang="zh-CN" dirty="0"/>
-          </a:p>
-          <a:p>
-            <a:r>
-              <a:rPr kumimoji="1" lang="zh-CN" altLang="en-US" dirty="0"/>
-              <a:t>发件箱模式。定义一个消息队列表，发送</a:t>
-            </a:r>
-            <a:r>
-              <a:rPr kumimoji="1" lang="en-US" altLang="zh-CN" dirty="0" err="1"/>
-              <a:t>mq</a:t>
-            </a:r>
-            <a:r>
-              <a:rPr kumimoji="1" lang="zh-CN" altLang="en-US" dirty="0"/>
-              <a:t>消息时，先将消息小如到消息表中，此时属于数据库本地事务。启用一个组件扫描发件箱并发送。</a:t>
-            </a:r>
-            <a:endParaRPr kumimoji="1" lang="en-US" altLang="zh-CN" dirty="0"/>
+            <a:pPr marL="0" indent="0">
+              <a:buNone/>
+            </a:pPr>
+            <a:endParaRPr kumimoji="1" lang="zh-CN" altLang="en-US" dirty="0"/>
           </a:p>
         </p:txBody>
       </p:sp>
     </p:spTree>
     <p:extLst>
       <p:ext uri="{BB962C8B-B14F-4D97-AF65-F5344CB8AC3E}">
-        <p14:creationId xmlns:p14="http://schemas.microsoft.com/office/powerpoint/2010/main" val="1962971040"/>
+        <p14:creationId xmlns:p14="http://schemas.microsoft.com/office/powerpoint/2010/main" val="2767276358"/>
       </p:ext>
     </p:extLst>
   </p:cSld>
@@ -11828,7 +12033,7 @@
           <p:cNvPr id="2" name="标题 1">
             <a:extLst>
               <a:ext uri="{FF2B5EF4-FFF2-40B4-BE49-F238E27FC236}">
-                <a16:creationId xmlns:a16="http://schemas.microsoft.com/office/drawing/2014/main" id="{AF1DC664-2C41-7543-953E-7256D28E7422}"/>
+                <a16:creationId xmlns:a16="http://schemas.microsoft.com/office/drawing/2014/main" id="{4605813C-1C8D-684C-972E-A7B35E17B52C}"/>
               </a:ext>
             </a:extLst>
           </p:cNvPr>
@@ -11845,12 +12050,24 @@
           <a:lstStyle/>
           <a:p>
             <a:r>
+              <a:rPr kumimoji="1" lang="zh-CN" altLang="en-US" dirty="0"/>
+              <a:t>引入</a:t>
+            </a:r>
+            <a:r>
               <a:rPr kumimoji="1" lang="en-US" altLang="zh-CN" dirty="0" err="1"/>
               <a:t>RocketMQ</a:t>
             </a:r>
             <a:r>
               <a:rPr kumimoji="1" lang="zh-CN" altLang="en-US" dirty="0"/>
-              <a:t>如何处理消息重复消费</a:t>
+              <a:t>（</a:t>
+            </a:r>
+            <a:r>
+              <a:rPr kumimoji="1" lang="en-US" altLang="zh-CN" dirty="0"/>
+              <a:t>MQ</a:t>
+            </a:r>
+            <a:r>
+              <a:rPr kumimoji="1" lang="zh-CN" altLang="en-US" dirty="0"/>
+              <a:t>）带来的问题</a:t>
             </a:r>
           </a:p>
         </p:txBody>
@@ -11860,7 +12077,7 @@
           <p:cNvPr id="3" name="内容占位符 2">
             <a:extLst>
               <a:ext uri="{FF2B5EF4-FFF2-40B4-BE49-F238E27FC236}">
-                <a16:creationId xmlns:a16="http://schemas.microsoft.com/office/drawing/2014/main" id="{8D92B3C3-CF9F-1D43-9D5D-D435D712EA06}"/>
+                <a16:creationId xmlns:a16="http://schemas.microsoft.com/office/drawing/2014/main" id="{148033EE-4F04-5048-9BEC-24DDFAEE6177}"/>
               </a:ext>
             </a:extLst>
           </p:cNvPr>
@@ -11871,67 +12088,143 @@
             <p:ph idx="1"/>
           </p:nvPr>
         </p:nvSpPr>
-        <p:spPr/>
+        <p:spPr>
+          <a:xfrm>
+            <a:off x="2589212" y="1643974"/>
+            <a:ext cx="8915400" cy="4267248"/>
+          </a:xfrm>
+        </p:spPr>
         <p:txBody>
-          <a:bodyPr/>
+          <a:bodyPr>
+            <a:normAutofit lnSpcReduction="10000"/>
+          </a:bodyPr>
           <a:lstStyle/>
           <a:p>
+            <a:r>
+              <a:rPr kumimoji="1" lang="en-US" altLang="zh-CN" dirty="0"/>
+              <a:t> </a:t>
+            </a:r>
+            <a:r>
+              <a:rPr kumimoji="1" lang="zh-CN" altLang="en-US" dirty="0"/>
+              <a:t>增加了中间件，也就增加了单点故障的可能性。</a:t>
+            </a:r>
+            <a:endParaRPr kumimoji="1" lang="en-US" altLang="zh-CN" dirty="0"/>
+          </a:p>
+          <a:p>
+            <a:r>
+              <a:rPr kumimoji="1" lang="zh-CN" altLang="en-US" dirty="0"/>
+              <a:t>通过消息队列的形式属于异步形式，无法同步获取返回值。</a:t>
+            </a:r>
+            <a:endParaRPr kumimoji="1" lang="en-US" altLang="zh-CN" dirty="0"/>
+          </a:p>
+          <a:p>
+            <a:r>
+              <a:rPr kumimoji="1" lang="zh-CN" altLang="en-US" dirty="0"/>
+              <a:t>解决思路：</a:t>
+            </a:r>
+            <a:endParaRPr kumimoji="1" lang="en-US" altLang="zh-CN" dirty="0"/>
+          </a:p>
+          <a:p>
+            <a:r>
+              <a:rPr kumimoji="1" lang="en-US" altLang="zh-CN" dirty="0"/>
+              <a:t>1.</a:t>
+            </a:r>
+            <a:r>
+              <a:rPr kumimoji="1" lang="zh-CN" altLang="en-US" dirty="0"/>
+              <a:t> 消费者消费完成后，把返回消息放到另一个消息通道，生产者通过发生的消息</a:t>
+            </a:r>
+            <a:r>
+              <a:rPr kumimoji="1" lang="en-US" altLang="zh-CN" dirty="0"/>
+              <a:t>ID</a:t>
+            </a:r>
+            <a:r>
+              <a:rPr kumimoji="1" lang="zh-CN" altLang="en-US" dirty="0"/>
+              <a:t>来确定返回消息。</a:t>
+            </a:r>
+            <a:endParaRPr kumimoji="1" lang="en-US" altLang="zh-CN" dirty="0"/>
+          </a:p>
+          <a:p>
+            <a:r>
+              <a:rPr kumimoji="1" lang="en-US" altLang="zh-CN" dirty="0"/>
+              <a:t>2. </a:t>
+            </a:r>
             <a:r>
               <a:rPr kumimoji="1" lang="en-US" altLang="zh-CN" dirty="0" err="1"/>
               <a:t>RocketMQ</a:t>
             </a:r>
             <a:r>
               <a:rPr kumimoji="1" lang="zh-CN" altLang="en-US" dirty="0"/>
-              <a:t>自身并不解决消息重复消费的问题。需要使用者自己解决。</a:t>
+              <a:t>支持</a:t>
+            </a:r>
+            <a:r>
+              <a:rPr lang="zh-CN" altLang="en-US" dirty="0"/>
+              <a:t>请求</a:t>
+            </a:r>
+            <a:r>
+              <a:rPr lang="en-US" altLang="zh-CN" dirty="0"/>
+              <a:t>/</a:t>
+            </a:r>
+            <a:r>
+              <a:rPr lang="zh-CN" altLang="en-US" dirty="0"/>
+              <a:t>应答 语义。可以通过</a:t>
+            </a:r>
+            <a:r>
+              <a:rPr lang="en-US" altLang="zh-CN" dirty="0" err="1"/>
+              <a:t>RocketMQ</a:t>
+            </a:r>
+            <a:r>
+              <a:rPr lang="zh-CN" altLang="en-US" dirty="0"/>
+              <a:t>的</a:t>
+            </a:r>
+            <a:r>
+              <a:rPr lang="en-US" altLang="zh-CN" dirty="0"/>
+              <a:t>API</a:t>
+            </a:r>
+            <a:r>
+              <a:rPr lang="zh-CN" altLang="en-US" dirty="0"/>
+              <a:t>进行消息和回复。</a:t>
             </a:r>
             <a:endParaRPr kumimoji="1" lang="en-US" altLang="zh-CN" dirty="0"/>
           </a:p>
           <a:p>
             <a:r>
-              <a:rPr kumimoji="1" lang="zh-CN" altLang="en-US" dirty="0"/>
-              <a:t>解决方案有</a:t>
-            </a:r>
-            <a:r>
-              <a:rPr kumimoji="1" lang="en-US" altLang="zh-CN" dirty="0"/>
-              <a:t>2</a:t>
-            </a:r>
-            <a:r>
-              <a:rPr kumimoji="1" lang="zh-CN" altLang="en-US" dirty="0"/>
-              <a:t>种：</a:t>
+              <a:rPr kumimoji="1" lang="en-US" altLang="zh-CN" dirty="0" err="1"/>
+              <a:t>RocketMQ</a:t>
+            </a:r>
+            <a:r>
+              <a:rPr kumimoji="1" lang="zh-CN" altLang="en-US" dirty="0"/>
+              <a:t>不同于数据库，没有</a:t>
+            </a:r>
+            <a:r>
+              <a:rPr kumimoji="1" lang="en-US" altLang="zh-CN" dirty="0"/>
+              <a:t>ACID</a:t>
+            </a:r>
+            <a:r>
+              <a:rPr kumimoji="1" lang="zh-CN" altLang="en-US" dirty="0"/>
+              <a:t>这样的本地事务。如何保证业务执行和消息发送在一个事务中？比如以下场景：用户下单，业务执行完成后发送了订单生成消息给下游系统，但是在事务提交的时候因为某些问题失败了，事务回退了，但是订单消息已经发送，无法回退。</a:t>
             </a:r>
             <a:endParaRPr kumimoji="1" lang="en-US" altLang="zh-CN" dirty="0"/>
           </a:p>
           <a:p>
             <a:r>
               <a:rPr kumimoji="1" lang="zh-CN" altLang="en-US" dirty="0"/>
-              <a:t>保证消费逻辑的幂等性。</a:t>
+              <a:t>解决思路：</a:t>
             </a:r>
             <a:endParaRPr kumimoji="1" lang="en-US" altLang="zh-CN" dirty="0"/>
           </a:p>
           <a:p>
             <a:r>
               <a:rPr kumimoji="1" lang="zh-CN" altLang="en-US" dirty="0"/>
-              <a:t>维护一个已消费消息的记录。（比如在数据库或者</a:t>
-            </a:r>
-            <a:r>
-              <a:rPr kumimoji="1" lang="en-US" altLang="zh-CN" dirty="0"/>
-              <a:t>Redis</a:t>
-            </a:r>
-            <a:r>
-              <a:rPr kumimoji="1" lang="zh-CN" altLang="en-US" dirty="0"/>
-              <a:t>中保存已经消费的消息</a:t>
-            </a:r>
-            <a:r>
-              <a:rPr kumimoji="1" lang="en-US" altLang="zh-CN" dirty="0"/>
-              <a:t>ID</a:t>
-            </a:r>
-            <a:r>
-              <a:rPr kumimoji="1" lang="zh-CN" altLang="en-US" dirty="0"/>
-              <a:t>）</a:t>
-            </a:r>
-            <a:endParaRPr kumimoji="1" lang="en-US" altLang="zh-CN" dirty="0"/>
-          </a:p>
-          <a:p>
+              <a:t>发件箱模式。定义一个消息队列表，发送</a:t>
+            </a:r>
+            <a:r>
+              <a:rPr kumimoji="1" lang="en-US" altLang="zh-CN" dirty="0" err="1"/>
+              <a:t>mq</a:t>
+            </a:r>
+            <a:r>
+              <a:rPr kumimoji="1" lang="zh-CN" altLang="en-US" dirty="0"/>
+              <a:t>消息时，先将消息小如到消息表中，此时属于数据库本地事务。启用一个组件扫描发件箱并发送。</a:t>
+            </a:r>
             <a:endParaRPr kumimoji="1" lang="en-US" altLang="zh-CN" dirty="0"/>
           </a:p>
         </p:txBody>
@@ -11939,7 +12232,7 @@
     </p:spTree>
     <p:extLst>
       <p:ext uri="{BB962C8B-B14F-4D97-AF65-F5344CB8AC3E}">
-        <p14:creationId xmlns:p14="http://schemas.microsoft.com/office/powerpoint/2010/main" val="3595485941"/>
+        <p14:creationId xmlns:p14="http://schemas.microsoft.com/office/powerpoint/2010/main" val="1962971040"/>
       </p:ext>
     </p:extLst>
   </p:cSld>
@@ -11971,7 +12264,7 @@
           <p:cNvPr id="2" name="标题 1">
             <a:extLst>
               <a:ext uri="{FF2B5EF4-FFF2-40B4-BE49-F238E27FC236}">
-                <a16:creationId xmlns:a16="http://schemas.microsoft.com/office/drawing/2014/main" id="{29BD7B92-C53F-5048-A035-CD294FA54FCA}"/>
+                <a16:creationId xmlns:a16="http://schemas.microsoft.com/office/drawing/2014/main" id="{AF1DC664-2C41-7543-953E-7256D28E7422}"/>
               </a:ext>
             </a:extLst>
           </p:cNvPr>
@@ -11993,7 +12286,7 @@
             </a:r>
             <a:r>
               <a:rPr kumimoji="1" lang="zh-CN" altLang="en-US" dirty="0"/>
-              <a:t>如何保证顺序消费</a:t>
+              <a:t>如何处理消息重复消费</a:t>
             </a:r>
           </a:p>
         </p:txBody>
@@ -12003,7 +12296,7 @@
           <p:cNvPr id="3" name="内容占位符 2">
             <a:extLst>
               <a:ext uri="{FF2B5EF4-FFF2-40B4-BE49-F238E27FC236}">
-                <a16:creationId xmlns:a16="http://schemas.microsoft.com/office/drawing/2014/main" id="{DFE86850-C320-CE4F-B6EC-693E90834B72}"/>
+                <a16:creationId xmlns:a16="http://schemas.microsoft.com/office/drawing/2014/main" id="{8D92B3C3-CF9F-1D43-9D5D-D435D712EA06}"/>
               </a:ext>
             </a:extLst>
           </p:cNvPr>
@@ -12020,8 +12313,19 @@
           <a:lstStyle/>
           <a:p>
             <a:r>
-              <a:rPr kumimoji="1" lang="zh-CN" altLang="en-US" dirty="0"/>
-              <a:t>顺序消费分为</a:t>
+              <a:rPr kumimoji="1" lang="en-US" altLang="zh-CN" dirty="0" err="1"/>
+              <a:t>RocketMQ</a:t>
+            </a:r>
+            <a:r>
+              <a:rPr kumimoji="1" lang="zh-CN" altLang="en-US" dirty="0"/>
+              <a:t>自身并不解决消息重复消费的问题。需要使用者自己解决。</a:t>
+            </a:r>
+            <a:endParaRPr kumimoji="1" lang="en-US" altLang="zh-CN" dirty="0"/>
+          </a:p>
+          <a:p>
+            <a:r>
+              <a:rPr kumimoji="1" lang="zh-CN" altLang="en-US" dirty="0"/>
+              <a:t>解决方案有</a:t>
             </a:r>
             <a:r>
               <a:rPr kumimoji="1" lang="en-US" altLang="zh-CN" dirty="0"/>
@@ -12029,181 +12333,49 @@
             </a:r>
             <a:r>
               <a:rPr kumimoji="1" lang="zh-CN" altLang="en-US" dirty="0"/>
-              <a:t>种：分区顺序和全局顺序。</a:t>
+              <a:t>种：</a:t>
             </a:r>
             <a:endParaRPr kumimoji="1" lang="en-US" altLang="zh-CN" dirty="0"/>
           </a:p>
           <a:p>
             <a:r>
               <a:rPr kumimoji="1" lang="zh-CN" altLang="en-US" dirty="0"/>
-              <a:t>分区顺序：在一个</a:t>
-            </a:r>
-            <a:r>
-              <a:rPr kumimoji="1" lang="en-US" altLang="zh-CN" dirty="0"/>
-              <a:t>topic</a:t>
-            </a:r>
-            <a:r>
-              <a:rPr kumimoji="1" lang="zh-CN" altLang="en-US" dirty="0"/>
-              <a:t>下的某个</a:t>
-            </a:r>
-            <a:r>
-              <a:rPr kumimoji="1" lang="en-US" altLang="zh-CN" dirty="0"/>
-              <a:t>queue</a:t>
-            </a:r>
-            <a:r>
-              <a:rPr kumimoji="1" lang="zh-CN" altLang="en-US" dirty="0"/>
-              <a:t>是顺序的。比如对某个用户进行持续更新的消息，可以通过</a:t>
-            </a:r>
-            <a:r>
-              <a:rPr lang="en" altLang="zh-CN" dirty="0" err="1"/>
-              <a:t>MessageQueueSelector</a:t>
-            </a:r>
-            <a:r>
-              <a:rPr lang="zh-CN" altLang="en" dirty="0"/>
-              <a:t>将</a:t>
-            </a:r>
-            <a:r>
-              <a:rPr lang="zh-CN" altLang="en-US" dirty="0"/>
-              <a:t>某个用户的消息制定发送到同一个</a:t>
-            </a:r>
-            <a:r>
-              <a:rPr lang="en-US" altLang="zh-CN" dirty="0"/>
-              <a:t>queue</a:t>
-            </a:r>
-            <a:r>
-              <a:rPr lang="zh-CN" altLang="en-US" dirty="0"/>
-              <a:t>。</a:t>
-            </a:r>
-            <a:r>
-              <a:rPr lang="en-US" altLang="zh-CN" dirty="0"/>
-              <a:t>Consumer</a:t>
-            </a:r>
-            <a:r>
-              <a:rPr lang="zh-CN" altLang="en-US" dirty="0"/>
-              <a:t>消费时可以 采用</a:t>
-            </a:r>
-            <a:r>
-              <a:rPr lang="en-US" altLang="zh-CN" dirty="0" err="1"/>
-              <a:t>MessageListenerOrderly</a:t>
-            </a:r>
-            <a:r>
-              <a:rPr lang="zh-CN" altLang="en-US" dirty="0"/>
-              <a:t>的形式进行顺序消费，如果用</a:t>
-            </a:r>
-            <a:r>
-              <a:rPr lang="en-US" altLang="zh-CN" dirty="0" err="1"/>
-              <a:t>MessageListenerConcurrently</a:t>
-            </a:r>
-            <a:r>
-              <a:rPr lang="zh-CN" altLang="en-US" dirty="0"/>
-              <a:t>，则需要将线程池改为单线程。</a:t>
-            </a:r>
-            <a:endParaRPr lang="en-US" altLang="zh-CN" dirty="0"/>
-          </a:p>
-          <a:p>
-            <a:r>
-              <a:rPr kumimoji="1" lang="zh-CN" altLang="en-US" dirty="0"/>
-              <a:t>全局顺序：只能通过将</a:t>
-            </a:r>
-            <a:r>
-              <a:rPr kumimoji="1" lang="en-US" altLang="zh-CN" dirty="0"/>
-              <a:t>Topic</a:t>
-            </a:r>
-            <a:r>
-              <a:rPr kumimoji="1" lang="zh-CN" altLang="en-US" dirty="0"/>
-              <a:t>设置成只有一个</a:t>
-            </a:r>
-            <a:r>
-              <a:rPr kumimoji="1" lang="en-US" altLang="zh-CN" dirty="0"/>
-              <a:t>queue</a:t>
-            </a:r>
-            <a:r>
-              <a:rPr kumimoji="1" lang="zh-CN" altLang="en-US" dirty="0"/>
-              <a:t>来实现。同样</a:t>
-            </a:r>
-            <a:r>
-              <a:rPr kumimoji="1" lang="en-US" altLang="zh-CN" dirty="0"/>
-              <a:t>Consumer</a:t>
-            </a:r>
-            <a:r>
-              <a:rPr kumimoji="1" lang="zh-CN" altLang="en-US" dirty="0"/>
-              <a:t>要顺序消费。</a:t>
+              <a:t>保证消费逻辑的幂等性。</a:t>
             </a:r>
             <a:endParaRPr kumimoji="1" lang="en-US" altLang="zh-CN" dirty="0"/>
           </a:p>
           <a:p>
             <a:r>
               <a:rPr kumimoji="1" lang="zh-CN" altLang="en-US" dirty="0"/>
-              <a:t>分区顺序并不能严格保证，在某些极端场景下，比如一个</a:t>
-            </a:r>
-            <a:r>
-              <a:rPr kumimoji="1" lang="en-US" altLang="zh-CN" dirty="0"/>
-              <a:t>Topic</a:t>
-            </a:r>
-            <a:r>
-              <a:rPr kumimoji="1" lang="zh-CN" altLang="en-US" dirty="0"/>
-              <a:t>的</a:t>
-            </a:r>
-            <a:r>
-              <a:rPr kumimoji="1" lang="en-US" altLang="zh-CN" dirty="0"/>
-              <a:t>queue</a:t>
-            </a:r>
-            <a:r>
-              <a:rPr kumimoji="1" lang="zh-CN" altLang="en-US" dirty="0"/>
-              <a:t>分布在多个</a:t>
-            </a:r>
-            <a:r>
-              <a:rPr kumimoji="1" lang="en-US" altLang="zh-CN" dirty="0"/>
-              <a:t>Broker</a:t>
-            </a:r>
-            <a:r>
-              <a:rPr kumimoji="1" lang="zh-CN" altLang="en-US" dirty="0"/>
-              <a:t>上，但是</a:t>
-            </a:r>
-            <a:r>
-              <a:rPr kumimoji="1" lang="en-US" altLang="zh-CN" dirty="0"/>
-              <a:t>Broker</a:t>
-            </a:r>
-            <a:r>
-              <a:rPr kumimoji="1" lang="zh-CN" altLang="en-US" dirty="0"/>
-              <a:t>宕机导致</a:t>
-            </a:r>
-            <a:r>
-              <a:rPr lang="en" altLang="zh-CN" dirty="0" err="1"/>
-              <a:t>MessageQueueSelector</a:t>
-            </a:r>
-            <a:r>
-              <a:rPr lang="zh-CN" altLang="en" dirty="0"/>
-              <a:t>返回</a:t>
-            </a:r>
-            <a:r>
-              <a:rPr lang="zh-CN" altLang="en-US" dirty="0"/>
-              <a:t>的</a:t>
-            </a:r>
-            <a:r>
-              <a:rPr lang="en-US" altLang="zh-CN" dirty="0"/>
-              <a:t>Queue</a:t>
-            </a:r>
-            <a:r>
-              <a:rPr lang="zh-CN" altLang="en-US" dirty="0"/>
-              <a:t>列表数量发生了变化 ，消息被发送到不同的</a:t>
-            </a:r>
-            <a:r>
-              <a:rPr lang="en-US" altLang="zh-CN" dirty="0"/>
-              <a:t>Queue</a:t>
-            </a:r>
-            <a:r>
-              <a:rPr lang="zh-CN" altLang="en-US" dirty="0"/>
-              <a:t>。</a:t>
-            </a:r>
-            <a:endParaRPr kumimoji="1" lang="zh-CN" altLang="en-US" dirty="0"/>
+              <a:t>维护一个已消费消息的记录。（比如在数据库或者</a:t>
+            </a:r>
+            <a:r>
+              <a:rPr kumimoji="1" lang="en-US" altLang="zh-CN" dirty="0"/>
+              <a:t>Redis</a:t>
+            </a:r>
+            <a:r>
+              <a:rPr kumimoji="1" lang="zh-CN" altLang="en-US" dirty="0"/>
+              <a:t>中保存已经消费的消息</a:t>
+            </a:r>
+            <a:r>
+              <a:rPr kumimoji="1" lang="en-US" altLang="zh-CN" dirty="0"/>
+              <a:t>ID</a:t>
+            </a:r>
+            <a:r>
+              <a:rPr kumimoji="1" lang="zh-CN" altLang="en-US" dirty="0"/>
+              <a:t>）</a:t>
+            </a:r>
+            <a:endParaRPr kumimoji="1" lang="en-US" altLang="zh-CN" dirty="0"/>
+          </a:p>
+          <a:p>
+            <a:endParaRPr kumimoji="1" lang="en-US" altLang="zh-CN" dirty="0"/>
           </a:p>
         </p:txBody>
       </p:sp>
     </p:spTree>
     <p:extLst>
       <p:ext uri="{BB962C8B-B14F-4D97-AF65-F5344CB8AC3E}">
-        <p14:creationId xmlns:p14="http://schemas.microsoft.com/office/powerpoint/2010/main" val="4146228857"/>
+        <p14:creationId xmlns:p14="http://schemas.microsoft.com/office/powerpoint/2010/main" val="3595485941"/>
       </p:ext>
     </p:extLst>
   </p:cSld>
@@ -12235,7 +12407,7 @@
           <p:cNvPr id="2" name="标题 1">
             <a:extLst>
               <a:ext uri="{FF2B5EF4-FFF2-40B4-BE49-F238E27FC236}">
-                <a16:creationId xmlns:a16="http://schemas.microsoft.com/office/drawing/2014/main" id="{9DDA7E95-64DE-874B-98C5-CAB5D7A84579}"/>
+                <a16:creationId xmlns:a16="http://schemas.microsoft.com/office/drawing/2014/main" id="{29BD7B92-C53F-5048-A035-CD294FA54FCA}"/>
               </a:ext>
             </a:extLst>
           </p:cNvPr>
@@ -12252,8 +12424,12 @@
           <a:lstStyle/>
           <a:p>
             <a:r>
-              <a:rPr kumimoji="1" lang="zh-CN" altLang="en-US" dirty="0"/>
-              <a:t>如何处理消息堆积</a:t>
+              <a:rPr kumimoji="1" lang="en-US" altLang="zh-CN" dirty="0" err="1"/>
+              <a:t>RocketMQ</a:t>
+            </a:r>
+            <a:r>
+              <a:rPr kumimoji="1" lang="zh-CN" altLang="en-US" dirty="0"/>
+              <a:t>如何保证顺序消费</a:t>
             </a:r>
           </a:p>
         </p:txBody>
@@ -12263,7 +12439,7 @@
           <p:cNvPr id="3" name="内容占位符 2">
             <a:extLst>
               <a:ext uri="{FF2B5EF4-FFF2-40B4-BE49-F238E27FC236}">
-                <a16:creationId xmlns:a16="http://schemas.microsoft.com/office/drawing/2014/main" id="{59F1AC20-F3E2-ED45-B105-080C9CB0461D}"/>
+                <a16:creationId xmlns:a16="http://schemas.microsoft.com/office/drawing/2014/main" id="{DFE86850-C320-CE4F-B6EC-693E90834B72}"/>
               </a:ext>
             </a:extLst>
           </p:cNvPr>
@@ -12276,89 +12452,94 @@
         </p:nvSpPr>
         <p:spPr/>
         <p:txBody>
-          <a:bodyPr>
-            <a:normAutofit lnSpcReduction="10000"/>
-          </a:bodyPr>
+          <a:bodyPr/>
           <a:lstStyle/>
           <a:p>
             <a:r>
               <a:rPr kumimoji="1" lang="zh-CN" altLang="en-US" dirty="0"/>
-              <a:t>场景：</a:t>
-            </a:r>
-            <a:r>
-              <a:rPr kumimoji="1" lang="en-US" altLang="zh-CN" dirty="0"/>
-              <a:t>consumer</a:t>
-            </a:r>
-            <a:r>
-              <a:rPr kumimoji="1" lang="zh-CN" altLang="en-US" dirty="0"/>
-              <a:t>长时间宕机导致消息大量积压，如何快速处理？</a:t>
+              <a:t>顺序消费分为</a:t>
+            </a:r>
+            <a:r>
+              <a:rPr kumimoji="1" lang="en-US" altLang="zh-CN" dirty="0"/>
+              <a:t>2</a:t>
+            </a:r>
+            <a:r>
+              <a:rPr kumimoji="1" lang="zh-CN" altLang="en-US" dirty="0"/>
+              <a:t>种：分区顺序和全局顺序。</a:t>
             </a:r>
             <a:endParaRPr kumimoji="1" lang="en-US" altLang="zh-CN" dirty="0"/>
           </a:p>
           <a:p>
             <a:r>
               <a:rPr kumimoji="1" lang="zh-CN" altLang="en-US" dirty="0"/>
-              <a:t>步骤</a:t>
-            </a:r>
-            <a:r>
-              <a:rPr kumimoji="1" lang="en-US" altLang="zh-CN" dirty="0"/>
-              <a:t>1:</a:t>
-            </a:r>
-            <a:r>
-              <a:rPr kumimoji="1" lang="zh-CN" altLang="en-US" dirty="0"/>
-              <a:t> 当然是先恢复</a:t>
-            </a:r>
-            <a:r>
-              <a:rPr kumimoji="1" lang="en-US" altLang="zh-CN" dirty="0"/>
-              <a:t>consumer</a:t>
-            </a:r>
-          </a:p>
-          <a:p>
-            <a:r>
-              <a:rPr kumimoji="1" lang="zh-CN" altLang="en-US" dirty="0"/>
-              <a:t>步骤</a:t>
-            </a:r>
-            <a:r>
-              <a:rPr kumimoji="1" lang="en-US" altLang="zh-CN" dirty="0"/>
-              <a:t>2:</a:t>
-            </a:r>
-            <a:r>
-              <a:rPr kumimoji="1" lang="zh-CN" altLang="en-US" dirty="0"/>
-              <a:t> 如果消息并不重要（日志，告警等），可以通过设置</a:t>
-            </a:r>
-            <a:r>
-              <a:rPr kumimoji="1" lang="en-US" altLang="zh-CN" dirty="0"/>
-              <a:t>consumer</a:t>
-            </a:r>
-            <a:r>
-              <a:rPr kumimoji="1" lang="zh-CN" altLang="en-US" dirty="0"/>
-              <a:t>消费时的</a:t>
-            </a:r>
-            <a:r>
-              <a:rPr kumimoji="1" lang="en-US" altLang="zh-CN" dirty="0"/>
-              <a:t>offset</a:t>
-            </a:r>
-            <a:r>
-              <a:rPr kumimoji="1" lang="zh-CN" altLang="en-US" dirty="0"/>
-              <a:t>为</a:t>
-            </a:r>
-            <a:r>
-              <a:rPr lang="en" altLang="zh-CN" i="1" dirty="0"/>
-              <a:t>CONSUME_FROM_LAST_OFFSET</a:t>
-            </a:r>
-          </a:p>
-          <a:p>
-            <a:r>
-              <a:rPr kumimoji="1" lang="zh-CN" altLang="en-US" dirty="0"/>
-              <a:t>步骤</a:t>
-            </a:r>
-            <a:r>
-              <a:rPr kumimoji="1" lang="en-US" altLang="zh-CN" dirty="0"/>
-              <a:t>3:</a:t>
-            </a:r>
-            <a:r>
-              <a:rPr kumimoji="1" lang="zh-CN" altLang="en-US" dirty="0"/>
-              <a:t> 如果消息必须要重新消费，那先要查看</a:t>
+              <a:t>分区顺序：在一个</a:t>
+            </a:r>
+            <a:r>
+              <a:rPr kumimoji="1" lang="en-US" altLang="zh-CN" dirty="0"/>
+              <a:t>topic</a:t>
+            </a:r>
+            <a:r>
+              <a:rPr kumimoji="1" lang="zh-CN" altLang="en-US" dirty="0"/>
+              <a:t>下的某个</a:t>
+            </a:r>
+            <a:r>
+              <a:rPr kumimoji="1" lang="en-US" altLang="zh-CN" dirty="0"/>
+              <a:t>queue</a:t>
+            </a:r>
+            <a:r>
+              <a:rPr kumimoji="1" lang="zh-CN" altLang="en-US" dirty="0"/>
+              <a:t>是顺序的。比如对某个用户进行持续更新的消息，可以通过</a:t>
+            </a:r>
+            <a:r>
+              <a:rPr lang="en" altLang="zh-CN" dirty="0" err="1"/>
+              <a:t>MessageQueueSelector</a:t>
+            </a:r>
+            <a:r>
+              <a:rPr lang="zh-CN" altLang="en" dirty="0"/>
+              <a:t>将</a:t>
+            </a:r>
+            <a:r>
+              <a:rPr lang="zh-CN" altLang="en-US" dirty="0"/>
+              <a:t>某个用户的消息制定发送到同一个</a:t>
+            </a:r>
+            <a:r>
+              <a:rPr lang="en-US" altLang="zh-CN" dirty="0"/>
+              <a:t>queue</a:t>
+            </a:r>
+            <a:r>
+              <a:rPr lang="zh-CN" altLang="en-US" dirty="0"/>
+              <a:t>。</a:t>
+            </a:r>
+            <a:r>
+              <a:rPr lang="en-US" altLang="zh-CN" dirty="0"/>
+              <a:t>Consumer</a:t>
+            </a:r>
+            <a:r>
+              <a:rPr lang="zh-CN" altLang="en-US" dirty="0"/>
+              <a:t>消费时可以 采用</a:t>
+            </a:r>
+            <a:r>
+              <a:rPr lang="en-US" altLang="zh-CN" dirty="0" err="1"/>
+              <a:t>MessageListenerOrderly</a:t>
+            </a:r>
+            <a:r>
+              <a:rPr lang="zh-CN" altLang="en-US" dirty="0"/>
+              <a:t>的形式进行顺序消费，如果用</a:t>
+            </a:r>
+            <a:r>
+              <a:rPr lang="en-US" altLang="zh-CN" dirty="0" err="1"/>
+              <a:t>MessageListenerConcurrently</a:t>
+            </a:r>
+            <a:r>
+              <a:rPr lang="zh-CN" altLang="en-US" dirty="0"/>
+              <a:t>，则需要将线程池改为单线程。</a:t>
+            </a:r>
+            <a:endParaRPr lang="en-US" altLang="zh-CN" dirty="0"/>
+          </a:p>
+          <a:p>
+            <a:r>
+              <a:rPr kumimoji="1" lang="zh-CN" altLang="en-US" dirty="0"/>
+              <a:t>全局顺序：只能通过将</a:t>
             </a:r>
             <a:r>
               <a:rPr kumimoji="1" lang="en-US" altLang="zh-CN" dirty="0"/>
@@ -12366,15 +12547,15 @@
             </a:r>
             <a:r>
               <a:rPr kumimoji="1" lang="zh-CN" altLang="en-US" dirty="0"/>
-              <a:t>对应的</a:t>
-            </a:r>
-            <a:r>
-              <a:rPr kumimoji="1" lang="en-US" altLang="zh-CN" dirty="0" err="1"/>
-              <a:t>ReadQueue</a:t>
-            </a:r>
-            <a:r>
-              <a:rPr kumimoji="1" lang="zh-CN" altLang="en-US" dirty="0"/>
-              <a:t>的数量，如果</a:t>
+              <a:t>设置成只有一个</a:t>
+            </a:r>
+            <a:r>
+              <a:rPr kumimoji="1" lang="en-US" altLang="zh-CN" dirty="0"/>
+              <a:t>queue</a:t>
+            </a:r>
+            <a:r>
+              <a:rPr kumimoji="1" lang="zh-CN" altLang="en-US" dirty="0"/>
+              <a:t>来实现。同样</a:t>
             </a:r>
             <a:r>
               <a:rPr kumimoji="1" lang="en-US" altLang="zh-CN" dirty="0"/>
@@ -12382,181 +12563,75 @@
             </a:r>
             <a:r>
               <a:rPr kumimoji="1" lang="zh-CN" altLang="en-US" dirty="0"/>
-              <a:t>数量小于</a:t>
-            </a:r>
-            <a:r>
-              <a:rPr kumimoji="1" lang="en-US" altLang="zh-CN" dirty="0" err="1"/>
-              <a:t>ReadQueue</a:t>
-            </a:r>
-            <a:r>
-              <a:rPr kumimoji="1" lang="zh-CN" altLang="en-US" dirty="0"/>
-              <a:t>的数量，可以通过增加</a:t>
-            </a:r>
-            <a:r>
-              <a:rPr kumimoji="1" lang="en-US" altLang="zh-CN" dirty="0"/>
-              <a:t>Consumer</a:t>
-            </a:r>
-            <a:r>
-              <a:rPr kumimoji="1" lang="zh-CN" altLang="en-US" dirty="0"/>
-              <a:t>数量到</a:t>
-            </a:r>
-            <a:r>
-              <a:rPr kumimoji="1" lang="en-US" altLang="zh-CN" dirty="0" err="1"/>
-              <a:t>ReadQueue</a:t>
-            </a:r>
-            <a:r>
-              <a:rPr kumimoji="1" lang="zh-CN" altLang="en-US" dirty="0"/>
-              <a:t>数量的形式来加快消息消费</a:t>
+              <a:t>要顺序消费。</a:t>
             </a:r>
             <a:endParaRPr kumimoji="1" lang="en-US" altLang="zh-CN" dirty="0"/>
           </a:p>
           <a:p>
             <a:r>
               <a:rPr kumimoji="1" lang="zh-CN" altLang="en-US" dirty="0"/>
-              <a:t>步骤</a:t>
-            </a:r>
-            <a:r>
-              <a:rPr kumimoji="1" lang="en-US" altLang="zh-CN" dirty="0"/>
-              <a:t>4:</a:t>
-            </a:r>
-            <a:r>
-              <a:rPr kumimoji="1" lang="zh-CN" altLang="en-US" dirty="0"/>
-              <a:t> 如果步骤</a:t>
-            </a:r>
-            <a:r>
-              <a:rPr kumimoji="1" lang="en-US" altLang="zh-CN" dirty="0"/>
-              <a:t>3</a:t>
-            </a:r>
-            <a:r>
-              <a:rPr kumimoji="1" lang="zh-CN" altLang="en-US" dirty="0"/>
-              <a:t>不成立，则不能直接通过增加</a:t>
-            </a:r>
-            <a:r>
-              <a:rPr kumimoji="1" lang="en-US" altLang="zh-CN" dirty="0"/>
-              <a:t>Consumer</a:t>
-            </a:r>
-            <a:r>
-              <a:rPr kumimoji="1" lang="zh-CN" altLang="en-US" dirty="0"/>
-              <a:t>数量的形式（因为一个</a:t>
-            </a:r>
-            <a:r>
-              <a:rPr kumimoji="1" lang="en-US" altLang="zh-CN" dirty="0"/>
+              <a:t>分区顺序并不能严格保证，在某些极端场景下，比如一个</a:t>
+            </a:r>
+            <a:r>
+              <a:rPr kumimoji="1" lang="en-US" altLang="zh-CN" dirty="0"/>
+              <a:t>Topic</a:t>
+            </a:r>
+            <a:r>
+              <a:rPr kumimoji="1" lang="zh-CN" altLang="en-US" dirty="0"/>
+              <a:t>的</a:t>
+            </a:r>
+            <a:r>
+              <a:rPr kumimoji="1" lang="en-US" altLang="zh-CN" dirty="0"/>
+              <a:t>queue</a:t>
+            </a:r>
+            <a:r>
+              <a:rPr kumimoji="1" lang="zh-CN" altLang="en-US" dirty="0"/>
+              <a:t>分布在多个</a:t>
+            </a:r>
+            <a:r>
+              <a:rPr kumimoji="1" lang="en-US" altLang="zh-CN" dirty="0"/>
+              <a:t>Broker</a:t>
+            </a:r>
+            <a:r>
+              <a:rPr kumimoji="1" lang="zh-CN" altLang="en-US" dirty="0"/>
+              <a:t>上，但是</a:t>
+            </a:r>
+            <a:r>
+              <a:rPr kumimoji="1" lang="en-US" altLang="zh-CN" dirty="0"/>
+              <a:t>Broker</a:t>
+            </a:r>
+            <a:r>
+              <a:rPr kumimoji="1" lang="zh-CN" altLang="en-US" dirty="0"/>
+              <a:t>宕机导致</a:t>
+            </a:r>
+            <a:r>
+              <a:rPr lang="en" altLang="zh-CN" dirty="0" err="1"/>
+              <a:t>MessageQueueSelector</a:t>
+            </a:r>
+            <a:r>
+              <a:rPr lang="zh-CN" altLang="en" dirty="0"/>
+              <a:t>返回</a:t>
+            </a:r>
+            <a:r>
+              <a:rPr lang="zh-CN" altLang="en-US" dirty="0"/>
+              <a:t>的</a:t>
+            </a:r>
+            <a:r>
+              <a:rPr lang="en-US" altLang="zh-CN" dirty="0"/>
               <a:t>Queue</a:t>
             </a:r>
             <a:r>
-              <a:rPr kumimoji="1" lang="zh-CN" altLang="en-US" dirty="0"/>
-              <a:t>只能被一个</a:t>
-            </a:r>
-            <a:r>
-              <a:rPr kumimoji="1" lang="en-US" altLang="zh-CN" dirty="0"/>
-              <a:t>Consumer</a:t>
-            </a:r>
-            <a:r>
-              <a:rPr kumimoji="1" lang="zh-CN" altLang="en-US" dirty="0"/>
-              <a:t>消费），可以考虑创建</a:t>
-            </a:r>
-            <a:r>
-              <a:rPr kumimoji="1" lang="en-US" altLang="zh-CN" dirty="0"/>
-              <a:t>N</a:t>
-            </a:r>
-            <a:r>
-              <a:rPr kumimoji="1" lang="zh-CN" altLang="en-US" dirty="0"/>
-              <a:t>个新的</a:t>
-            </a:r>
-            <a:r>
-              <a:rPr kumimoji="1" lang="en-US" altLang="zh-CN" dirty="0"/>
-              <a:t>Consumer</a:t>
-            </a:r>
-            <a:r>
-              <a:rPr kumimoji="1" lang="zh-CN" altLang="en-US" dirty="0"/>
-              <a:t>，将堆积</a:t>
-            </a:r>
-            <a:r>
-              <a:rPr kumimoji="1" lang="en-US" altLang="zh-CN" dirty="0"/>
-              <a:t>Topic</a:t>
-            </a:r>
-            <a:r>
-              <a:rPr kumimoji="1" lang="zh-CN" altLang="en-US" dirty="0"/>
-              <a:t>的消息搬运到一个新的</a:t>
-            </a:r>
-            <a:r>
-              <a:rPr kumimoji="1" lang="en-US" altLang="zh-CN" dirty="0"/>
-              <a:t>Topic</a:t>
-            </a:r>
-            <a:r>
-              <a:rPr kumimoji="1" lang="zh-CN" altLang="en-US" dirty="0"/>
-              <a:t>（不处理业务逻辑，只搬运），新</a:t>
-            </a:r>
-            <a:r>
-              <a:rPr kumimoji="1" lang="en-US" altLang="zh-CN" dirty="0"/>
-              <a:t>Topic</a:t>
-            </a:r>
-            <a:r>
-              <a:rPr kumimoji="1" lang="zh-CN" altLang="en-US" dirty="0"/>
-              <a:t>的</a:t>
-            </a:r>
-            <a:r>
-              <a:rPr kumimoji="1" lang="en-US" altLang="zh-CN" dirty="0"/>
+              <a:rPr lang="zh-CN" altLang="en-US" dirty="0"/>
+              <a:t>列表数量发生了变化 ，消息被发送到不同的</a:t>
+            </a:r>
+            <a:r>
+              <a:rPr lang="en-US" altLang="zh-CN" dirty="0"/>
               <a:t>Queue</a:t>
             </a:r>
             <a:r>
-              <a:rPr kumimoji="1" lang="zh-CN" altLang="en-US" dirty="0"/>
-              <a:t>数量是原来</a:t>
-            </a:r>
-            <a:r>
-              <a:rPr kumimoji="1" lang="en-US" altLang="zh-CN" dirty="0"/>
-              <a:t>Topic</a:t>
-            </a:r>
-            <a:r>
-              <a:rPr kumimoji="1" lang="zh-CN" altLang="en-US" dirty="0"/>
-              <a:t>的</a:t>
-            </a:r>
-            <a:r>
-              <a:rPr kumimoji="1" lang="en-US" altLang="zh-CN" dirty="0"/>
-              <a:t>N</a:t>
-            </a:r>
-            <a:r>
-              <a:rPr kumimoji="1" lang="zh-CN" altLang="en-US" dirty="0"/>
-              <a:t>倍。然后扩大</a:t>
-            </a:r>
-            <a:r>
-              <a:rPr kumimoji="1" lang="en-US" altLang="zh-CN" dirty="0"/>
-              <a:t>Consumer</a:t>
-            </a:r>
-            <a:r>
-              <a:rPr kumimoji="1" lang="zh-CN" altLang="en-US" dirty="0"/>
-              <a:t>的数量来消费新</a:t>
-            </a:r>
-            <a:r>
-              <a:rPr kumimoji="1" lang="en-US" altLang="zh-CN" dirty="0"/>
-              <a:t>Topic</a:t>
-            </a:r>
-            <a:r>
-              <a:rPr kumimoji="1" lang="zh-CN" altLang="en-US" dirty="0"/>
-              <a:t>的消息并完成业务处理，完成后将</a:t>
-            </a:r>
-            <a:r>
-              <a:rPr kumimoji="1" lang="en-US" altLang="zh-CN" dirty="0"/>
-              <a:t>Consumer</a:t>
-            </a:r>
-            <a:r>
-              <a:rPr kumimoji="1" lang="zh-CN" altLang="en-US" dirty="0"/>
-              <a:t>数量恢复到原来并消费旧的</a:t>
-            </a:r>
-            <a:r>
-              <a:rPr kumimoji="1" lang="en-US" altLang="zh-CN" dirty="0"/>
-              <a:t>Topic</a:t>
-            </a:r>
-            <a:r>
-              <a:rPr kumimoji="1" lang="zh-CN" altLang="en-US"/>
+              <a:rPr lang="zh-CN" altLang="en-US" dirty="0"/>
               <a:t>。</a:t>
             </a:r>
-            <a:endParaRPr kumimoji="1" lang="en-US" altLang="zh-CN" dirty="0"/>
-          </a:p>
-          <a:p>
-            <a:endParaRPr kumimoji="1" lang="en-US" altLang="zh-CN" dirty="0"/>
-          </a:p>
-          <a:p>
             <a:endParaRPr kumimoji="1" lang="zh-CN" altLang="en-US" dirty="0"/>
           </a:p>
         </p:txBody>
@@ -12564,7 +12639,7 @@
     </p:spTree>
     <p:extLst>
       <p:ext uri="{BB962C8B-B14F-4D97-AF65-F5344CB8AC3E}">
-        <p14:creationId xmlns:p14="http://schemas.microsoft.com/office/powerpoint/2010/main" val="2862804118"/>
+        <p14:creationId xmlns:p14="http://schemas.microsoft.com/office/powerpoint/2010/main" val="4146228857"/>
       </p:ext>
     </p:extLst>
   </p:cSld>
@@ -12919,6 +12994,367 @@
           <p:cNvPr id="2" name="标题 1">
             <a:extLst>
               <a:ext uri="{FF2B5EF4-FFF2-40B4-BE49-F238E27FC236}">
+                <a16:creationId xmlns:a16="http://schemas.microsoft.com/office/drawing/2014/main" id="{9DDA7E95-64DE-874B-98C5-CAB5D7A84579}"/>
+              </a:ext>
+            </a:extLst>
+          </p:cNvPr>
+          <p:cNvSpPr>
+            <a:spLocks noGrp="1"/>
+          </p:cNvSpPr>
+          <p:nvPr>
+            <p:ph type="title"/>
+          </p:nvPr>
+        </p:nvSpPr>
+        <p:spPr/>
+        <p:txBody>
+          <a:bodyPr/>
+          <a:lstStyle/>
+          <a:p>
+            <a:r>
+              <a:rPr kumimoji="1" lang="zh-CN" altLang="en-US" dirty="0"/>
+              <a:t>如何处理消息堆积</a:t>
+            </a:r>
+          </a:p>
+        </p:txBody>
+      </p:sp>
+      <p:sp>
+        <p:nvSpPr>
+          <p:cNvPr id="3" name="内容占位符 2">
+            <a:extLst>
+              <a:ext uri="{FF2B5EF4-FFF2-40B4-BE49-F238E27FC236}">
+                <a16:creationId xmlns:a16="http://schemas.microsoft.com/office/drawing/2014/main" id="{59F1AC20-F3E2-ED45-B105-080C9CB0461D}"/>
+              </a:ext>
+            </a:extLst>
+          </p:cNvPr>
+          <p:cNvSpPr>
+            <a:spLocks noGrp="1"/>
+          </p:cNvSpPr>
+          <p:nvPr>
+            <p:ph idx="1"/>
+          </p:nvPr>
+        </p:nvSpPr>
+        <p:spPr/>
+        <p:txBody>
+          <a:bodyPr>
+            <a:normAutofit lnSpcReduction="10000"/>
+          </a:bodyPr>
+          <a:lstStyle/>
+          <a:p>
+            <a:r>
+              <a:rPr kumimoji="1" lang="zh-CN" altLang="en-US" dirty="0"/>
+              <a:t>场景：</a:t>
+            </a:r>
+            <a:r>
+              <a:rPr kumimoji="1" lang="en-US" altLang="zh-CN" dirty="0"/>
+              <a:t>consumer</a:t>
+            </a:r>
+            <a:r>
+              <a:rPr kumimoji="1" lang="zh-CN" altLang="en-US" dirty="0"/>
+              <a:t>长时间宕机导致消息大量积压，如何快速处理？</a:t>
+            </a:r>
+            <a:endParaRPr kumimoji="1" lang="en-US" altLang="zh-CN" dirty="0"/>
+          </a:p>
+          <a:p>
+            <a:r>
+              <a:rPr kumimoji="1" lang="zh-CN" altLang="en-US" dirty="0"/>
+              <a:t>步骤</a:t>
+            </a:r>
+            <a:r>
+              <a:rPr kumimoji="1" lang="en-US" altLang="zh-CN" dirty="0"/>
+              <a:t>1:</a:t>
+            </a:r>
+            <a:r>
+              <a:rPr kumimoji="1" lang="zh-CN" altLang="en-US" dirty="0"/>
+              <a:t> 当然是先恢复</a:t>
+            </a:r>
+            <a:r>
+              <a:rPr kumimoji="1" lang="en-US" altLang="zh-CN" dirty="0"/>
+              <a:t>consumer</a:t>
+            </a:r>
+          </a:p>
+          <a:p>
+            <a:r>
+              <a:rPr kumimoji="1" lang="zh-CN" altLang="en-US" dirty="0"/>
+              <a:t>步骤</a:t>
+            </a:r>
+            <a:r>
+              <a:rPr kumimoji="1" lang="en-US" altLang="zh-CN" dirty="0"/>
+              <a:t>2:</a:t>
+            </a:r>
+            <a:r>
+              <a:rPr kumimoji="1" lang="zh-CN" altLang="en-US" dirty="0"/>
+              <a:t> 如果消息并不重要（日志，告警等），可以通过设置</a:t>
+            </a:r>
+            <a:r>
+              <a:rPr kumimoji="1" lang="en-US" altLang="zh-CN" dirty="0"/>
+              <a:t>consumer</a:t>
+            </a:r>
+            <a:r>
+              <a:rPr kumimoji="1" lang="zh-CN" altLang="en-US" dirty="0"/>
+              <a:t>消费时的</a:t>
+            </a:r>
+            <a:r>
+              <a:rPr kumimoji="1" lang="en-US" altLang="zh-CN" dirty="0"/>
+              <a:t>offset</a:t>
+            </a:r>
+            <a:r>
+              <a:rPr kumimoji="1" lang="zh-CN" altLang="en-US" dirty="0"/>
+              <a:t>为</a:t>
+            </a:r>
+            <a:r>
+              <a:rPr lang="en" altLang="zh-CN" i="1" dirty="0"/>
+              <a:t>CONSUME_FROM_LAST_OFFSET</a:t>
+            </a:r>
+          </a:p>
+          <a:p>
+            <a:r>
+              <a:rPr kumimoji="1" lang="zh-CN" altLang="en-US" dirty="0"/>
+              <a:t>步骤</a:t>
+            </a:r>
+            <a:r>
+              <a:rPr kumimoji="1" lang="en-US" altLang="zh-CN" dirty="0"/>
+              <a:t>3:</a:t>
+            </a:r>
+            <a:r>
+              <a:rPr kumimoji="1" lang="zh-CN" altLang="en-US" dirty="0"/>
+              <a:t> 如果消息必须要重新消费，那先要查看</a:t>
+            </a:r>
+            <a:r>
+              <a:rPr kumimoji="1" lang="en-US" altLang="zh-CN" dirty="0"/>
+              <a:t>Topic</a:t>
+            </a:r>
+            <a:r>
+              <a:rPr kumimoji="1" lang="zh-CN" altLang="en-US" dirty="0"/>
+              <a:t>对应的</a:t>
+            </a:r>
+            <a:r>
+              <a:rPr kumimoji="1" lang="en-US" altLang="zh-CN" dirty="0" err="1"/>
+              <a:t>ReadQueue</a:t>
+            </a:r>
+            <a:r>
+              <a:rPr kumimoji="1" lang="zh-CN" altLang="en-US" dirty="0"/>
+              <a:t>的数量，如果</a:t>
+            </a:r>
+            <a:r>
+              <a:rPr kumimoji="1" lang="en-US" altLang="zh-CN" dirty="0"/>
+              <a:t>Consumer</a:t>
+            </a:r>
+            <a:r>
+              <a:rPr kumimoji="1" lang="zh-CN" altLang="en-US" dirty="0"/>
+              <a:t>数量小于</a:t>
+            </a:r>
+            <a:r>
+              <a:rPr kumimoji="1" lang="en-US" altLang="zh-CN" dirty="0" err="1"/>
+              <a:t>ReadQueue</a:t>
+            </a:r>
+            <a:r>
+              <a:rPr kumimoji="1" lang="zh-CN" altLang="en-US" dirty="0"/>
+              <a:t>的数量，可以通过增加</a:t>
+            </a:r>
+            <a:r>
+              <a:rPr kumimoji="1" lang="en-US" altLang="zh-CN" dirty="0"/>
+              <a:t>Consumer</a:t>
+            </a:r>
+            <a:r>
+              <a:rPr kumimoji="1" lang="zh-CN" altLang="en-US" dirty="0"/>
+              <a:t>数量到</a:t>
+            </a:r>
+            <a:r>
+              <a:rPr kumimoji="1" lang="en-US" altLang="zh-CN" dirty="0" err="1"/>
+              <a:t>ReadQueue</a:t>
+            </a:r>
+            <a:r>
+              <a:rPr kumimoji="1" lang="zh-CN" altLang="en-US" dirty="0"/>
+              <a:t>数量的形式来加快消息消费</a:t>
+            </a:r>
+            <a:endParaRPr kumimoji="1" lang="en-US" altLang="zh-CN" dirty="0"/>
+          </a:p>
+          <a:p>
+            <a:r>
+              <a:rPr kumimoji="1" lang="zh-CN" altLang="en-US" dirty="0"/>
+              <a:t>步骤</a:t>
+            </a:r>
+            <a:r>
+              <a:rPr kumimoji="1" lang="en-US" altLang="zh-CN" dirty="0"/>
+              <a:t>4:</a:t>
+            </a:r>
+            <a:r>
+              <a:rPr kumimoji="1" lang="zh-CN" altLang="en-US" dirty="0"/>
+              <a:t> 如果步骤</a:t>
+            </a:r>
+            <a:r>
+              <a:rPr kumimoji="1" lang="en-US" altLang="zh-CN" dirty="0"/>
+              <a:t>3</a:t>
+            </a:r>
+            <a:r>
+              <a:rPr kumimoji="1" lang="zh-CN" altLang="en-US" dirty="0"/>
+              <a:t>不成立，则不能直接通过增加</a:t>
+            </a:r>
+            <a:r>
+              <a:rPr kumimoji="1" lang="en-US" altLang="zh-CN" dirty="0"/>
+              <a:t>Consumer</a:t>
+            </a:r>
+            <a:r>
+              <a:rPr kumimoji="1" lang="zh-CN" altLang="en-US" dirty="0"/>
+              <a:t>数量的形式（因为一个</a:t>
+            </a:r>
+            <a:r>
+              <a:rPr kumimoji="1" lang="en-US" altLang="zh-CN" dirty="0"/>
+              <a:t>Queue</a:t>
+            </a:r>
+            <a:r>
+              <a:rPr kumimoji="1" lang="zh-CN" altLang="en-US" dirty="0"/>
+              <a:t>只能被一个</a:t>
+            </a:r>
+            <a:r>
+              <a:rPr kumimoji="1" lang="en-US" altLang="zh-CN" dirty="0"/>
+              <a:t>Consumer</a:t>
+            </a:r>
+            <a:r>
+              <a:rPr kumimoji="1" lang="zh-CN" altLang="en-US" dirty="0"/>
+              <a:t>消费），可以考虑创建</a:t>
+            </a:r>
+            <a:r>
+              <a:rPr kumimoji="1" lang="en-US" altLang="zh-CN" dirty="0"/>
+              <a:t>N</a:t>
+            </a:r>
+            <a:r>
+              <a:rPr kumimoji="1" lang="zh-CN" altLang="en-US" dirty="0"/>
+              <a:t>个新的</a:t>
+            </a:r>
+            <a:r>
+              <a:rPr kumimoji="1" lang="en-US" altLang="zh-CN" dirty="0"/>
+              <a:t>Consumer</a:t>
+            </a:r>
+            <a:r>
+              <a:rPr kumimoji="1" lang="zh-CN" altLang="en-US" dirty="0"/>
+              <a:t>，将堆积</a:t>
+            </a:r>
+            <a:r>
+              <a:rPr kumimoji="1" lang="en-US" altLang="zh-CN" dirty="0"/>
+              <a:t>Topic</a:t>
+            </a:r>
+            <a:r>
+              <a:rPr kumimoji="1" lang="zh-CN" altLang="en-US" dirty="0"/>
+              <a:t>的消息搬运到一个新的</a:t>
+            </a:r>
+            <a:r>
+              <a:rPr kumimoji="1" lang="en-US" altLang="zh-CN" dirty="0"/>
+              <a:t>Topic</a:t>
+            </a:r>
+            <a:r>
+              <a:rPr kumimoji="1" lang="zh-CN" altLang="en-US" dirty="0"/>
+              <a:t>（不处理业务逻辑，只搬运），新</a:t>
+            </a:r>
+            <a:r>
+              <a:rPr kumimoji="1" lang="en-US" altLang="zh-CN" dirty="0"/>
+              <a:t>Topic</a:t>
+            </a:r>
+            <a:r>
+              <a:rPr kumimoji="1" lang="zh-CN" altLang="en-US" dirty="0"/>
+              <a:t>的</a:t>
+            </a:r>
+            <a:r>
+              <a:rPr kumimoji="1" lang="en-US" altLang="zh-CN" dirty="0"/>
+              <a:t>Queue</a:t>
+            </a:r>
+            <a:r>
+              <a:rPr kumimoji="1" lang="zh-CN" altLang="en-US" dirty="0"/>
+              <a:t>数量是原来</a:t>
+            </a:r>
+            <a:r>
+              <a:rPr kumimoji="1" lang="en-US" altLang="zh-CN" dirty="0"/>
+              <a:t>Topic</a:t>
+            </a:r>
+            <a:r>
+              <a:rPr kumimoji="1" lang="zh-CN" altLang="en-US" dirty="0"/>
+              <a:t>的</a:t>
+            </a:r>
+            <a:r>
+              <a:rPr kumimoji="1" lang="en-US" altLang="zh-CN" dirty="0"/>
+              <a:t>N</a:t>
+            </a:r>
+            <a:r>
+              <a:rPr kumimoji="1" lang="zh-CN" altLang="en-US" dirty="0"/>
+              <a:t>倍。然后扩大</a:t>
+            </a:r>
+            <a:r>
+              <a:rPr kumimoji="1" lang="en-US" altLang="zh-CN" dirty="0"/>
+              <a:t>Consumer</a:t>
+            </a:r>
+            <a:r>
+              <a:rPr kumimoji="1" lang="zh-CN" altLang="en-US" dirty="0"/>
+              <a:t>的数量来消费新</a:t>
+            </a:r>
+            <a:r>
+              <a:rPr kumimoji="1" lang="en-US" altLang="zh-CN" dirty="0"/>
+              <a:t>Topic</a:t>
+            </a:r>
+            <a:r>
+              <a:rPr kumimoji="1" lang="zh-CN" altLang="en-US" dirty="0"/>
+              <a:t>的消息并完成业务处理，完成后将</a:t>
+            </a:r>
+            <a:r>
+              <a:rPr kumimoji="1" lang="en-US" altLang="zh-CN" dirty="0"/>
+              <a:t>Consumer</a:t>
+            </a:r>
+            <a:r>
+              <a:rPr kumimoji="1" lang="zh-CN" altLang="en-US" dirty="0"/>
+              <a:t>数量恢复到原来并消费旧的</a:t>
+            </a:r>
+            <a:r>
+              <a:rPr kumimoji="1" lang="en-US" altLang="zh-CN" dirty="0"/>
+              <a:t>Topic</a:t>
+            </a:r>
+            <a:r>
+              <a:rPr kumimoji="1" lang="zh-CN" altLang="en-US"/>
+              <a:t>。</a:t>
+            </a:r>
+            <a:endParaRPr kumimoji="1" lang="en-US" altLang="zh-CN" dirty="0"/>
+          </a:p>
+          <a:p>
+            <a:endParaRPr kumimoji="1" lang="en-US" altLang="zh-CN" dirty="0"/>
+          </a:p>
+          <a:p>
+            <a:endParaRPr kumimoji="1" lang="zh-CN" altLang="en-US" dirty="0"/>
+          </a:p>
+        </p:txBody>
+      </p:sp>
+    </p:spTree>
+    <p:extLst>
+      <p:ext uri="{BB962C8B-B14F-4D97-AF65-F5344CB8AC3E}">
+        <p14:creationId xmlns:p14="http://schemas.microsoft.com/office/powerpoint/2010/main" val="2862804118"/>
+      </p:ext>
+    </p:extLst>
+  </p:cSld>
+  <p:clrMapOvr>
+    <a:masterClrMapping/>
+  </p:clrMapOvr>
+</p:sld>
+</file>
+
+<file path=ppt/slides/slide31.xml><?xml version="1.0" encoding="utf-8"?>
+<p:sld xmlns:a="http://schemas.openxmlformats.org/drawingml/2006/main" xmlns:r="http://schemas.openxmlformats.org/officeDocument/2006/relationships" xmlns:p="http://schemas.openxmlformats.org/presentationml/2006/main">
+  <p:cSld>
+    <p:spTree>
+      <p:nvGrpSpPr>
+        <p:cNvPr id="1" name=""/>
+        <p:cNvGrpSpPr/>
+        <p:nvPr/>
+      </p:nvGrpSpPr>
+      <p:grpSpPr>
+        <a:xfrm>
+          <a:off x="0" y="0"/>
+          <a:ext cx="0" cy="0"/>
+          <a:chOff x="0" y="0"/>
+          <a:chExt cx="0" cy="0"/>
+        </a:xfrm>
+      </p:grpSpPr>
+      <p:sp>
+        <p:nvSpPr>
+          <p:cNvPr id="2" name="标题 1">
+            <a:extLst>
+              <a:ext uri="{FF2B5EF4-FFF2-40B4-BE49-F238E27FC236}">
                 <a16:creationId xmlns:a16="http://schemas.microsoft.com/office/drawing/2014/main" id="{63A09A91-A650-9D4B-BE61-62F8F8FF4EE8}"/>
               </a:ext>
             </a:extLst>
@@ -12961,7 +13397,7 @@
 </p:sld>
 </file>
 
-<file path=ppt/slides/slide31.xml><?xml version="1.0" encoding="utf-8"?>
+<file path=ppt/slides/slide32.xml><?xml version="1.0" encoding="utf-8"?>
 <p:sld xmlns:a="http://schemas.openxmlformats.org/drawingml/2006/main" xmlns:r="http://schemas.openxmlformats.org/officeDocument/2006/relationships" xmlns:p="http://schemas.openxmlformats.org/presentationml/2006/main">
   <p:cSld>
     <p:spTree>

</xml_diff>

<commit_message>
RocketMQ文档 by yipin 2021-05-21
</commit_message>
<xml_diff>
--- a/doc/RocketMQ简介.pptx
+++ b/doc/RocketMQ简介.pptx
@@ -35,8 +35,9 @@
     <p:sldId id="261" r:id="rId29"/>
     <p:sldId id="263" r:id="rId30"/>
     <p:sldId id="267" r:id="rId31"/>
-    <p:sldId id="288" r:id="rId32"/>
-    <p:sldId id="289" r:id="rId33"/>
+    <p:sldId id="292" r:id="rId32"/>
+    <p:sldId id="288" r:id="rId33"/>
+    <p:sldId id="289" r:id="rId34"/>
   </p:sldIdLst>
   <p:sldSz cx="12192000" cy="6858000"/>
   <p:notesSz cx="6858000" cy="9144000"/>
@@ -332,7 +333,7 @@
             <a:fld id="{B61BEF0D-F0BB-DE4B-95CE-6DB70DBA9567}" type="datetimeFigureOut">
               <a:rPr lang="en-US" dirty="0"/>
               <a:pPr/>
-              <a:t>5/19/21</a:t>
+              <a:t>5/21/21</a:t>
             </a:fld>
             <a:endParaRPr lang="en-US" dirty="0"/>
           </a:p>
@@ -667,7 +668,7 @@
             <a:fld id="{B61BEF0D-F0BB-DE4B-95CE-6DB70DBA9567}" type="datetimeFigureOut">
               <a:rPr lang="en-US" dirty="0"/>
               <a:pPr/>
-              <a:t>5/19/21</a:t>
+              <a:t>5/21/21</a:t>
             </a:fld>
             <a:endParaRPr lang="en-US" dirty="0"/>
           </a:p>
@@ -1065,7 +1066,7 @@
             <a:fld id="{B61BEF0D-F0BB-DE4B-95CE-6DB70DBA9567}" type="datetimeFigureOut">
               <a:rPr lang="en-US" dirty="0"/>
               <a:pPr/>
-              <a:t>5/19/21</a:t>
+              <a:t>5/21/21</a:t>
             </a:fld>
             <a:endParaRPr lang="en-US" dirty="0"/>
           </a:p>
@@ -1398,7 +1399,7 @@
             <a:fld id="{B61BEF0D-F0BB-DE4B-95CE-6DB70DBA9567}" type="datetimeFigureOut">
               <a:rPr lang="en-US" dirty="0"/>
               <a:pPr/>
-              <a:t>5/19/21</a:t>
+              <a:t>5/21/21</a:t>
             </a:fld>
             <a:endParaRPr lang="en-US" dirty="0"/>
           </a:p>
@@ -1715,7 +1716,7 @@
             <a:fld id="{B61BEF0D-F0BB-DE4B-95CE-6DB70DBA9567}" type="datetimeFigureOut">
               <a:rPr lang="en-US" dirty="0"/>
               <a:pPr/>
-              <a:t>5/19/21</a:t>
+              <a:t>5/21/21</a:t>
             </a:fld>
             <a:endParaRPr lang="en-US" dirty="0"/>
           </a:p>
@@ -2108,7 +2109,7 @@
             <a:fld id="{B61BEF0D-F0BB-DE4B-95CE-6DB70DBA9567}" type="datetimeFigureOut">
               <a:rPr lang="en-US" dirty="0"/>
               <a:pPr/>
-              <a:t>5/19/21</a:t>
+              <a:t>5/21/21</a:t>
             </a:fld>
             <a:endParaRPr lang="en-US" dirty="0"/>
           </a:p>
@@ -2362,7 +2363,7 @@
             <a:fld id="{B61BEF0D-F0BB-DE4B-95CE-6DB70DBA9567}" type="datetimeFigureOut">
               <a:rPr lang="en-US" dirty="0"/>
               <a:pPr/>
-              <a:t>5/19/21</a:t>
+              <a:t>5/21/21</a:t>
             </a:fld>
             <a:endParaRPr lang="en-US" dirty="0"/>
           </a:p>
@@ -2621,7 +2622,7 @@
             <a:fld id="{B61BEF0D-F0BB-DE4B-95CE-6DB70DBA9567}" type="datetimeFigureOut">
               <a:rPr lang="en-US" dirty="0"/>
               <a:pPr/>
-              <a:t>5/19/21</a:t>
+              <a:t>5/21/21</a:t>
             </a:fld>
             <a:endParaRPr lang="en-US" dirty="0"/>
           </a:p>
@@ -2880,7 +2881,7 @@
             <a:fld id="{B61BEF0D-F0BB-DE4B-95CE-6DB70DBA9567}" type="datetimeFigureOut">
               <a:rPr lang="en-US" dirty="0"/>
               <a:pPr/>
-              <a:t>5/19/21</a:t>
+              <a:t>5/21/21</a:t>
             </a:fld>
             <a:endParaRPr lang="en-US" dirty="0"/>
           </a:p>
@@ -3206,7 +3207,7 @@
             <a:fld id="{B61BEF0D-F0BB-DE4B-95CE-6DB70DBA9567}" type="datetimeFigureOut">
               <a:rPr lang="en-US" dirty="0"/>
               <a:pPr/>
-              <a:t>5/19/21</a:t>
+              <a:t>5/21/21</a:t>
             </a:fld>
             <a:endParaRPr lang="en-US" dirty="0"/>
           </a:p>
@@ -3526,7 +3527,7 @@
             <a:fld id="{B61BEF0D-F0BB-DE4B-95CE-6DB70DBA9567}" type="datetimeFigureOut">
               <a:rPr lang="en-US" dirty="0"/>
               <a:pPr/>
-              <a:t>5/19/21</a:t>
+              <a:t>5/21/21</a:t>
             </a:fld>
             <a:endParaRPr lang="en-US" dirty="0"/>
           </a:p>
@@ -3980,7 +3981,7 @@
             <a:fld id="{B61BEF0D-F0BB-DE4B-95CE-6DB70DBA9567}" type="datetimeFigureOut">
               <a:rPr lang="en-US" dirty="0"/>
               <a:pPr/>
-              <a:t>5/19/21</a:t>
+              <a:t>5/21/21</a:t>
             </a:fld>
             <a:endParaRPr lang="en-US" dirty="0"/>
           </a:p>
@@ -4182,7 +4183,7 @@
             <a:fld id="{B61BEF0D-F0BB-DE4B-95CE-6DB70DBA9567}" type="datetimeFigureOut">
               <a:rPr lang="en-US" dirty="0"/>
               <a:pPr/>
-              <a:t>5/19/21</a:t>
+              <a:t>5/21/21</a:t>
             </a:fld>
             <a:endParaRPr lang="en-US" dirty="0"/>
           </a:p>
@@ -4356,7 +4357,7 @@
             <a:fld id="{B61BEF0D-F0BB-DE4B-95CE-6DB70DBA9567}" type="datetimeFigureOut">
               <a:rPr lang="en-US" dirty="0"/>
               <a:pPr/>
-              <a:t>5/19/21</a:t>
+              <a:t>5/21/21</a:t>
             </a:fld>
             <a:endParaRPr lang="en-US" dirty="0"/>
           </a:p>
@@ -4686,7 +4687,7 @@
             <a:fld id="{B61BEF0D-F0BB-DE4B-95CE-6DB70DBA9567}" type="datetimeFigureOut">
               <a:rPr lang="en-US" dirty="0"/>
               <a:pPr/>
-              <a:t>5/19/21</a:t>
+              <a:t>5/21/21</a:t>
             </a:fld>
             <a:endParaRPr lang="en-US" dirty="0"/>
           </a:p>
@@ -5028,7 +5029,7 @@
             <a:fld id="{B61BEF0D-F0BB-DE4B-95CE-6DB70DBA9567}" type="datetimeFigureOut">
               <a:rPr lang="en-US" dirty="0"/>
               <a:pPr/>
-              <a:t>5/19/21</a:t>
+              <a:t>5/21/21</a:t>
             </a:fld>
             <a:endParaRPr lang="en-US" dirty="0"/>
           </a:p>
@@ -7142,7 +7143,7 @@
             <a:fld id="{B61BEF0D-F0BB-DE4B-95CE-6DB70DBA9567}" type="datetimeFigureOut">
               <a:rPr lang="en-US" dirty="0"/>
               <a:pPr/>
-              <a:t>5/19/21</a:t>
+              <a:t>5/21/21</a:t>
             </a:fld>
             <a:endParaRPr lang="en-US" dirty="0"/>
           </a:p>
@@ -8666,7 +8667,19 @@
             </a:r>
             <a:r>
               <a:rPr lang="zh-CN" altLang="en-US" dirty="0"/>
-              <a:t>信息，然后选择一个</a:t>
+              <a:t>信息（从</a:t>
+            </a:r>
+            <a:r>
+              <a:rPr lang="en-US" altLang="zh-CN"/>
+              <a:t>nameserver</a:t>
+            </a:r>
+            <a:r>
+              <a:rPr lang="zh-CN" altLang="en-US"/>
+              <a:t>），</a:t>
+            </a:r>
+            <a:r>
+              <a:rPr lang="zh-CN" altLang="en-US" dirty="0"/>
+              <a:t>然后选择一个</a:t>
             </a:r>
             <a:r>
               <a:rPr lang="en-US" altLang="zh-CN" dirty="0" err="1"/>
@@ -13355,6 +13368,381 @@
           <p:cNvPr id="2" name="标题 1">
             <a:extLst>
               <a:ext uri="{FF2B5EF4-FFF2-40B4-BE49-F238E27FC236}">
+                <a16:creationId xmlns:a16="http://schemas.microsoft.com/office/drawing/2014/main" id="{5C89F919-14A4-7C4C-8AF6-50C9A7FFC26D}"/>
+              </a:ext>
+            </a:extLst>
+          </p:cNvPr>
+          <p:cNvSpPr>
+            <a:spLocks noGrp="1"/>
+          </p:cNvSpPr>
+          <p:nvPr>
+            <p:ph type="title"/>
+          </p:nvPr>
+        </p:nvSpPr>
+        <p:spPr/>
+        <p:txBody>
+          <a:bodyPr/>
+          <a:lstStyle/>
+          <a:p>
+            <a:r>
+              <a:rPr kumimoji="1" lang="zh-CN" altLang="en-US" dirty="0"/>
+              <a:t>如何处理过期文件</a:t>
+            </a:r>
+          </a:p>
+        </p:txBody>
+      </p:sp>
+      <p:sp>
+        <p:nvSpPr>
+          <p:cNvPr id="3" name="内容占位符 2">
+            <a:extLst>
+              <a:ext uri="{FF2B5EF4-FFF2-40B4-BE49-F238E27FC236}">
+                <a16:creationId xmlns:a16="http://schemas.microsoft.com/office/drawing/2014/main" id="{B10B16E8-1176-4D45-AF1A-A144D5E92647}"/>
+              </a:ext>
+            </a:extLst>
+          </p:cNvPr>
+          <p:cNvSpPr>
+            <a:spLocks noGrp="1"/>
+          </p:cNvSpPr>
+          <p:nvPr>
+            <p:ph idx="1"/>
+          </p:nvPr>
+        </p:nvSpPr>
+        <p:spPr>
+          <a:xfrm>
+            <a:off x="2589212" y="1786759"/>
+            <a:ext cx="8915400" cy="4124463"/>
+          </a:xfrm>
+        </p:spPr>
+        <p:txBody>
+          <a:bodyPr>
+            <a:normAutofit fontScale="85000" lnSpcReduction="20000"/>
+          </a:bodyPr>
+          <a:lstStyle/>
+          <a:p>
+            <a:r>
+              <a:rPr kumimoji="1" lang="zh-CN" altLang="en-US" dirty="0"/>
+              <a:t>文件过期判定：</a:t>
+            </a:r>
+            <a:r>
+              <a:rPr lang="en-US" altLang="zh-CN" dirty="0"/>
+              <a:t> </a:t>
+            </a:r>
+            <a:r>
+              <a:rPr lang="en-US" altLang="zh-CN" dirty="0" err="1"/>
+              <a:t>RocketMQ</a:t>
+            </a:r>
+            <a:r>
+              <a:rPr lang="zh-CN" altLang="en-US" dirty="0"/>
+              <a:t>顺序写</a:t>
+            </a:r>
+            <a:r>
+              <a:rPr lang="en-US" altLang="zh-CN" dirty="0" err="1"/>
+              <a:t>CommitLog</a:t>
+            </a:r>
+            <a:r>
+              <a:rPr lang="zh-CN" altLang="en-US" dirty="0"/>
+              <a:t>文件、</a:t>
+            </a:r>
+            <a:r>
+              <a:rPr lang="en-US" altLang="zh-CN" dirty="0" err="1"/>
+              <a:t>ComsumeQueue</a:t>
+            </a:r>
+            <a:r>
+              <a:rPr lang="zh-CN" altLang="en-US" dirty="0"/>
+              <a:t>文件，所有的写操作都追加到最后一个文件上，因此在当前写文件之前的文件将不会有数据插入，也就不会有任何变动，因此可通过时间来做判断，比如超过</a:t>
+            </a:r>
+            <a:r>
+              <a:rPr lang="en-US" altLang="zh-CN" dirty="0" err="1"/>
+              <a:t>fileReservedTime</a:t>
+            </a:r>
+            <a:r>
+              <a:rPr lang="zh-CN" altLang="en-US" dirty="0"/>
+              <a:t>（默认</a:t>
+            </a:r>
+            <a:r>
+              <a:rPr lang="en-US" altLang="zh-CN" dirty="0"/>
+              <a:t>48</a:t>
+            </a:r>
+            <a:r>
+              <a:rPr lang="zh-CN" altLang="en-US" dirty="0"/>
+              <a:t>）小时未更新的文件将会被删除（即使这个</a:t>
+            </a:r>
+            <a:r>
+              <a:rPr lang="en-US" altLang="zh-CN" dirty="0" err="1"/>
+              <a:t>CommitLog</a:t>
+            </a:r>
+            <a:r>
+              <a:rPr lang="zh-CN" altLang="en-US" dirty="0"/>
+              <a:t>文件没有被完全消费）。</a:t>
+            </a:r>
+            <a:endParaRPr lang="en-US" altLang="zh-CN" dirty="0"/>
+          </a:p>
+          <a:p>
+            <a:r>
+              <a:rPr kumimoji="1" lang="en-US" altLang="zh-CN" dirty="0" err="1"/>
+              <a:t>deleteWhen</a:t>
+            </a:r>
+            <a:r>
+              <a:rPr kumimoji="1" lang="zh-CN" altLang="en-US" dirty="0"/>
+              <a:t>参数代表在几年做过期文件删除（默认</a:t>
+            </a:r>
+            <a:r>
+              <a:rPr kumimoji="1" lang="en-US" altLang="zh-CN" dirty="0"/>
+              <a:t>04</a:t>
+            </a:r>
+            <a:r>
+              <a:rPr kumimoji="1" lang="zh-CN" altLang="en-US" dirty="0"/>
+              <a:t>代表凌晨</a:t>
+            </a:r>
+            <a:r>
+              <a:rPr kumimoji="1" lang="en-US" altLang="zh-CN" dirty="0"/>
+              <a:t>4</a:t>
+            </a:r>
+            <a:r>
+              <a:rPr kumimoji="1" lang="zh-CN" altLang="en-US" dirty="0"/>
+              <a:t>点）</a:t>
+            </a:r>
+            <a:endParaRPr kumimoji="1" lang="en-US" altLang="zh-CN" dirty="0"/>
+          </a:p>
+          <a:p>
+            <a:r>
+              <a:rPr kumimoji="1" lang="zh-CN" altLang="en-US" dirty="0"/>
+              <a:t>流程：</a:t>
+            </a:r>
+            <a:endParaRPr kumimoji="1" lang="en-US" altLang="zh-CN" dirty="0"/>
+          </a:p>
+          <a:p>
+            <a:pPr marL="0" indent="0">
+              <a:buNone/>
+            </a:pPr>
+            <a:r>
+              <a:rPr kumimoji="1" lang="zh-CN" altLang="en-US" dirty="0"/>
+              <a:t>     </a:t>
+            </a:r>
+            <a:r>
+              <a:rPr kumimoji="1" lang="en-US" altLang="zh-CN" dirty="0"/>
+              <a:t>1.</a:t>
+            </a:r>
+            <a:r>
+              <a:rPr kumimoji="1" lang="zh-CN" altLang="en-US" dirty="0"/>
+              <a:t> </a:t>
+            </a:r>
+            <a:r>
+              <a:rPr lang="en-US" altLang="zh-CN" dirty="0"/>
+              <a:t>broker</a:t>
+            </a:r>
+            <a:r>
+              <a:rPr lang="zh-CN" altLang="en-US" dirty="0"/>
+              <a:t>定时任务每</a:t>
+            </a:r>
+            <a:r>
+              <a:rPr lang="en-US" altLang="zh-CN" dirty="0"/>
+              <a:t>10</a:t>
+            </a:r>
+            <a:r>
+              <a:rPr lang="zh-CN" altLang="en-US" dirty="0"/>
+              <a:t>秒扫描是否有文件需要删除</a:t>
+            </a:r>
+            <a:endParaRPr lang="en-US" altLang="zh-CN" dirty="0"/>
+          </a:p>
+          <a:p>
+            <a:pPr marL="0" indent="0">
+              <a:buNone/>
+            </a:pPr>
+            <a:r>
+              <a:rPr lang="zh-CN" altLang="en-US" dirty="0"/>
+              <a:t>     </a:t>
+            </a:r>
+            <a:r>
+              <a:rPr lang="en-US" altLang="zh-CN" dirty="0"/>
+              <a:t>2.</a:t>
+            </a:r>
+            <a:r>
+              <a:rPr lang="zh-CN" altLang="en-US" dirty="0"/>
+              <a:t> 以下三种情况触发文件删除：到了</a:t>
+            </a:r>
+            <a:r>
+              <a:rPr lang="en-US" altLang="zh-CN" dirty="0" err="1"/>
+              <a:t>deleteWhere</a:t>
+            </a:r>
+            <a:r>
+              <a:rPr lang="zh-CN" altLang="en-US" dirty="0"/>
+              <a:t>指定的时间点（默认是凌晨</a:t>
+            </a:r>
+            <a:r>
+              <a:rPr lang="en-US" altLang="zh-CN" dirty="0"/>
+              <a:t>4</a:t>
+            </a:r>
+            <a:r>
+              <a:rPr lang="zh-CN" altLang="en-US" dirty="0"/>
+              <a:t>点）、磁盘不足、手动触发</a:t>
+            </a:r>
+            <a:endParaRPr lang="en-US" altLang="zh-CN" dirty="0"/>
+          </a:p>
+          <a:p>
+            <a:pPr marL="0" indent="0">
+              <a:buNone/>
+            </a:pPr>
+            <a:r>
+              <a:rPr lang="zh-CN" altLang="en-US" dirty="0"/>
+              <a:t>     </a:t>
+            </a:r>
+            <a:r>
+              <a:rPr lang="en-US" altLang="zh-CN" dirty="0"/>
+              <a:t>3.</a:t>
+            </a:r>
+            <a:r>
+              <a:rPr lang="zh-CN" altLang="en-US" dirty="0"/>
+              <a:t>对于磁盘不足的情况</a:t>
+            </a:r>
+            <a:endParaRPr lang="en-US" altLang="zh-CN" dirty="0"/>
+          </a:p>
+          <a:p>
+            <a:pPr marL="0" indent="0">
+              <a:buNone/>
+            </a:pPr>
+            <a:r>
+              <a:rPr lang="en-US" altLang="zh-CN" dirty="0"/>
+              <a:t>	a. </a:t>
+            </a:r>
+            <a:r>
+              <a:rPr lang="zh-CN" altLang="en-US" dirty="0"/>
+              <a:t>当磁盘使用率大于磁盘空间警戒线水位（默认是</a:t>
+            </a:r>
+            <a:r>
+              <a:rPr lang="en-US" altLang="zh-CN" dirty="0"/>
+              <a:t>90%</a:t>
+            </a:r>
+            <a:r>
+              <a:rPr lang="zh-CN" altLang="en-US" dirty="0"/>
+              <a:t>），会阻止消息写入</a:t>
+            </a:r>
+            <a:endParaRPr lang="en-US" altLang="zh-CN" dirty="0"/>
+          </a:p>
+          <a:p>
+            <a:pPr marL="0" indent="0">
+              <a:buNone/>
+            </a:pPr>
+            <a:r>
+              <a:rPr lang="en-US" altLang="zh-CN" dirty="0"/>
+              <a:t>	b. </a:t>
+            </a:r>
+            <a:r>
+              <a:rPr lang="zh-CN" altLang="en-US" dirty="0"/>
+              <a:t>磁盘已经达到必须释放的上限（</a:t>
+            </a:r>
+            <a:r>
+              <a:rPr lang="en-US" altLang="zh-CN" dirty="0"/>
+              <a:t>85%</a:t>
+            </a:r>
+            <a:r>
+              <a:rPr lang="zh-CN" altLang="en-US" dirty="0"/>
+              <a:t>水位线）的时候，则开始批量清理文件（无论是否过期），直到空间充足。</a:t>
+            </a:r>
+            <a:endParaRPr lang="en-US" altLang="zh-CN" dirty="0"/>
+          </a:p>
+          <a:p>
+            <a:pPr marL="0" indent="0">
+              <a:buNone/>
+            </a:pPr>
+            <a:r>
+              <a:rPr lang="en-US" altLang="zh-CN" dirty="0"/>
+              <a:t>	c. </a:t>
+            </a:r>
+            <a:r>
+              <a:rPr lang="zh-CN" altLang="en-US" dirty="0"/>
+              <a:t>消息文件过期，且到达清理时点（默认是凌晨</a:t>
+            </a:r>
+            <a:r>
+              <a:rPr lang="en-US" altLang="zh-CN" dirty="0"/>
+              <a:t>4</a:t>
+            </a:r>
+            <a:r>
+              <a:rPr lang="zh-CN" altLang="en-US" dirty="0"/>
+              <a:t>点），删除过期文件。</a:t>
+            </a:r>
+          </a:p>
+          <a:p>
+            <a:pPr marL="0" indent="0">
+              <a:buNone/>
+            </a:pPr>
+            <a:r>
+              <a:rPr lang="en-US" altLang="zh-CN" dirty="0"/>
+              <a:t>	d. </a:t>
+            </a:r>
+            <a:r>
+              <a:rPr lang="zh-CN" altLang="en-US" dirty="0"/>
+              <a:t>消息</a:t>
+            </a:r>
+            <a:r>
+              <a:rPr lang="zh-CN" altLang="en-US"/>
+              <a:t>文件过期，</a:t>
+            </a:r>
+            <a:r>
+              <a:rPr lang="zh-CN" altLang="en-US" dirty="0"/>
+              <a:t>且磁盘空间达到了水位线（默认</a:t>
+            </a:r>
+            <a:r>
+              <a:rPr lang="en-US" altLang="zh-CN" dirty="0"/>
+              <a:t>75%</a:t>
+            </a:r>
+            <a:r>
+              <a:rPr lang="zh-CN" altLang="en-US" dirty="0"/>
+              <a:t>），删除过期文件。</a:t>
+            </a:r>
+          </a:p>
+          <a:p>
+            <a:pPr marL="0" indent="0">
+              <a:buNone/>
+            </a:pPr>
+            <a:endParaRPr lang="zh-CN" altLang="en-US" dirty="0"/>
+          </a:p>
+          <a:p>
+            <a:pPr marL="0" indent="0">
+              <a:buNone/>
+            </a:pPr>
+            <a:endParaRPr lang="zh-CN" altLang="en-US" dirty="0"/>
+          </a:p>
+          <a:p>
+            <a:endParaRPr kumimoji="1" lang="zh-CN" altLang="en-US" dirty="0"/>
+          </a:p>
+        </p:txBody>
+      </p:sp>
+    </p:spTree>
+    <p:extLst>
+      <p:ext uri="{BB962C8B-B14F-4D97-AF65-F5344CB8AC3E}">
+        <p14:creationId xmlns:p14="http://schemas.microsoft.com/office/powerpoint/2010/main" val="3234409179"/>
+      </p:ext>
+    </p:extLst>
+  </p:cSld>
+  <p:clrMapOvr>
+    <a:masterClrMapping/>
+  </p:clrMapOvr>
+</p:sld>
+</file>
+
+<file path=ppt/slides/slide32.xml><?xml version="1.0" encoding="utf-8"?>
+<p:sld xmlns:a="http://schemas.openxmlformats.org/drawingml/2006/main" xmlns:r="http://schemas.openxmlformats.org/officeDocument/2006/relationships" xmlns:p="http://schemas.openxmlformats.org/presentationml/2006/main">
+  <p:cSld>
+    <p:spTree>
+      <p:nvGrpSpPr>
+        <p:cNvPr id="1" name=""/>
+        <p:cNvGrpSpPr/>
+        <p:nvPr/>
+      </p:nvGrpSpPr>
+      <p:grpSpPr>
+        <a:xfrm>
+          <a:off x="0" y="0"/>
+          <a:ext cx="0" cy="0"/>
+          <a:chOff x="0" y="0"/>
+          <a:chExt cx="0" cy="0"/>
+        </a:xfrm>
+      </p:grpSpPr>
+      <p:sp>
+        <p:nvSpPr>
+          <p:cNvPr id="2" name="标题 1">
+            <a:extLst>
+              <a:ext uri="{FF2B5EF4-FFF2-40B4-BE49-F238E27FC236}">
                 <a16:creationId xmlns:a16="http://schemas.microsoft.com/office/drawing/2014/main" id="{63A09A91-A650-9D4B-BE61-62F8F8FF4EE8}"/>
               </a:ext>
             </a:extLst>
@@ -13397,7 +13785,7 @@
 </p:sld>
 </file>
 
-<file path=ppt/slides/slide32.xml><?xml version="1.0" encoding="utf-8"?>
+<file path=ppt/slides/slide33.xml><?xml version="1.0" encoding="utf-8"?>
 <p:sld xmlns:a="http://schemas.openxmlformats.org/drawingml/2006/main" xmlns:r="http://schemas.openxmlformats.org/officeDocument/2006/relationships" xmlns:p="http://schemas.openxmlformats.org/presentationml/2006/main">
   <p:cSld>
     <p:spTree>

</xml_diff>